<commit_message>
Updating and fixing the presentation for topic 1
</commit_message>
<xml_diff>
--- a/Courses/Software-Sciences/Module-3-Databases-New/01-IT-Systems/01-IT-Systems.pptx
+++ b/Courses/Software-Sciences/Module-3-Databases-New/01-IT-Systems/01-IT-Systems.pptx
@@ -135,7 +135,7 @@
   </p:defaultTextStyle>
   <p:extLst>
     <p:ext uri="{521415D9-36F7-43E2-AB2F-B90AF26B5E84}">
-      <p14:sectionLst xmlns="" xmlns:p14="http://schemas.microsoft.com/office/powerpoint/2010/main">
+      <p14:sectionLst xmlns:p14="http://schemas.microsoft.com/office/powerpoint/2010/main" xmlns="">
         <p14:section name="Intro" id="{A0C7653D-1924-4F56-9E27-AA2B21F1DA92}">
           <p14:sldIdLst>
             <p14:sldId id="503"/>
@@ -236,7 +236,7 @@
       </p14:sectionLst>
     </p:ext>
     <p:ext uri="{EFAFB233-063F-42B5-8137-9DF3F51BA10A}">
-      <p15:sldGuideLst xmlns="" xmlns:p15="http://schemas.microsoft.com/office/powerpoint/2012/main">
+      <p15:sldGuideLst xmlns:p15="http://schemas.microsoft.com/office/powerpoint/2012/main" xmlns="">
         <p15:guide id="1" orient="horz" pos="2184" userDrawn="1">
           <p15:clr>
             <a:srgbClr val="A4A3A4"/>
@@ -250,7 +250,7 @@
       </p15:sldGuideLst>
     </p:ext>
     <p:ext uri="{2D200454-40CA-4A62-9FC3-DE9A4176ACB9}">
-      <p15:notesGuideLst xmlns="" xmlns:p15="http://schemas.microsoft.com/office/powerpoint/2012/main"/>
+      <p15:notesGuideLst xmlns:p15="http://schemas.microsoft.com/office/powerpoint/2012/main" xmlns=""/>
     </p:ext>
   </p:extLst>
 </p:presentation>
@@ -283,7 +283,7 @@
           <p:cNvPr id="2" name="Header Placeholder 1">
             <a:extLst>
               <a:ext uri="{FF2B5EF4-FFF2-40B4-BE49-F238E27FC236}">
-                <a16:creationId xmlns="" xmlns:a16="http://schemas.microsoft.com/office/drawing/2014/main" id="{56F20103-83CC-4A54-8FDE-9D37FC2629C0}"/>
+                <a16:creationId xmlns:a16="http://schemas.microsoft.com/office/drawing/2014/main" xmlns="" id="{56F20103-83CC-4A54-8FDE-9D37FC2629C0}"/>
               </a:ext>
             </a:extLst>
           </p:cNvPr>
@@ -320,7 +320,7 @@
           <p:cNvPr id="3" name="Date Placeholder 2">
             <a:extLst>
               <a:ext uri="{FF2B5EF4-FFF2-40B4-BE49-F238E27FC236}">
-                <a16:creationId xmlns="" xmlns:a16="http://schemas.microsoft.com/office/drawing/2014/main" id="{27A53962-26EF-44E4-9E69-61B1727AB1C2}"/>
+                <a16:creationId xmlns:a16="http://schemas.microsoft.com/office/drawing/2014/main" xmlns="" id="{27A53962-26EF-44E4-9E69-61B1727AB1C2}"/>
               </a:ext>
             </a:extLst>
           </p:cNvPr>
@@ -351,7 +351,7 @@
             <a:fld id="{4E087215-0C8F-4762-A664-737A353EC9A4}" type="datetimeFigureOut">
               <a:rPr lang="bg-BG" smtClean="0"/>
               <a:pPr/>
-              <a:t>4.8.2023 г.</a:t>
+              <a:t>14.8.2023 г.</a:t>
             </a:fld>
             <a:endParaRPr lang="bg-BG"/>
           </a:p>
@@ -362,7 +362,7 @@
           <p:cNvPr id="4" name="Footer Placeholder 3">
             <a:extLst>
               <a:ext uri="{FF2B5EF4-FFF2-40B4-BE49-F238E27FC236}">
-                <a16:creationId xmlns="" xmlns:a16="http://schemas.microsoft.com/office/drawing/2014/main" id="{28A6967E-448F-4887-8FCB-34482EFBCC74}"/>
+                <a16:creationId xmlns:a16="http://schemas.microsoft.com/office/drawing/2014/main" xmlns="" id="{28A6967E-448F-4887-8FCB-34482EFBCC74}"/>
               </a:ext>
             </a:extLst>
           </p:cNvPr>
@@ -412,7 +412,7 @@
           <p:cNvPr id="5" name="Slide Number Placeholder 4">
             <a:extLst>
               <a:ext uri="{FF2B5EF4-FFF2-40B4-BE49-F238E27FC236}">
-                <a16:creationId xmlns="" xmlns:a16="http://schemas.microsoft.com/office/drawing/2014/main" id="{8B6554C2-DDBA-40E2-9536-53A07EC50274}"/>
+                <a16:creationId xmlns:a16="http://schemas.microsoft.com/office/drawing/2014/main" xmlns="" id="{8B6554C2-DDBA-40E2-9536-53A07EC50274}"/>
               </a:ext>
             </a:extLst>
           </p:cNvPr>
@@ -452,7 +452,7 @@
     </p:spTree>
     <p:extLst>
       <p:ext uri="{BB962C8B-B14F-4D97-AF65-F5344CB8AC3E}">
-        <p14:creationId xmlns="" xmlns:p14="http://schemas.microsoft.com/office/powerpoint/2010/main" val="4150602968"/>
+        <p14:creationId xmlns:p14="http://schemas.microsoft.com/office/powerpoint/2010/main" xmlns="" val="4150602968"/>
       </p:ext>
     </p:extLst>
   </p:cSld>
@@ -544,7 +544,7 @@
             <a:fld id="{72D84649-876A-46C9-8472-14CB09C070D8}" type="datetimeFigureOut">
               <a:rPr lang="en-US" smtClean="0"/>
               <a:pPr/>
-              <a:t>8/4/2023</a:t>
+              <a:t>8/14/2023</a:t>
             </a:fld>
             <a:endParaRPr lang="en-US"/>
           </a:p>
@@ -683,7 +683,7 @@
           <p:cNvPr id="8" name="Footer Placeholder 7">
             <a:extLst>
               <a:ext uri="{FF2B5EF4-FFF2-40B4-BE49-F238E27FC236}">
-                <a16:creationId xmlns="" xmlns:a16="http://schemas.microsoft.com/office/drawing/2014/main" id="{CAC3A49B-3196-44DF-AC28-085C72EFBFF0}"/>
+                <a16:creationId xmlns:a16="http://schemas.microsoft.com/office/drawing/2014/main" xmlns="" id="{CAC3A49B-3196-44DF-AC28-085C72EFBFF0}"/>
               </a:ext>
             </a:extLst>
           </p:cNvPr>
@@ -731,7 +731,7 @@
     </p:spTree>
     <p:extLst>
       <p:ext uri="{BB962C8B-B14F-4D97-AF65-F5344CB8AC3E}">
-        <p14:creationId xmlns="" xmlns:p14="http://schemas.microsoft.com/office/powerpoint/2010/main" val="1530847692"/>
+        <p14:creationId xmlns:p14="http://schemas.microsoft.com/office/powerpoint/2010/main" xmlns="" val="1530847692"/>
       </p:ext>
     </p:extLst>
   </p:cSld>
@@ -878,7 +878,7 @@
           <p:cNvPr id="8" name="Slide Image Placeholder 7">
             <a:extLst>
               <a:ext uri="{FF2B5EF4-FFF2-40B4-BE49-F238E27FC236}">
-                <a16:creationId xmlns="" xmlns:a16="http://schemas.microsoft.com/office/drawing/2014/main" id="{78811095-27E9-49AB-972B-D4E20B3963A6}"/>
+                <a16:creationId xmlns:a16="http://schemas.microsoft.com/office/drawing/2014/main" xmlns="" id="{78811095-27E9-49AB-972B-D4E20B3963A6}"/>
               </a:ext>
             </a:extLst>
           </p:cNvPr>
@@ -896,7 +896,7 @@
           <p:cNvPr id="9" name="Notes Placeholder 8">
             <a:extLst>
               <a:ext uri="{FF2B5EF4-FFF2-40B4-BE49-F238E27FC236}">
-                <a16:creationId xmlns="" xmlns:a16="http://schemas.microsoft.com/office/drawing/2014/main" id="{E923224B-0CC3-475A-8628-8A90751AE61A}"/>
+                <a16:creationId xmlns:a16="http://schemas.microsoft.com/office/drawing/2014/main" xmlns="" id="{E923224B-0CC3-475A-8628-8A90751AE61A}"/>
               </a:ext>
             </a:extLst>
           </p:cNvPr>
@@ -921,7 +921,7 @@
           <p:cNvPr id="2" name="Footer Placeholder 1">
             <a:extLst>
               <a:ext uri="{FF2B5EF4-FFF2-40B4-BE49-F238E27FC236}">
-                <a16:creationId xmlns="" xmlns:a16="http://schemas.microsoft.com/office/drawing/2014/main" id="{3288A3F3-90B1-4930-8D00-5603BDABEF10}"/>
+                <a16:creationId xmlns:a16="http://schemas.microsoft.com/office/drawing/2014/main" xmlns="" id="{3288A3F3-90B1-4930-8D00-5603BDABEF10}"/>
               </a:ext>
             </a:extLst>
           </p:cNvPr>
@@ -957,7 +957,7 @@
     </p:spTree>
     <p:extLst>
       <p:ext uri="{BB962C8B-B14F-4D97-AF65-F5344CB8AC3E}">
-        <p14:creationId xmlns="" xmlns:p14="http://schemas.microsoft.com/office/powerpoint/2010/main" val="2594489433"/>
+        <p14:creationId xmlns:p14="http://schemas.microsoft.com/office/powerpoint/2010/main" xmlns="" val="2594489433"/>
       </p:ext>
     </p:extLst>
   </p:cSld>
@@ -1011,6 +1011,91 @@
           <a:bodyPr/>
           <a:lstStyle/>
           <a:p>
+            <a:endParaRPr lang="x-none"/>
+          </a:p>
+        </p:txBody>
+      </p:sp>
+      <p:sp>
+        <p:nvSpPr>
+          <p:cNvPr id="4" name="Slide Number Placeholder 3"/>
+          <p:cNvSpPr>
+            <a:spLocks noGrp="1"/>
+          </p:cNvSpPr>
+          <p:nvPr>
+            <p:ph type="sldNum" sz="quarter" idx="5"/>
+          </p:nvPr>
+        </p:nvSpPr>
+        <p:spPr/>
+        <p:txBody>
+          <a:bodyPr/>
+          <a:lstStyle/>
+          <a:p>
+            <a:fld id="{85C0F205-FB23-4B4A-AA1E-CC80DEDB9B7E}" type="slidenum">
+              <a:rPr lang="x-none" smtClean="0"/>
+              <a:pPr/>
+              <a:t>23</a:t>
+            </a:fld>
+            <a:endParaRPr lang="x-none"/>
+          </a:p>
+        </p:txBody>
+      </p:sp>
+    </p:spTree>
+    <p:extLst>
+      <p:ext uri="{BB962C8B-B14F-4D97-AF65-F5344CB8AC3E}">
+        <p14:creationId xmlns="" xmlns:p14="http://schemas.microsoft.com/office/powerpoint/2010/main" val="1201445929"/>
+      </p:ext>
+    </p:extLst>
+  </p:cSld>
+  <p:clrMapOvr>
+    <a:masterClrMapping/>
+  </p:clrMapOvr>
+</p:notes>
+</file>
+
+<file path=ppt/notesSlides/notesSlide11.xml><?xml version="1.0" encoding="utf-8"?>
+<p:notes xmlns:a="http://schemas.openxmlformats.org/drawingml/2006/main" xmlns:r="http://schemas.openxmlformats.org/officeDocument/2006/relationships" xmlns:p="http://schemas.openxmlformats.org/presentationml/2006/main">
+  <p:cSld>
+    <p:spTree>
+      <p:nvGrpSpPr>
+        <p:cNvPr id="1" name=""/>
+        <p:cNvGrpSpPr/>
+        <p:nvPr/>
+      </p:nvGrpSpPr>
+      <p:grpSpPr>
+        <a:xfrm>
+          <a:off x="0" y="0"/>
+          <a:ext cx="0" cy="0"/>
+          <a:chOff x="0" y="0"/>
+          <a:chExt cx="0" cy="0"/>
+        </a:xfrm>
+      </p:grpSpPr>
+      <p:sp>
+        <p:nvSpPr>
+          <p:cNvPr id="2" name="Slide Image Placeholder 1"/>
+          <p:cNvSpPr>
+            <a:spLocks noGrp="1" noRot="1" noChangeAspect="1"/>
+          </p:cNvSpPr>
+          <p:nvPr>
+            <p:ph type="sldImg"/>
+          </p:nvPr>
+        </p:nvSpPr>
+        <p:spPr/>
+      </p:sp>
+      <p:sp>
+        <p:nvSpPr>
+          <p:cNvPr id="3" name="Notes Placeholder 2"/>
+          <p:cNvSpPr>
+            <a:spLocks noGrp="1"/>
+          </p:cNvSpPr>
+          <p:nvPr>
+            <p:ph type="body" idx="1"/>
+          </p:nvPr>
+        </p:nvSpPr>
+        <p:spPr/>
+        <p:txBody>
+          <a:bodyPr/>
+          <a:lstStyle/>
+          <a:p>
             <a:endParaRPr lang="en-US" dirty="0"/>
           </a:p>
         </p:txBody>
@@ -1020,7 +1105,7 @@
           <p:cNvPr id="6" name="Slide Number Placeholder 5">
             <a:extLst>
               <a:ext uri="{FF2B5EF4-FFF2-40B4-BE49-F238E27FC236}">
-                <a16:creationId xmlns:a16="http://schemas.microsoft.com/office/drawing/2014/main" xmlns="" id="{6627548A-4D3C-449B-81A5-FA4BE4628490}"/>
+                <a16:creationId xmlns="" xmlns:a16="http://schemas.microsoft.com/office/drawing/2014/main" id="{6627548A-4D3C-449B-81A5-FA4BE4628490}"/>
               </a:ext>
             </a:extLst>
           </p:cNvPr>
@@ -1150,7 +1235,7 @@
           <p:cNvPr id="4" name="Footer Placeholder 3">
             <a:extLst>
               <a:ext uri="{FF2B5EF4-FFF2-40B4-BE49-F238E27FC236}">
-                <a16:creationId xmlns:a16="http://schemas.microsoft.com/office/drawing/2014/main" xmlns="" id="{D2472CE7-61C1-4B7B-B0C8-5A45F0178717}"/>
+                <a16:creationId xmlns="" xmlns:a16="http://schemas.microsoft.com/office/drawing/2014/main" id="{D2472CE7-61C1-4B7B-B0C8-5A45F0178717}"/>
               </a:ext>
             </a:extLst>
           </p:cNvPr>
@@ -1186,7 +1271,7 @@
     </p:spTree>
     <p:extLst>
       <p:ext uri="{BB962C8B-B14F-4D97-AF65-F5344CB8AC3E}">
-        <p14:creationId xmlns:p14="http://schemas.microsoft.com/office/powerpoint/2010/main" xmlns="" val="729041308"/>
+        <p14:creationId xmlns="" xmlns:p14="http://schemas.microsoft.com/office/powerpoint/2010/main" val="729041308"/>
       </p:ext>
     </p:extLst>
   </p:cSld>
@@ -1276,7 +1361,7 @@
           <p:cNvPr id="6" name="Footer Placeholder 7">
             <a:extLst>
               <a:ext uri="{FF2B5EF4-FFF2-40B4-BE49-F238E27FC236}">
-                <a16:creationId xmlns="" xmlns:a16="http://schemas.microsoft.com/office/drawing/2014/main" id="{723695C8-404A-439D-AB5B-CFE5A08C09D4}"/>
+                <a16:creationId xmlns:a16="http://schemas.microsoft.com/office/drawing/2014/main" xmlns="" id="{723695C8-404A-439D-AB5B-CFE5A08C09D4}"/>
               </a:ext>
             </a:extLst>
           </p:cNvPr>
@@ -1324,7 +1409,7 @@
     </p:spTree>
     <p:extLst>
       <p:ext uri="{BB962C8B-B14F-4D97-AF65-F5344CB8AC3E}">
-        <p14:creationId xmlns="" xmlns:p14="http://schemas.microsoft.com/office/powerpoint/2010/main" val="198067426"/>
+        <p14:creationId xmlns:p14="http://schemas.microsoft.com/office/powerpoint/2010/main" xmlns="" val="198067426"/>
       </p:ext>
     </p:extLst>
   </p:cSld>
@@ -1419,7 +1504,7 @@
           <p:cNvPr id="6" name="Footer Placeholder 7">
             <a:extLst>
               <a:ext uri="{FF2B5EF4-FFF2-40B4-BE49-F238E27FC236}">
-                <a16:creationId xmlns="" xmlns:a16="http://schemas.microsoft.com/office/drawing/2014/main" id="{4261BFA0-B0BA-4FDF-AE00-DE640F85475F}"/>
+                <a16:creationId xmlns:a16="http://schemas.microsoft.com/office/drawing/2014/main" xmlns="" id="{4261BFA0-B0BA-4FDF-AE00-DE640F85475F}"/>
               </a:ext>
             </a:extLst>
           </p:cNvPr>
@@ -1467,7 +1552,7 @@
     </p:spTree>
     <p:extLst>
       <p:ext uri="{BB962C8B-B14F-4D97-AF65-F5344CB8AC3E}">
-        <p14:creationId xmlns="" xmlns:p14="http://schemas.microsoft.com/office/powerpoint/2010/main" val="916297846"/>
+        <p14:creationId xmlns:p14="http://schemas.microsoft.com/office/powerpoint/2010/main" xmlns="" val="916297846"/>
       </p:ext>
     </p:extLst>
   </p:cSld>
@@ -1677,7 +1762,7 @@
           <p:cNvPr id="6" name="Footer Placeholder 7">
             <a:extLst>
               <a:ext uri="{FF2B5EF4-FFF2-40B4-BE49-F238E27FC236}">
-                <a16:creationId xmlns="" xmlns:a16="http://schemas.microsoft.com/office/drawing/2014/main" id="{2A0F5137-53C7-4812-92AA-97D6AA7A07C0}"/>
+                <a16:creationId xmlns:a16="http://schemas.microsoft.com/office/drawing/2014/main" xmlns="" id="{2A0F5137-53C7-4812-92AA-97D6AA7A07C0}"/>
               </a:ext>
             </a:extLst>
           </p:cNvPr>
@@ -1725,7 +1810,7 @@
     </p:spTree>
     <p:extLst>
       <p:ext uri="{BB962C8B-B14F-4D97-AF65-F5344CB8AC3E}">
-        <p14:creationId xmlns="" xmlns:p14="http://schemas.microsoft.com/office/powerpoint/2010/main" val="988332044"/>
+        <p14:creationId xmlns:p14="http://schemas.microsoft.com/office/powerpoint/2010/main" xmlns="" val="988332044"/>
       </p:ext>
     </p:extLst>
   </p:cSld>
@@ -1788,7 +1873,7 @@
           <p:cNvPr id="7" name="Slide Number Placeholder 5">
             <a:extLst>
               <a:ext uri="{FF2B5EF4-FFF2-40B4-BE49-F238E27FC236}">
-                <a16:creationId xmlns="" xmlns:a16="http://schemas.microsoft.com/office/drawing/2014/main" id="{BD88B0D8-949C-482D-990A-2DAB14AD4AD1}"/>
+                <a16:creationId xmlns:a16="http://schemas.microsoft.com/office/drawing/2014/main" xmlns="" id="{BD88B0D8-949C-482D-990A-2DAB14AD4AD1}"/>
               </a:ext>
             </a:extLst>
           </p:cNvPr>
@@ -1918,7 +2003,7 @@
           <p:cNvPr id="4" name="Footer Placeholder 3">
             <a:extLst>
               <a:ext uri="{FF2B5EF4-FFF2-40B4-BE49-F238E27FC236}">
-                <a16:creationId xmlns="" xmlns:a16="http://schemas.microsoft.com/office/drawing/2014/main" id="{58474633-D38D-4432-867B-70F325FA7016}"/>
+                <a16:creationId xmlns:a16="http://schemas.microsoft.com/office/drawing/2014/main" xmlns="" id="{58474633-D38D-4432-867B-70F325FA7016}"/>
               </a:ext>
             </a:extLst>
           </p:cNvPr>
@@ -1954,7 +2039,7 @@
     </p:spTree>
     <p:extLst>
       <p:ext uri="{BB962C8B-B14F-4D97-AF65-F5344CB8AC3E}">
-        <p14:creationId xmlns="" xmlns:p14="http://schemas.microsoft.com/office/powerpoint/2010/main" val="1321098562"/>
+        <p14:creationId xmlns:p14="http://schemas.microsoft.com/office/powerpoint/2010/main" xmlns="" val="1321098562"/>
       </p:ext>
     </p:extLst>
   </p:cSld>
@@ -2120,6 +2205,121 @@
         </p:nvSpPr>
         <p:spPr/>
         <p:txBody>
+          <a:bodyPr>
+            <a:normAutofit/>
+          </a:bodyPr>
+          <a:lstStyle/>
+          <a:p>
+            <a:endParaRPr lang="en-US" dirty="0"/>
+          </a:p>
+        </p:txBody>
+      </p:sp>
+      <p:sp>
+        <p:nvSpPr>
+          <p:cNvPr id="4" name="Slide Number Placeholder 3"/>
+          <p:cNvSpPr>
+            <a:spLocks noGrp="1"/>
+          </p:cNvSpPr>
+          <p:nvPr>
+            <p:ph type="sldNum" sz="quarter" idx="10"/>
+          </p:nvPr>
+        </p:nvSpPr>
+        <p:spPr/>
+        <p:txBody>
+          <a:bodyPr/>
+          <a:lstStyle/>
+          <a:p>
+            <a:fld id="{2BF067CD-8E6B-4360-9AA8-C5DF2A48A6D1}" type="slidenum">
+              <a:rPr lang="en-US" smtClean="0"/>
+              <a:pPr/>
+              <a:t>20</a:t>
+            </a:fld>
+            <a:endParaRPr lang="en-US"/>
+          </a:p>
+        </p:txBody>
+      </p:sp>
+      <p:sp>
+        <p:nvSpPr>
+          <p:cNvPr id="5" name="Footer Placeholder 4"/>
+          <p:cNvSpPr>
+            <a:spLocks noGrp="1"/>
+          </p:cNvSpPr>
+          <p:nvPr>
+            <p:ph type="ftr" sz="quarter" idx="11"/>
+          </p:nvPr>
+        </p:nvSpPr>
+        <p:spPr/>
+        <p:txBody>
+          <a:bodyPr/>
+          <a:lstStyle/>
+          <a:p>
+            <a:r>
+              <a:rPr lang="en-US" smtClean="0"/>
+              <a:t>© SoftUni – </a:t>
+            </a:r>
+            <a:r>
+              <a:rPr lang="en-US" u="sng" smtClean="0">
+                <a:hlinkClick r:id="rId3"/>
+              </a:rPr>
+              <a:t>https://softuni.org</a:t>
+            </a:r>
+            <a:r>
+              <a:rPr lang="en-US" smtClean="0"/>
+              <a:t>. Copyrighted document. Unauthorized copy or reproduction is not permitted.</a:t>
+            </a:r>
+            <a:endParaRPr lang="en-US"/>
+          </a:p>
+        </p:txBody>
+      </p:sp>
+    </p:spTree>
+  </p:cSld>
+  <p:clrMapOvr>
+    <a:masterClrMapping/>
+  </p:clrMapOvr>
+</p:notes>
+</file>
+
+<file path=ppt/notesSlides/notesSlide9.xml><?xml version="1.0" encoding="utf-8"?>
+<p:notes xmlns:a="http://schemas.openxmlformats.org/drawingml/2006/main" xmlns:r="http://schemas.openxmlformats.org/officeDocument/2006/relationships" xmlns:p="http://schemas.openxmlformats.org/presentationml/2006/main">
+  <p:cSld>
+    <p:spTree>
+      <p:nvGrpSpPr>
+        <p:cNvPr id="1" name=""/>
+        <p:cNvGrpSpPr/>
+        <p:nvPr/>
+      </p:nvGrpSpPr>
+      <p:grpSpPr>
+        <a:xfrm>
+          <a:off x="0" y="0"/>
+          <a:ext cx="0" cy="0"/>
+          <a:chOff x="0" y="0"/>
+          <a:chExt cx="0" cy="0"/>
+        </a:xfrm>
+      </p:grpSpPr>
+      <p:sp>
+        <p:nvSpPr>
+          <p:cNvPr id="2" name="Slide Image Placeholder 1"/>
+          <p:cNvSpPr>
+            <a:spLocks noGrp="1" noRot="1" noChangeAspect="1"/>
+          </p:cNvSpPr>
+          <p:nvPr>
+            <p:ph type="sldImg"/>
+          </p:nvPr>
+        </p:nvSpPr>
+        <p:spPr/>
+      </p:sp>
+      <p:sp>
+        <p:nvSpPr>
+          <p:cNvPr id="3" name="Notes Placeholder 2"/>
+          <p:cNvSpPr>
+            <a:spLocks noGrp="1"/>
+          </p:cNvSpPr>
+          <p:nvPr>
+            <p:ph type="body" idx="1"/>
+          </p:nvPr>
+        </p:nvSpPr>
+        <p:spPr/>
+        <p:txBody>
           <a:bodyPr/>
           <a:lstStyle/>
           <a:p>
@@ -2132,7 +2332,7 @@
           <p:cNvPr id="7" name="Slide Number Placeholder 5">
             <a:extLst>
               <a:ext uri="{FF2B5EF4-FFF2-40B4-BE49-F238E27FC236}">
-                <a16:creationId xmlns:a16="http://schemas.microsoft.com/office/drawing/2014/main" xmlns="" id="{E65F1CA9-65DC-416B-8882-B3A5E415CE67}"/>
+                <a16:creationId xmlns="" xmlns:a16="http://schemas.microsoft.com/office/drawing/2014/main" id="{E65F1CA9-65DC-416B-8882-B3A5E415CE67}"/>
               </a:ext>
             </a:extLst>
           </p:cNvPr>
@@ -2262,7 +2462,7 @@
           <p:cNvPr id="4" name="Footer Placeholder 3">
             <a:extLst>
               <a:ext uri="{FF2B5EF4-FFF2-40B4-BE49-F238E27FC236}">
-                <a16:creationId xmlns:a16="http://schemas.microsoft.com/office/drawing/2014/main" xmlns="" id="{C5BD11C3-9FCD-4EAE-876D-E766924FAFF2}"/>
+                <a16:creationId xmlns="" xmlns:a16="http://schemas.microsoft.com/office/drawing/2014/main" id="{C5BD11C3-9FCD-4EAE-876D-E766924FAFF2}"/>
               </a:ext>
             </a:extLst>
           </p:cNvPr>
@@ -2298,92 +2498,7 @@
     </p:spTree>
     <p:extLst>
       <p:ext uri="{BB962C8B-B14F-4D97-AF65-F5344CB8AC3E}">
-        <p14:creationId xmlns:p14="http://schemas.microsoft.com/office/powerpoint/2010/main" xmlns="" val="1860974293"/>
-      </p:ext>
-    </p:extLst>
-  </p:cSld>
-  <p:clrMapOvr>
-    <a:masterClrMapping/>
-  </p:clrMapOvr>
-</p:notes>
-</file>
-
-<file path=ppt/notesSlides/notesSlide9.xml><?xml version="1.0" encoding="utf-8"?>
-<p:notes xmlns:a="http://schemas.openxmlformats.org/drawingml/2006/main" xmlns:r="http://schemas.openxmlformats.org/officeDocument/2006/relationships" xmlns:p="http://schemas.openxmlformats.org/presentationml/2006/main">
-  <p:cSld>
-    <p:spTree>
-      <p:nvGrpSpPr>
-        <p:cNvPr id="1" name=""/>
-        <p:cNvGrpSpPr/>
-        <p:nvPr/>
-      </p:nvGrpSpPr>
-      <p:grpSpPr>
-        <a:xfrm>
-          <a:off x="0" y="0"/>
-          <a:ext cx="0" cy="0"/>
-          <a:chOff x="0" y="0"/>
-          <a:chExt cx="0" cy="0"/>
-        </a:xfrm>
-      </p:grpSpPr>
-      <p:sp>
-        <p:nvSpPr>
-          <p:cNvPr id="2" name="Slide Image Placeholder 1"/>
-          <p:cNvSpPr>
-            <a:spLocks noGrp="1" noRot="1" noChangeAspect="1"/>
-          </p:cNvSpPr>
-          <p:nvPr>
-            <p:ph type="sldImg"/>
-          </p:nvPr>
-        </p:nvSpPr>
-        <p:spPr/>
-      </p:sp>
-      <p:sp>
-        <p:nvSpPr>
-          <p:cNvPr id="3" name="Notes Placeholder 2"/>
-          <p:cNvSpPr>
-            <a:spLocks noGrp="1"/>
-          </p:cNvSpPr>
-          <p:nvPr>
-            <p:ph type="body" idx="1"/>
-          </p:nvPr>
-        </p:nvSpPr>
-        <p:spPr/>
-        <p:txBody>
-          <a:bodyPr/>
-          <a:lstStyle/>
-          <a:p>
-            <a:endParaRPr lang="x-none"/>
-          </a:p>
-        </p:txBody>
-      </p:sp>
-      <p:sp>
-        <p:nvSpPr>
-          <p:cNvPr id="4" name="Slide Number Placeholder 3"/>
-          <p:cNvSpPr>
-            <a:spLocks noGrp="1"/>
-          </p:cNvSpPr>
-          <p:nvPr>
-            <p:ph type="sldNum" sz="quarter" idx="5"/>
-          </p:nvPr>
-        </p:nvSpPr>
-        <p:spPr/>
-        <p:txBody>
-          <a:bodyPr/>
-          <a:lstStyle/>
-          <a:p>
-            <a:fld id="{85C0F205-FB23-4B4A-AA1E-CC80DEDB9B7E}" type="slidenum">
-              <a:rPr lang="x-none" smtClean="0"/>
-              <a:pPr/>
-              <a:t>23</a:t>
-            </a:fld>
-            <a:endParaRPr lang="x-none"/>
-          </a:p>
-        </p:txBody>
-      </p:sp>
-    </p:spTree>
-    <p:extLst>
-      <p:ext uri="{BB962C8B-B14F-4D97-AF65-F5344CB8AC3E}">
-        <p14:creationId xmlns:p14="http://schemas.microsoft.com/office/powerpoint/2010/main" xmlns="" val="1201445929"/>
+        <p14:creationId xmlns="" xmlns:p14="http://schemas.microsoft.com/office/powerpoint/2010/main" val="1860974293"/>
       </p:ext>
     </p:extLst>
   </p:cSld>
@@ -2415,7 +2530,7 @@
           <p:cNvPr id="16" name="Rectangle Bottom">
             <a:extLst>
               <a:ext uri="{FF2B5EF4-FFF2-40B4-BE49-F238E27FC236}">
-                <a16:creationId xmlns="" xmlns:a16="http://schemas.microsoft.com/office/drawing/2014/main" id="{6854D183-0374-4B3E-B2CE-32F308A81591}"/>
+                <a16:creationId xmlns:a16="http://schemas.microsoft.com/office/drawing/2014/main" xmlns="" id="{6854D183-0374-4B3E-B2CE-32F308A81591}"/>
               </a:ext>
             </a:extLst>
           </p:cNvPr>
@@ -2496,7 +2611,7 @@
           <p:cNvPr id="14" name="Picture Logo SoftUni" descr="SoftUni logo">
             <a:extLst>
               <a:ext uri="{FF2B5EF4-FFF2-40B4-BE49-F238E27FC236}">
-                <a16:creationId xmlns="" xmlns:a16="http://schemas.microsoft.com/office/drawing/2014/main" id="{C4D6B2A2-DFF0-4712-BFEC-6676BEC99FEC}"/>
+                <a16:creationId xmlns:a16="http://schemas.microsoft.com/office/drawing/2014/main" xmlns="" id="{C4D6B2A2-DFF0-4712-BFEC-6676BEC99FEC}"/>
               </a:ext>
             </a:extLst>
           </p:cNvPr>
@@ -2519,7 +2634,7 @@
             </a:clrChange>
             <a:extLst>
               <a:ext uri="{28A0092B-C50C-407E-A947-70E740481C1C}">
-                <a14:useLocalDpi xmlns="" xmlns:a14="http://schemas.microsoft.com/office/drawing/2010/main" val="0"/>
+                <a14:useLocalDpi xmlns:a14="http://schemas.microsoft.com/office/drawing/2010/main" xmlns="" val="0"/>
               </a:ext>
             </a:extLst>
           </a:blip>
@@ -2542,7 +2657,7 @@
           <p:cNvPr id="31" name="Text Placeholder Company Site">
             <a:extLst>
               <a:ext uri="{FF2B5EF4-FFF2-40B4-BE49-F238E27FC236}">
-                <a16:creationId xmlns="" xmlns:a16="http://schemas.microsoft.com/office/drawing/2014/main" id="{3E6B87B7-9D33-4EBB-BD4F-C0436BA3FD72}"/>
+                <a16:creationId xmlns:a16="http://schemas.microsoft.com/office/drawing/2014/main" xmlns="" id="{3E6B87B7-9D33-4EBB-BD4F-C0436BA3FD72}"/>
               </a:ext>
             </a:extLst>
           </p:cNvPr>
@@ -2604,7 +2719,7 @@
           <p:cNvPr id="30" name="Text Placeholder Company Name">
             <a:extLst>
               <a:ext uri="{FF2B5EF4-FFF2-40B4-BE49-F238E27FC236}">
-                <a16:creationId xmlns="" xmlns:a16="http://schemas.microsoft.com/office/drawing/2014/main" id="{2EA92DCA-4DB5-4D03-ACD3-A6A296592D0C}"/>
+                <a16:creationId xmlns:a16="http://schemas.microsoft.com/office/drawing/2014/main" xmlns="" id="{2EA92DCA-4DB5-4D03-ACD3-A6A296592D0C}"/>
               </a:ext>
             </a:extLst>
           </p:cNvPr>
@@ -2666,7 +2781,7 @@
           <p:cNvPr id="35" name="Picture SoftUni Mascot" descr="SoftUni mascot">
             <a:extLst>
               <a:ext uri="{FF2B5EF4-FFF2-40B4-BE49-F238E27FC236}">
-                <a16:creationId xmlns="" xmlns:a16="http://schemas.microsoft.com/office/drawing/2014/main" id="{951E7DA9-C5F0-43D9-B013-3BDF9EEF029D}"/>
+                <a16:creationId xmlns:a16="http://schemas.microsoft.com/office/drawing/2014/main" xmlns="" id="{951E7DA9-C5F0-43D9-B013-3BDF9EEF029D}"/>
               </a:ext>
             </a:extLst>
           </p:cNvPr>
@@ -2679,7 +2794,7 @@
           <a:blip r:embed="rId3" cstate="print">
             <a:extLst>
               <a:ext uri="{28A0092B-C50C-407E-A947-70E740481C1C}">
-                <a14:useLocalDpi xmlns="" xmlns:a14="http://schemas.microsoft.com/office/drawing/2010/main" val="0"/>
+                <a14:useLocalDpi xmlns:a14="http://schemas.microsoft.com/office/drawing/2010/main" xmlns="" val="0"/>
               </a:ext>
             </a:extLst>
           </a:blip>
@@ -2702,7 +2817,7 @@
             <a:hlinkClick r:id="rId4"/>
             <a:extLst>
               <a:ext uri="{FF2B5EF4-FFF2-40B4-BE49-F238E27FC236}">
-                <a16:creationId xmlns="" xmlns:a16="http://schemas.microsoft.com/office/drawing/2014/main" id="{F2315EB3-3FE4-4D3B-921E-5F209CEC13CB}"/>
+                <a16:creationId xmlns:a16="http://schemas.microsoft.com/office/drawing/2014/main" xmlns="" id="{F2315EB3-3FE4-4D3B-921E-5F209CEC13CB}"/>
               </a:ext>
             </a:extLst>
           </p:cNvPr>
@@ -2725,7 +2840,7 @@
             </a:clrChange>
             <a:extLst>
               <a:ext uri="{28A0092B-C50C-407E-A947-70E740481C1C}">
-                <a14:useLocalDpi xmlns="" xmlns:a14="http://schemas.microsoft.com/office/drawing/2010/main" val="0"/>
+                <a14:useLocalDpi xmlns:a14="http://schemas.microsoft.com/office/drawing/2010/main" xmlns="" val="0"/>
               </a:ext>
             </a:extLst>
           </a:blip>
@@ -2748,7 +2863,7 @@
           <p:cNvPr id="40" name="Text Placeholder Author Position">
             <a:extLst>
               <a:ext uri="{FF2B5EF4-FFF2-40B4-BE49-F238E27FC236}">
-                <a16:creationId xmlns="" xmlns:a16="http://schemas.microsoft.com/office/drawing/2014/main" id="{CD940256-851E-46C8-8BFB-A5ECA6C7DA07}"/>
+                <a16:creationId xmlns:a16="http://schemas.microsoft.com/office/drawing/2014/main" xmlns="" id="{CD940256-851E-46C8-8BFB-A5ECA6C7DA07}"/>
               </a:ext>
             </a:extLst>
           </p:cNvPr>
@@ -2808,7 +2923,7 @@
           <p:cNvPr id="36" name="Text Placeholder Author Name">
             <a:extLst>
               <a:ext uri="{FF2B5EF4-FFF2-40B4-BE49-F238E27FC236}">
-                <a16:creationId xmlns="" xmlns:a16="http://schemas.microsoft.com/office/drawing/2014/main" id="{3B21F47B-DE1F-442D-A2B7-6866F8786704}"/>
+                <a16:creationId xmlns:a16="http://schemas.microsoft.com/office/drawing/2014/main" xmlns="" id="{3B21F47B-DE1F-442D-A2B7-6866F8786704}"/>
               </a:ext>
             </a:extLst>
           </p:cNvPr>
@@ -2868,7 +2983,7 @@
           <p:cNvPr id="33" name="Picture Placeholder Title Image">
             <a:extLst>
               <a:ext uri="{FF2B5EF4-FFF2-40B4-BE49-F238E27FC236}">
-                <a16:creationId xmlns="" xmlns:a16="http://schemas.microsoft.com/office/drawing/2014/main" id="{A04D819A-89E2-4714-8C56-1838BF467EF7}"/>
+                <a16:creationId xmlns:a16="http://schemas.microsoft.com/office/drawing/2014/main" xmlns="" id="{A04D819A-89E2-4714-8C56-1838BF467EF7}"/>
               </a:ext>
             </a:extLst>
           </p:cNvPr>
@@ -2910,7 +3025,7 @@
           <p:cNvPr id="43" name="Presentation Subtitle">
             <a:extLst>
               <a:ext uri="{FF2B5EF4-FFF2-40B4-BE49-F238E27FC236}">
-                <a16:creationId xmlns="" xmlns:a16="http://schemas.microsoft.com/office/drawing/2014/main" id="{37BDB812-1395-4B02-ABCF-6A331EEE23E5}"/>
+                <a16:creationId xmlns:a16="http://schemas.microsoft.com/office/drawing/2014/main" xmlns="" id="{37BDB812-1395-4B02-ABCF-6A331EEE23E5}"/>
               </a:ext>
             </a:extLst>
           </p:cNvPr>
@@ -2954,7 +3069,7 @@
           <p:cNvPr id="2" name="Presentation Title">
             <a:extLst>
               <a:ext uri="{FF2B5EF4-FFF2-40B4-BE49-F238E27FC236}">
-                <a16:creationId xmlns="" xmlns:a16="http://schemas.microsoft.com/office/drawing/2014/main" id="{A4DF3AB8-E6E3-4FCE-8A4A-ECD147720A5D}"/>
+                <a16:creationId xmlns:a16="http://schemas.microsoft.com/office/drawing/2014/main" xmlns="" id="{A4DF3AB8-E6E3-4FCE-8A4A-ECD147720A5D}"/>
               </a:ext>
             </a:extLst>
           </p:cNvPr>
@@ -2989,7 +3104,7 @@
     </p:spTree>
     <p:extLst>
       <p:ext uri="{BB962C8B-B14F-4D97-AF65-F5344CB8AC3E}">
-        <p14:creationId xmlns="" xmlns:p14="http://schemas.microsoft.com/office/powerpoint/2010/main" val="970179299"/>
+        <p14:creationId xmlns:p14="http://schemas.microsoft.com/office/powerpoint/2010/main" xmlns="" val="970179299"/>
       </p:ext>
     </p:extLst>
   </p:cSld>
@@ -2997,7 +3112,7 @@
     <a:masterClrMapping/>
   </p:clrMapOvr>
   <mc:AlternateContent xmlns:mc="http://schemas.openxmlformats.org/markup-compatibility/2006">
-    <mc:Choice xmlns="" xmlns:p14="http://schemas.microsoft.com/office/powerpoint/2010/main" Requires="p14">
+    <mc:Choice xmlns:p14="http://schemas.microsoft.com/office/powerpoint/2010/main" xmlns="" Requires="p14">
       <p:transition spd="slow" p14:dur="2000" advClick="0" advTm="5000"/>
     </mc:Choice>
     <mc:Fallback>
@@ -3006,7 +3121,7 @@
   </mc:AlternateContent>
   <p:extLst>
     <p:ext uri="{DCECCB84-F9BA-43D5-87BE-67443E8EF086}">
-      <p15:sldGuideLst xmlns="" xmlns:p15="http://schemas.microsoft.com/office/powerpoint/2012/main">
+      <p15:sldGuideLst xmlns:p15="http://schemas.microsoft.com/office/powerpoint/2012/main" xmlns="">
         <p15:guide id="1" orient="horz" pos="2160">
           <p15:clr>
             <a:srgbClr val="FBAE40"/>
@@ -3045,7 +3160,7 @@
           <p:cNvPr id="15" name="Slide Number">
             <a:extLst>
               <a:ext uri="{FF2B5EF4-FFF2-40B4-BE49-F238E27FC236}">
-                <a16:creationId xmlns="" xmlns:a16="http://schemas.microsoft.com/office/drawing/2014/main" id="{F888EE71-82B3-40F1-A63F-7417422FB4A4}"/>
+                <a16:creationId xmlns:a16="http://schemas.microsoft.com/office/drawing/2014/main" xmlns="" id="{F888EE71-82B3-40F1-A63F-7417422FB4A4}"/>
               </a:ext>
             </a:extLst>
           </p:cNvPr>
@@ -3087,7 +3202,7 @@
           <p:cNvPr id="14" name="Text Placeholder Body">
             <a:extLst>
               <a:ext uri="{FF2B5EF4-FFF2-40B4-BE49-F238E27FC236}">
-                <a16:creationId xmlns="" xmlns:a16="http://schemas.microsoft.com/office/drawing/2014/main" id="{A2ABE920-240F-4CF6-AD45-23ED489FAD6E}"/>
+                <a16:creationId xmlns:a16="http://schemas.microsoft.com/office/drawing/2014/main" xmlns="" id="{A2ABE920-240F-4CF6-AD45-23ED489FAD6E}"/>
               </a:ext>
             </a:extLst>
           </p:cNvPr>
@@ -3393,7 +3508,7 @@
           <p:cNvPr id="10" name="Rectangle Down">
             <a:extLst>
               <a:ext uri="{FF2B5EF4-FFF2-40B4-BE49-F238E27FC236}">
-                <a16:creationId xmlns="" xmlns:a16="http://schemas.microsoft.com/office/drawing/2014/main" id="{E9B994EC-35A8-4A11-98CB-25DC28852F94}"/>
+                <a16:creationId xmlns:a16="http://schemas.microsoft.com/office/drawing/2014/main" xmlns="" id="{E9B994EC-35A8-4A11-98CB-25DC28852F94}"/>
               </a:ext>
             </a:extLst>
           </p:cNvPr>
@@ -3474,7 +3589,7 @@
           <p:cNvPr id="11" name="Rectangle Top">
             <a:extLst>
               <a:ext uri="{FF2B5EF4-FFF2-40B4-BE49-F238E27FC236}">
-                <a16:creationId xmlns="" xmlns:a16="http://schemas.microsoft.com/office/drawing/2014/main" id="{274B8F05-DFCE-47BD-BAFD-DF93E1A63BDD}"/>
+                <a16:creationId xmlns:a16="http://schemas.microsoft.com/office/drawing/2014/main" xmlns="" id="{274B8F05-DFCE-47BD-BAFD-DF93E1A63BDD}"/>
               </a:ext>
             </a:extLst>
           </p:cNvPr>
@@ -3555,7 +3670,7 @@
           <p:cNvPr id="12" name="Logo Software University" descr="Software University logo">
             <a:extLst>
               <a:ext uri="{FF2B5EF4-FFF2-40B4-BE49-F238E27FC236}">
-                <a16:creationId xmlns="" xmlns:a16="http://schemas.microsoft.com/office/drawing/2014/main" id="{233CBB95-791E-4630-B3D9-FADFCE7BCF52}"/>
+                <a16:creationId xmlns:a16="http://schemas.microsoft.com/office/drawing/2014/main" xmlns="" id="{233CBB95-791E-4630-B3D9-FADFCE7BCF52}"/>
               </a:ext>
             </a:extLst>
           </p:cNvPr>
@@ -3568,7 +3683,7 @@
           <a:blip r:embed="rId2" cstate="print">
             <a:extLst>
               <a:ext uri="{28A0092B-C50C-407E-A947-70E740481C1C}">
-                <a14:useLocalDpi xmlns="" xmlns:a14="http://schemas.microsoft.com/office/drawing/2010/main" val="0"/>
+                <a14:useLocalDpi xmlns:a14="http://schemas.microsoft.com/office/drawing/2010/main" xmlns="" val="0"/>
               </a:ext>
             </a:extLst>
           </a:blip>
@@ -3591,7 +3706,7 @@
           <p:cNvPr id="13" name="Slide Title">
             <a:extLst>
               <a:ext uri="{FF2B5EF4-FFF2-40B4-BE49-F238E27FC236}">
-                <a16:creationId xmlns="" xmlns:a16="http://schemas.microsoft.com/office/drawing/2014/main" id="{3F218E34-55D7-4290-BFE4-80F31F941551}"/>
+                <a16:creationId xmlns:a16="http://schemas.microsoft.com/office/drawing/2014/main" xmlns="" id="{3F218E34-55D7-4290-BFE4-80F31F941551}"/>
               </a:ext>
             </a:extLst>
           </p:cNvPr>
@@ -3630,7 +3745,7 @@
     </p:spTree>
     <p:extLst>
       <p:ext uri="{BB962C8B-B14F-4D97-AF65-F5344CB8AC3E}">
-        <p14:creationId xmlns="" xmlns:p14="http://schemas.microsoft.com/office/powerpoint/2010/main" val="3774019400"/>
+        <p14:creationId xmlns:p14="http://schemas.microsoft.com/office/powerpoint/2010/main" xmlns="" val="3774019400"/>
       </p:ext>
     </p:extLst>
   </p:cSld>
@@ -3638,7 +3753,7 @@
     <a:masterClrMapping/>
   </p:clrMapOvr>
   <mc:AlternateContent xmlns:mc="http://schemas.openxmlformats.org/markup-compatibility/2006">
-    <mc:Choice xmlns="" xmlns:p14="http://schemas.microsoft.com/office/powerpoint/2010/main" Requires="p14">
+    <mc:Choice xmlns:p14="http://schemas.microsoft.com/office/powerpoint/2010/main" xmlns="" Requires="p14">
       <p:transition spd="slow" p14:dur="2000" advClick="0" advTm="5000"/>
     </mc:Choice>
     <mc:Fallback>
@@ -3678,7 +3793,7 @@
           <p:cNvPr id="35" name="Rectangle Bottom">
             <a:extLst>
               <a:ext uri="{FF2B5EF4-FFF2-40B4-BE49-F238E27FC236}">
-                <a16:creationId xmlns="" xmlns:a16="http://schemas.microsoft.com/office/drawing/2014/main" id="{550A59F9-9A9D-4956-95B4-F78CC0DB1D59}"/>
+                <a16:creationId xmlns:a16="http://schemas.microsoft.com/office/drawing/2014/main" xmlns="" id="{550A59F9-9A9D-4956-95B4-F78CC0DB1D59}"/>
               </a:ext>
             </a:extLst>
           </p:cNvPr>
@@ -3759,7 +3874,7 @@
           <p:cNvPr id="53" name="Rectangle Bottom Copyright">
             <a:extLst>
               <a:ext uri="{FF2B5EF4-FFF2-40B4-BE49-F238E27FC236}">
-                <a16:creationId xmlns="" xmlns:a16="http://schemas.microsoft.com/office/drawing/2014/main" id="{B07FB7FB-DA6C-4F5D-B068-357F0FCE27D8}"/>
+                <a16:creationId xmlns:a16="http://schemas.microsoft.com/office/drawing/2014/main" xmlns="" id="{B07FB7FB-DA6C-4F5D-B068-357F0FCE27D8}"/>
               </a:ext>
             </a:extLst>
           </p:cNvPr>
@@ -3816,7 +3931,7 @@
                 <a:hlinkClick r:id="rId2">
                   <a:extLst>
                     <a:ext uri="{A12FA001-AC4F-418D-AE19-62706E023703}">
-                      <ahyp:hlinkClr xmlns="" xmlns:ahyp="http://schemas.microsoft.com/office/drawing/2018/hyperlinkcolor" val="tx"/>
+                      <ahyp:hlinkClr xmlns:ahyp="http://schemas.microsoft.com/office/drawing/2018/hyperlinkcolor" xmlns="" val="tx"/>
                     </a:ext>
                   </a:extLst>
                 </a:hlinkClick>
@@ -3852,7 +3967,7 @@
           <p:cNvPr id="26" name="Picture SoftUni Mascot" descr="SoftUni mascot with open hand">
             <a:extLst>
               <a:ext uri="{FF2B5EF4-FFF2-40B4-BE49-F238E27FC236}">
-                <a16:creationId xmlns="" xmlns:a16="http://schemas.microsoft.com/office/drawing/2014/main" id="{247CFF3C-C4FA-493D-8505-DF469F4D36A4}"/>
+                <a16:creationId xmlns:a16="http://schemas.microsoft.com/office/drawing/2014/main" xmlns="" id="{247CFF3C-C4FA-493D-8505-DF469F4D36A4}"/>
               </a:ext>
             </a:extLst>
           </p:cNvPr>
@@ -3865,7 +3980,7 @@
           <a:blip r:embed="rId3" cstate="print">
             <a:extLst>
               <a:ext uri="{28A0092B-C50C-407E-A947-70E740481C1C}">
-                <a14:useLocalDpi xmlns="" xmlns:a14="http://schemas.microsoft.com/office/drawing/2010/main" val="0"/>
+                <a14:useLocalDpi xmlns:a14="http://schemas.microsoft.com/office/drawing/2010/main" xmlns="" val="0"/>
               </a:ext>
             </a:extLst>
           </a:blip>
@@ -3888,7 +4003,7 @@
           <p:cNvPr id="2" name="Group SoftUni Brands">
             <a:extLst>
               <a:ext uri="{FF2B5EF4-FFF2-40B4-BE49-F238E27FC236}">
-                <a16:creationId xmlns="" xmlns:a16="http://schemas.microsoft.com/office/drawing/2014/main" id="{418FAE34-C1F8-46C7-A4AE-F270D1E70F25}"/>
+                <a16:creationId xmlns:a16="http://schemas.microsoft.com/office/drawing/2014/main" xmlns="" id="{418FAE34-C1F8-46C7-A4AE-F270D1E70F25}"/>
               </a:ext>
             </a:extLst>
           </p:cNvPr>
@@ -3908,7 +4023,7 @@
             <p:cNvPr id="24" name="Picture SoftUni Kids Logo" descr="SoftUni Kids logo">
               <a:extLst>
                 <a:ext uri="{FF2B5EF4-FFF2-40B4-BE49-F238E27FC236}">
-                  <a16:creationId xmlns="" xmlns:a16="http://schemas.microsoft.com/office/drawing/2014/main" id="{B0812936-74B6-4265-8C08-AEDC8C798702}"/>
+                  <a16:creationId xmlns:a16="http://schemas.microsoft.com/office/drawing/2014/main" xmlns="" id="{B0812936-74B6-4265-8C08-AEDC8C798702}"/>
                 </a:ext>
               </a:extLst>
             </p:cNvPr>
@@ -3921,7 +4036,7 @@
             <a:blip r:embed="rId4" cstate="print">
               <a:extLst>
                 <a:ext uri="{28A0092B-C50C-407E-A947-70E740481C1C}">
-                  <a14:useLocalDpi xmlns="" xmlns:a14="http://schemas.microsoft.com/office/drawing/2010/main" val="0"/>
+                  <a14:useLocalDpi xmlns:a14="http://schemas.microsoft.com/office/drawing/2010/main" xmlns="" val="0"/>
                 </a:ext>
               </a:extLst>
             </a:blip>
@@ -3944,7 +4059,7 @@
             <p:cNvPr id="23" name="Picture SoftUni Foundation Logo" descr="SoftUni Foundation logo">
               <a:extLst>
                 <a:ext uri="{FF2B5EF4-FFF2-40B4-BE49-F238E27FC236}">
-                  <a16:creationId xmlns="" xmlns:a16="http://schemas.microsoft.com/office/drawing/2014/main" id="{6643F71A-2013-433A-8322-FBAAED3162D8}"/>
+                  <a16:creationId xmlns:a16="http://schemas.microsoft.com/office/drawing/2014/main" xmlns="" id="{6643F71A-2013-433A-8322-FBAAED3162D8}"/>
                 </a:ext>
               </a:extLst>
             </p:cNvPr>
@@ -3957,7 +4072,7 @@
             <a:blip r:embed="rId5" cstate="print">
               <a:extLst>
                 <a:ext uri="{28A0092B-C50C-407E-A947-70E740481C1C}">
-                  <a14:useLocalDpi xmlns="" xmlns:a14="http://schemas.microsoft.com/office/drawing/2010/main" val="0"/>
+                  <a14:useLocalDpi xmlns:a14="http://schemas.microsoft.com/office/drawing/2010/main" xmlns="" val="0"/>
                 </a:ext>
               </a:extLst>
             </a:blip>
@@ -3980,7 +4095,7 @@
             <p:cNvPr id="22" name="Picture SoftUni Digital Logo" descr="SoftUni Digital logo">
               <a:extLst>
                 <a:ext uri="{FF2B5EF4-FFF2-40B4-BE49-F238E27FC236}">
-                  <a16:creationId xmlns="" xmlns:a16="http://schemas.microsoft.com/office/drawing/2014/main" id="{0A83D66F-855B-463B-920B-BF239B01A206}"/>
+                  <a16:creationId xmlns:a16="http://schemas.microsoft.com/office/drawing/2014/main" xmlns="" id="{0A83D66F-855B-463B-920B-BF239B01A206}"/>
                 </a:ext>
               </a:extLst>
             </p:cNvPr>
@@ -3993,7 +4108,7 @@
             <a:blip r:embed="rId6" cstate="print">
               <a:extLst>
                 <a:ext uri="{28A0092B-C50C-407E-A947-70E740481C1C}">
-                  <a14:useLocalDpi xmlns="" xmlns:a14="http://schemas.microsoft.com/office/drawing/2010/main" val="0"/>
+                  <a14:useLocalDpi xmlns:a14="http://schemas.microsoft.com/office/drawing/2010/main" xmlns="" val="0"/>
                 </a:ext>
               </a:extLst>
             </a:blip>
@@ -4016,7 +4131,7 @@
             <p:cNvPr id="21" name="Picture SoftUni Creative Logo" descr="SoftUni Creative logo">
               <a:extLst>
                 <a:ext uri="{FF2B5EF4-FFF2-40B4-BE49-F238E27FC236}">
-                  <a16:creationId xmlns="" xmlns:a16="http://schemas.microsoft.com/office/drawing/2014/main" id="{EA755AAE-BA08-481C-9224-0061170EE4B8}"/>
+                  <a16:creationId xmlns:a16="http://schemas.microsoft.com/office/drawing/2014/main" xmlns="" id="{EA755AAE-BA08-481C-9224-0061170EE4B8}"/>
                 </a:ext>
               </a:extLst>
             </p:cNvPr>
@@ -4029,7 +4144,7 @@
             <a:blip r:embed="rId7" cstate="print">
               <a:extLst>
                 <a:ext uri="{28A0092B-C50C-407E-A947-70E740481C1C}">
-                  <a14:useLocalDpi xmlns="" xmlns:a14="http://schemas.microsoft.com/office/drawing/2010/main" val="0"/>
+                  <a14:useLocalDpi xmlns:a14="http://schemas.microsoft.com/office/drawing/2010/main" xmlns="" val="0"/>
                 </a:ext>
               </a:extLst>
             </a:blip>
@@ -4052,7 +4167,7 @@
             <p:cNvPr id="20" name="Picture SoftUni Svetlina Logo" descr="SoftUni Svetlina logo">
               <a:extLst>
                 <a:ext uri="{FF2B5EF4-FFF2-40B4-BE49-F238E27FC236}">
-                  <a16:creationId xmlns="" xmlns:a16="http://schemas.microsoft.com/office/drawing/2014/main" id="{827D15FD-4C66-4B85-98E6-7826AA8F61C6}"/>
+                  <a16:creationId xmlns:a16="http://schemas.microsoft.com/office/drawing/2014/main" xmlns="" id="{827D15FD-4C66-4B85-98E6-7826AA8F61C6}"/>
                 </a:ext>
               </a:extLst>
             </p:cNvPr>
@@ -4065,7 +4180,7 @@
             <a:blip r:embed="rId8" cstate="print">
               <a:extLst>
                 <a:ext uri="{28A0092B-C50C-407E-A947-70E740481C1C}">
-                  <a14:useLocalDpi xmlns="" xmlns:a14="http://schemas.microsoft.com/office/drawing/2010/main" val="0"/>
+                  <a14:useLocalDpi xmlns:a14="http://schemas.microsoft.com/office/drawing/2010/main" xmlns="" val="0"/>
                 </a:ext>
               </a:extLst>
             </a:blip>
@@ -4088,7 +4203,7 @@
             <p:cNvPr id="25" name="Picture Software University Logo" descr="Software University logo">
               <a:extLst>
                 <a:ext uri="{FF2B5EF4-FFF2-40B4-BE49-F238E27FC236}">
-                  <a16:creationId xmlns="" xmlns:a16="http://schemas.microsoft.com/office/drawing/2014/main" id="{C74C190C-5856-41B9-8819-AE8DE0E10980}"/>
+                  <a16:creationId xmlns:a16="http://schemas.microsoft.com/office/drawing/2014/main" xmlns="" id="{C74C190C-5856-41B9-8819-AE8DE0E10980}"/>
                 </a:ext>
               </a:extLst>
             </p:cNvPr>
@@ -4101,7 +4216,7 @@
             <a:blip r:embed="rId9" cstate="print">
               <a:extLst>
                 <a:ext uri="{28A0092B-C50C-407E-A947-70E740481C1C}">
-                  <a14:useLocalDpi xmlns="" xmlns:a14="http://schemas.microsoft.com/office/drawing/2010/main" val="0"/>
+                  <a14:useLocalDpi xmlns:a14="http://schemas.microsoft.com/office/drawing/2010/main" xmlns="" val="0"/>
                 </a:ext>
               </a:extLst>
             </a:blip>
@@ -4124,7 +4239,7 @@
             <p:cNvPr id="33" name="Straight Connector 6">
               <a:extLst>
                 <a:ext uri="{FF2B5EF4-FFF2-40B4-BE49-F238E27FC236}">
-                  <a16:creationId xmlns="" xmlns:a16="http://schemas.microsoft.com/office/drawing/2014/main" id="{5C63D1E8-4A92-4691-8A24-A2FC7E8008E5}"/>
+                  <a16:creationId xmlns:a16="http://schemas.microsoft.com/office/drawing/2014/main" xmlns="" id="{5C63D1E8-4A92-4691-8A24-A2FC7E8008E5}"/>
                 </a:ext>
               </a:extLst>
             </p:cNvPr>
@@ -4163,7 +4278,7 @@
             <p:cNvPr id="32" name="Straight Connector 5">
               <a:extLst>
                 <a:ext uri="{FF2B5EF4-FFF2-40B4-BE49-F238E27FC236}">
-                  <a16:creationId xmlns="" xmlns:a16="http://schemas.microsoft.com/office/drawing/2014/main" id="{6E91D320-3732-40B8-864D-142D0A277ED1}"/>
+                  <a16:creationId xmlns:a16="http://schemas.microsoft.com/office/drawing/2014/main" xmlns="" id="{6E91D320-3732-40B8-864D-142D0A277ED1}"/>
                 </a:ext>
               </a:extLst>
             </p:cNvPr>
@@ -4202,7 +4317,7 @@
             <p:cNvPr id="31" name="Straight Connector 4">
               <a:extLst>
                 <a:ext uri="{FF2B5EF4-FFF2-40B4-BE49-F238E27FC236}">
-                  <a16:creationId xmlns="" xmlns:a16="http://schemas.microsoft.com/office/drawing/2014/main" id="{299ABE09-E33C-46B7-A80D-7BF4A6956211}"/>
+                  <a16:creationId xmlns:a16="http://schemas.microsoft.com/office/drawing/2014/main" xmlns="" id="{299ABE09-E33C-46B7-A80D-7BF4A6956211}"/>
                 </a:ext>
               </a:extLst>
             </p:cNvPr>
@@ -4239,7 +4354,7 @@
             <p:cNvPr id="30" name="Straight Connector 3">
               <a:extLst>
                 <a:ext uri="{FF2B5EF4-FFF2-40B4-BE49-F238E27FC236}">
-                  <a16:creationId xmlns="" xmlns:a16="http://schemas.microsoft.com/office/drawing/2014/main" id="{93DDBF37-0764-47AA-94E3-9A44F3ED8FB5}"/>
+                  <a16:creationId xmlns:a16="http://schemas.microsoft.com/office/drawing/2014/main" xmlns="" id="{93DDBF37-0764-47AA-94E3-9A44F3ED8FB5}"/>
                 </a:ext>
               </a:extLst>
             </p:cNvPr>
@@ -4276,7 +4391,7 @@
             <p:cNvPr id="29" name="Straight Connector 2">
               <a:extLst>
                 <a:ext uri="{FF2B5EF4-FFF2-40B4-BE49-F238E27FC236}">
-                  <a16:creationId xmlns="" xmlns:a16="http://schemas.microsoft.com/office/drawing/2014/main" id="{72BFE2F3-0845-4E5B-9375-E9D4027DD675}"/>
+                  <a16:creationId xmlns:a16="http://schemas.microsoft.com/office/drawing/2014/main" xmlns="" id="{72BFE2F3-0845-4E5B-9375-E9D4027DD675}"/>
                 </a:ext>
               </a:extLst>
             </p:cNvPr>
@@ -4313,7 +4428,7 @@
             <p:cNvPr id="28" name="Straight Connector 1">
               <a:extLst>
                 <a:ext uri="{FF2B5EF4-FFF2-40B4-BE49-F238E27FC236}">
-                  <a16:creationId xmlns="" xmlns:a16="http://schemas.microsoft.com/office/drawing/2014/main" id="{D4E5982E-3110-47E1-A5BB-91B7BECC3093}"/>
+                  <a16:creationId xmlns:a16="http://schemas.microsoft.com/office/drawing/2014/main" xmlns="" id="{D4E5982E-3110-47E1-A5BB-91B7BECC3093}"/>
                 </a:ext>
               </a:extLst>
             </p:cNvPr>
@@ -4350,7 +4465,7 @@
             <p:cNvPr id="27" name="Straight Connector Horizontal">
               <a:extLst>
                 <a:ext uri="{FF2B5EF4-FFF2-40B4-BE49-F238E27FC236}">
-                  <a16:creationId xmlns="" xmlns:a16="http://schemas.microsoft.com/office/drawing/2014/main" id="{5F62FB7C-BD6E-4383-98C1-2CF30F34CAFD}"/>
+                  <a16:creationId xmlns:a16="http://schemas.microsoft.com/office/drawing/2014/main" xmlns="" id="{5F62FB7C-BD6E-4383-98C1-2CF30F34CAFD}"/>
                 </a:ext>
               </a:extLst>
             </p:cNvPr>
@@ -4389,7 +4504,7 @@
             <p:cNvPr id="34" name="Straight Connector 0">
               <a:extLst>
                 <a:ext uri="{FF2B5EF4-FFF2-40B4-BE49-F238E27FC236}">
-                  <a16:creationId xmlns="" xmlns:a16="http://schemas.microsoft.com/office/drawing/2014/main" id="{C84A0FE1-723D-4682-8682-77BAD950EE15}"/>
+                  <a16:creationId xmlns:a16="http://schemas.microsoft.com/office/drawing/2014/main" xmlns="" id="{C84A0FE1-723D-4682-8682-77BAD950EE15}"/>
                 </a:ext>
               </a:extLst>
             </p:cNvPr>
@@ -4426,7 +4541,7 @@
             <p:cNvPr id="18" name="Picture SoftUni Logo" descr="SoftUni logo">
               <a:extLst>
                 <a:ext uri="{FF2B5EF4-FFF2-40B4-BE49-F238E27FC236}">
-                  <a16:creationId xmlns="" xmlns:a16="http://schemas.microsoft.com/office/drawing/2014/main" id="{A0675455-B7FA-4569-A5FD-A3B0F20B2A26}"/>
+                  <a16:creationId xmlns:a16="http://schemas.microsoft.com/office/drawing/2014/main" xmlns="" id="{A0675455-B7FA-4569-A5FD-A3B0F20B2A26}"/>
                 </a:ext>
               </a:extLst>
             </p:cNvPr>
@@ -4439,7 +4554,7 @@
             <a:blip r:embed="rId10" cstate="print">
               <a:extLst>
                 <a:ext uri="{28A0092B-C50C-407E-A947-70E740481C1C}">
-                  <a14:useLocalDpi xmlns="" xmlns:a14="http://schemas.microsoft.com/office/drawing/2010/main" val="0"/>
+                  <a14:useLocalDpi xmlns:a14="http://schemas.microsoft.com/office/drawing/2010/main" xmlns="" val="0"/>
                 </a:ext>
               </a:extLst>
             </a:blip>
@@ -4463,7 +4578,7 @@
           <p:cNvPr id="19" name="Slide Title">
             <a:extLst>
               <a:ext uri="{FF2B5EF4-FFF2-40B4-BE49-F238E27FC236}">
-                <a16:creationId xmlns="" xmlns:a16="http://schemas.microsoft.com/office/drawing/2014/main" id="{7CFDBB16-985C-4CC7-B6DB-B81B36037922}"/>
+                <a16:creationId xmlns:a16="http://schemas.microsoft.com/office/drawing/2014/main" xmlns="" id="{7CFDBB16-985C-4CC7-B6DB-B81B36037922}"/>
               </a:ext>
             </a:extLst>
           </p:cNvPr>
@@ -4566,7 +4681,7 @@
           <p:cNvPr id="36" name="Logo Software University" descr="Software University logo">
             <a:extLst>
               <a:ext uri="{FF2B5EF4-FFF2-40B4-BE49-F238E27FC236}">
-                <a16:creationId xmlns="" xmlns:a16="http://schemas.microsoft.com/office/drawing/2014/main" id="{67FC4D2E-913D-432A-B658-F0D82839FA5E}"/>
+                <a16:creationId xmlns:a16="http://schemas.microsoft.com/office/drawing/2014/main" xmlns="" id="{67FC4D2E-913D-432A-B658-F0D82839FA5E}"/>
               </a:ext>
             </a:extLst>
           </p:cNvPr>
@@ -4589,7 +4704,7 @@
             </a:clrChange>
             <a:extLst>
               <a:ext uri="{28A0092B-C50C-407E-A947-70E740481C1C}">
-                <a14:useLocalDpi xmlns="" xmlns:a14="http://schemas.microsoft.com/office/drawing/2010/main" val="0"/>
+                <a14:useLocalDpi xmlns:a14="http://schemas.microsoft.com/office/drawing/2010/main" xmlns="" val="0"/>
               </a:ext>
             </a:extLst>
           </a:blip>
@@ -4610,7 +4725,7 @@
     </p:spTree>
     <p:extLst>
       <p:ext uri="{BB962C8B-B14F-4D97-AF65-F5344CB8AC3E}">
-        <p14:creationId xmlns="" xmlns:p14="http://schemas.microsoft.com/office/powerpoint/2010/main" val="4192061223"/>
+        <p14:creationId xmlns:p14="http://schemas.microsoft.com/office/powerpoint/2010/main" xmlns="" val="4192061223"/>
       </p:ext>
     </p:extLst>
   </p:cSld>
@@ -4618,7 +4733,7 @@
     <a:masterClrMapping/>
   </p:clrMapOvr>
   <mc:AlternateContent xmlns:mc="http://schemas.openxmlformats.org/markup-compatibility/2006">
-    <mc:Choice xmlns="" xmlns:p14="http://schemas.microsoft.com/office/powerpoint/2010/main" Requires="p14">
+    <mc:Choice xmlns:p14="http://schemas.microsoft.com/office/powerpoint/2010/main" xmlns="" Requires="p14">
       <p:transition spd="slow" p14:dur="2000" advClick="0" advTm="5000"/>
     </mc:Choice>
     <mc:Fallback>
@@ -4627,7 +4742,7 @@
   </mc:AlternateContent>
   <p:extLst>
     <p:ext uri="{DCECCB84-F9BA-43D5-87BE-67443E8EF086}">
-      <p15:sldGuideLst xmlns="" xmlns:p15="http://schemas.microsoft.com/office/powerpoint/2012/main">
+      <p15:sldGuideLst xmlns:p15="http://schemas.microsoft.com/office/powerpoint/2012/main" xmlns="">
         <p15:guide id="1" orient="horz" pos="2160">
           <p15:clr>
             <a:srgbClr val="FBAE40"/>
@@ -4666,7 +4781,7 @@
           <p:cNvPr id="13" name="Slide Number">
             <a:extLst>
               <a:ext uri="{FF2B5EF4-FFF2-40B4-BE49-F238E27FC236}">
-                <a16:creationId xmlns="" xmlns:a16="http://schemas.microsoft.com/office/drawing/2014/main" id="{5B8761D8-B42F-4A70-A0CE-682CEB2AE31B}"/>
+                <a16:creationId xmlns:a16="http://schemas.microsoft.com/office/drawing/2014/main" xmlns="" id="{5B8761D8-B42F-4A70-A0CE-682CEB2AE31B}"/>
               </a:ext>
             </a:extLst>
           </p:cNvPr>
@@ -4709,7 +4824,7 @@
             <a:hlinkClick r:id="rId2" tooltip="Software University Discussion Forum"/>
             <a:extLst>
               <a:ext uri="{FF2B5EF4-FFF2-40B4-BE49-F238E27FC236}">
-                <a16:creationId xmlns="" xmlns:a16="http://schemas.microsoft.com/office/drawing/2014/main" id="{98C579AD-FAF5-4B28-9B52-5457F1E90061}"/>
+                <a16:creationId xmlns:a16="http://schemas.microsoft.com/office/drawing/2014/main" xmlns="" id="{98C579AD-FAF5-4B28-9B52-5457F1E90061}"/>
               </a:ext>
             </a:extLst>
           </p:cNvPr>
@@ -4722,7 +4837,7 @@
           <a:blip r:embed="rId3" cstate="print">
             <a:extLst>
               <a:ext uri="{28A0092B-C50C-407E-A947-70E740481C1C}">
-                <a14:useLocalDpi xmlns="" xmlns:a14="http://schemas.microsoft.com/office/drawing/2010/main"/>
+                <a14:useLocalDpi xmlns:a14="http://schemas.microsoft.com/office/drawing/2010/main" xmlns=""/>
               </a:ext>
             </a:extLst>
           </a:blip>
@@ -4746,7 +4861,7 @@
             <a:hlinkClick r:id="rId4" tooltip="Software University @ Facebook"/>
             <a:extLst>
               <a:ext uri="{FF2B5EF4-FFF2-40B4-BE49-F238E27FC236}">
-                <a16:creationId xmlns="" xmlns:a16="http://schemas.microsoft.com/office/drawing/2014/main" id="{6B2C510E-5EF2-49F6-B926-2BD74CD3C7F8}"/>
+                <a16:creationId xmlns:a16="http://schemas.microsoft.com/office/drawing/2014/main" xmlns="" id="{6B2C510E-5EF2-49F6-B926-2BD74CD3C7F8}"/>
               </a:ext>
             </a:extLst>
           </p:cNvPr>
@@ -4759,7 +4874,7 @@
           <a:blip r:embed="rId5" cstate="print">
             <a:extLst>
               <a:ext uri="{28A0092B-C50C-407E-A947-70E740481C1C}">
-                <a14:useLocalDpi xmlns="" xmlns:a14="http://schemas.microsoft.com/office/drawing/2010/main"/>
+                <a14:useLocalDpi xmlns:a14="http://schemas.microsoft.com/office/drawing/2010/main" xmlns=""/>
               </a:ext>
             </a:extLst>
           </a:blip>
@@ -4777,7 +4892,7 @@
           <a:noFill/>
           <a:extLst>
             <a:ext uri="{909E8E84-426E-40DD-AFC4-6F175D3DCCD1}">
-              <a14:hiddenFill xmlns="" xmlns:a14="http://schemas.microsoft.com/office/drawing/2010/main">
+              <a14:hiddenFill xmlns:a14="http://schemas.microsoft.com/office/drawing/2010/main" xmlns="">
                 <a:solidFill>
                   <a:srgbClr val="FFFFFF"/>
                 </a:solidFill>
@@ -4792,7 +4907,7 @@
             <a:hlinkClick r:id="rId6"/>
             <a:extLst>
               <a:ext uri="{FF2B5EF4-FFF2-40B4-BE49-F238E27FC236}">
-                <a16:creationId xmlns="" xmlns:a16="http://schemas.microsoft.com/office/drawing/2014/main" id="{F4604840-E810-44B7-9FF1-3B28CD68B758}"/>
+                <a16:creationId xmlns:a16="http://schemas.microsoft.com/office/drawing/2014/main" xmlns="" id="{F4604840-E810-44B7-9FF1-3B28CD68B758}"/>
               </a:ext>
             </a:extLst>
           </p:cNvPr>
@@ -4805,7 +4920,7 @@
           <a:blip r:embed="rId7" cstate="print">
             <a:extLst>
               <a:ext uri="{28A0092B-C50C-407E-A947-70E740481C1C}">
-                <a14:useLocalDpi xmlns="" xmlns:a14="http://schemas.microsoft.com/office/drawing/2010/main" val="0"/>
+                <a14:useLocalDpi xmlns:a14="http://schemas.microsoft.com/office/drawing/2010/main" xmlns="" val="0"/>
               </a:ext>
             </a:extLst>
           </a:blip>
@@ -4829,7 +4944,7 @@
             <a:hlinkClick r:id="rId8"/>
             <a:extLst>
               <a:ext uri="{FF2B5EF4-FFF2-40B4-BE49-F238E27FC236}">
-                <a16:creationId xmlns="" xmlns:a16="http://schemas.microsoft.com/office/drawing/2014/main" id="{07C965FA-A87E-4824-AFA8-C67AF548A76A}"/>
+                <a16:creationId xmlns:a16="http://schemas.microsoft.com/office/drawing/2014/main" xmlns="" id="{07C965FA-A87E-4824-AFA8-C67AF548A76A}"/>
               </a:ext>
             </a:extLst>
           </p:cNvPr>
@@ -4842,7 +4957,7 @@
           <a:blip r:embed="rId9" cstate="print">
             <a:extLst>
               <a:ext uri="{28A0092B-C50C-407E-A947-70E740481C1C}">
-                <a14:useLocalDpi xmlns="" xmlns:a14="http://schemas.microsoft.com/office/drawing/2010/main" val="0"/>
+                <a14:useLocalDpi xmlns:a14="http://schemas.microsoft.com/office/drawing/2010/main" xmlns="" val="0"/>
               </a:ext>
             </a:extLst>
           </a:blip>
@@ -4864,7 +4979,7 @@
           <p:cNvPr id="12" name="Slide Body Text">
             <a:extLst>
               <a:ext uri="{FF2B5EF4-FFF2-40B4-BE49-F238E27FC236}">
-                <a16:creationId xmlns="" xmlns:a16="http://schemas.microsoft.com/office/drawing/2014/main" id="{0C1F9416-8B6E-46DE-973C-777785E27A26}"/>
+                <a16:creationId xmlns:a16="http://schemas.microsoft.com/office/drawing/2014/main" xmlns="" id="{0C1F9416-8B6E-46DE-973C-777785E27A26}"/>
               </a:ext>
             </a:extLst>
           </p:cNvPr>
@@ -4989,7 +5104,7 @@
           <p:cNvPr id="10" name="Rectangle Top">
             <a:extLst>
               <a:ext uri="{FF2B5EF4-FFF2-40B4-BE49-F238E27FC236}">
-                <a16:creationId xmlns="" xmlns:a16="http://schemas.microsoft.com/office/drawing/2014/main" id="{86646B95-5E3B-4DE8-9118-031C2C296D8C}"/>
+                <a16:creationId xmlns:a16="http://schemas.microsoft.com/office/drawing/2014/main" xmlns="" id="{86646B95-5E3B-4DE8-9118-031C2C296D8C}"/>
               </a:ext>
             </a:extLst>
           </p:cNvPr>
@@ -5070,7 +5185,7 @@
           <p:cNvPr id="11" name="Logo Software University" descr="Software University logo">
             <a:extLst>
               <a:ext uri="{FF2B5EF4-FFF2-40B4-BE49-F238E27FC236}">
-                <a16:creationId xmlns="" xmlns:a16="http://schemas.microsoft.com/office/drawing/2014/main" id="{58AB1944-B146-4E89-B2D9-426EB610F319}"/>
+                <a16:creationId xmlns:a16="http://schemas.microsoft.com/office/drawing/2014/main" xmlns="" id="{58AB1944-B146-4E89-B2D9-426EB610F319}"/>
               </a:ext>
             </a:extLst>
           </p:cNvPr>
@@ -5083,7 +5198,7 @@
           <a:blip r:embed="rId11" cstate="print">
             <a:extLst>
               <a:ext uri="{28A0092B-C50C-407E-A947-70E740481C1C}">
-                <a14:useLocalDpi xmlns="" xmlns:a14="http://schemas.microsoft.com/office/drawing/2010/main" val="0"/>
+                <a14:useLocalDpi xmlns:a14="http://schemas.microsoft.com/office/drawing/2010/main" xmlns="" val="0"/>
               </a:ext>
             </a:extLst>
           </a:blip>
@@ -5106,7 +5221,7 @@
           <p:cNvPr id="18" name="Slide Title">
             <a:extLst>
               <a:ext uri="{FF2B5EF4-FFF2-40B4-BE49-F238E27FC236}">
-                <a16:creationId xmlns="" xmlns:a16="http://schemas.microsoft.com/office/drawing/2014/main" id="{AE87ED9C-76E1-4D85-9B06-3AF44AABB668}"/>
+                <a16:creationId xmlns:a16="http://schemas.microsoft.com/office/drawing/2014/main" xmlns="" id="{AE87ED9C-76E1-4D85-9B06-3AF44AABB668}"/>
               </a:ext>
             </a:extLst>
           </p:cNvPr>
@@ -5145,7 +5260,7 @@
     </p:spTree>
     <p:extLst>
       <p:ext uri="{BB962C8B-B14F-4D97-AF65-F5344CB8AC3E}">
-        <p14:creationId xmlns="" xmlns:p14="http://schemas.microsoft.com/office/powerpoint/2010/main" val="2196466322"/>
+        <p14:creationId xmlns:p14="http://schemas.microsoft.com/office/powerpoint/2010/main" xmlns="" val="2196466322"/>
       </p:ext>
     </p:extLst>
   </p:cSld>
@@ -5153,7 +5268,7 @@
     <a:masterClrMapping/>
   </p:clrMapOvr>
   <mc:AlternateContent xmlns:mc="http://schemas.openxmlformats.org/markup-compatibility/2006">
-    <mc:Choice xmlns="" xmlns:p14="http://schemas.microsoft.com/office/powerpoint/2010/main" Requires="p14">
+    <mc:Choice xmlns:p14="http://schemas.microsoft.com/office/powerpoint/2010/main" xmlns="" Requires="p14">
       <p:transition spd="slow" p14:dur="2000" advClick="0" advTm="5000"/>
     </mc:Choice>
     <mc:Fallback>
@@ -5185,7 +5300,7 @@
           <p:cNvPr id="9" name="Oval Center Icon">
             <a:extLst>
               <a:ext uri="{FF2B5EF4-FFF2-40B4-BE49-F238E27FC236}">
-                <a16:creationId xmlns="" xmlns:a16="http://schemas.microsoft.com/office/drawing/2014/main" id="{13B9A8FE-2718-4F2C-98D4-CBF86AD69D58}"/>
+                <a16:creationId xmlns:a16="http://schemas.microsoft.com/office/drawing/2014/main" xmlns="" id="{13B9A8FE-2718-4F2C-98D4-CBF86AD69D58}"/>
               </a:ext>
             </a:extLst>
           </p:cNvPr>
@@ -5266,7 +5381,7 @@
           <p:cNvPr id="8" name="Slide Subtitle">
             <a:extLst>
               <a:ext uri="{FF2B5EF4-FFF2-40B4-BE49-F238E27FC236}">
-                <a16:creationId xmlns="" xmlns:a16="http://schemas.microsoft.com/office/drawing/2014/main" id="{588387B4-E99E-4145-9D1D-F17CA5190DFD}"/>
+                <a16:creationId xmlns:a16="http://schemas.microsoft.com/office/drawing/2014/main" xmlns="" id="{588387B4-E99E-4145-9D1D-F17CA5190DFD}"/>
               </a:ext>
             </a:extLst>
           </p:cNvPr>
@@ -5316,7 +5431,7 @@
           <p:cNvPr id="13" name="Slide Title">
             <a:extLst>
               <a:ext uri="{FF2B5EF4-FFF2-40B4-BE49-F238E27FC236}">
-                <a16:creationId xmlns="" xmlns:a16="http://schemas.microsoft.com/office/drawing/2014/main" id="{8A28C56F-AE84-49D0-9AD1-1F0CEEABF710}"/>
+                <a16:creationId xmlns:a16="http://schemas.microsoft.com/office/drawing/2014/main" xmlns="" id="{8A28C56F-AE84-49D0-9AD1-1F0CEEABF710}"/>
               </a:ext>
             </a:extLst>
           </p:cNvPr>
@@ -5361,7 +5476,7 @@
     </p:spTree>
     <p:extLst>
       <p:ext uri="{BB962C8B-B14F-4D97-AF65-F5344CB8AC3E}">
-        <p14:creationId xmlns="" xmlns:p14="http://schemas.microsoft.com/office/powerpoint/2010/main" val="475389923"/>
+        <p14:creationId xmlns:p14="http://schemas.microsoft.com/office/powerpoint/2010/main" xmlns="" val="475389923"/>
       </p:ext>
     </p:extLst>
   </p:cSld>
@@ -5369,7 +5484,7 @@
     <a:masterClrMapping/>
   </p:clrMapOvr>
   <mc:AlternateContent xmlns:mc="http://schemas.openxmlformats.org/markup-compatibility/2006">
-    <mc:Choice xmlns="" xmlns:p14="http://schemas.microsoft.com/office/powerpoint/2010/main" Requires="p14">
+    <mc:Choice xmlns:p14="http://schemas.microsoft.com/office/powerpoint/2010/main" xmlns="" Requires="p14">
       <p:transition spd="slow" p14:dur="2000" advClick="0" advTm="5000"/>
     </mc:Choice>
     <mc:Fallback>
@@ -5402,7 +5517,7 @@
           <p:cNvPr id="8" name="Rectangle Top">
             <a:extLst>
               <a:ext uri="{FF2B5EF4-FFF2-40B4-BE49-F238E27FC236}">
-                <a16:creationId xmlns="" xmlns:a16="http://schemas.microsoft.com/office/drawing/2014/main" id="{454BD9C2-93A6-4860-A758-846ED0E1C8FA}"/>
+                <a16:creationId xmlns:a16="http://schemas.microsoft.com/office/drawing/2014/main" xmlns="" id="{454BD9C2-93A6-4860-A758-846ED0E1C8FA}"/>
               </a:ext>
             </a:extLst>
           </p:cNvPr>
@@ -5483,7 +5598,7 @@
           <p:cNvPr id="7" name="Slide Number">
             <a:extLst>
               <a:ext uri="{FF2B5EF4-FFF2-40B4-BE49-F238E27FC236}">
-                <a16:creationId xmlns="" xmlns:a16="http://schemas.microsoft.com/office/drawing/2014/main" id="{C1780DB1-0AF0-4108-AFE1-9DA99F0DBCB8}"/>
+                <a16:creationId xmlns:a16="http://schemas.microsoft.com/office/drawing/2014/main" xmlns="" id="{C1780DB1-0AF0-4108-AFE1-9DA99F0DBCB8}"/>
               </a:ext>
             </a:extLst>
           </p:cNvPr>
@@ -5525,7 +5640,7 @@
           <p:cNvPr id="3" name="Slide Body Text">
             <a:extLst>
               <a:ext uri="{FF2B5EF4-FFF2-40B4-BE49-F238E27FC236}">
-                <a16:creationId xmlns="" xmlns:a16="http://schemas.microsoft.com/office/drawing/2014/main" id="{5A9D2960-6D42-439F-82E8-812822013A10}"/>
+                <a16:creationId xmlns:a16="http://schemas.microsoft.com/office/drawing/2014/main" xmlns="" id="{5A9D2960-6D42-439F-82E8-812822013A10}"/>
               </a:ext>
             </a:extLst>
           </p:cNvPr>
@@ -5603,7 +5718,7 @@
           <p:cNvPr id="13" name="Rectangle Top">
             <a:extLst>
               <a:ext uri="{FF2B5EF4-FFF2-40B4-BE49-F238E27FC236}">
-                <a16:creationId xmlns="" xmlns:a16="http://schemas.microsoft.com/office/drawing/2014/main" id="{391AFA4E-7870-4561-A1B8-AC956B0C8931}"/>
+                <a16:creationId xmlns:a16="http://schemas.microsoft.com/office/drawing/2014/main" xmlns="" id="{391AFA4E-7870-4561-A1B8-AC956B0C8931}"/>
               </a:ext>
             </a:extLst>
           </p:cNvPr>
@@ -5684,7 +5799,7 @@
           <p:cNvPr id="12" name="Logo Software University" descr="Software University logo">
             <a:extLst>
               <a:ext uri="{FF2B5EF4-FFF2-40B4-BE49-F238E27FC236}">
-                <a16:creationId xmlns="" xmlns:a16="http://schemas.microsoft.com/office/drawing/2014/main" id="{B1D3B425-B9BF-43ED-9DEC-C05002FBA22F}"/>
+                <a16:creationId xmlns:a16="http://schemas.microsoft.com/office/drawing/2014/main" xmlns="" id="{B1D3B425-B9BF-43ED-9DEC-C05002FBA22F}"/>
               </a:ext>
             </a:extLst>
           </p:cNvPr>
@@ -5697,7 +5812,7 @@
           <a:blip r:embed="rId2" cstate="print">
             <a:extLst>
               <a:ext uri="{28A0092B-C50C-407E-A947-70E740481C1C}">
-                <a14:useLocalDpi xmlns="" xmlns:a14="http://schemas.microsoft.com/office/drawing/2010/main" val="0"/>
+                <a14:useLocalDpi xmlns:a14="http://schemas.microsoft.com/office/drawing/2010/main" xmlns="" val="0"/>
               </a:ext>
             </a:extLst>
           </a:blip>
@@ -5720,7 +5835,7 @@
           <p:cNvPr id="6" name="Slide Title">
             <a:extLst>
               <a:ext uri="{FF2B5EF4-FFF2-40B4-BE49-F238E27FC236}">
-                <a16:creationId xmlns="" xmlns:a16="http://schemas.microsoft.com/office/drawing/2014/main" id="{19B5B676-7892-440F-8191-7109B2C59885}"/>
+                <a16:creationId xmlns:a16="http://schemas.microsoft.com/office/drawing/2014/main" xmlns="" id="{19B5B676-7892-440F-8191-7109B2C59885}"/>
               </a:ext>
             </a:extLst>
           </p:cNvPr>
@@ -5759,7 +5874,7 @@
     </p:spTree>
     <p:extLst>
       <p:ext uri="{BB962C8B-B14F-4D97-AF65-F5344CB8AC3E}">
-        <p14:creationId xmlns="" xmlns:p14="http://schemas.microsoft.com/office/powerpoint/2010/main" val="2685365194"/>
+        <p14:creationId xmlns:p14="http://schemas.microsoft.com/office/powerpoint/2010/main" xmlns="" val="2685365194"/>
       </p:ext>
     </p:extLst>
   </p:cSld>
@@ -5767,7 +5882,7 @@
     <a:masterClrMapping/>
   </p:clrMapOvr>
   <mc:AlternateContent xmlns:mc="http://schemas.openxmlformats.org/markup-compatibility/2006">
-    <mc:Choice xmlns="" xmlns:p14="http://schemas.microsoft.com/office/powerpoint/2010/main" Requires="p14">
+    <mc:Choice xmlns:p14="http://schemas.microsoft.com/office/powerpoint/2010/main" xmlns="" Requires="p14">
       <p:transition spd="slow" p14:dur="2000" advClick="0" advTm="5000"/>
     </mc:Choice>
     <mc:Fallback>
@@ -6817,7 +6932,7 @@
             <a:fld id="{1D8BD707-D9CF-40AE-B4C6-C98DA3205C09}" type="datetimeFigureOut">
               <a:rPr lang="en-US"/>
               <a:pPr/>
-              <a:t>8/4/2023</a:t>
+              <a:t>8/14/2023</a:t>
             </a:fld>
             <a:endParaRPr lang="en-US"/>
           </a:p>
@@ -6877,7 +6992,7 @@
     </p:spTree>
     <p:extLst>
       <p:ext uri="{BB962C8B-B14F-4D97-AF65-F5344CB8AC3E}">
-        <p14:creationId xmlns="" xmlns:p14="http://schemas.microsoft.com/office/powerpoint/2010/main" val="2531485629"/>
+        <p14:creationId xmlns:p14="http://schemas.microsoft.com/office/powerpoint/2010/main" xmlns="" val="2531485629"/>
       </p:ext>
     </p:extLst>
   </p:cSld>
@@ -6909,7 +7024,7 @@
           <p:cNvPr id="2" name="Title 1">
             <a:extLst>
               <a:ext uri="{FF2B5EF4-FFF2-40B4-BE49-F238E27FC236}">
-                <a16:creationId xmlns:a16="http://schemas.microsoft.com/office/drawing/2014/main" xmlns="" id="{5213C145-EA12-94EF-AA17-5F628EA0AD2D}"/>
+                <a16:creationId xmlns="" xmlns:a16="http://schemas.microsoft.com/office/drawing/2014/main" id="{5213C145-EA12-94EF-AA17-5F628EA0AD2D}"/>
               </a:ext>
             </a:extLst>
           </p:cNvPr>
@@ -6947,7 +7062,7 @@
           <p:cNvPr id="3" name="Subtitle 2">
             <a:extLst>
               <a:ext uri="{FF2B5EF4-FFF2-40B4-BE49-F238E27FC236}">
-                <a16:creationId xmlns:a16="http://schemas.microsoft.com/office/drawing/2014/main" xmlns="" id="{5F55E72E-5B45-B6EE-75AE-03B188AD9A08}"/>
+                <a16:creationId xmlns="" xmlns:a16="http://schemas.microsoft.com/office/drawing/2014/main" id="{5F55E72E-5B45-B6EE-75AE-03B188AD9A08}"/>
               </a:ext>
             </a:extLst>
           </p:cNvPr>
@@ -7018,7 +7133,7 @@
           <p:cNvPr id="4" name="Date Placeholder 3">
             <a:extLst>
               <a:ext uri="{FF2B5EF4-FFF2-40B4-BE49-F238E27FC236}">
-                <a16:creationId xmlns:a16="http://schemas.microsoft.com/office/drawing/2014/main" xmlns="" id="{30C6A8EA-0240-01AB-A7C2-BD1CD885E1C1}"/>
+                <a16:creationId xmlns="" xmlns:a16="http://schemas.microsoft.com/office/drawing/2014/main" id="{30C6A8EA-0240-01AB-A7C2-BD1CD885E1C1}"/>
               </a:ext>
             </a:extLst>
           </p:cNvPr>
@@ -7037,7 +7152,7 @@
             <a:fld id="{1CF2F75B-1C4E-1E47-AE31-5B79E79ADF4F}" type="datetimeFigureOut">
               <a:rPr lang="x-none" smtClean="0"/>
               <a:pPr/>
-              <a:t>4.8.2023 г.</a:t>
+              <a:t>14.8.2023 г.</a:t>
             </a:fld>
             <a:endParaRPr lang="x-none"/>
           </a:p>
@@ -7048,7 +7163,7 @@
           <p:cNvPr id="5" name="Footer Placeholder 4">
             <a:extLst>
               <a:ext uri="{FF2B5EF4-FFF2-40B4-BE49-F238E27FC236}">
-                <a16:creationId xmlns:a16="http://schemas.microsoft.com/office/drawing/2014/main" xmlns="" id="{F95CBF96-4249-1541-E44E-FBCECA233B3C}"/>
+                <a16:creationId xmlns="" xmlns:a16="http://schemas.microsoft.com/office/drawing/2014/main" id="{F95CBF96-4249-1541-E44E-FBCECA233B3C}"/>
               </a:ext>
             </a:extLst>
           </p:cNvPr>
@@ -7073,7 +7188,7 @@
           <p:cNvPr id="6" name="Slide Number Placeholder 5">
             <a:extLst>
               <a:ext uri="{FF2B5EF4-FFF2-40B4-BE49-F238E27FC236}">
-                <a16:creationId xmlns:a16="http://schemas.microsoft.com/office/drawing/2014/main" xmlns="" id="{7ACB54F2-814F-F79B-8CD7-FA3133365CBC}"/>
+                <a16:creationId xmlns="" xmlns:a16="http://schemas.microsoft.com/office/drawing/2014/main" id="{7ACB54F2-814F-F79B-8CD7-FA3133365CBC}"/>
               </a:ext>
             </a:extLst>
           </p:cNvPr>
@@ -7101,7 +7216,7 @@
     </p:spTree>
     <p:extLst>
       <p:ext uri="{BB962C8B-B14F-4D97-AF65-F5344CB8AC3E}">
-        <p14:creationId xmlns:p14="http://schemas.microsoft.com/office/powerpoint/2010/main" xmlns="" val="2773863354"/>
+        <p14:creationId xmlns="" xmlns:p14="http://schemas.microsoft.com/office/powerpoint/2010/main" val="2773863354"/>
       </p:ext>
     </p:extLst>
   </p:cSld>
@@ -7297,7 +7412,7 @@
     </p:spTree>
     <p:extLst>
       <p:ext uri="{BB962C8B-B14F-4D97-AF65-F5344CB8AC3E}">
-        <p14:creationId xmlns="" xmlns:p14="http://schemas.microsoft.com/office/powerpoint/2010/main" val="3529216409"/>
+        <p14:creationId xmlns:p14="http://schemas.microsoft.com/office/powerpoint/2010/main" xmlns="" val="3529216409"/>
       </p:ext>
     </p:extLst>
   </p:cSld>
@@ -7305,7 +7420,7 @@
     <a:masterClrMapping/>
   </p:clrMapOvr>
   <mc:AlternateContent xmlns:mc="http://schemas.openxmlformats.org/markup-compatibility/2006">
-    <mc:Choice xmlns="" xmlns:p14="http://schemas.microsoft.com/office/powerpoint/2010/main" Requires="p14">
+    <mc:Choice xmlns:p14="http://schemas.microsoft.com/office/powerpoint/2010/main" xmlns="" Requires="p14">
       <p:transition spd="slow" p14:dur="2000" advClick="0" advTm="5000"/>
     </mc:Choice>
     <mc:Fallback>
@@ -7337,7 +7452,7 @@
           <p:cNvPr id="7" name="Slide Number">
             <a:extLst>
               <a:ext uri="{FF2B5EF4-FFF2-40B4-BE49-F238E27FC236}">
-                <a16:creationId xmlns="" xmlns:a16="http://schemas.microsoft.com/office/drawing/2014/main" id="{C1780DB1-0AF0-4108-AFE1-9DA99F0DBCB8}"/>
+                <a16:creationId xmlns:a16="http://schemas.microsoft.com/office/drawing/2014/main" xmlns="" id="{C1780DB1-0AF0-4108-AFE1-9DA99F0DBCB8}"/>
               </a:ext>
             </a:extLst>
           </p:cNvPr>
@@ -7379,7 +7494,7 @@
           <p:cNvPr id="3" name="Slide Body Text">
             <a:extLst>
               <a:ext uri="{FF2B5EF4-FFF2-40B4-BE49-F238E27FC236}">
-                <a16:creationId xmlns="" xmlns:a16="http://schemas.microsoft.com/office/drawing/2014/main" id="{5A9D2960-6D42-439F-82E8-812822013A10}"/>
+                <a16:creationId xmlns:a16="http://schemas.microsoft.com/office/drawing/2014/main" xmlns="" id="{5A9D2960-6D42-439F-82E8-812822013A10}"/>
               </a:ext>
             </a:extLst>
           </p:cNvPr>
@@ -7457,7 +7572,7 @@
           <p:cNvPr id="13" name="Rectangle Top">
             <a:extLst>
               <a:ext uri="{FF2B5EF4-FFF2-40B4-BE49-F238E27FC236}">
-                <a16:creationId xmlns="" xmlns:a16="http://schemas.microsoft.com/office/drawing/2014/main" id="{391AFA4E-7870-4561-A1B8-AC956B0C8931}"/>
+                <a16:creationId xmlns:a16="http://schemas.microsoft.com/office/drawing/2014/main" xmlns="" id="{391AFA4E-7870-4561-A1B8-AC956B0C8931}"/>
               </a:ext>
             </a:extLst>
           </p:cNvPr>
@@ -7538,7 +7653,7 @@
           <p:cNvPr id="12" name="Logo Software University" descr="Software University logo">
             <a:extLst>
               <a:ext uri="{FF2B5EF4-FFF2-40B4-BE49-F238E27FC236}">
-                <a16:creationId xmlns="" xmlns:a16="http://schemas.microsoft.com/office/drawing/2014/main" id="{B1D3B425-B9BF-43ED-9DEC-C05002FBA22F}"/>
+                <a16:creationId xmlns:a16="http://schemas.microsoft.com/office/drawing/2014/main" xmlns="" id="{B1D3B425-B9BF-43ED-9DEC-C05002FBA22F}"/>
               </a:ext>
             </a:extLst>
           </p:cNvPr>
@@ -7551,7 +7666,7 @@
           <a:blip r:embed="rId2" cstate="print">
             <a:extLst>
               <a:ext uri="{28A0092B-C50C-407E-A947-70E740481C1C}">
-                <a14:useLocalDpi xmlns="" xmlns:a14="http://schemas.microsoft.com/office/drawing/2010/main" val="0"/>
+                <a14:useLocalDpi xmlns:a14="http://schemas.microsoft.com/office/drawing/2010/main" xmlns="" val="0"/>
               </a:ext>
             </a:extLst>
           </a:blip>
@@ -7574,7 +7689,7 @@
           <p:cNvPr id="6" name="Slide Title">
             <a:extLst>
               <a:ext uri="{FF2B5EF4-FFF2-40B4-BE49-F238E27FC236}">
-                <a16:creationId xmlns="" xmlns:a16="http://schemas.microsoft.com/office/drawing/2014/main" id="{19B5B676-7892-440F-8191-7109B2C59885}"/>
+                <a16:creationId xmlns:a16="http://schemas.microsoft.com/office/drawing/2014/main" xmlns="" id="{19B5B676-7892-440F-8191-7109B2C59885}"/>
               </a:ext>
             </a:extLst>
           </p:cNvPr>
@@ -7613,7 +7728,7 @@
     </p:spTree>
     <p:extLst>
       <p:ext uri="{BB962C8B-B14F-4D97-AF65-F5344CB8AC3E}">
-        <p14:creationId xmlns="" xmlns:p14="http://schemas.microsoft.com/office/powerpoint/2010/main" val="1102970716"/>
+        <p14:creationId xmlns:p14="http://schemas.microsoft.com/office/powerpoint/2010/main" xmlns="" val="1102970716"/>
       </p:ext>
     </p:extLst>
   </p:cSld>
@@ -7621,7 +7736,7 @@
     <a:masterClrMapping/>
   </p:clrMapOvr>
   <mc:AlternateContent xmlns:mc="http://schemas.openxmlformats.org/markup-compatibility/2006">
-    <mc:Choice xmlns="" xmlns:p14="http://schemas.microsoft.com/office/powerpoint/2010/main" Requires="p14">
+    <mc:Choice xmlns:p14="http://schemas.microsoft.com/office/powerpoint/2010/main" xmlns="" Requires="p14">
       <p:transition spd="slow" p14:dur="2000" advClick="0" advTm="5000"/>
     </mc:Choice>
     <mc:Fallback>
@@ -7653,7 +7768,7 @@
           <p:cNvPr id="9" name="Slide Number">
             <a:extLst>
               <a:ext uri="{FF2B5EF4-FFF2-40B4-BE49-F238E27FC236}">
-                <a16:creationId xmlns="" xmlns:a16="http://schemas.microsoft.com/office/drawing/2014/main" id="{0020EB61-2079-41A3-B356-B1D8D48D786E}"/>
+                <a16:creationId xmlns:a16="http://schemas.microsoft.com/office/drawing/2014/main" xmlns="" id="{0020EB61-2079-41A3-B356-B1D8D48D786E}"/>
               </a:ext>
             </a:extLst>
           </p:cNvPr>
@@ -7770,7 +7885,7 @@
           <p:cNvPr id="7" name="Slide Body Text">
             <a:extLst>
               <a:ext uri="{FF2B5EF4-FFF2-40B4-BE49-F238E27FC236}">
-                <a16:creationId xmlns="" xmlns:a16="http://schemas.microsoft.com/office/drawing/2014/main" id="{CB4CB13C-66A1-466B-A6C1-B0BABF5CFEC1}"/>
+                <a16:creationId xmlns:a16="http://schemas.microsoft.com/office/drawing/2014/main" xmlns="" id="{CB4CB13C-66A1-466B-A6C1-B0BABF5CFEC1}"/>
               </a:ext>
             </a:extLst>
           </p:cNvPr>
@@ -7868,7 +7983,7 @@
           <p:cNvPr id="3" name="Logo Software University" descr="Software University logo">
             <a:extLst>
               <a:ext uri="{FF2B5EF4-FFF2-40B4-BE49-F238E27FC236}">
-                <a16:creationId xmlns="" xmlns:a16="http://schemas.microsoft.com/office/drawing/2014/main" id="{5573C101-930B-47AC-967A-A64513DFFDEE}"/>
+                <a16:creationId xmlns:a16="http://schemas.microsoft.com/office/drawing/2014/main" xmlns="" id="{5573C101-930B-47AC-967A-A64513DFFDEE}"/>
               </a:ext>
             </a:extLst>
           </p:cNvPr>
@@ -7891,7 +8006,7 @@
             </a:clrChange>
             <a:extLst>
               <a:ext uri="{28A0092B-C50C-407E-A947-70E740481C1C}">
-                <a14:useLocalDpi xmlns="" xmlns:a14="http://schemas.microsoft.com/office/drawing/2010/main" val="0"/>
+                <a14:useLocalDpi xmlns:a14="http://schemas.microsoft.com/office/drawing/2010/main" xmlns="" val="0"/>
               </a:ext>
             </a:extLst>
           </a:blip>
@@ -7914,7 +8029,7 @@
           <p:cNvPr id="8" name="Slide Title">
             <a:extLst>
               <a:ext uri="{FF2B5EF4-FFF2-40B4-BE49-F238E27FC236}">
-                <a16:creationId xmlns="" xmlns:a16="http://schemas.microsoft.com/office/drawing/2014/main" id="{E2DA9691-CDF5-499C-94BB-AAA61DAC1BFB}"/>
+                <a16:creationId xmlns:a16="http://schemas.microsoft.com/office/drawing/2014/main" xmlns="" id="{E2DA9691-CDF5-499C-94BB-AAA61DAC1BFB}"/>
               </a:ext>
             </a:extLst>
           </p:cNvPr>
@@ -7951,7 +8066,7 @@
           <p:cNvPr id="10" name="Group 9">
             <a:extLst>
               <a:ext uri="{FF2B5EF4-FFF2-40B4-BE49-F238E27FC236}">
-                <a16:creationId xmlns="" xmlns:a16="http://schemas.microsoft.com/office/drawing/2014/main" id="{43CDBCC2-1C96-44BC-B992-7B0C49C34904}"/>
+                <a16:creationId xmlns:a16="http://schemas.microsoft.com/office/drawing/2014/main" xmlns="" id="{43CDBCC2-1C96-44BC-B992-7B0C49C34904}"/>
               </a:ext>
             </a:extLst>
           </p:cNvPr>
@@ -7971,7 +8086,7 @@
             <p:cNvPr id="11" name="Group 10">
               <a:extLst>
                 <a:ext uri="{FF2B5EF4-FFF2-40B4-BE49-F238E27FC236}">
-                  <a16:creationId xmlns="" xmlns:a16="http://schemas.microsoft.com/office/drawing/2014/main" id="{7D71B3A8-4D39-42CF-9255-81EA3A622DD6}"/>
+                  <a16:creationId xmlns:a16="http://schemas.microsoft.com/office/drawing/2014/main" xmlns="" id="{7D71B3A8-4D39-42CF-9255-81EA3A622DD6}"/>
                 </a:ext>
               </a:extLst>
             </p:cNvPr>
@@ -7991,7 +8106,7 @@
               <p:cNvPr id="25" name="Oval 24">
                 <a:extLst>
                   <a:ext uri="{FF2B5EF4-FFF2-40B4-BE49-F238E27FC236}">
-                    <a16:creationId xmlns="" xmlns:a16="http://schemas.microsoft.com/office/drawing/2014/main" id="{B98059F9-1874-426D-8AF7-A12C21F37DD9}"/>
+                    <a16:creationId xmlns:a16="http://schemas.microsoft.com/office/drawing/2014/main" xmlns="" id="{B98059F9-1874-426D-8AF7-A12C21F37DD9}"/>
                   </a:ext>
                 </a:extLst>
               </p:cNvPr>
@@ -8043,7 +8158,7 @@
               <p:cNvPr id="26" name="Rectangle 5">
                 <a:extLst>
                   <a:ext uri="{FF2B5EF4-FFF2-40B4-BE49-F238E27FC236}">
-                    <a16:creationId xmlns="" xmlns:a16="http://schemas.microsoft.com/office/drawing/2014/main" id="{A3A1E077-DBDF-48F0-A924-604984B940A2}"/>
+                    <a16:creationId xmlns:a16="http://schemas.microsoft.com/office/drawing/2014/main" xmlns="" id="{A3A1E077-DBDF-48F0-A924-604984B940A2}"/>
                   </a:ext>
                 </a:extLst>
               </p:cNvPr>
@@ -8188,7 +8303,7 @@
               <p:cNvPr id="27" name="Rectangle 5">
                 <a:extLst>
                   <a:ext uri="{FF2B5EF4-FFF2-40B4-BE49-F238E27FC236}">
-                    <a16:creationId xmlns="" xmlns:a16="http://schemas.microsoft.com/office/drawing/2014/main" id="{798B1F51-1FA4-4199-81C7-62356C936CC9}"/>
+                    <a16:creationId xmlns:a16="http://schemas.microsoft.com/office/drawing/2014/main" xmlns="" id="{798B1F51-1FA4-4199-81C7-62356C936CC9}"/>
                   </a:ext>
                 </a:extLst>
               </p:cNvPr>
@@ -8333,7 +8448,7 @@
               <p:cNvPr id="28" name="Arc 27">
                 <a:extLst>
                   <a:ext uri="{FF2B5EF4-FFF2-40B4-BE49-F238E27FC236}">
-                    <a16:creationId xmlns="" xmlns:a16="http://schemas.microsoft.com/office/drawing/2014/main" id="{40A224C8-1233-40F7-96AB-BFF79AF6CDCB}"/>
+                    <a16:creationId xmlns:a16="http://schemas.microsoft.com/office/drawing/2014/main" xmlns="" id="{40A224C8-1233-40F7-96AB-BFF79AF6CDCB}"/>
                   </a:ext>
                 </a:extLst>
               </p:cNvPr>
@@ -8392,7 +8507,7 @@
               <p:cNvPr id="29" name="Arc 28">
                 <a:extLst>
                   <a:ext uri="{FF2B5EF4-FFF2-40B4-BE49-F238E27FC236}">
-                    <a16:creationId xmlns="" xmlns:a16="http://schemas.microsoft.com/office/drawing/2014/main" id="{B57C7CCC-E218-4321-8C7B-3F0C5753C7A1}"/>
+                    <a16:creationId xmlns:a16="http://schemas.microsoft.com/office/drawing/2014/main" xmlns="" id="{B57C7CCC-E218-4321-8C7B-3F0C5753C7A1}"/>
                   </a:ext>
                 </a:extLst>
               </p:cNvPr>
@@ -8452,7 +8567,7 @@
             <p:cNvPr id="13" name="Rectangle: Rounded Corners 12">
               <a:extLst>
                 <a:ext uri="{FF2B5EF4-FFF2-40B4-BE49-F238E27FC236}">
-                  <a16:creationId xmlns="" xmlns:a16="http://schemas.microsoft.com/office/drawing/2014/main" id="{6AF309CA-A56C-4ABC-B293-420F4EB1A9B4}"/>
+                  <a16:creationId xmlns:a16="http://schemas.microsoft.com/office/drawing/2014/main" xmlns="" id="{6AF309CA-A56C-4ABC-B293-420F4EB1A9B4}"/>
                 </a:ext>
               </a:extLst>
             </p:cNvPr>
@@ -8506,7 +8621,7 @@
             <p:cNvPr id="14" name="Rectangle: Rounded Corners 13">
               <a:extLst>
                 <a:ext uri="{FF2B5EF4-FFF2-40B4-BE49-F238E27FC236}">
-                  <a16:creationId xmlns="" xmlns:a16="http://schemas.microsoft.com/office/drawing/2014/main" id="{07955808-2AC7-44EB-8B6D-82B974E53A3C}"/>
+                  <a16:creationId xmlns:a16="http://schemas.microsoft.com/office/drawing/2014/main" xmlns="" id="{07955808-2AC7-44EB-8B6D-82B974E53A3C}"/>
                 </a:ext>
               </a:extLst>
             </p:cNvPr>
@@ -8567,7 +8682,7 @@
             <p:cNvPr id="15" name="Straight Connector 14">
               <a:extLst>
                 <a:ext uri="{FF2B5EF4-FFF2-40B4-BE49-F238E27FC236}">
-                  <a16:creationId xmlns="" xmlns:a16="http://schemas.microsoft.com/office/drawing/2014/main" id="{AC6420D7-AEAB-45EF-8D46-11EB06E4AFEA}"/>
+                  <a16:creationId xmlns:a16="http://schemas.microsoft.com/office/drawing/2014/main" xmlns="" id="{AC6420D7-AEAB-45EF-8D46-11EB06E4AFEA}"/>
                 </a:ext>
               </a:extLst>
             </p:cNvPr>
@@ -8613,7 +8728,7 @@
             <p:cNvPr id="16" name="Straight Connector 15">
               <a:extLst>
                 <a:ext uri="{FF2B5EF4-FFF2-40B4-BE49-F238E27FC236}">
-                  <a16:creationId xmlns="" xmlns:a16="http://schemas.microsoft.com/office/drawing/2014/main" id="{76C7FABC-6773-44F6-990B-3EB082BE9B35}"/>
+                  <a16:creationId xmlns:a16="http://schemas.microsoft.com/office/drawing/2014/main" xmlns="" id="{76C7FABC-6773-44F6-990B-3EB082BE9B35}"/>
                 </a:ext>
               </a:extLst>
             </p:cNvPr>
@@ -8659,7 +8774,7 @@
             <p:cNvPr id="17" name="Group 16">
               <a:extLst>
                 <a:ext uri="{FF2B5EF4-FFF2-40B4-BE49-F238E27FC236}">
-                  <a16:creationId xmlns="" xmlns:a16="http://schemas.microsoft.com/office/drawing/2014/main" id="{1FAD48E1-DC45-4B3D-9CE5-613250708496}"/>
+                  <a16:creationId xmlns:a16="http://schemas.microsoft.com/office/drawing/2014/main" xmlns="" id="{1FAD48E1-DC45-4B3D-9CE5-613250708496}"/>
                 </a:ext>
               </a:extLst>
             </p:cNvPr>
@@ -8682,7 +8797,7 @@
               <p:cNvPr id="23" name="Straight Connector 22">
                 <a:extLst>
                   <a:ext uri="{FF2B5EF4-FFF2-40B4-BE49-F238E27FC236}">
-                    <a16:creationId xmlns="" xmlns:a16="http://schemas.microsoft.com/office/drawing/2014/main" id="{B01FD1D1-046F-457B-AB63-2702CE3E906E}"/>
+                    <a16:creationId xmlns:a16="http://schemas.microsoft.com/office/drawing/2014/main" xmlns="" id="{B01FD1D1-046F-457B-AB63-2702CE3E906E}"/>
                   </a:ext>
                 </a:extLst>
               </p:cNvPr>
@@ -8726,7 +8841,7 @@
               <p:cNvPr id="24" name="Straight Connector 23">
                 <a:extLst>
                   <a:ext uri="{FF2B5EF4-FFF2-40B4-BE49-F238E27FC236}">
-                    <a16:creationId xmlns="" xmlns:a16="http://schemas.microsoft.com/office/drawing/2014/main" id="{895660C3-C72C-43EE-9C4A-170F85E5BE08}"/>
+                    <a16:creationId xmlns:a16="http://schemas.microsoft.com/office/drawing/2014/main" xmlns="" id="{895660C3-C72C-43EE-9C4A-170F85E5BE08}"/>
                   </a:ext>
                 </a:extLst>
               </p:cNvPr>
@@ -8771,7 +8886,7 @@
             <p:cNvPr id="19" name="Straight Connector 18">
               <a:extLst>
                 <a:ext uri="{FF2B5EF4-FFF2-40B4-BE49-F238E27FC236}">
-                  <a16:creationId xmlns="" xmlns:a16="http://schemas.microsoft.com/office/drawing/2014/main" id="{A74EE503-8FC0-42A6-8860-CA4EE42272E4}"/>
+                  <a16:creationId xmlns:a16="http://schemas.microsoft.com/office/drawing/2014/main" xmlns="" id="{A74EE503-8FC0-42A6-8860-CA4EE42272E4}"/>
                 </a:ext>
               </a:extLst>
             </p:cNvPr>
@@ -8817,7 +8932,7 @@
             <p:cNvPr id="12" name="Rectangle: Rounded Corners 11">
               <a:extLst>
                 <a:ext uri="{FF2B5EF4-FFF2-40B4-BE49-F238E27FC236}">
-                  <a16:creationId xmlns="" xmlns:a16="http://schemas.microsoft.com/office/drawing/2014/main" id="{F4189FDA-9FE8-490B-8A70-2E941811021F}"/>
+                  <a16:creationId xmlns:a16="http://schemas.microsoft.com/office/drawing/2014/main" xmlns="" id="{F4189FDA-9FE8-490B-8A70-2E941811021F}"/>
                 </a:ext>
               </a:extLst>
             </p:cNvPr>
@@ -8871,7 +8986,7 @@
             <p:cNvPr id="18" name="Group 17">
               <a:extLst>
                 <a:ext uri="{FF2B5EF4-FFF2-40B4-BE49-F238E27FC236}">
-                  <a16:creationId xmlns="" xmlns:a16="http://schemas.microsoft.com/office/drawing/2014/main" id="{FDA3EFCD-0DF8-419D-8533-D781521E597E}"/>
+                  <a16:creationId xmlns:a16="http://schemas.microsoft.com/office/drawing/2014/main" xmlns="" id="{FDA3EFCD-0DF8-419D-8533-D781521E597E}"/>
                 </a:ext>
               </a:extLst>
             </p:cNvPr>
@@ -8894,7 +9009,7 @@
               <p:cNvPr id="21" name="Straight Connector 20">
                 <a:extLst>
                   <a:ext uri="{FF2B5EF4-FFF2-40B4-BE49-F238E27FC236}">
-                    <a16:creationId xmlns="" xmlns:a16="http://schemas.microsoft.com/office/drawing/2014/main" id="{C3CC6A5A-182E-4A09-9C04-EB191881D789}"/>
+                    <a16:creationId xmlns:a16="http://schemas.microsoft.com/office/drawing/2014/main" xmlns="" id="{C3CC6A5A-182E-4A09-9C04-EB191881D789}"/>
                   </a:ext>
                 </a:extLst>
               </p:cNvPr>
@@ -8938,7 +9053,7 @@
               <p:cNvPr id="22" name="Straight Connector 21">
                 <a:extLst>
                   <a:ext uri="{FF2B5EF4-FFF2-40B4-BE49-F238E27FC236}">
-                    <a16:creationId xmlns="" xmlns:a16="http://schemas.microsoft.com/office/drawing/2014/main" id="{440C8953-0555-48CC-8255-78F17E053EE7}"/>
+                    <a16:creationId xmlns:a16="http://schemas.microsoft.com/office/drawing/2014/main" xmlns="" id="{440C8953-0555-48CC-8255-78F17E053EE7}"/>
                   </a:ext>
                 </a:extLst>
               </p:cNvPr>
@@ -8984,7 +9099,7 @@
           <p:cNvPr id="34" name="Straight Connector 33">
             <a:extLst>
               <a:ext uri="{FF2B5EF4-FFF2-40B4-BE49-F238E27FC236}">
-                <a16:creationId xmlns="" xmlns:a16="http://schemas.microsoft.com/office/drawing/2014/main" id="{29B538CA-8CCB-43FB-B5E5-5FC04EBC1F54}"/>
+                <a16:creationId xmlns:a16="http://schemas.microsoft.com/office/drawing/2014/main" xmlns="" id="{29B538CA-8CCB-43FB-B5E5-5FC04EBC1F54}"/>
               </a:ext>
             </a:extLst>
           </p:cNvPr>
@@ -9029,7 +9144,7 @@
     </p:spTree>
     <p:extLst>
       <p:ext uri="{BB962C8B-B14F-4D97-AF65-F5344CB8AC3E}">
-        <p14:creationId xmlns="" xmlns:p14="http://schemas.microsoft.com/office/powerpoint/2010/main" val="743545348"/>
+        <p14:creationId xmlns:p14="http://schemas.microsoft.com/office/powerpoint/2010/main" xmlns="" val="743545348"/>
       </p:ext>
     </p:extLst>
   </p:cSld>
@@ -9037,7 +9152,7 @@
     <a:masterClrMapping/>
   </p:clrMapOvr>
   <mc:AlternateContent xmlns:mc="http://schemas.openxmlformats.org/markup-compatibility/2006">
-    <mc:Choice xmlns="" xmlns:p14="http://schemas.microsoft.com/office/powerpoint/2010/main" Requires="p14">
+    <mc:Choice xmlns:p14="http://schemas.microsoft.com/office/powerpoint/2010/main" xmlns="" Requires="p14">
       <p:transition spd="slow" p14:dur="2000" advClick="0" advTm="5000"/>
     </mc:Choice>
     <mc:Fallback>
@@ -9069,7 +9184,7 @@
           <p:cNvPr id="9" name="Slide Number">
             <a:extLst>
               <a:ext uri="{FF2B5EF4-FFF2-40B4-BE49-F238E27FC236}">
-                <a16:creationId xmlns="" xmlns:a16="http://schemas.microsoft.com/office/drawing/2014/main" id="{1865BF6B-7F07-4E9C-879F-80E36EEB3405}"/>
+                <a16:creationId xmlns:a16="http://schemas.microsoft.com/office/drawing/2014/main" xmlns="" id="{1865BF6B-7F07-4E9C-879F-80E36EEB3405}"/>
               </a:ext>
             </a:extLst>
           </p:cNvPr>
@@ -9111,7 +9226,7 @@
           <p:cNvPr id="12" name="Rectangle Left">
             <a:extLst>
               <a:ext uri="{FF2B5EF4-FFF2-40B4-BE49-F238E27FC236}">
-                <a16:creationId xmlns="" xmlns:a16="http://schemas.microsoft.com/office/drawing/2014/main" id="{345FB1C8-7F66-4D5C-ACCE-AE919936BCFD}"/>
+                <a16:creationId xmlns:a16="http://schemas.microsoft.com/office/drawing/2014/main" xmlns="" id="{345FB1C8-7F66-4D5C-ACCE-AE919936BCFD}"/>
               </a:ext>
             </a:extLst>
           </p:cNvPr>
@@ -9192,7 +9307,7 @@
           <p:cNvPr id="15" name="Slide Body Text">
             <a:extLst>
               <a:ext uri="{FF2B5EF4-FFF2-40B4-BE49-F238E27FC236}">
-                <a16:creationId xmlns="" xmlns:a16="http://schemas.microsoft.com/office/drawing/2014/main" id="{6157C8DE-E0AF-422B-BBB1-F0AF1264B5E9}"/>
+                <a16:creationId xmlns:a16="http://schemas.microsoft.com/office/drawing/2014/main" xmlns="" id="{6157C8DE-E0AF-422B-BBB1-F0AF1264B5E9}"/>
               </a:ext>
             </a:extLst>
           </p:cNvPr>
@@ -9290,7 +9405,7 @@
           <p:cNvPr id="16" name="Logo Software University" descr="Software University logo">
             <a:extLst>
               <a:ext uri="{FF2B5EF4-FFF2-40B4-BE49-F238E27FC236}">
-                <a16:creationId xmlns="" xmlns:a16="http://schemas.microsoft.com/office/drawing/2014/main" id="{EFEBB553-EACE-4B4F-8B4F-7629FDD910A4}"/>
+                <a16:creationId xmlns:a16="http://schemas.microsoft.com/office/drawing/2014/main" xmlns="" id="{EFEBB553-EACE-4B4F-8B4F-7629FDD910A4}"/>
               </a:ext>
             </a:extLst>
           </p:cNvPr>
@@ -9313,7 +9428,7 @@
             </a:clrChange>
             <a:extLst>
               <a:ext uri="{28A0092B-C50C-407E-A947-70E740481C1C}">
-                <a14:useLocalDpi xmlns="" xmlns:a14="http://schemas.microsoft.com/office/drawing/2010/main" val="0"/>
+                <a14:useLocalDpi xmlns:a14="http://schemas.microsoft.com/office/drawing/2010/main" xmlns="" val="0"/>
               </a:ext>
             </a:extLst>
           </a:blip>
@@ -9336,7 +9451,7 @@
           <p:cNvPr id="13" name="Slide Title">
             <a:extLst>
               <a:ext uri="{FF2B5EF4-FFF2-40B4-BE49-F238E27FC236}">
-                <a16:creationId xmlns="" xmlns:a16="http://schemas.microsoft.com/office/drawing/2014/main" id="{0D5CC956-5C4A-44BE-8F8B-327FAFA51E97}"/>
+                <a16:creationId xmlns:a16="http://schemas.microsoft.com/office/drawing/2014/main" xmlns="" id="{0D5CC956-5C4A-44BE-8F8B-327FAFA51E97}"/>
               </a:ext>
             </a:extLst>
           </p:cNvPr>
@@ -9373,7 +9488,7 @@
           <p:cNvPr id="33" name="Group 32">
             <a:extLst>
               <a:ext uri="{FF2B5EF4-FFF2-40B4-BE49-F238E27FC236}">
-                <a16:creationId xmlns="" xmlns:a16="http://schemas.microsoft.com/office/drawing/2014/main" id="{7CF60135-47AA-48F0-96BA-0E795668ABDB}"/>
+                <a16:creationId xmlns:a16="http://schemas.microsoft.com/office/drawing/2014/main" xmlns="" id="{7CF60135-47AA-48F0-96BA-0E795668ABDB}"/>
               </a:ext>
             </a:extLst>
           </p:cNvPr>
@@ -9393,7 +9508,7 @@
             <p:cNvPr id="34" name="Group 33">
               <a:extLst>
                 <a:ext uri="{FF2B5EF4-FFF2-40B4-BE49-F238E27FC236}">
-                  <a16:creationId xmlns="" xmlns:a16="http://schemas.microsoft.com/office/drawing/2014/main" id="{2823380E-3936-41AF-BDF7-DA54D75BBF6B}"/>
+                  <a16:creationId xmlns:a16="http://schemas.microsoft.com/office/drawing/2014/main" xmlns="" id="{2823380E-3936-41AF-BDF7-DA54D75BBF6B}"/>
                 </a:ext>
               </a:extLst>
             </p:cNvPr>
@@ -9413,7 +9528,7 @@
               <p:cNvPr id="47" name="Oval 46">
                 <a:extLst>
                   <a:ext uri="{FF2B5EF4-FFF2-40B4-BE49-F238E27FC236}">
-                    <a16:creationId xmlns="" xmlns:a16="http://schemas.microsoft.com/office/drawing/2014/main" id="{52B047D9-D8DD-45C7-9BC8-6D4F682F5182}"/>
+                    <a16:creationId xmlns:a16="http://schemas.microsoft.com/office/drawing/2014/main" xmlns="" id="{52B047D9-D8DD-45C7-9BC8-6D4F682F5182}"/>
                   </a:ext>
                 </a:extLst>
               </p:cNvPr>
@@ -9465,7 +9580,7 @@
               <p:cNvPr id="48" name="Rectangle 5">
                 <a:extLst>
                   <a:ext uri="{FF2B5EF4-FFF2-40B4-BE49-F238E27FC236}">
-                    <a16:creationId xmlns="" xmlns:a16="http://schemas.microsoft.com/office/drawing/2014/main" id="{4D84FE51-BD8E-47EA-9463-CE02FEA31766}"/>
+                    <a16:creationId xmlns:a16="http://schemas.microsoft.com/office/drawing/2014/main" xmlns="" id="{4D84FE51-BD8E-47EA-9463-CE02FEA31766}"/>
                   </a:ext>
                 </a:extLst>
               </p:cNvPr>
@@ -9610,7 +9725,7 @@
               <p:cNvPr id="49" name="Rectangle 5">
                 <a:extLst>
                   <a:ext uri="{FF2B5EF4-FFF2-40B4-BE49-F238E27FC236}">
-                    <a16:creationId xmlns="" xmlns:a16="http://schemas.microsoft.com/office/drawing/2014/main" id="{F5C8F037-C197-4219-AC87-3A81763512BC}"/>
+                    <a16:creationId xmlns:a16="http://schemas.microsoft.com/office/drawing/2014/main" xmlns="" id="{F5C8F037-C197-4219-AC87-3A81763512BC}"/>
                   </a:ext>
                 </a:extLst>
               </p:cNvPr>
@@ -9755,7 +9870,7 @@
               <p:cNvPr id="50" name="Arc 49">
                 <a:extLst>
                   <a:ext uri="{FF2B5EF4-FFF2-40B4-BE49-F238E27FC236}">
-                    <a16:creationId xmlns="" xmlns:a16="http://schemas.microsoft.com/office/drawing/2014/main" id="{786EE401-CF8E-439B-94A0-EE6F3A7D5798}"/>
+                    <a16:creationId xmlns:a16="http://schemas.microsoft.com/office/drawing/2014/main" xmlns="" id="{786EE401-CF8E-439B-94A0-EE6F3A7D5798}"/>
                   </a:ext>
                 </a:extLst>
               </p:cNvPr>
@@ -9814,7 +9929,7 @@
               <p:cNvPr id="51" name="Arc 50">
                 <a:extLst>
                   <a:ext uri="{FF2B5EF4-FFF2-40B4-BE49-F238E27FC236}">
-                    <a16:creationId xmlns="" xmlns:a16="http://schemas.microsoft.com/office/drawing/2014/main" id="{8D9ACD38-B3EB-4A63-9730-CBF0501BF235}"/>
+                    <a16:creationId xmlns:a16="http://schemas.microsoft.com/office/drawing/2014/main" xmlns="" id="{8D9ACD38-B3EB-4A63-9730-CBF0501BF235}"/>
                   </a:ext>
                 </a:extLst>
               </p:cNvPr>
@@ -9874,7 +9989,7 @@
             <p:cNvPr id="35" name="Rectangle: Rounded Corners 34">
               <a:extLst>
                 <a:ext uri="{FF2B5EF4-FFF2-40B4-BE49-F238E27FC236}">
-                  <a16:creationId xmlns="" xmlns:a16="http://schemas.microsoft.com/office/drawing/2014/main" id="{64EE493E-A353-4C75-A3B9-D48ABA2C57CC}"/>
+                  <a16:creationId xmlns:a16="http://schemas.microsoft.com/office/drawing/2014/main" xmlns="" id="{64EE493E-A353-4C75-A3B9-D48ABA2C57CC}"/>
                 </a:ext>
               </a:extLst>
             </p:cNvPr>
@@ -9928,7 +10043,7 @@
             <p:cNvPr id="36" name="Rectangle: Rounded Corners 35">
               <a:extLst>
                 <a:ext uri="{FF2B5EF4-FFF2-40B4-BE49-F238E27FC236}">
-                  <a16:creationId xmlns="" xmlns:a16="http://schemas.microsoft.com/office/drawing/2014/main" id="{718408B9-204E-42E3-9E79-33E047E869BC}"/>
+                  <a16:creationId xmlns:a16="http://schemas.microsoft.com/office/drawing/2014/main" xmlns="" id="{718408B9-204E-42E3-9E79-33E047E869BC}"/>
                 </a:ext>
               </a:extLst>
             </p:cNvPr>
@@ -9989,7 +10104,7 @@
             <p:cNvPr id="37" name="Straight Connector 36">
               <a:extLst>
                 <a:ext uri="{FF2B5EF4-FFF2-40B4-BE49-F238E27FC236}">
-                  <a16:creationId xmlns="" xmlns:a16="http://schemas.microsoft.com/office/drawing/2014/main" id="{0AB66D97-DF6F-4CD2-AF13-42B5C852F673}"/>
+                  <a16:creationId xmlns:a16="http://schemas.microsoft.com/office/drawing/2014/main" xmlns="" id="{0AB66D97-DF6F-4CD2-AF13-42B5C852F673}"/>
                 </a:ext>
               </a:extLst>
             </p:cNvPr>
@@ -10035,7 +10150,7 @@
             <p:cNvPr id="38" name="Straight Connector 37">
               <a:extLst>
                 <a:ext uri="{FF2B5EF4-FFF2-40B4-BE49-F238E27FC236}">
-                  <a16:creationId xmlns="" xmlns:a16="http://schemas.microsoft.com/office/drawing/2014/main" id="{F2AFBA69-C196-4703-8AAB-5F72A8EDCEB5}"/>
+                  <a16:creationId xmlns:a16="http://schemas.microsoft.com/office/drawing/2014/main" xmlns="" id="{F2AFBA69-C196-4703-8AAB-5F72A8EDCEB5}"/>
                 </a:ext>
               </a:extLst>
             </p:cNvPr>
@@ -10081,7 +10196,7 @@
             <p:cNvPr id="39" name="Group 38">
               <a:extLst>
                 <a:ext uri="{FF2B5EF4-FFF2-40B4-BE49-F238E27FC236}">
-                  <a16:creationId xmlns="" xmlns:a16="http://schemas.microsoft.com/office/drawing/2014/main" id="{9AFC66C1-0C1C-4332-9C4E-782574C896B8}"/>
+                  <a16:creationId xmlns:a16="http://schemas.microsoft.com/office/drawing/2014/main" xmlns="" id="{9AFC66C1-0C1C-4332-9C4E-782574C896B8}"/>
                 </a:ext>
               </a:extLst>
             </p:cNvPr>
@@ -10104,7 +10219,7 @@
               <p:cNvPr id="45" name="Straight Connector 44">
                 <a:extLst>
                   <a:ext uri="{FF2B5EF4-FFF2-40B4-BE49-F238E27FC236}">
-                    <a16:creationId xmlns="" xmlns:a16="http://schemas.microsoft.com/office/drawing/2014/main" id="{872CA8AD-EAF6-40BE-9DDE-ECDB4A980CA5}"/>
+                    <a16:creationId xmlns:a16="http://schemas.microsoft.com/office/drawing/2014/main" xmlns="" id="{872CA8AD-EAF6-40BE-9DDE-ECDB4A980CA5}"/>
                   </a:ext>
                 </a:extLst>
               </p:cNvPr>
@@ -10148,7 +10263,7 @@
               <p:cNvPr id="46" name="Straight Connector 45">
                 <a:extLst>
                   <a:ext uri="{FF2B5EF4-FFF2-40B4-BE49-F238E27FC236}">
-                    <a16:creationId xmlns="" xmlns:a16="http://schemas.microsoft.com/office/drawing/2014/main" id="{57DD3EC7-1A13-4AFE-BD6F-DA12C281FAFB}"/>
+                    <a16:creationId xmlns:a16="http://schemas.microsoft.com/office/drawing/2014/main" xmlns="" id="{57DD3EC7-1A13-4AFE-BD6F-DA12C281FAFB}"/>
                   </a:ext>
                 </a:extLst>
               </p:cNvPr>
@@ -10193,7 +10308,7 @@
             <p:cNvPr id="40" name="Straight Connector 39">
               <a:extLst>
                 <a:ext uri="{FF2B5EF4-FFF2-40B4-BE49-F238E27FC236}">
-                  <a16:creationId xmlns="" xmlns:a16="http://schemas.microsoft.com/office/drawing/2014/main" id="{E46151FA-19E9-4E84-A082-EDAC6F76EA9D}"/>
+                  <a16:creationId xmlns:a16="http://schemas.microsoft.com/office/drawing/2014/main" xmlns="" id="{E46151FA-19E9-4E84-A082-EDAC6F76EA9D}"/>
                 </a:ext>
               </a:extLst>
             </p:cNvPr>
@@ -10239,7 +10354,7 @@
             <p:cNvPr id="41" name="Rectangle: Rounded Corners 40">
               <a:extLst>
                 <a:ext uri="{FF2B5EF4-FFF2-40B4-BE49-F238E27FC236}">
-                  <a16:creationId xmlns="" xmlns:a16="http://schemas.microsoft.com/office/drawing/2014/main" id="{3423EEF0-5B70-4091-B2DA-0740D2609643}"/>
+                  <a16:creationId xmlns:a16="http://schemas.microsoft.com/office/drawing/2014/main" xmlns="" id="{3423EEF0-5B70-4091-B2DA-0740D2609643}"/>
                 </a:ext>
               </a:extLst>
             </p:cNvPr>
@@ -10293,7 +10408,7 @@
             <p:cNvPr id="42" name="Group 41">
               <a:extLst>
                 <a:ext uri="{FF2B5EF4-FFF2-40B4-BE49-F238E27FC236}">
-                  <a16:creationId xmlns="" xmlns:a16="http://schemas.microsoft.com/office/drawing/2014/main" id="{49A8AAA7-98E7-4224-B027-830FFCC285A3}"/>
+                  <a16:creationId xmlns:a16="http://schemas.microsoft.com/office/drawing/2014/main" xmlns="" id="{49A8AAA7-98E7-4224-B027-830FFCC285A3}"/>
                 </a:ext>
               </a:extLst>
             </p:cNvPr>
@@ -10316,7 +10431,7 @@
               <p:cNvPr id="43" name="Straight Connector 42">
                 <a:extLst>
                   <a:ext uri="{FF2B5EF4-FFF2-40B4-BE49-F238E27FC236}">
-                    <a16:creationId xmlns="" xmlns:a16="http://schemas.microsoft.com/office/drawing/2014/main" id="{2129EC38-471E-4685-973E-BA7A7F567C42}"/>
+                    <a16:creationId xmlns:a16="http://schemas.microsoft.com/office/drawing/2014/main" xmlns="" id="{2129EC38-471E-4685-973E-BA7A7F567C42}"/>
                   </a:ext>
                 </a:extLst>
               </p:cNvPr>
@@ -10360,7 +10475,7 @@
               <p:cNvPr id="44" name="Straight Connector 43">
                 <a:extLst>
                   <a:ext uri="{FF2B5EF4-FFF2-40B4-BE49-F238E27FC236}">
-                    <a16:creationId xmlns="" xmlns:a16="http://schemas.microsoft.com/office/drawing/2014/main" id="{678142BE-84C9-4834-B6CC-6623E401661C}"/>
+                    <a16:creationId xmlns:a16="http://schemas.microsoft.com/office/drawing/2014/main" xmlns="" id="{678142BE-84C9-4834-B6CC-6623E401661C}"/>
                   </a:ext>
                 </a:extLst>
               </p:cNvPr>
@@ -10404,7 +10519,7 @@
     </p:spTree>
     <p:extLst>
       <p:ext uri="{BB962C8B-B14F-4D97-AF65-F5344CB8AC3E}">
-        <p14:creationId xmlns="" xmlns:p14="http://schemas.microsoft.com/office/powerpoint/2010/main" val="1679651758"/>
+        <p14:creationId xmlns:p14="http://schemas.microsoft.com/office/powerpoint/2010/main" xmlns="" val="1679651758"/>
       </p:ext>
     </p:extLst>
   </p:cSld>
@@ -10412,7 +10527,7 @@
     <a:masterClrMapping/>
   </p:clrMapOvr>
   <mc:AlternateContent xmlns:mc="http://schemas.openxmlformats.org/markup-compatibility/2006">
-    <mc:Choice xmlns="" xmlns:p14="http://schemas.microsoft.com/office/powerpoint/2010/main" Requires="p14">
+    <mc:Choice xmlns:p14="http://schemas.microsoft.com/office/powerpoint/2010/main" xmlns="" Requires="p14">
       <p:transition spd="slow" p14:dur="2000" advClick="0" advTm="5000"/>
     </mc:Choice>
     <mc:Fallback>
@@ -10444,7 +10559,7 @@
           <p:cNvPr id="5" name="Slide Number">
             <a:extLst>
               <a:ext uri="{FF2B5EF4-FFF2-40B4-BE49-F238E27FC236}">
-                <a16:creationId xmlns="" xmlns:a16="http://schemas.microsoft.com/office/drawing/2014/main" id="{F0B8C963-1813-4B69-AD27-6D02EBBBB569}"/>
+                <a16:creationId xmlns:a16="http://schemas.microsoft.com/office/drawing/2014/main" xmlns="" id="{F0B8C963-1813-4B69-AD27-6D02EBBBB569}"/>
               </a:ext>
             </a:extLst>
           </p:cNvPr>
@@ -10486,7 +10601,7 @@
           <p:cNvPr id="3" name="Rectangle Left">
             <a:extLst>
               <a:ext uri="{FF2B5EF4-FFF2-40B4-BE49-F238E27FC236}">
-                <a16:creationId xmlns="" xmlns:a16="http://schemas.microsoft.com/office/drawing/2014/main" id="{345FB1C8-7F66-4D5C-ACCE-AE919936BCFD}"/>
+                <a16:creationId xmlns:a16="http://schemas.microsoft.com/office/drawing/2014/main" xmlns="" id="{345FB1C8-7F66-4D5C-ACCE-AE919936BCFD}"/>
               </a:ext>
             </a:extLst>
           </p:cNvPr>
@@ -10567,7 +10682,7 @@
           <p:cNvPr id="7" name="Slide Body Text">
             <a:extLst>
               <a:ext uri="{FF2B5EF4-FFF2-40B4-BE49-F238E27FC236}">
-                <a16:creationId xmlns="" xmlns:a16="http://schemas.microsoft.com/office/drawing/2014/main" id="{7296EDA7-D37D-4B31-A888-371F0804124F}"/>
+                <a16:creationId xmlns:a16="http://schemas.microsoft.com/office/drawing/2014/main" xmlns="" id="{7296EDA7-D37D-4B31-A888-371F0804124F}"/>
               </a:ext>
             </a:extLst>
           </p:cNvPr>
@@ -10665,7 +10780,7 @@
           <p:cNvPr id="6" name="Slide Title">
             <a:extLst>
               <a:ext uri="{FF2B5EF4-FFF2-40B4-BE49-F238E27FC236}">
-                <a16:creationId xmlns="" xmlns:a16="http://schemas.microsoft.com/office/drawing/2014/main" id="{55A88B09-3557-48A3-BF27-42699C269215}"/>
+                <a16:creationId xmlns:a16="http://schemas.microsoft.com/office/drawing/2014/main" xmlns="" id="{55A88B09-3557-48A3-BF27-42699C269215}"/>
               </a:ext>
             </a:extLst>
           </p:cNvPr>
@@ -10702,7 +10817,7 @@
           <p:cNvPr id="28" name="Group 27">
             <a:extLst>
               <a:ext uri="{FF2B5EF4-FFF2-40B4-BE49-F238E27FC236}">
-                <a16:creationId xmlns="" xmlns:a16="http://schemas.microsoft.com/office/drawing/2014/main" id="{C4248838-4E67-439E-AE0A-0043D2CB04D6}"/>
+                <a16:creationId xmlns:a16="http://schemas.microsoft.com/office/drawing/2014/main" xmlns="" id="{C4248838-4E67-439E-AE0A-0043D2CB04D6}"/>
               </a:ext>
             </a:extLst>
           </p:cNvPr>
@@ -10722,7 +10837,7 @@
             <p:cNvPr id="29" name="Group 28">
               <a:extLst>
                 <a:ext uri="{FF2B5EF4-FFF2-40B4-BE49-F238E27FC236}">
-                  <a16:creationId xmlns="" xmlns:a16="http://schemas.microsoft.com/office/drawing/2014/main" id="{810CFD6A-2427-49D5-846A-5F93601D4184}"/>
+                  <a16:creationId xmlns:a16="http://schemas.microsoft.com/office/drawing/2014/main" xmlns="" id="{810CFD6A-2427-49D5-846A-5F93601D4184}"/>
                 </a:ext>
               </a:extLst>
             </p:cNvPr>
@@ -10742,7 +10857,7 @@
               <p:cNvPr id="42" name="Oval 41">
                 <a:extLst>
                   <a:ext uri="{FF2B5EF4-FFF2-40B4-BE49-F238E27FC236}">
-                    <a16:creationId xmlns="" xmlns:a16="http://schemas.microsoft.com/office/drawing/2014/main" id="{017B1AE5-5C36-4839-BA1F-B404EA44E701}"/>
+                    <a16:creationId xmlns:a16="http://schemas.microsoft.com/office/drawing/2014/main" xmlns="" id="{017B1AE5-5C36-4839-BA1F-B404EA44E701}"/>
                   </a:ext>
                 </a:extLst>
               </p:cNvPr>
@@ -10794,7 +10909,7 @@
               <p:cNvPr id="43" name="Rectangle 5">
                 <a:extLst>
                   <a:ext uri="{FF2B5EF4-FFF2-40B4-BE49-F238E27FC236}">
-                    <a16:creationId xmlns="" xmlns:a16="http://schemas.microsoft.com/office/drawing/2014/main" id="{FB963D79-BB49-4A1D-BA66-EA0670C79BAE}"/>
+                    <a16:creationId xmlns:a16="http://schemas.microsoft.com/office/drawing/2014/main" xmlns="" id="{FB963D79-BB49-4A1D-BA66-EA0670C79BAE}"/>
                   </a:ext>
                 </a:extLst>
               </p:cNvPr>
@@ -10939,7 +11054,7 @@
               <p:cNvPr id="44" name="Rectangle 5">
                 <a:extLst>
                   <a:ext uri="{FF2B5EF4-FFF2-40B4-BE49-F238E27FC236}">
-                    <a16:creationId xmlns="" xmlns:a16="http://schemas.microsoft.com/office/drawing/2014/main" id="{6D7746D8-B913-493B-AAE9-25BC6893D40E}"/>
+                    <a16:creationId xmlns:a16="http://schemas.microsoft.com/office/drawing/2014/main" xmlns="" id="{6D7746D8-B913-493B-AAE9-25BC6893D40E}"/>
                   </a:ext>
                 </a:extLst>
               </p:cNvPr>
@@ -11084,7 +11199,7 @@
               <p:cNvPr id="45" name="Arc 44">
                 <a:extLst>
                   <a:ext uri="{FF2B5EF4-FFF2-40B4-BE49-F238E27FC236}">
-                    <a16:creationId xmlns="" xmlns:a16="http://schemas.microsoft.com/office/drawing/2014/main" id="{29031C02-E965-417B-8799-96061B14F30D}"/>
+                    <a16:creationId xmlns:a16="http://schemas.microsoft.com/office/drawing/2014/main" xmlns="" id="{29031C02-E965-417B-8799-96061B14F30D}"/>
                   </a:ext>
                 </a:extLst>
               </p:cNvPr>
@@ -11143,7 +11258,7 @@
               <p:cNvPr id="46" name="Arc 45">
                 <a:extLst>
                   <a:ext uri="{FF2B5EF4-FFF2-40B4-BE49-F238E27FC236}">
-                    <a16:creationId xmlns="" xmlns:a16="http://schemas.microsoft.com/office/drawing/2014/main" id="{26BFD8A6-BC99-4B16-BA10-08A9E5C681C0}"/>
+                    <a16:creationId xmlns:a16="http://schemas.microsoft.com/office/drawing/2014/main" xmlns="" id="{26BFD8A6-BC99-4B16-BA10-08A9E5C681C0}"/>
                   </a:ext>
                 </a:extLst>
               </p:cNvPr>
@@ -11203,7 +11318,7 @@
             <p:cNvPr id="30" name="Rectangle: Rounded Corners 29">
               <a:extLst>
                 <a:ext uri="{FF2B5EF4-FFF2-40B4-BE49-F238E27FC236}">
-                  <a16:creationId xmlns="" xmlns:a16="http://schemas.microsoft.com/office/drawing/2014/main" id="{B310277F-A78E-4FB9-9EA9-88BE4F1D585B}"/>
+                  <a16:creationId xmlns:a16="http://schemas.microsoft.com/office/drawing/2014/main" xmlns="" id="{B310277F-A78E-4FB9-9EA9-88BE4F1D585B}"/>
                 </a:ext>
               </a:extLst>
             </p:cNvPr>
@@ -11257,7 +11372,7 @@
             <p:cNvPr id="31" name="Rectangle: Rounded Corners 30">
               <a:extLst>
                 <a:ext uri="{FF2B5EF4-FFF2-40B4-BE49-F238E27FC236}">
-                  <a16:creationId xmlns="" xmlns:a16="http://schemas.microsoft.com/office/drawing/2014/main" id="{A92CF92B-C212-4542-83AE-A0058B5BB5EA}"/>
+                  <a16:creationId xmlns:a16="http://schemas.microsoft.com/office/drawing/2014/main" xmlns="" id="{A92CF92B-C212-4542-83AE-A0058B5BB5EA}"/>
                 </a:ext>
               </a:extLst>
             </p:cNvPr>
@@ -11318,7 +11433,7 @@
             <p:cNvPr id="32" name="Straight Connector 31">
               <a:extLst>
                 <a:ext uri="{FF2B5EF4-FFF2-40B4-BE49-F238E27FC236}">
-                  <a16:creationId xmlns="" xmlns:a16="http://schemas.microsoft.com/office/drawing/2014/main" id="{563B4374-5C0D-461F-B3BD-78D99614D365}"/>
+                  <a16:creationId xmlns:a16="http://schemas.microsoft.com/office/drawing/2014/main" xmlns="" id="{563B4374-5C0D-461F-B3BD-78D99614D365}"/>
                 </a:ext>
               </a:extLst>
             </p:cNvPr>
@@ -11364,7 +11479,7 @@
             <p:cNvPr id="33" name="Straight Connector 32">
               <a:extLst>
                 <a:ext uri="{FF2B5EF4-FFF2-40B4-BE49-F238E27FC236}">
-                  <a16:creationId xmlns="" xmlns:a16="http://schemas.microsoft.com/office/drawing/2014/main" id="{FBC6FDE7-AEA1-4230-8433-4C088A0FF5F9}"/>
+                  <a16:creationId xmlns:a16="http://schemas.microsoft.com/office/drawing/2014/main" xmlns="" id="{FBC6FDE7-AEA1-4230-8433-4C088A0FF5F9}"/>
                 </a:ext>
               </a:extLst>
             </p:cNvPr>
@@ -11410,7 +11525,7 @@
             <p:cNvPr id="34" name="Group 33">
               <a:extLst>
                 <a:ext uri="{FF2B5EF4-FFF2-40B4-BE49-F238E27FC236}">
-                  <a16:creationId xmlns="" xmlns:a16="http://schemas.microsoft.com/office/drawing/2014/main" id="{C4D1021D-07C7-4331-8FF6-36980A30978B}"/>
+                  <a16:creationId xmlns:a16="http://schemas.microsoft.com/office/drawing/2014/main" xmlns="" id="{C4D1021D-07C7-4331-8FF6-36980A30978B}"/>
                 </a:ext>
               </a:extLst>
             </p:cNvPr>
@@ -11433,7 +11548,7 @@
               <p:cNvPr id="40" name="Straight Connector 39">
                 <a:extLst>
                   <a:ext uri="{FF2B5EF4-FFF2-40B4-BE49-F238E27FC236}">
-                    <a16:creationId xmlns="" xmlns:a16="http://schemas.microsoft.com/office/drawing/2014/main" id="{13B7FE99-95CF-45D5-966B-87A979B93431}"/>
+                    <a16:creationId xmlns:a16="http://schemas.microsoft.com/office/drawing/2014/main" xmlns="" id="{13B7FE99-95CF-45D5-966B-87A979B93431}"/>
                   </a:ext>
                 </a:extLst>
               </p:cNvPr>
@@ -11477,7 +11592,7 @@
               <p:cNvPr id="41" name="Straight Connector 40">
                 <a:extLst>
                   <a:ext uri="{FF2B5EF4-FFF2-40B4-BE49-F238E27FC236}">
-                    <a16:creationId xmlns="" xmlns:a16="http://schemas.microsoft.com/office/drawing/2014/main" id="{71BBA69B-19FF-4ADB-A739-AD8136A5F0A6}"/>
+                    <a16:creationId xmlns:a16="http://schemas.microsoft.com/office/drawing/2014/main" xmlns="" id="{71BBA69B-19FF-4ADB-A739-AD8136A5F0A6}"/>
                   </a:ext>
                 </a:extLst>
               </p:cNvPr>
@@ -11522,7 +11637,7 @@
             <p:cNvPr id="35" name="Straight Connector 34">
               <a:extLst>
                 <a:ext uri="{FF2B5EF4-FFF2-40B4-BE49-F238E27FC236}">
-                  <a16:creationId xmlns="" xmlns:a16="http://schemas.microsoft.com/office/drawing/2014/main" id="{BFD1D86B-562B-40B2-8E46-34233EFEE7FC}"/>
+                  <a16:creationId xmlns:a16="http://schemas.microsoft.com/office/drawing/2014/main" xmlns="" id="{BFD1D86B-562B-40B2-8E46-34233EFEE7FC}"/>
                 </a:ext>
               </a:extLst>
             </p:cNvPr>
@@ -11568,7 +11683,7 @@
             <p:cNvPr id="36" name="Rectangle: Rounded Corners 35">
               <a:extLst>
                 <a:ext uri="{FF2B5EF4-FFF2-40B4-BE49-F238E27FC236}">
-                  <a16:creationId xmlns="" xmlns:a16="http://schemas.microsoft.com/office/drawing/2014/main" id="{388C17BD-16A1-43C5-BFFA-2FF9174719E1}"/>
+                  <a16:creationId xmlns:a16="http://schemas.microsoft.com/office/drawing/2014/main" xmlns="" id="{388C17BD-16A1-43C5-BFFA-2FF9174719E1}"/>
                 </a:ext>
               </a:extLst>
             </p:cNvPr>
@@ -11622,7 +11737,7 @@
             <p:cNvPr id="37" name="Group 36">
               <a:extLst>
                 <a:ext uri="{FF2B5EF4-FFF2-40B4-BE49-F238E27FC236}">
-                  <a16:creationId xmlns="" xmlns:a16="http://schemas.microsoft.com/office/drawing/2014/main" id="{1B3B910E-ACFC-4F28-8E28-F02E1588B87E}"/>
+                  <a16:creationId xmlns:a16="http://schemas.microsoft.com/office/drawing/2014/main" xmlns="" id="{1B3B910E-ACFC-4F28-8E28-F02E1588B87E}"/>
                 </a:ext>
               </a:extLst>
             </p:cNvPr>
@@ -11645,7 +11760,7 @@
               <p:cNvPr id="38" name="Straight Connector 37">
                 <a:extLst>
                   <a:ext uri="{FF2B5EF4-FFF2-40B4-BE49-F238E27FC236}">
-                    <a16:creationId xmlns="" xmlns:a16="http://schemas.microsoft.com/office/drawing/2014/main" id="{F57772B6-06C0-4F54-AA94-D3F92DA4716A}"/>
+                    <a16:creationId xmlns:a16="http://schemas.microsoft.com/office/drawing/2014/main" xmlns="" id="{F57772B6-06C0-4F54-AA94-D3F92DA4716A}"/>
                   </a:ext>
                 </a:extLst>
               </p:cNvPr>
@@ -11689,7 +11804,7 @@
               <p:cNvPr id="39" name="Straight Connector 38">
                 <a:extLst>
                   <a:ext uri="{FF2B5EF4-FFF2-40B4-BE49-F238E27FC236}">
-                    <a16:creationId xmlns="" xmlns:a16="http://schemas.microsoft.com/office/drawing/2014/main" id="{23370C1F-7876-4278-AB20-78F6CAA385E2}"/>
+                    <a16:creationId xmlns:a16="http://schemas.microsoft.com/office/drawing/2014/main" xmlns="" id="{23370C1F-7876-4278-AB20-78F6CAA385E2}"/>
                   </a:ext>
                 </a:extLst>
               </p:cNvPr>
@@ -11733,7 +11848,7 @@
     </p:spTree>
     <p:extLst>
       <p:ext uri="{BB962C8B-B14F-4D97-AF65-F5344CB8AC3E}">
-        <p14:creationId xmlns="" xmlns:p14="http://schemas.microsoft.com/office/powerpoint/2010/main" val="3284562556"/>
+        <p14:creationId xmlns:p14="http://schemas.microsoft.com/office/powerpoint/2010/main" xmlns="" val="3284562556"/>
       </p:ext>
     </p:extLst>
   </p:cSld>
@@ -11741,7 +11856,7 @@
     <a:masterClrMapping/>
   </p:clrMapOvr>
   <mc:AlternateContent xmlns:mc="http://schemas.openxmlformats.org/markup-compatibility/2006">
-    <mc:Choice xmlns="" xmlns:p14="http://schemas.microsoft.com/office/powerpoint/2010/main" Requires="p14">
+    <mc:Choice xmlns:p14="http://schemas.microsoft.com/office/powerpoint/2010/main" xmlns="" Requires="p14">
       <p:transition spd="slow" p14:dur="2000" advClick="0" advTm="5000"/>
     </mc:Choice>
     <mc:Fallback>
@@ -11773,7 +11888,7 @@
           <p:cNvPr id="8" name="Slide Number">
             <a:extLst>
               <a:ext uri="{FF2B5EF4-FFF2-40B4-BE49-F238E27FC236}">
-                <a16:creationId xmlns="" xmlns:a16="http://schemas.microsoft.com/office/drawing/2014/main" id="{509D954E-A844-4072-A556-DE584BEB9321}"/>
+                <a16:creationId xmlns:a16="http://schemas.microsoft.com/office/drawing/2014/main" xmlns="" id="{509D954E-A844-4072-A556-DE584BEB9321}"/>
               </a:ext>
             </a:extLst>
           </p:cNvPr>
@@ -11815,7 +11930,7 @@
           <p:cNvPr id="6" name="Code Box">
             <a:extLst>
               <a:ext uri="{FF2B5EF4-FFF2-40B4-BE49-F238E27FC236}">
-                <a16:creationId xmlns="" xmlns:a16="http://schemas.microsoft.com/office/drawing/2014/main" id="{3278A82F-5546-4977-9F75-2A933B415945}"/>
+                <a16:creationId xmlns:a16="http://schemas.microsoft.com/office/drawing/2014/main" xmlns="" id="{3278A82F-5546-4977-9F75-2A933B415945}"/>
               </a:ext>
             </a:extLst>
           </p:cNvPr>
@@ -11902,7 +12017,7 @@
           <p:cNvPr id="21" name="Slide Body Text">
             <a:extLst>
               <a:ext uri="{FF2B5EF4-FFF2-40B4-BE49-F238E27FC236}">
-                <a16:creationId xmlns="" xmlns:a16="http://schemas.microsoft.com/office/drawing/2014/main" id="{04F318BE-2BAD-4677-871C-D78A4BF0CBA6}"/>
+                <a16:creationId xmlns:a16="http://schemas.microsoft.com/office/drawing/2014/main" xmlns="" id="{04F318BE-2BAD-4677-871C-D78A4BF0CBA6}"/>
               </a:ext>
             </a:extLst>
           </p:cNvPr>
@@ -11949,7 +12064,7 @@
           <p:cNvPr id="9" name="Rectangle Top">
             <a:extLst>
               <a:ext uri="{FF2B5EF4-FFF2-40B4-BE49-F238E27FC236}">
-                <a16:creationId xmlns="" xmlns:a16="http://schemas.microsoft.com/office/drawing/2014/main" id="{A15CE03A-0933-4E5D-9EA1-718D4F802FFC}"/>
+                <a16:creationId xmlns:a16="http://schemas.microsoft.com/office/drawing/2014/main" xmlns="" id="{A15CE03A-0933-4E5D-9EA1-718D4F802FFC}"/>
               </a:ext>
             </a:extLst>
           </p:cNvPr>
@@ -12030,7 +12145,7 @@
           <p:cNvPr id="10" name="Logo Software University" descr="Software University logo">
             <a:extLst>
               <a:ext uri="{FF2B5EF4-FFF2-40B4-BE49-F238E27FC236}">
-                <a16:creationId xmlns="" xmlns:a16="http://schemas.microsoft.com/office/drawing/2014/main" id="{8C01D7AF-7CBD-46E1-99F3-8EB60E838D91}"/>
+                <a16:creationId xmlns:a16="http://schemas.microsoft.com/office/drawing/2014/main" xmlns="" id="{8C01D7AF-7CBD-46E1-99F3-8EB60E838D91}"/>
               </a:ext>
             </a:extLst>
           </p:cNvPr>
@@ -12043,7 +12158,7 @@
           <a:blip r:embed="rId2" cstate="print">
             <a:extLst>
               <a:ext uri="{28A0092B-C50C-407E-A947-70E740481C1C}">
-                <a14:useLocalDpi xmlns="" xmlns:a14="http://schemas.microsoft.com/office/drawing/2010/main" val="0"/>
+                <a14:useLocalDpi xmlns:a14="http://schemas.microsoft.com/office/drawing/2010/main" xmlns="" val="0"/>
               </a:ext>
             </a:extLst>
           </a:blip>
@@ -12066,7 +12181,7 @@
           <p:cNvPr id="11" name="Slide Title">
             <a:extLst>
               <a:ext uri="{FF2B5EF4-FFF2-40B4-BE49-F238E27FC236}">
-                <a16:creationId xmlns="" xmlns:a16="http://schemas.microsoft.com/office/drawing/2014/main" id="{47D60833-F0A9-4F29-8C06-A963A7C8BE93}"/>
+                <a16:creationId xmlns:a16="http://schemas.microsoft.com/office/drawing/2014/main" xmlns="" id="{47D60833-F0A9-4F29-8C06-A963A7C8BE93}"/>
               </a:ext>
             </a:extLst>
           </p:cNvPr>
@@ -12105,7 +12220,7 @@
     </p:spTree>
     <p:extLst>
       <p:ext uri="{BB962C8B-B14F-4D97-AF65-F5344CB8AC3E}">
-        <p14:creationId xmlns="" xmlns:p14="http://schemas.microsoft.com/office/powerpoint/2010/main" val="1000829826"/>
+        <p14:creationId xmlns:p14="http://schemas.microsoft.com/office/powerpoint/2010/main" xmlns="" val="1000829826"/>
       </p:ext>
     </p:extLst>
   </p:cSld>
@@ -12113,7 +12228,7 @@
     <a:masterClrMapping/>
   </p:clrMapOvr>
   <mc:AlternateContent xmlns:mc="http://schemas.openxmlformats.org/markup-compatibility/2006">
-    <mc:Choice xmlns="" xmlns:p14="http://schemas.microsoft.com/office/powerpoint/2010/main" Requires="p14">
+    <mc:Choice xmlns:p14="http://schemas.microsoft.com/office/powerpoint/2010/main" xmlns="" Requires="p14">
       <p:transition spd="slow" p14:dur="2000" advClick="0" advTm="5000"/>
     </mc:Choice>
     <mc:Fallback>
@@ -12145,7 +12260,7 @@
           <p:cNvPr id="10" name="Slide Number">
             <a:extLst>
               <a:ext uri="{FF2B5EF4-FFF2-40B4-BE49-F238E27FC236}">
-                <a16:creationId xmlns="" xmlns:a16="http://schemas.microsoft.com/office/drawing/2014/main" id="{39DDE17E-5472-41F3-AF5F-54DFF10DC63C}"/>
+                <a16:creationId xmlns:a16="http://schemas.microsoft.com/office/drawing/2014/main" xmlns="" id="{39DDE17E-5472-41F3-AF5F-54DFF10DC63C}"/>
               </a:ext>
             </a:extLst>
           </p:cNvPr>
@@ -12187,7 +12302,7 @@
           <p:cNvPr id="9" name="Picture SoftUni Mascot" descr="SoftUni mascot with laptop">
             <a:extLst>
               <a:ext uri="{FF2B5EF4-FFF2-40B4-BE49-F238E27FC236}">
-                <a16:creationId xmlns="" xmlns:a16="http://schemas.microsoft.com/office/drawing/2014/main" id="{DC4365F6-D2C1-47B4-8477-38FD2C7711AA}"/>
+                <a16:creationId xmlns:a16="http://schemas.microsoft.com/office/drawing/2014/main" xmlns="" id="{DC4365F6-D2C1-47B4-8477-38FD2C7711AA}"/>
               </a:ext>
             </a:extLst>
           </p:cNvPr>
@@ -12200,7 +12315,7 @@
           <a:blip r:embed="rId2" cstate="print">
             <a:extLst>
               <a:ext uri="{28A0092B-C50C-407E-A947-70E740481C1C}">
-                <a14:useLocalDpi xmlns="" xmlns:a14="http://schemas.microsoft.com/office/drawing/2010/main" val="0"/>
+                <a14:useLocalDpi xmlns:a14="http://schemas.microsoft.com/office/drawing/2010/main" xmlns="" val="0"/>
               </a:ext>
             </a:extLst>
           </a:blip>
@@ -12223,7 +12338,7 @@
           <p:cNvPr id="23" name="Slide Body Text">
             <a:extLst>
               <a:ext uri="{FF2B5EF4-FFF2-40B4-BE49-F238E27FC236}">
-                <a16:creationId xmlns="" xmlns:a16="http://schemas.microsoft.com/office/drawing/2014/main" id="{889D93F4-ABFA-46BF-8E5D-FE6562ACB20F}"/>
+                <a16:creationId xmlns:a16="http://schemas.microsoft.com/office/drawing/2014/main" xmlns="" id="{889D93F4-ABFA-46BF-8E5D-FE6562ACB20F}"/>
               </a:ext>
             </a:extLst>
           </p:cNvPr>
@@ -12314,7 +12429,7 @@
           <p:cNvPr id="8" name="Rectangle Top">
             <a:extLst>
               <a:ext uri="{FF2B5EF4-FFF2-40B4-BE49-F238E27FC236}">
-                <a16:creationId xmlns="" xmlns:a16="http://schemas.microsoft.com/office/drawing/2014/main" id="{930E0800-9260-4369-8330-8264DD33C5CE}"/>
+                <a16:creationId xmlns:a16="http://schemas.microsoft.com/office/drawing/2014/main" xmlns="" id="{930E0800-9260-4369-8330-8264DD33C5CE}"/>
               </a:ext>
             </a:extLst>
           </p:cNvPr>
@@ -12395,7 +12510,7 @@
           <p:cNvPr id="11" name="Logo Software University" descr="Software University logo">
             <a:extLst>
               <a:ext uri="{FF2B5EF4-FFF2-40B4-BE49-F238E27FC236}">
-                <a16:creationId xmlns="" xmlns:a16="http://schemas.microsoft.com/office/drawing/2014/main" id="{14F779A7-4A91-448B-BEFA-956C70A1C22F}"/>
+                <a16:creationId xmlns:a16="http://schemas.microsoft.com/office/drawing/2014/main" xmlns="" id="{14F779A7-4A91-448B-BEFA-956C70A1C22F}"/>
               </a:ext>
             </a:extLst>
           </p:cNvPr>
@@ -12408,7 +12523,7 @@
           <a:blip r:embed="rId3" cstate="print">
             <a:extLst>
               <a:ext uri="{28A0092B-C50C-407E-A947-70E740481C1C}">
-                <a14:useLocalDpi xmlns="" xmlns:a14="http://schemas.microsoft.com/office/drawing/2010/main" val="0"/>
+                <a14:useLocalDpi xmlns:a14="http://schemas.microsoft.com/office/drawing/2010/main" xmlns="" val="0"/>
               </a:ext>
             </a:extLst>
           </a:blip>
@@ -12431,7 +12546,7 @@
           <p:cNvPr id="13" name="Slide Title">
             <a:extLst>
               <a:ext uri="{FF2B5EF4-FFF2-40B4-BE49-F238E27FC236}">
-                <a16:creationId xmlns="" xmlns:a16="http://schemas.microsoft.com/office/drawing/2014/main" id="{357D7BE1-6358-42CC-94F3-7BCDD91DCB6D}"/>
+                <a16:creationId xmlns:a16="http://schemas.microsoft.com/office/drawing/2014/main" xmlns="" id="{357D7BE1-6358-42CC-94F3-7BCDD91DCB6D}"/>
               </a:ext>
             </a:extLst>
           </p:cNvPr>
@@ -12470,7 +12585,7 @@
     </p:spTree>
     <p:extLst>
       <p:ext uri="{BB962C8B-B14F-4D97-AF65-F5344CB8AC3E}">
-        <p14:creationId xmlns="" xmlns:p14="http://schemas.microsoft.com/office/powerpoint/2010/main" val="1028724482"/>
+        <p14:creationId xmlns:p14="http://schemas.microsoft.com/office/powerpoint/2010/main" xmlns="" val="1028724482"/>
       </p:ext>
     </p:extLst>
   </p:cSld>
@@ -12478,7 +12593,7 @@
     <a:masterClrMapping/>
   </p:clrMapOvr>
   <mc:AlternateContent xmlns:mc="http://schemas.openxmlformats.org/markup-compatibility/2006">
-    <mc:Choice xmlns="" xmlns:p14="http://schemas.microsoft.com/office/powerpoint/2010/main" Requires="p14">
+    <mc:Choice xmlns:p14="http://schemas.microsoft.com/office/powerpoint/2010/main" xmlns="" Requires="p14">
       <p:transition spd="slow" p14:dur="2000" advClick="0" advTm="5000"/>
     </mc:Choice>
     <mc:Fallback>
@@ -12590,7 +12705,7 @@
           <p:cNvPr id="11" name="Slide Number">
             <a:extLst>
               <a:ext uri="{FF2B5EF4-FFF2-40B4-BE49-F238E27FC236}">
-                <a16:creationId xmlns="" xmlns:a16="http://schemas.microsoft.com/office/drawing/2014/main" id="{6750ECE4-94E0-469B-B8E4-562792823B0F}"/>
+                <a16:creationId xmlns:a16="http://schemas.microsoft.com/office/drawing/2014/main" xmlns="" id="{6750ECE4-94E0-469B-B8E4-562792823B0F}"/>
               </a:ext>
             </a:extLst>
           </p:cNvPr>
@@ -12713,7 +12828,7 @@
           <p:cNvPr id="12" name="Logo Software University Down" descr="Software University logo">
             <a:extLst>
               <a:ext uri="{FF2B5EF4-FFF2-40B4-BE49-F238E27FC236}">
-                <a16:creationId xmlns="" xmlns:a16="http://schemas.microsoft.com/office/drawing/2014/main" id="{7028D2F0-1E67-414B-A93D-D3F8F131A132}"/>
+                <a16:creationId xmlns:a16="http://schemas.microsoft.com/office/drawing/2014/main" xmlns="" id="{7028D2F0-1E67-414B-A93D-D3F8F131A132}"/>
               </a:ext>
             </a:extLst>
           </p:cNvPr>
@@ -12726,7 +12841,7 @@
           <a:blip r:embed="rId2" cstate="print">
             <a:extLst>
               <a:ext uri="{28A0092B-C50C-407E-A947-70E740481C1C}">
-                <a14:useLocalDpi xmlns="" xmlns:a14="http://schemas.microsoft.com/office/drawing/2010/main" val="0"/>
+                <a14:useLocalDpi xmlns:a14="http://schemas.microsoft.com/office/drawing/2010/main" xmlns="" val="0"/>
               </a:ext>
             </a:extLst>
           </a:blip>
@@ -12749,7 +12864,7 @@
           <p:cNvPr id="10" name="Text Placeholder Right">
             <a:extLst>
               <a:ext uri="{FF2B5EF4-FFF2-40B4-BE49-F238E27FC236}">
-                <a16:creationId xmlns="" xmlns:a16="http://schemas.microsoft.com/office/drawing/2014/main" id="{AF69A59F-C564-4A04-B1CC-31C261499991}"/>
+                <a16:creationId xmlns:a16="http://schemas.microsoft.com/office/drawing/2014/main" xmlns="" id="{AF69A59F-C564-4A04-B1CC-31C261499991}"/>
               </a:ext>
             </a:extLst>
           </p:cNvPr>
@@ -12827,7 +12942,7 @@
           <p:cNvPr id="9" name="Text Placeholder Left">
             <a:extLst>
               <a:ext uri="{FF2B5EF4-FFF2-40B4-BE49-F238E27FC236}">
-                <a16:creationId xmlns="" xmlns:a16="http://schemas.microsoft.com/office/drawing/2014/main" id="{C8A626D2-456B-41EF-9818-EA8DD7E314DA}"/>
+                <a16:creationId xmlns:a16="http://schemas.microsoft.com/office/drawing/2014/main" xmlns="" id="{C8A626D2-456B-41EF-9818-EA8DD7E314DA}"/>
               </a:ext>
             </a:extLst>
           </p:cNvPr>
@@ -12905,7 +13020,7 @@
           <p:cNvPr id="13" name="Rectangle Top">
             <a:extLst>
               <a:ext uri="{FF2B5EF4-FFF2-40B4-BE49-F238E27FC236}">
-                <a16:creationId xmlns="" xmlns:a16="http://schemas.microsoft.com/office/drawing/2014/main" id="{E03301DA-D0AF-46FD-8740-2F761250203A}"/>
+                <a16:creationId xmlns:a16="http://schemas.microsoft.com/office/drawing/2014/main" xmlns="" id="{E03301DA-D0AF-46FD-8740-2F761250203A}"/>
               </a:ext>
             </a:extLst>
           </p:cNvPr>
@@ -12986,7 +13101,7 @@
           <p:cNvPr id="14" name="Logo Software University" descr="Software University logo">
             <a:extLst>
               <a:ext uri="{FF2B5EF4-FFF2-40B4-BE49-F238E27FC236}">
-                <a16:creationId xmlns="" xmlns:a16="http://schemas.microsoft.com/office/drawing/2014/main" id="{19A67BB9-D880-4EAD-B90E-89C4219BFC0B}"/>
+                <a16:creationId xmlns:a16="http://schemas.microsoft.com/office/drawing/2014/main" xmlns="" id="{19A67BB9-D880-4EAD-B90E-89C4219BFC0B}"/>
               </a:ext>
             </a:extLst>
           </p:cNvPr>
@@ -12999,7 +13114,7 @@
           <a:blip r:embed="rId3" cstate="print">
             <a:extLst>
               <a:ext uri="{28A0092B-C50C-407E-A947-70E740481C1C}">
-                <a14:useLocalDpi xmlns="" xmlns:a14="http://schemas.microsoft.com/office/drawing/2010/main" val="0"/>
+                <a14:useLocalDpi xmlns:a14="http://schemas.microsoft.com/office/drawing/2010/main" xmlns="" val="0"/>
               </a:ext>
             </a:extLst>
           </a:blip>
@@ -13022,7 +13137,7 @@
           <p:cNvPr id="15" name="Slide Title">
             <a:extLst>
               <a:ext uri="{FF2B5EF4-FFF2-40B4-BE49-F238E27FC236}">
-                <a16:creationId xmlns="" xmlns:a16="http://schemas.microsoft.com/office/drawing/2014/main" id="{EA9A94D1-F9F6-4D7B-85E3-896A987B6A4D}"/>
+                <a16:creationId xmlns:a16="http://schemas.microsoft.com/office/drawing/2014/main" xmlns="" id="{EA9A94D1-F9F6-4D7B-85E3-896A987B6A4D}"/>
               </a:ext>
             </a:extLst>
           </p:cNvPr>
@@ -13061,7 +13176,7 @@
     </p:spTree>
     <p:extLst>
       <p:ext uri="{BB962C8B-B14F-4D97-AF65-F5344CB8AC3E}">
-        <p14:creationId xmlns="" xmlns:p14="http://schemas.microsoft.com/office/powerpoint/2010/main" val="3044033461"/>
+        <p14:creationId xmlns:p14="http://schemas.microsoft.com/office/powerpoint/2010/main" xmlns="" val="3044033461"/>
       </p:ext>
     </p:extLst>
   </p:cSld>
@@ -13069,7 +13184,7 @@
     <a:masterClrMapping/>
   </p:clrMapOvr>
   <mc:AlternateContent xmlns:mc="http://schemas.openxmlformats.org/markup-compatibility/2006">
-    <mc:Choice xmlns="" xmlns:p14="http://schemas.microsoft.com/office/powerpoint/2010/main" Requires="p14">
+    <mc:Choice xmlns:p14="http://schemas.microsoft.com/office/powerpoint/2010/main" xmlns="" Requires="p14">
       <p:transition spd="slow" p14:dur="2000" advClick="0" advTm="5000"/>
     </mc:Choice>
     <mc:Fallback>
@@ -13078,7 +13193,7 @@
   </mc:AlternateContent>
   <p:extLst>
     <p:ext uri="{DCECCB84-F9BA-43D5-87BE-67443E8EF086}">
-      <p15:sldGuideLst xmlns="" xmlns:p15="http://schemas.microsoft.com/office/powerpoint/2012/main">
+      <p15:sldGuideLst xmlns:p15="http://schemas.microsoft.com/office/powerpoint/2012/main" xmlns="">
         <p15:guide id="1" orient="horz" pos="2160">
           <p15:clr>
             <a:srgbClr val="FBAE40"/>
@@ -13125,7 +13240,7 @@
           <p:cNvPr id="4" name="Picture Background" descr="SoftUni Background">
             <a:extLst>
               <a:ext uri="{FF2B5EF4-FFF2-40B4-BE49-F238E27FC236}">
-                <a16:creationId xmlns="" xmlns:a16="http://schemas.microsoft.com/office/drawing/2014/main" id="{5BE90A63-DDD9-4B3B-A234-DF69B9BC812F}"/>
+                <a16:creationId xmlns:a16="http://schemas.microsoft.com/office/drawing/2014/main" xmlns="" id="{5BE90A63-DDD9-4B3B-A234-DF69B9BC812F}"/>
               </a:ext>
             </a:extLst>
           </p:cNvPr>
@@ -13154,7 +13269,7 @@
           <p:cNvPr id="11" name="Slide Body Text">
             <a:extLst>
               <a:ext uri="{FF2B5EF4-FFF2-40B4-BE49-F238E27FC236}">
-                <a16:creationId xmlns="" xmlns:a16="http://schemas.microsoft.com/office/drawing/2014/main" id="{90CBFB32-9F46-4F2F-8A54-9EE8BED27855}"/>
+                <a16:creationId xmlns:a16="http://schemas.microsoft.com/office/drawing/2014/main" xmlns="" id="{90CBFB32-9F46-4F2F-8A54-9EE8BED27855}"/>
               </a:ext>
             </a:extLst>
           </p:cNvPr>
@@ -13222,7 +13337,7 @@
           <p:cNvPr id="10" name="Slide Title">
             <a:extLst>
               <a:ext uri="{FF2B5EF4-FFF2-40B4-BE49-F238E27FC236}">
-                <a16:creationId xmlns="" xmlns:a16="http://schemas.microsoft.com/office/drawing/2014/main" id="{B770C392-3003-4C35-9625-BB041F8257BA}"/>
+                <a16:creationId xmlns:a16="http://schemas.microsoft.com/office/drawing/2014/main" xmlns="" id="{B770C392-3003-4C35-9625-BB041F8257BA}"/>
               </a:ext>
             </a:extLst>
           </p:cNvPr>
@@ -13259,7 +13374,7 @@
     </p:spTree>
     <p:extLst>
       <p:ext uri="{BB962C8B-B14F-4D97-AF65-F5344CB8AC3E}">
-        <p14:creationId xmlns="" xmlns:p14="http://schemas.microsoft.com/office/powerpoint/2010/main" val="156789181"/>
+        <p14:creationId xmlns:p14="http://schemas.microsoft.com/office/powerpoint/2010/main" xmlns="" val="156789181"/>
       </p:ext>
     </p:extLst>
   </p:cSld>
@@ -13283,7 +13398,7 @@
     <p:sldLayoutId id="2147483697" r:id="rId16"/>
   </p:sldLayoutIdLst>
   <mc:AlternateContent xmlns:mc="http://schemas.openxmlformats.org/markup-compatibility/2006">
-    <mc:Choice xmlns="" xmlns:p14="http://schemas.microsoft.com/office/powerpoint/2010/main" Requires="p14">
+    <mc:Choice xmlns:p14="http://schemas.microsoft.com/office/powerpoint/2010/main" xmlns="" Requires="p14">
       <p:transition spd="slow" p14:dur="2000" advClick="0" advTm="5000"/>
     </mc:Choice>
     <mc:Fallback>
@@ -13573,7 +13688,7 @@
   </p:txStyles>
   <p:extLst>
     <p:ext uri="{27BBF7A9-308A-43DC-89C8-2F10F3537804}">
-      <p15:sldGuideLst xmlns="" xmlns:p15="http://schemas.microsoft.com/office/powerpoint/2012/main">
+      <p15:sldGuideLst xmlns:p15="http://schemas.microsoft.com/office/powerpoint/2012/main" xmlns="">
         <p15:guide id="1" orient="horz" pos="2160">
           <p15:clr>
             <a:srgbClr val="F26B43"/>
@@ -13659,7 +13774,7 @@
           <p:cNvPr id="10" name="Author Position">
             <a:extLst>
               <a:ext uri="{FF2B5EF4-FFF2-40B4-BE49-F238E27FC236}">
-                <a16:creationId xmlns="" xmlns:a16="http://schemas.microsoft.com/office/drawing/2014/main" id="{F585BC4C-0F13-4FD4-8F23-99FD46618370}"/>
+                <a16:creationId xmlns:a16="http://schemas.microsoft.com/office/drawing/2014/main" xmlns="" id="{F585BC4C-0F13-4FD4-8F23-99FD46618370}"/>
               </a:ext>
             </a:extLst>
           </p:cNvPr>
@@ -13687,7 +13802,7 @@
           <p:cNvPr id="9" name="Author Name">
             <a:extLst>
               <a:ext uri="{FF2B5EF4-FFF2-40B4-BE49-F238E27FC236}">
-                <a16:creationId xmlns="" xmlns:a16="http://schemas.microsoft.com/office/drawing/2014/main" id="{FA396BB6-2053-4690-9672-BC528007D370}"/>
+                <a16:creationId xmlns:a16="http://schemas.microsoft.com/office/drawing/2014/main" xmlns="" id="{FA396BB6-2053-4690-9672-BC528007D370}"/>
               </a:ext>
             </a:extLst>
           </p:cNvPr>
@@ -13715,7 +13830,7 @@
           <p:cNvPr id="3" name="Presentation Subtitle">
             <a:extLst>
               <a:ext uri="{FF2B5EF4-FFF2-40B4-BE49-F238E27FC236}">
-                <a16:creationId xmlns="" xmlns:a16="http://schemas.microsoft.com/office/drawing/2014/main" id="{A004DC04-DA2A-41C0-8578-4B8D2F08EA7D}"/>
+                <a16:creationId xmlns:a16="http://schemas.microsoft.com/office/drawing/2014/main" xmlns="" id="{A004DC04-DA2A-41C0-8578-4B8D2F08EA7D}"/>
               </a:ext>
             </a:extLst>
           </p:cNvPr>
@@ -13751,7 +13866,7 @@
           <p:cNvPr id="2" name="Presentation Title">
             <a:extLst>
               <a:ext uri="{FF2B5EF4-FFF2-40B4-BE49-F238E27FC236}">
-                <a16:creationId xmlns="" xmlns:a16="http://schemas.microsoft.com/office/drawing/2014/main" id="{37F91798-9AD5-4209-8887-958029548481}"/>
+                <a16:creationId xmlns:a16="http://schemas.microsoft.com/office/drawing/2014/main" xmlns="" id="{37F91798-9AD5-4209-8887-958029548481}"/>
               </a:ext>
             </a:extLst>
           </p:cNvPr>
@@ -13814,7 +13929,7 @@
     </p:spTree>
     <p:extLst>
       <p:ext uri="{BB962C8B-B14F-4D97-AF65-F5344CB8AC3E}">
-        <p14:creationId xmlns="" xmlns:p14="http://schemas.microsoft.com/office/powerpoint/2010/main" val="3666405375"/>
+        <p14:creationId xmlns:p14="http://schemas.microsoft.com/office/powerpoint/2010/main" xmlns="" val="3666405375"/>
       </p:ext>
     </p:extLst>
   </p:cSld>
@@ -13822,7 +13937,7 @@
     <a:masterClrMapping/>
   </p:clrMapOvr>
   <mc:AlternateContent xmlns:mc="http://schemas.openxmlformats.org/markup-compatibility/2006">
-    <mc:Choice xmlns="" xmlns:p14="http://schemas.microsoft.com/office/powerpoint/2010/main" Requires="p14">
+    <mc:Choice xmlns:p14="http://schemas.microsoft.com/office/powerpoint/2010/main" xmlns="" Requires="p14">
       <p:transition spd="slow" p14:dur="2000" advClick="0" advTm="5000"/>
     </mc:Choice>
     <mc:Fallback>
@@ -13861,7 +13976,7 @@
           <p:cNvPr id="70" name="Text Placeholder 69">
             <a:extLst>
               <a:ext uri="{FF2B5EF4-FFF2-40B4-BE49-F238E27FC236}">
-                <a16:creationId xmlns="" xmlns:a16="http://schemas.microsoft.com/office/drawing/2014/main" id="{DC931EDA-4DC3-E507-BE2D-25188076631C}"/>
+                <a16:creationId xmlns:a16="http://schemas.microsoft.com/office/drawing/2014/main" xmlns="" id="{DC931EDA-4DC3-E507-BE2D-25188076631C}"/>
               </a:ext>
             </a:extLst>
           </p:cNvPr>
@@ -13875,7 +13990,7 @@
         <p:spPr>
           <a:xfrm>
             <a:off x="2018400" y="1121143"/>
-            <a:ext cx="7049400" cy="5546589"/>
+            <a:ext cx="7278000" cy="5736857"/>
           </a:xfrm>
         </p:spPr>
         <p:txBody>
@@ -13899,7 +14014,7 @@
               </a:tabLst>
             </a:pPr>
             <a:r>
-              <a:rPr lang="bg-BG" sz="3200" b="1" spc="-10" dirty="0" smtClean="0">
+              <a:rPr lang="bg-BG" sz="3400" b="1" spc="-10" dirty="0" smtClean="0">
                 <a:solidFill>
                   <a:schemeClr val="bg1"/>
                 </a:solidFill>
@@ -13909,19 +14024,19 @@
               <a:t>Съхраняването и обработката на данни </a:t>
             </a:r>
             <a:r>
-              <a:rPr lang="bg-BG" sz="3200" b="1" spc="-10" dirty="0" smtClean="0">
+              <a:rPr lang="bg-BG" sz="3400" b="1" spc="-10" dirty="0" smtClean="0">
                 <a:latin typeface="Calibri"/>
                 <a:cs typeface="Calibri"/>
               </a:rPr>
               <a:t>е необходимост </a:t>
             </a:r>
             <a:r>
-              <a:rPr lang="bg-BG" sz="3200" spc="-5" dirty="0" smtClean="0">
+              <a:rPr lang="bg-BG" sz="3400" spc="-5" dirty="0" smtClean="0">
                 <a:cs typeface="Calibri"/>
               </a:rPr>
               <a:t>в технологичната индустрия</a:t>
             </a:r>
-            <a:endParaRPr lang="en-US" sz="3200" dirty="0">
+            <a:endParaRPr lang="en-US" sz="3400" dirty="0">
               <a:latin typeface="Calibri"/>
               <a:cs typeface="Calibri"/>
             </a:endParaRPr>
@@ -13942,7 +14057,7 @@
               </a:tabLst>
             </a:pPr>
             <a:r>
-              <a:rPr lang="ru-RU" sz="3200" spc="-10" dirty="0" smtClean="0">
+              <a:rPr lang="ru-RU" sz="3400" spc="-10" dirty="0" smtClean="0">
                 <a:solidFill>
                   <a:srgbClr val="224464"/>
                 </a:solidFill>
@@ -13951,7 +14066,7 @@
               <a:t>Нужди за съхранение на данни</a:t>
             </a:r>
             <a:r>
-              <a:rPr lang="en-US" sz="3200" spc="-5" dirty="0" smtClean="0">
+              <a:rPr lang="en-US" sz="3400" spc="-5" dirty="0" smtClean="0">
                 <a:solidFill>
                   <a:srgbClr val="224464"/>
                 </a:solidFill>
@@ -13960,7 +14075,7 @@
               </a:rPr>
               <a:t>:</a:t>
             </a:r>
-            <a:endParaRPr lang="en-US" sz="3200" dirty="0">
+            <a:endParaRPr lang="en-US" sz="3400" dirty="0">
               <a:latin typeface="Calibri"/>
               <a:cs typeface="Calibri"/>
             </a:endParaRPr>
@@ -14173,7 +14288,7 @@
           <a:blip r:embed="rId2" cstate="print">
             <a:extLst>
               <a:ext uri="{28A0092B-C50C-407E-A947-70E740481C1C}">
-                <a14:useLocalDpi xmlns="" xmlns:a14="http://schemas.microsoft.com/office/drawing/2010/main" val="0"/>
+                <a14:useLocalDpi xmlns:a14="http://schemas.microsoft.com/office/drawing/2010/main" xmlns="" val="0"/>
               </a:ext>
             </a:extLst>
           </a:blip>
@@ -14196,7 +14311,7 @@
           <p:cNvPr id="106" name="object 15">
             <a:extLst>
               <a:ext uri="{FF2B5EF4-FFF2-40B4-BE49-F238E27FC236}">
-                <a16:creationId xmlns="" xmlns:a16="http://schemas.microsoft.com/office/drawing/2014/main" id="{37CE6B7F-8446-3804-46EB-322B94F25F47}"/>
+                <a16:creationId xmlns:a16="http://schemas.microsoft.com/office/drawing/2014/main" xmlns="" id="{37CE6B7F-8446-3804-46EB-322B94F25F47}"/>
               </a:ext>
             </a:extLst>
           </p:cNvPr>
@@ -14248,7 +14363,7 @@
     </p:spTree>
     <p:extLst>
       <p:ext uri="{BB962C8B-B14F-4D97-AF65-F5344CB8AC3E}">
-        <p14:creationId xmlns="" xmlns:p14="http://schemas.microsoft.com/office/powerpoint/2010/main" val="372399440"/>
+        <p14:creationId xmlns:p14="http://schemas.microsoft.com/office/powerpoint/2010/main" xmlns="" val="372399440"/>
       </p:ext>
     </p:extLst>
   </p:cSld>
@@ -14256,7 +14371,7 @@
     <a:masterClrMapping/>
   </p:clrMapOvr>
   <mc:AlternateContent xmlns:mc="http://schemas.openxmlformats.org/markup-compatibility/2006">
-    <mc:Choice xmlns="" xmlns:p14="http://schemas.microsoft.com/office/powerpoint/2010/main" Requires="p14">
+    <mc:Choice xmlns:p14="http://schemas.microsoft.com/office/powerpoint/2010/main" xmlns="" Requires="p14">
       <p:transition spd="slow" p14:dur="2000" advClick="0" advTm="5000"/>
     </mc:Choice>
     <mc:Fallback>
@@ -14867,7 +14982,7 @@
               </a:tabLst>
             </a:pPr>
             <a:r>
-              <a:rPr lang="bg-BG" sz="3200" spc="-10" dirty="0" smtClean="0">
+              <a:rPr lang="bg-BG" sz="3000" spc="-10" dirty="0" smtClean="0">
                 <a:solidFill>
                   <a:srgbClr val="224464"/>
                 </a:solidFill>
@@ -14877,7 +14992,7 @@
               <a:t>Определят </a:t>
             </a:r>
             <a:r>
-              <a:rPr lang="bg-BG" sz="3200" b="1" spc="-10" dirty="0" smtClean="0">
+              <a:rPr lang="bg-BG" sz="3000" b="1" spc="-10" dirty="0" smtClean="0">
                 <a:solidFill>
                   <a:srgbClr val="224464"/>
                 </a:solidFill>
@@ -14887,7 +15002,7 @@
               <a:t>структурата</a:t>
             </a:r>
             <a:r>
-              <a:rPr lang="bg-BG" sz="3200" spc="-10" dirty="0" smtClean="0">
+              <a:rPr lang="bg-BG" sz="3000" spc="-10" dirty="0" smtClean="0">
                 <a:solidFill>
                   <a:srgbClr val="224464"/>
                 </a:solidFill>
@@ -14896,7 +15011,7 @@
               </a:rPr>
               <a:t> на базата данни</a:t>
             </a:r>
-            <a:endParaRPr sz="3200" dirty="0">
+            <a:endParaRPr sz="3000" dirty="0">
               <a:latin typeface="Calibri"/>
               <a:cs typeface="Calibri"/>
             </a:endParaRPr>
@@ -14917,7 +15032,7 @@
               </a:tabLst>
             </a:pPr>
             <a:r>
-              <a:rPr sz="3200" b="1" spc="-20" dirty="0">
+              <a:rPr sz="3000" b="1" spc="-20" dirty="0">
                 <a:solidFill>
                   <a:srgbClr val="224464"/>
                 </a:solidFill>
@@ -14927,7 +15042,7 @@
               <a:t>C</a:t>
             </a:r>
             <a:r>
-              <a:rPr sz="3200" spc="-20" dirty="0">
+              <a:rPr sz="3000" spc="-20" dirty="0">
                 <a:solidFill>
                   <a:srgbClr val="224464"/>
                 </a:solidFill>
@@ -14937,7 +15052,7 @@
               <a:t>reate</a:t>
             </a:r>
             <a:r>
-              <a:rPr sz="3200" spc="-10" dirty="0">
+              <a:rPr sz="3000" spc="-10" dirty="0">
                 <a:solidFill>
                   <a:srgbClr val="224464"/>
                 </a:solidFill>
@@ -14947,7 +15062,7 @@
               <a:t> </a:t>
             </a:r>
             <a:r>
-              <a:rPr sz="3200" spc="-5" dirty="0">
+              <a:rPr sz="3000" spc="-5" dirty="0">
                 <a:solidFill>
                   <a:srgbClr val="224464"/>
                 </a:solidFill>
@@ -14957,7 +15072,7 @@
               <a:t>/</a:t>
             </a:r>
             <a:r>
-              <a:rPr sz="3200" spc="-10" dirty="0">
+              <a:rPr sz="3000" spc="-10" dirty="0">
                 <a:solidFill>
                   <a:srgbClr val="224464"/>
                 </a:solidFill>
@@ -14967,7 +15082,7 @@
               <a:t> </a:t>
             </a:r>
             <a:r>
-              <a:rPr sz="3200" b="1" spc="-20" dirty="0">
+              <a:rPr sz="3000" b="1" spc="-20" dirty="0">
                 <a:solidFill>
                   <a:srgbClr val="224464"/>
                 </a:solidFill>
@@ -14977,7 +15092,7 @@
               <a:t>R</a:t>
             </a:r>
             <a:r>
-              <a:rPr sz="3200" spc="-20" dirty="0">
+              <a:rPr sz="3000" spc="-20" dirty="0">
                 <a:solidFill>
                   <a:srgbClr val="224464"/>
                 </a:solidFill>
@@ -14987,7 +15102,7 @@
               <a:t>ead</a:t>
             </a:r>
             <a:r>
-              <a:rPr sz="3200" spc="-5" dirty="0">
+              <a:rPr sz="3000" spc="-5" dirty="0">
                 <a:solidFill>
                   <a:srgbClr val="224464"/>
                 </a:solidFill>
@@ -14997,7 +15112,7 @@
               <a:t> /</a:t>
             </a:r>
             <a:r>
-              <a:rPr sz="3200" dirty="0">
+              <a:rPr sz="3000" dirty="0">
                 <a:solidFill>
                   <a:srgbClr val="224464"/>
                 </a:solidFill>
@@ -15007,7 +15122,7 @@
               <a:t> </a:t>
             </a:r>
             <a:r>
-              <a:rPr sz="3200" b="1" spc="-15" dirty="0">
+              <a:rPr sz="3000" b="1" spc="-15" dirty="0">
                 <a:solidFill>
                   <a:srgbClr val="224464"/>
                 </a:solidFill>
@@ -15017,7 +15132,7 @@
               <a:t>U</a:t>
             </a:r>
             <a:r>
-              <a:rPr sz="3200" spc="-15" dirty="0">
+              <a:rPr sz="3000" spc="-15" dirty="0">
                 <a:solidFill>
                   <a:srgbClr val="224464"/>
                 </a:solidFill>
@@ -15027,7 +15142,7 @@
               <a:t>pdate</a:t>
             </a:r>
             <a:r>
-              <a:rPr sz="3200" spc="-40" dirty="0">
+              <a:rPr sz="3000" spc="-40" dirty="0">
                 <a:solidFill>
                   <a:srgbClr val="224464"/>
                 </a:solidFill>
@@ -15037,7 +15152,7 @@
               <a:t> </a:t>
             </a:r>
             <a:r>
-              <a:rPr sz="3200" spc="-5" dirty="0">
+              <a:rPr sz="3000" spc="-5" dirty="0">
                 <a:solidFill>
                   <a:srgbClr val="224464"/>
                 </a:solidFill>
@@ -15047,7 +15162,7 @@
               <a:t>/</a:t>
             </a:r>
             <a:r>
-              <a:rPr sz="3200" dirty="0">
+              <a:rPr sz="3000" dirty="0">
                 <a:solidFill>
                   <a:srgbClr val="224464"/>
                 </a:solidFill>
@@ -15057,7 +15172,7 @@
               <a:t> </a:t>
             </a:r>
             <a:r>
-              <a:rPr sz="3200" b="1" spc="-15" dirty="0" smtClean="0">
+              <a:rPr sz="3000" b="1" spc="-15" dirty="0" smtClean="0">
                 <a:solidFill>
                   <a:srgbClr val="224464"/>
                 </a:solidFill>
@@ -15067,7 +15182,7 @@
               <a:t>D</a:t>
             </a:r>
             <a:r>
-              <a:rPr sz="3200" spc="-15" dirty="0" smtClean="0">
+              <a:rPr sz="3000" spc="-15" dirty="0" smtClean="0">
                 <a:solidFill>
                   <a:srgbClr val="224464"/>
                 </a:solidFill>
@@ -15077,7 +15192,7 @@
               <a:t>elete</a:t>
             </a:r>
             <a:r>
-              <a:rPr lang="bg-BG" sz="3200" spc="-5" dirty="0" smtClean="0">
+              <a:rPr lang="bg-BG" sz="3000" spc="-5" dirty="0" smtClean="0">
                 <a:solidFill>
                   <a:srgbClr val="224464"/>
                 </a:solidFill>
@@ -15087,7 +15202,7 @@
               <a:t> </a:t>
             </a:r>
             <a:r>
-              <a:rPr sz="3200" spc="-10" dirty="0" smtClean="0">
+              <a:rPr sz="3000" spc="-10" dirty="0" smtClean="0">
                 <a:solidFill>
                   <a:srgbClr val="224464"/>
                 </a:solidFill>
@@ -15097,7 +15212,7 @@
               <a:t>(</a:t>
             </a:r>
             <a:r>
-              <a:rPr sz="3200" b="1" spc="-10" dirty="0" smtClean="0">
+              <a:rPr sz="3000" b="1" spc="-10" dirty="0" smtClean="0">
                 <a:solidFill>
                   <a:srgbClr val="224464"/>
                 </a:solidFill>
@@ -15107,7 +15222,7 @@
               <a:t>CRUD</a:t>
             </a:r>
             <a:r>
-              <a:rPr sz="3200" b="1" spc="20" dirty="0" smtClean="0">
+              <a:rPr sz="3000" b="1" spc="20" dirty="0" smtClean="0">
                 <a:solidFill>
                   <a:srgbClr val="224464"/>
                 </a:solidFill>
@@ -15117,7 +15232,7 @@
               <a:t> </a:t>
             </a:r>
             <a:r>
-              <a:rPr lang="bg-BG" sz="3200" spc="-20" dirty="0" smtClean="0">
+              <a:rPr lang="bg-BG" sz="3000" spc="-20" dirty="0" smtClean="0">
                 <a:solidFill>
                   <a:srgbClr val="224464"/>
                 </a:solidFill>
@@ -15127,7 +15242,7 @@
               <a:t>операции</a:t>
             </a:r>
             <a:r>
-              <a:rPr sz="3200" spc="-20" dirty="0" smtClean="0">
+              <a:rPr sz="3000" spc="-20" dirty="0" smtClean="0">
                 <a:solidFill>
                   <a:srgbClr val="224464"/>
                 </a:solidFill>
@@ -15136,7 +15251,7 @@
               </a:rPr>
               <a:t>)</a:t>
             </a:r>
-            <a:endParaRPr sz="3200" dirty="0">
+            <a:endParaRPr sz="3000" dirty="0">
               <a:latin typeface="Calibri"/>
               <a:cs typeface="Calibri"/>
             </a:endParaRPr>
@@ -15157,7 +15272,7 @@
               </a:tabLst>
             </a:pPr>
             <a:r>
-              <a:rPr lang="bg-BG" sz="3200" spc="-25" dirty="0" smtClean="0">
+              <a:rPr lang="bg-BG" sz="3000" spc="-25" dirty="0" smtClean="0">
                 <a:solidFill>
                   <a:srgbClr val="224464"/>
                 </a:solidFill>
@@ -15167,7 +15282,7 @@
               <a:t>Изпълняват заявки </a:t>
             </a:r>
             <a:r>
-              <a:rPr sz="3200" spc="-5" dirty="0" smtClean="0">
+              <a:rPr sz="3000" spc="-5" dirty="0" smtClean="0">
                 <a:solidFill>
                   <a:srgbClr val="224464"/>
                 </a:solidFill>
@@ -15177,7 +15292,7 @@
               <a:t>(</a:t>
             </a:r>
             <a:r>
-              <a:rPr lang="bg-BG" sz="3200" spc="-5" dirty="0" smtClean="0">
+              <a:rPr lang="bg-BG" sz="3000" spc="-5" dirty="0" smtClean="0">
                 <a:solidFill>
                   <a:srgbClr val="224464"/>
                 </a:solidFill>
@@ -15187,7 +15302,7 @@
               <a:t>филтриране </a:t>
             </a:r>
             <a:r>
-              <a:rPr sz="3200" spc="-5" dirty="0" smtClean="0">
+              <a:rPr sz="3000" spc="-5" dirty="0" smtClean="0">
                 <a:solidFill>
                   <a:srgbClr val="224464"/>
                 </a:solidFill>
@@ -15197,7 +15312,7 @@
               <a:t>/</a:t>
             </a:r>
             <a:r>
-              <a:rPr sz="3200" spc="-20" dirty="0" smtClean="0">
+              <a:rPr sz="3000" spc="-20" dirty="0" smtClean="0">
                 <a:solidFill>
                   <a:srgbClr val="224464"/>
                 </a:solidFill>
@@ -15207,7 +15322,7 @@
               <a:t> </a:t>
             </a:r>
             <a:r>
-              <a:rPr lang="bg-BG" sz="3200" spc="-20" dirty="0" smtClean="0">
+              <a:rPr lang="bg-BG" sz="3000" spc="-20" dirty="0" smtClean="0">
                 <a:solidFill>
                   <a:srgbClr val="224464"/>
                 </a:solidFill>
@@ -15217,7 +15332,7 @@
               <a:t>търсене на данни</a:t>
             </a:r>
             <a:r>
-              <a:rPr sz="3200" spc="-20" dirty="0" smtClean="0">
+              <a:rPr sz="3000" spc="-20" dirty="0" smtClean="0">
                 <a:solidFill>
                   <a:srgbClr val="224464"/>
                 </a:solidFill>
@@ -15226,7 +15341,7 @@
               </a:rPr>
               <a:t>)</a:t>
             </a:r>
-            <a:endParaRPr sz="3200" dirty="0">
+            <a:endParaRPr sz="3000" dirty="0">
               <a:latin typeface="Calibri"/>
               <a:cs typeface="Calibri"/>
             </a:endParaRPr>
@@ -15351,7 +15466,7 @@
     </p:spTree>
     <p:extLst>
       <p:ext uri="{BB962C8B-B14F-4D97-AF65-F5344CB8AC3E}">
-        <p14:creationId xmlns="" xmlns:p14="http://schemas.microsoft.com/office/powerpoint/2010/main" val="409679368"/>
+        <p14:creationId xmlns:p14="http://schemas.microsoft.com/office/powerpoint/2010/main" xmlns="" val="409679368"/>
       </p:ext>
     </p:extLst>
   </p:cSld>
@@ -15359,7 +15474,7 @@
     <a:masterClrMapping/>
   </p:clrMapOvr>
   <mc:AlternateContent xmlns:mc="http://schemas.openxmlformats.org/markup-compatibility/2006">
-    <mc:Choice xmlns="" xmlns:p14="http://schemas.microsoft.com/office/powerpoint/2010/main" Requires="p14">
+    <mc:Choice xmlns:p14="http://schemas.microsoft.com/office/powerpoint/2010/main" xmlns="" Requires="p14">
       <p:transition spd="slow" p14:dur="2000" advClick="0" advTm="5000"/>
     </mc:Choice>
     <mc:Fallback>
@@ -15721,7 +15836,7 @@
     <a:masterClrMapping/>
   </p:clrMapOvr>
   <mc:AlternateContent xmlns:mc="http://schemas.openxmlformats.org/markup-compatibility/2006">
-    <mc:Choice xmlns="" xmlns:p14="http://schemas.microsoft.com/office/powerpoint/2010/main" Requires="p14">
+    <mc:Choice xmlns:p14="http://schemas.microsoft.com/office/powerpoint/2010/main" xmlns="" Requires="p14">
       <p:transition spd="slow" p14:dur="2000" advClick="0" advTm="5000"/>
     </mc:Choice>
     <mc:Fallback>
@@ -16022,7 +16137,7 @@
     <a:masterClrMapping/>
   </p:clrMapOvr>
   <mc:AlternateContent xmlns:mc="http://schemas.openxmlformats.org/markup-compatibility/2006">
-    <mc:Choice xmlns="" xmlns:p14="http://schemas.microsoft.com/office/powerpoint/2010/main" Requires="p14">
+    <mc:Choice xmlns:p14="http://schemas.microsoft.com/office/powerpoint/2010/main" xmlns="" Requires="p14">
       <p:transition spd="slow" p14:dur="2000" advClick="0" advTm="5000"/>
     </mc:Choice>
     <mc:Fallback>
@@ -16347,7 +16462,7 @@
     <a:masterClrMapping/>
   </p:clrMapOvr>
   <mc:AlternateContent xmlns:mc="http://schemas.openxmlformats.org/markup-compatibility/2006">
-    <mc:Choice xmlns="" xmlns:p14="http://schemas.microsoft.com/office/powerpoint/2010/main" Requires="p14">
+    <mc:Choice xmlns:p14="http://schemas.microsoft.com/office/powerpoint/2010/main" xmlns="" Requires="p14">
       <p:transition spd="slow" p14:dur="2000" advClick="0" advTm="5000"/>
     </mc:Choice>
     <mc:Fallback>
@@ -16786,7 +16901,7 @@
     <a:masterClrMapping/>
   </p:clrMapOvr>
   <mc:AlternateContent xmlns:mc="http://schemas.openxmlformats.org/markup-compatibility/2006">
-    <mc:Choice xmlns="" xmlns:p14="http://schemas.microsoft.com/office/powerpoint/2010/main" Requires="p14">
+    <mc:Choice xmlns:p14="http://schemas.microsoft.com/office/powerpoint/2010/main" xmlns="" Requires="p14">
       <p:transition spd="slow" p14:dur="2000" advClick="0" advTm="5000"/>
     </mc:Choice>
     <mc:Fallback>
@@ -16862,13 +16977,13 @@
           <a:lstStyle/>
           <a:p>
             <a:r>
-              <a:rPr lang="ru-RU" sz="3400" dirty="0" smtClean="0"/>
+              <a:rPr lang="ru-RU" sz="3600" dirty="0" smtClean="0"/>
               <a:t>MS Word, MS Excel и PDF документите не са достатъчни за управление на големи обеми данни и сложни структури</a:t>
             </a:r>
           </a:p>
           <a:p>
             <a:r>
-              <a:rPr lang="ru-RU" sz="3400" dirty="0" smtClean="0"/>
+              <a:rPr lang="ru-RU" sz="3600" dirty="0" smtClean="0"/>
               <a:t>Едновременен достъп на много потребители</a:t>
             </a:r>
           </a:p>
@@ -16922,7 +17037,7 @@
     <a:masterClrMapping/>
   </p:clrMapOvr>
   <mc:AlternateContent xmlns:mc="http://schemas.openxmlformats.org/markup-compatibility/2006">
-    <mc:Choice xmlns="" xmlns:p14="http://schemas.microsoft.com/office/powerpoint/2010/main" Requires="p14">
+    <mc:Choice xmlns:p14="http://schemas.microsoft.com/office/powerpoint/2010/main" xmlns="" Requires="p14">
       <p:transition spd="slow" p14:dur="2000" advClick="0" advTm="5000"/>
     </mc:Choice>
     <mc:Fallback>
@@ -16932,7 +17047,110 @@
   <p:timing>
     <p:tnLst>
       <p:par>
-        <p:cTn id="1" dur="indefinite" restart="never" nodeType="tmRoot"/>
+        <p:cTn id="1" dur="indefinite" restart="never" nodeType="tmRoot">
+          <p:childTnLst>
+            <p:seq concurrent="1" nextAc="seek">
+              <p:cTn id="2" dur="indefinite" nodeType="mainSeq">
+                <p:childTnLst>
+                  <p:par>
+                    <p:cTn id="3" fill="hold">
+                      <p:stCondLst>
+                        <p:cond delay="indefinite"/>
+                      </p:stCondLst>
+                      <p:childTnLst>
+                        <p:par>
+                          <p:cTn id="4" fill="hold">
+                            <p:stCondLst>
+                              <p:cond delay="0"/>
+                            </p:stCondLst>
+                            <p:childTnLst>
+                              <p:par>
+                                <p:cTn id="5" presetID="1" presetClass="entr" presetSubtype="0" fill="hold" nodeType="clickEffect">
+                                  <p:stCondLst>
+                                    <p:cond delay="0"/>
+                                  </p:stCondLst>
+                                  <p:childTnLst>
+                                    <p:set>
+                                      <p:cBhvr>
+                                        <p:cTn id="6" dur="1" fill="hold">
+                                          <p:stCondLst>
+                                            <p:cond delay="0"/>
+                                          </p:stCondLst>
+                                        </p:cTn>
+                                        <p:tgtEl>
+                                          <p:spTgt spid="3">
+                                            <p:txEl>
+                                              <p:pRg st="1" end="1"/>
+                                            </p:txEl>
+                                          </p:spTgt>
+                                        </p:tgtEl>
+                                        <p:attrNameLst>
+                                          <p:attrName>style.visibility</p:attrName>
+                                        </p:attrNameLst>
+                                      </p:cBhvr>
+                                      <p:to>
+                                        <p:strVal val="visible"/>
+                                      </p:to>
+                                    </p:set>
+                                  </p:childTnLst>
+                                </p:cTn>
+                              </p:par>
+                              <p:par>
+                                <p:cTn id="7" presetID="1" presetClass="entr" presetSubtype="0" fill="hold" nodeType="withEffect">
+                                  <p:stCondLst>
+                                    <p:cond delay="0"/>
+                                  </p:stCondLst>
+                                  <p:childTnLst>
+                                    <p:set>
+                                      <p:cBhvr>
+                                        <p:cTn id="8" dur="1" fill="hold">
+                                          <p:stCondLst>
+                                            <p:cond delay="0"/>
+                                          </p:stCondLst>
+                                        </p:cTn>
+                                        <p:tgtEl>
+                                          <p:spTgt spid="3">
+                                            <p:txEl>
+                                              <p:pRg st="2" end="2"/>
+                                            </p:txEl>
+                                          </p:spTgt>
+                                        </p:tgtEl>
+                                        <p:attrNameLst>
+                                          <p:attrName>style.visibility</p:attrName>
+                                        </p:attrNameLst>
+                                      </p:cBhvr>
+                                      <p:to>
+                                        <p:strVal val="visible"/>
+                                      </p:to>
+                                    </p:set>
+                                  </p:childTnLst>
+                                </p:cTn>
+                              </p:par>
+                            </p:childTnLst>
+                          </p:cTn>
+                        </p:par>
+                      </p:childTnLst>
+                    </p:cTn>
+                  </p:par>
+                </p:childTnLst>
+              </p:cTn>
+              <p:prevCondLst>
+                <p:cond evt="onPrev" delay="0">
+                  <p:tgtEl>
+                    <p:sldTgt/>
+                  </p:tgtEl>
+                </p:cond>
+              </p:prevCondLst>
+              <p:nextCondLst>
+                <p:cond evt="onNext" delay="0">
+                  <p:tgtEl>
+                    <p:sldTgt/>
+                  </p:tgtEl>
+                </p:cond>
+              </p:nextCondLst>
+            </p:seq>
+          </p:childTnLst>
+        </p:cTn>
       </p:par>
     </p:tnLst>
   </p:timing>
@@ -16996,11 +17214,11 @@
           <a:lstStyle/>
           <a:p>
             <a:r>
-              <a:rPr lang="ru-RU" dirty="0" smtClean="0"/>
+              <a:rPr lang="ru-RU" sz="3400" dirty="0" smtClean="0"/>
               <a:t>Проблемът с </a:t>
             </a:r>
             <a:r>
-              <a:rPr lang="bg-BG" sz="3600" b="1" dirty="0" smtClean="0">
+              <a:rPr lang="bg-BG" sz="3400" b="1" dirty="0" smtClean="0">
                 <a:solidFill>
                   <a:schemeClr val="bg1"/>
                 </a:solidFill>
@@ -17008,7 +17226,7 @@
               <a:t>дублиране на данни </a:t>
             </a:r>
             <a:r>
-              <a:rPr lang="ru-RU" dirty="0" smtClean="0"/>
+              <a:rPr lang="ru-RU" sz="3400" dirty="0" smtClean="0"/>
               <a:t>води до неефективно използване на дисково пространство</a:t>
             </a:r>
           </a:p>
@@ -17053,7 +17271,7 @@
     <a:masterClrMapping/>
   </p:clrMapOvr>
   <mc:AlternateContent xmlns:mc="http://schemas.openxmlformats.org/markup-compatibility/2006">
-    <mc:Choice xmlns="" xmlns:p14="http://schemas.microsoft.com/office/powerpoint/2010/main" Requires="p14">
+    <mc:Choice xmlns:p14="http://schemas.microsoft.com/office/powerpoint/2010/main" xmlns="" Requires="p14">
       <p:transition spd="slow" p14:dur="2000" advClick="0" advTm="5000"/>
     </mc:Choice>
     <mc:Fallback>
@@ -17134,7 +17352,7 @@
               </a:buClr>
             </a:pPr>
             <a:r>
-              <a:rPr lang="bg-BG" sz="3600" b="1" dirty="0" smtClean="0">
+              <a:rPr lang="bg-BG" sz="3800" b="1" dirty="0" smtClean="0">
                 <a:solidFill>
                   <a:schemeClr val="bg1"/>
                 </a:solidFill>
@@ -17142,7 +17360,7 @@
               <a:t>Сигруността на достъпа </a:t>
             </a:r>
             <a:r>
-              <a:rPr lang="ru-RU" sz="3600" dirty="0" smtClean="0"/>
+              <a:rPr lang="ru-RU" sz="3800" dirty="0" smtClean="0"/>
               <a:t>е от първостепенно значение за защита на чувствителна информация и данни</a:t>
             </a:r>
           </a:p>
@@ -17153,7 +17371,7 @@
               </a:buClr>
             </a:pPr>
             <a:r>
-              <a:rPr lang="bg-BG" sz="3600" b="1" dirty="0" smtClean="0">
+              <a:rPr lang="bg-BG" sz="3800" b="1" dirty="0" smtClean="0">
                 <a:solidFill>
                   <a:schemeClr val="bg1"/>
                 </a:solidFill>
@@ -17161,7 +17379,7 @@
               <a:t>Информационните системи </a:t>
             </a:r>
             <a:r>
-              <a:rPr lang="ru-RU" sz="3600" dirty="0" smtClean="0"/>
+              <a:rPr lang="ru-RU" sz="3800" dirty="0" smtClean="0"/>
               <a:t>позволяват:</a:t>
             </a:r>
           </a:p>
@@ -17196,7 +17414,11 @@
             </a:r>
             <a:r>
               <a:rPr lang="ru-RU" sz="3600" dirty="0" smtClean="0"/>
-              <a:t>, които осигуряват правата на потребителите и контрол върху техния достъп.</a:t>
+              <a:t>, които осигуряват правата на потребителите и контрол върху техния </a:t>
+            </a:r>
+            <a:r>
+              <a:rPr lang="ru-RU" sz="3600" dirty="0" smtClean="0"/>
+              <a:t>достъп</a:t>
             </a:r>
             <a:endParaRPr lang="en-US" sz="3600" dirty="0"/>
           </a:p>
@@ -17242,7 +17464,7 @@
         </p:blipFill>
         <p:spPr bwMode="auto">
           <a:xfrm>
-            <a:off x="9601200" y="2209800"/>
+            <a:off x="9601200" y="2362200"/>
             <a:ext cx="2057400" cy="2057400"/>
           </a:xfrm>
           <a:prstGeom prst="rect">
@@ -17257,7 +17479,7 @@
     <a:masterClrMapping/>
   </p:clrMapOvr>
   <mc:AlternateContent xmlns:mc="http://schemas.openxmlformats.org/markup-compatibility/2006">
-    <mc:Choice xmlns="" xmlns:p14="http://schemas.microsoft.com/office/powerpoint/2010/main" Requires="p14">
+    <mc:Choice xmlns:p14="http://schemas.microsoft.com/office/powerpoint/2010/main" xmlns="" Requires="p14">
       <p:transition spd="slow" p14:dur="2000" advClick="0" advTm="5000"/>
     </mc:Choice>
     <mc:Fallback>
@@ -17490,7 +17712,7 @@
               </a:buClr>
             </a:pPr>
             <a:r>
-              <a:rPr lang="bg-BG" sz="3600" b="1" dirty="0" smtClean="0">
+              <a:rPr lang="bg-BG" sz="3800" b="1" dirty="0" smtClean="0">
                 <a:solidFill>
                   <a:schemeClr val="bg1"/>
                 </a:solidFill>
@@ -17498,7 +17720,7 @@
               <a:t>Заявките</a:t>
             </a:r>
             <a:r>
-              <a:rPr lang="ru-RU" sz="3600" dirty="0" smtClean="0"/>
+              <a:rPr lang="ru-RU" sz="3800" dirty="0" smtClean="0"/>
               <a:t>:</a:t>
             </a:r>
           </a:p>
@@ -17603,7 +17825,7 @@
     <a:masterClrMapping/>
   </p:clrMapOvr>
   <mc:AlternateContent xmlns:mc="http://schemas.openxmlformats.org/markup-compatibility/2006">
-    <mc:Choice xmlns="" xmlns:p14="http://schemas.microsoft.com/office/powerpoint/2010/main" Requires="p14">
+    <mc:Choice xmlns:p14="http://schemas.microsoft.com/office/powerpoint/2010/main" xmlns="" Requires="p14">
       <p:transition spd="slow" p14:dur="2000" advClick="0" advTm="5000"/>
     </mc:Choice>
     <mc:Fallback>
@@ -17770,7 +17992,7 @@
           <a:blip r:embed="rId2" cstate="print">
             <a:extLst>
               <a:ext uri="{28A0092B-C50C-407E-A947-70E740481C1C}">
-                <a14:useLocalDpi xmlns="" xmlns:a14="http://schemas.microsoft.com/office/drawing/2010/main" val="0"/>
+                <a14:useLocalDpi xmlns:a14="http://schemas.microsoft.com/office/drawing/2010/main" xmlns="" val="0"/>
               </a:ext>
             </a:extLst>
           </a:blip>
@@ -17793,7 +18015,7 @@
           <p:cNvPr id="4" name="Title 3">
             <a:extLst>
               <a:ext uri="{FF2B5EF4-FFF2-40B4-BE49-F238E27FC236}">
-                <a16:creationId xmlns="" xmlns:a16="http://schemas.microsoft.com/office/drawing/2014/main" id="{E9EFC68F-6FF8-4834-BE17-2ABAD8DDA597}"/>
+                <a16:creationId xmlns:a16="http://schemas.microsoft.com/office/drawing/2014/main" xmlns="" id="{E9EFC68F-6FF8-4834-BE17-2ABAD8DDA597}"/>
               </a:ext>
             </a:extLst>
           </p:cNvPr>
@@ -17822,7 +18044,7 @@
           <p:cNvPr id="8" name="Subtitle 7">
             <a:extLst>
               <a:ext uri="{FF2B5EF4-FFF2-40B4-BE49-F238E27FC236}">
-                <a16:creationId xmlns="" xmlns:a16="http://schemas.microsoft.com/office/drawing/2014/main" id="{4E30F08F-1F88-4334-816E-DBC4840861A3}"/>
+                <a16:creationId xmlns:a16="http://schemas.microsoft.com/office/drawing/2014/main" xmlns="" id="{4E30F08F-1F88-4334-816E-DBC4840861A3}"/>
               </a:ext>
             </a:extLst>
           </p:cNvPr>
@@ -17849,7 +18071,7 @@
     </p:spTree>
     <p:extLst>
       <p:ext uri="{BB962C8B-B14F-4D97-AF65-F5344CB8AC3E}">
-        <p14:creationId xmlns="" xmlns:p14="http://schemas.microsoft.com/office/powerpoint/2010/main" val="1593741169"/>
+        <p14:creationId xmlns:p14="http://schemas.microsoft.com/office/powerpoint/2010/main" xmlns="" val="1593741169"/>
       </p:ext>
     </p:extLst>
   </p:cSld>
@@ -17857,7 +18079,7 @@
     <a:masterClrMapping/>
   </p:clrMapOvr>
   <mc:AlternateContent xmlns:mc="http://schemas.openxmlformats.org/markup-compatibility/2006">
-    <mc:Choice xmlns="" xmlns:p14="http://schemas.microsoft.com/office/powerpoint/2010/main" Requires="p14">
+    <mc:Choice xmlns:p14="http://schemas.microsoft.com/office/powerpoint/2010/main" xmlns="" Requires="p14">
       <p:transition spd="slow" p14:dur="2000" advClick="0" advTm="5000"/>
     </mc:Choice>
     <mc:Fallback>
@@ -17938,7 +18160,7 @@
               </a:buClr>
             </a:pPr>
             <a:r>
-              <a:rPr lang="bg-BG" sz="3600" b="1" dirty="0" smtClean="0">
+              <a:rPr lang="bg-BG" sz="3800" b="1" dirty="0" smtClean="0">
                 <a:solidFill>
                   <a:schemeClr val="bg1"/>
                 </a:solidFill>
@@ -17946,7 +18168,7 @@
               <a:t>Отчетите</a:t>
             </a:r>
             <a:r>
-              <a:rPr lang="ru-RU" sz="3600" dirty="0" smtClean="0"/>
+              <a:rPr lang="ru-RU" sz="3800" dirty="0" smtClean="0"/>
               <a:t>:</a:t>
             </a:r>
           </a:p>
@@ -17983,8 +18205,64 @@
           </a:p>
           <a:p>
             <a:r>
+              <a:rPr lang="ru-RU" sz="3800" dirty="0" smtClean="0"/>
+              <a:t>ИТ системите позволяват автоматизация на създаването на </a:t>
+            </a:r>
+            <a:r>
+              <a:rPr lang="ru-RU" sz="3800" dirty="0" smtClean="0"/>
+              <a:t>отчети</a:t>
+            </a:r>
+            <a:endParaRPr lang="en-US" sz="3800" dirty="0" smtClean="0"/>
+          </a:p>
+          <a:p>
+            <a:pPr lvl="1">
+              <a:buClr>
+                <a:schemeClr val="tx2"/>
+              </a:buClr>
+            </a:pPr>
+            <a:r>
+              <a:rPr lang="bg-BG" sz="3600" b="1" dirty="0" smtClean="0">
+                <a:solidFill>
+                  <a:schemeClr val="bg1"/>
+                </a:solidFill>
+              </a:rPr>
+              <a:t>Улесняване</a:t>
+            </a:r>
+            <a:r>
+              <a:rPr lang="bg-BG" sz="3600" dirty="0" smtClean="0"/>
+              <a:t> на</a:t>
+            </a:r>
+            <a:r>
               <a:rPr lang="ru-RU" sz="3600" dirty="0" smtClean="0"/>
-              <a:t>ИТ системите позволяват автоматизация на създаването на отчети, което улеснява вземането на решения и подобрява ефективността на бизнес процесите</a:t>
+              <a:t> </a:t>
+            </a:r>
+            <a:r>
+              <a:rPr lang="ru-RU" sz="3600" dirty="0" smtClean="0"/>
+              <a:t>вземането на решения </a:t>
+            </a:r>
+            <a:endParaRPr lang="ru-RU" sz="3600" dirty="0" smtClean="0"/>
+          </a:p>
+          <a:p>
+            <a:pPr lvl="1">
+              <a:buClr>
+                <a:schemeClr val="tx2"/>
+              </a:buClr>
+            </a:pPr>
+            <a:r>
+              <a:rPr lang="ru-RU" sz="3600" b="1" dirty="0" smtClean="0">
+                <a:solidFill>
+                  <a:schemeClr val="bg1"/>
+                </a:solidFill>
+              </a:rPr>
+              <a:t>Подобряване</a:t>
+            </a:r>
+            <a:r>
+              <a:rPr lang="ru-RU" sz="3600" dirty="0" smtClean="0"/>
+              <a:t> на ефективността </a:t>
+            </a:r>
+            <a:r>
+              <a:rPr lang="ru-RU" sz="3600" dirty="0" smtClean="0"/>
+              <a:t>на бизнес процесите</a:t>
             </a:r>
           </a:p>
           <a:p>
@@ -18021,7 +18299,7 @@
     <a:masterClrMapping/>
   </p:clrMapOvr>
   <mc:AlternateContent xmlns:mc="http://schemas.openxmlformats.org/markup-compatibility/2006">
-    <mc:Choice xmlns="" xmlns:p14="http://schemas.microsoft.com/office/powerpoint/2010/main" Requires="p14">
+    <mc:Choice xmlns:p14="http://schemas.microsoft.com/office/powerpoint/2010/main" xmlns="" Requires="p14">
       <p:transition spd="slow" p14:dur="2000" advClick="0" advTm="5000"/>
     </mc:Choice>
     <mc:Fallback>
@@ -18065,6 +18343,86 @@
                                           <p:spTgt spid="3">
                                             <p:txEl>
                                               <p:pRg st="2" end="2"/>
+                                            </p:txEl>
+                                          </p:spTgt>
+                                        </p:tgtEl>
+                                        <p:attrNameLst>
+                                          <p:attrName>style.visibility</p:attrName>
+                                        </p:attrNameLst>
+                                      </p:cBhvr>
+                                      <p:to>
+                                        <p:strVal val="visible"/>
+                                      </p:to>
+                                    </p:set>
+                                  </p:childTnLst>
+                                </p:cTn>
+                              </p:par>
+                              <p:par>
+                                <p:cTn id="7" presetID="1" presetClass="entr" presetSubtype="0" fill="hold" nodeType="withEffect">
+                                  <p:stCondLst>
+                                    <p:cond delay="0"/>
+                                  </p:stCondLst>
+                                  <p:childTnLst>
+                                    <p:set>
+                                      <p:cBhvr>
+                                        <p:cTn id="8" dur="1" fill="hold">
+                                          <p:stCondLst>
+                                            <p:cond delay="0"/>
+                                          </p:stCondLst>
+                                        </p:cTn>
+                                        <p:tgtEl>
+                                          <p:spTgt spid="3">
+                                            <p:txEl>
+                                              <p:pRg st="3" end="3"/>
+                                            </p:txEl>
+                                          </p:spTgt>
+                                        </p:tgtEl>
+                                        <p:attrNameLst>
+                                          <p:attrName>style.visibility</p:attrName>
+                                        </p:attrNameLst>
+                                      </p:cBhvr>
+                                      <p:to>
+                                        <p:strVal val="visible"/>
+                                      </p:to>
+                                    </p:set>
+                                  </p:childTnLst>
+                                </p:cTn>
+                              </p:par>
+                            </p:childTnLst>
+                          </p:cTn>
+                        </p:par>
+                      </p:childTnLst>
+                    </p:cTn>
+                  </p:par>
+                  <p:par>
+                    <p:cTn id="9" fill="hold">
+                      <p:stCondLst>
+                        <p:cond delay="indefinite"/>
+                      </p:stCondLst>
+                      <p:childTnLst>
+                        <p:par>
+                          <p:cTn id="10" fill="hold">
+                            <p:stCondLst>
+                              <p:cond delay="0"/>
+                            </p:stCondLst>
+                            <p:childTnLst>
+                              <p:par>
+                                <p:cTn id="11" presetID="1" presetClass="entr" presetSubtype="0" fill="hold" nodeType="clickEffect">
+                                  <p:stCondLst>
+                                    <p:cond delay="0"/>
+                                  </p:stCondLst>
+                                  <p:childTnLst>
+                                    <p:set>
+                                      <p:cBhvr>
+                                        <p:cTn id="12" dur="1" fill="hold">
+                                          <p:stCondLst>
+                                            <p:cond delay="0"/>
+                                          </p:stCondLst>
+                                        </p:cTn>
+                                        <p:tgtEl>
+                                          <p:spTgt spid="3">
+                                            <p:txEl>
+                                              <p:pRg st="4" end="4"/>
                                             </p:txEl>
                                           </p:spTgt>
                                         </p:tgtEl>
@@ -18306,7 +18664,7 @@
     <a:masterClrMapping/>
   </p:clrMapOvr>
   <mc:AlternateContent xmlns:mc="http://schemas.openxmlformats.org/markup-compatibility/2006">
-    <mc:Choice xmlns="" xmlns:p14="http://schemas.microsoft.com/office/powerpoint/2010/main" Requires="p14">
+    <mc:Choice xmlns:p14="http://schemas.microsoft.com/office/powerpoint/2010/main" xmlns="" Requires="p14">
       <p:transition spd="slow" p14:dur="2000" advClick="0" advTm="5000"/>
     </mc:Choice>
     <mc:Fallback>
@@ -18613,7 +18971,7 @@
           <p:cNvPr id="3" name="Summary Box Group">
             <a:extLst>
               <a:ext uri="{FF2B5EF4-FFF2-40B4-BE49-F238E27FC236}">
-                <a16:creationId xmlns:a16="http://schemas.microsoft.com/office/drawing/2014/main" xmlns="" id="{EBAFE522-EB7D-4931-A015-9A7E8A98517D}"/>
+                <a16:creationId xmlns="" xmlns:a16="http://schemas.microsoft.com/office/drawing/2014/main" id="{EBAFE522-EB7D-4931-A015-9A7E8A98517D}"/>
               </a:ext>
             </a:extLst>
           </p:cNvPr>
@@ -18633,7 +18991,7 @@
             <p:cNvPr id="10" name="Rounded Rectangle Blue">
               <a:extLst>
                 <a:ext uri="{FF2B5EF4-FFF2-40B4-BE49-F238E27FC236}">
-                  <a16:creationId xmlns:a16="http://schemas.microsoft.com/office/drawing/2014/main" xmlns="" id="{18F78F23-3D09-4B63-8DF9-D49CFBB145EE}"/>
+                  <a16:creationId xmlns="" xmlns:a16="http://schemas.microsoft.com/office/drawing/2014/main" id="{18F78F23-3D09-4B63-8DF9-D49CFBB145EE}"/>
                 </a:ext>
               </a:extLst>
             </p:cNvPr>
@@ -18687,7 +19045,7 @@
             <p:cNvPr id="11" name="Rounded Rectangle Left">
               <a:extLst>
                 <a:ext uri="{FF2B5EF4-FFF2-40B4-BE49-F238E27FC236}">
-                  <a16:creationId xmlns:a16="http://schemas.microsoft.com/office/drawing/2014/main" xmlns="" id="{F12C06CE-2BBE-46C2-B718-813794C58DF9}"/>
+                  <a16:creationId xmlns="" xmlns:a16="http://schemas.microsoft.com/office/drawing/2014/main" id="{F12C06CE-2BBE-46C2-B718-813794C58DF9}"/>
                 </a:ext>
               </a:extLst>
             </p:cNvPr>
@@ -18747,7 +19105,7 @@
             <p:cNvPr id="12" name="Half Frame Top Right">
               <a:extLst>
                 <a:ext uri="{FF2B5EF4-FFF2-40B4-BE49-F238E27FC236}">
-                  <a16:creationId xmlns:a16="http://schemas.microsoft.com/office/drawing/2014/main" xmlns="" id="{66CDBB1E-AF3C-43FC-9F34-2DD691F81726}"/>
+                  <a16:creationId xmlns="" xmlns:a16="http://schemas.microsoft.com/office/drawing/2014/main" id="{66CDBB1E-AF3C-43FC-9F34-2DD691F81726}"/>
                 </a:ext>
               </a:extLst>
             </p:cNvPr>
@@ -18809,7 +19167,7 @@
           <p:cNvPr id="14" name="Text Placeholder Body">
             <a:extLst>
               <a:ext uri="{FF2B5EF4-FFF2-40B4-BE49-F238E27FC236}">
-                <a16:creationId xmlns:a16="http://schemas.microsoft.com/office/drawing/2014/main" xmlns="" id="{0E49D336-45B6-44D3-97C4-E28F8DEA2022}"/>
+                <a16:creationId xmlns="" xmlns:a16="http://schemas.microsoft.com/office/drawing/2014/main" id="{0E49D336-45B6-44D3-97C4-E28F8DEA2022}"/>
               </a:ext>
             </a:extLst>
           </p:cNvPr>
@@ -18884,7 +19242,7 @@
               </a:buClr>
             </a:pPr>
             <a:r>
-              <a:rPr lang="bg-BG" sz="3600" dirty="0" smtClean="0"/>
+              <a:rPr lang="bg-BG" sz="3800" dirty="0" smtClean="0"/>
               <a:t>Данни в реалния и компютърния свят</a:t>
             </a:r>
           </a:p>
@@ -18895,11 +19253,11 @@
               </a:buClr>
             </a:pPr>
             <a:r>
-              <a:rPr lang="bg-BG" sz="3600" dirty="0" smtClean="0"/>
+              <a:rPr lang="bg-BG" sz="3800" dirty="0" smtClean="0"/>
               <a:t>Нужда от </a:t>
             </a:r>
             <a:r>
-              <a:rPr lang="bg-BG" sz="3600" b="1" dirty="0" smtClean="0">
+              <a:rPr lang="bg-BG" sz="3800" b="1" dirty="0" smtClean="0">
                 <a:solidFill>
                   <a:schemeClr val="bg1">
                     <a:lumMod val="60000"/>
@@ -18909,7 +19267,7 @@
               </a:rPr>
               <a:t>ИТ системи</a:t>
             </a:r>
-            <a:endParaRPr lang="bg-BG" sz="3600" dirty="0" smtClean="0"/>
+            <a:endParaRPr lang="bg-BG" sz="3800" dirty="0" smtClean="0"/>
           </a:p>
           <a:p>
             <a:pPr marL="360363" indent="-360363" fontAlgn="base">
@@ -18918,11 +19276,11 @@
               </a:buClr>
             </a:pPr>
             <a:r>
-              <a:rPr lang="bg-BG" sz="3600" dirty="0" smtClean="0"/>
+              <a:rPr lang="bg-BG" sz="3800" dirty="0" smtClean="0"/>
               <a:t>Какво са </a:t>
             </a:r>
             <a:r>
-              <a:rPr lang="bg-BG" sz="3600" b="1" dirty="0" smtClean="0">
+              <a:rPr lang="bg-BG" sz="3800" b="1" dirty="0" smtClean="0">
                 <a:solidFill>
                   <a:schemeClr val="bg1">
                     <a:lumMod val="60000"/>
@@ -18933,7 +19291,7 @@
               <a:t>базите данни</a:t>
             </a:r>
             <a:r>
-              <a:rPr lang="bg-BG" sz="3600" dirty="0" smtClean="0"/>
+              <a:rPr lang="bg-BG" sz="3800" dirty="0" smtClean="0"/>
               <a:t>?</a:t>
             </a:r>
           </a:p>
@@ -18960,11 +19318,11 @@
               </a:buClr>
             </a:pPr>
             <a:r>
-              <a:rPr lang="bg-BG" sz="3600" dirty="0" smtClean="0"/>
+              <a:rPr lang="bg-BG" sz="3800" dirty="0" smtClean="0"/>
               <a:t>Употреба и примери за </a:t>
             </a:r>
             <a:r>
-              <a:rPr lang="bg-BG" sz="3600" b="1" dirty="0" smtClean="0">
+              <a:rPr lang="bg-BG" sz="3800" b="1" dirty="0" smtClean="0">
                 <a:solidFill>
                   <a:schemeClr val="bg1">
                     <a:lumMod val="60000"/>
@@ -18974,7 +19332,7 @@
               </a:rPr>
               <a:t>ИТ системите</a:t>
             </a:r>
-            <a:endParaRPr lang="bg-BG" sz="3600" dirty="0" smtClean="0"/>
+            <a:endParaRPr lang="bg-BG" sz="3800" dirty="0" smtClean="0"/>
           </a:p>
           <a:p>
             <a:pPr marL="969948" lvl="1" indent="-360363" fontAlgn="base">
@@ -18995,7 +19353,7 @@
           <p:cNvPr id="17" name="Slide Number">
             <a:extLst>
               <a:ext uri="{FF2B5EF4-FFF2-40B4-BE49-F238E27FC236}">
-                <a16:creationId xmlns:a16="http://schemas.microsoft.com/office/drawing/2014/main" xmlns="" id="{9DE5559F-55C2-47F1-A321-B593B1EC63C1}"/>
+                <a16:creationId xmlns="" xmlns:a16="http://schemas.microsoft.com/office/drawing/2014/main" id="{9DE5559F-55C2-47F1-A321-B593B1EC63C1}"/>
               </a:ext>
             </a:extLst>
           </p:cNvPr>
@@ -19037,7 +19395,7 @@
           <p:cNvPr id="13" name="Picture SoftUni Mascot">
             <a:extLst>
               <a:ext uri="{FF2B5EF4-FFF2-40B4-BE49-F238E27FC236}">
-                <a16:creationId xmlns:a16="http://schemas.microsoft.com/office/drawing/2014/main" xmlns="" id="{CCC3A316-993C-4741-8826-E104F27650A3}"/>
+                <a16:creationId xmlns="" xmlns:a16="http://schemas.microsoft.com/office/drawing/2014/main" id="{CCC3A316-993C-4741-8826-E104F27650A3}"/>
               </a:ext>
             </a:extLst>
           </p:cNvPr>
@@ -19050,7 +19408,7 @@
           <a:blip r:embed="rId3" cstate="print">
             <a:extLst>
               <a:ext uri="{28A0092B-C50C-407E-A947-70E740481C1C}">
-                <a14:useLocalDpi xmlns:a14="http://schemas.microsoft.com/office/drawing/2010/main" xmlns="" val="0"/>
+                <a14:useLocalDpi xmlns="" xmlns:a14="http://schemas.microsoft.com/office/drawing/2010/main" val="0"/>
               </a:ext>
             </a:extLst>
           </a:blip>
@@ -19095,7 +19453,7 @@
     </p:spTree>
     <p:extLst>
       <p:ext uri="{BB962C8B-B14F-4D97-AF65-F5344CB8AC3E}">
-        <p14:creationId xmlns:p14="http://schemas.microsoft.com/office/powerpoint/2010/main" xmlns="" val="2087190546"/>
+        <p14:creationId xmlns="" xmlns:p14="http://schemas.microsoft.com/office/powerpoint/2010/main" val="2087190546"/>
       </p:ext>
     </p:extLst>
   </p:cSld>
@@ -19103,7 +19461,7 @@
     <a:masterClrMapping/>
   </p:clrMapOvr>
   <mc:AlternateContent xmlns:mc="http://schemas.openxmlformats.org/markup-compatibility/2006">
-    <mc:Choice xmlns:p14="http://schemas.microsoft.com/office/powerpoint/2010/main" xmlns="" Requires="p14">
+    <mc:Choice xmlns="" xmlns:p14="http://schemas.microsoft.com/office/powerpoint/2010/main" Requires="p14">
       <p:transition spd="slow" p14:dur="2000" advClick="0" advTm="5000"/>
     </mc:Choice>
     <mc:Fallback>
@@ -19361,7 +19719,7 @@
           <p:cNvPr id="3" name="Group 4">
             <a:extLst>
               <a:ext uri="{FF2B5EF4-FFF2-40B4-BE49-F238E27FC236}">
-                <a16:creationId xmlns:a16="http://schemas.microsoft.com/office/drawing/2014/main" xmlns="" id="{1A67F800-7980-E3CA-7188-3C478C8E98B8}"/>
+                <a16:creationId xmlns="" xmlns:a16="http://schemas.microsoft.com/office/drawing/2014/main" id="{1A67F800-7980-E3CA-7188-3C478C8E98B8}"/>
               </a:ext>
             </a:extLst>
           </p:cNvPr>
@@ -19381,7 +19739,7 @@
             <p:cNvPr id="7" name="Picture 6" descr="A picture containing text, sign, vector graphics&#10;&#10;Description automatically generated">
               <a:extLst>
                 <a:ext uri="{FF2B5EF4-FFF2-40B4-BE49-F238E27FC236}">
-                  <a16:creationId xmlns:a16="http://schemas.microsoft.com/office/drawing/2014/main" xmlns="" id="{15CE28B1-02BA-4014-E149-BF1EE09447ED}"/>
+                  <a16:creationId xmlns="" xmlns:a16="http://schemas.microsoft.com/office/drawing/2014/main" id="{15CE28B1-02BA-4014-E149-BF1EE09447ED}"/>
                 </a:ext>
               </a:extLst>
             </p:cNvPr>
@@ -19411,7 +19769,7 @@
             <p:cNvPr id="9" name="Picture 8" descr="Logo&#10;&#10;Description automatically generated">
               <a:extLst>
                 <a:ext uri="{FF2B5EF4-FFF2-40B4-BE49-F238E27FC236}">
-                  <a16:creationId xmlns:a16="http://schemas.microsoft.com/office/drawing/2014/main" xmlns="" id="{5F82FF4F-4AD2-4B3B-1445-F3C6BA268522}"/>
+                  <a16:creationId xmlns="" xmlns:a16="http://schemas.microsoft.com/office/drawing/2014/main" id="{5F82FF4F-4AD2-4B3B-1445-F3C6BA268522}"/>
                 </a:ext>
               </a:extLst>
             </p:cNvPr>
@@ -19441,7 +19799,7 @@
             <p:cNvPr id="11" name="Picture 10" descr="Logo&#10;&#10;Description automatically generated">
               <a:extLst>
                 <a:ext uri="{FF2B5EF4-FFF2-40B4-BE49-F238E27FC236}">
-                  <a16:creationId xmlns:a16="http://schemas.microsoft.com/office/drawing/2014/main" xmlns="" id="{68CCA8DB-9EFC-F9BC-57AE-81E4F843E863}"/>
+                  <a16:creationId xmlns="" xmlns:a16="http://schemas.microsoft.com/office/drawing/2014/main" id="{68CCA8DB-9EFC-F9BC-57AE-81E4F843E863}"/>
                 </a:ext>
               </a:extLst>
             </p:cNvPr>
@@ -19471,7 +19829,7 @@
             <p:cNvPr id="13" name="Picture 12" descr="Logo&#10;&#10;Description automatically generated">
               <a:extLst>
                 <a:ext uri="{FF2B5EF4-FFF2-40B4-BE49-F238E27FC236}">
-                  <a16:creationId xmlns:a16="http://schemas.microsoft.com/office/drawing/2014/main" xmlns="" id="{3FDF9297-50FA-E866-B6CE-9D64B1E892BF}"/>
+                  <a16:creationId xmlns="" xmlns:a16="http://schemas.microsoft.com/office/drawing/2014/main" id="{3FDF9297-50FA-E866-B6CE-9D64B1E892BF}"/>
                 </a:ext>
               </a:extLst>
             </p:cNvPr>
@@ -19501,7 +19859,7 @@
             <p:cNvPr id="18" name="Graphic 17">
               <a:extLst>
                 <a:ext uri="{FF2B5EF4-FFF2-40B4-BE49-F238E27FC236}">
-                  <a16:creationId xmlns:a16="http://schemas.microsoft.com/office/drawing/2014/main" xmlns="" id="{2A1BC0C9-7A7B-9C5B-B457-3E86E59EF29E}"/>
+                  <a16:creationId xmlns="" xmlns:a16="http://schemas.microsoft.com/office/drawing/2014/main" id="{2A1BC0C9-7A7B-9C5B-B457-3E86E59EF29E}"/>
                 </a:ext>
               </a:extLst>
             </p:cNvPr>
@@ -19514,7 +19872,7 @@
             <a:blip r:embed="rId7" cstate="print">
               <a:extLst>
                 <a:ext uri="{96DAC541-7B7A-43D3-8B79-37D633B846F1}">
-                  <asvg:svgBlip xmlns:asvg="http://schemas.microsoft.com/office/drawing/2016/SVG/main" xmlns="" r:embed="rId8"/>
+                  <asvg:svgBlip xmlns="" xmlns:asvg="http://schemas.microsoft.com/office/drawing/2016/SVG/main" r:embed="rId8"/>
                 </a:ext>
               </a:extLst>
             </a:blip>
@@ -19537,7 +19895,7 @@
             <p:cNvPr id="20" name="Graphic 19">
               <a:extLst>
                 <a:ext uri="{FF2B5EF4-FFF2-40B4-BE49-F238E27FC236}">
-                  <a16:creationId xmlns:a16="http://schemas.microsoft.com/office/drawing/2014/main" xmlns="" id="{DBE174DA-A182-7E57-06D4-86AFA26D484D}"/>
+                  <a16:creationId xmlns="" xmlns:a16="http://schemas.microsoft.com/office/drawing/2014/main" id="{DBE174DA-A182-7E57-06D4-86AFA26D484D}"/>
                 </a:ext>
               </a:extLst>
             </p:cNvPr>
@@ -19550,7 +19908,7 @@
             <a:blip r:embed="rId9" cstate="print">
               <a:extLst>
                 <a:ext uri="{96DAC541-7B7A-43D3-8B79-37D633B846F1}">
-                  <asvg:svgBlip xmlns:asvg="http://schemas.microsoft.com/office/drawing/2016/SVG/main" xmlns="" r:embed="rId10"/>
+                  <asvg:svgBlip xmlns="" xmlns:asvg="http://schemas.microsoft.com/office/drawing/2016/SVG/main" r:embed="rId10"/>
                 </a:ext>
               </a:extLst>
             </a:blip>
@@ -19573,7 +19931,7 @@
             <p:cNvPr id="22" name="Picture 21" descr="Logo&#10;&#10;Description automatically generated">
               <a:extLst>
                 <a:ext uri="{FF2B5EF4-FFF2-40B4-BE49-F238E27FC236}">
-                  <a16:creationId xmlns:a16="http://schemas.microsoft.com/office/drawing/2014/main" xmlns="" id="{9B7FFC36-A4BC-7A53-AB82-82C398A47538}"/>
+                  <a16:creationId xmlns="" xmlns:a16="http://schemas.microsoft.com/office/drawing/2014/main" id="{9B7FFC36-A4BC-7A53-AB82-82C398A47538}"/>
                 </a:ext>
               </a:extLst>
             </p:cNvPr>
@@ -19603,7 +19961,7 @@
             <p:cNvPr id="4" name="Group 35">
               <a:extLst>
                 <a:ext uri="{FF2B5EF4-FFF2-40B4-BE49-F238E27FC236}">
-                  <a16:creationId xmlns:a16="http://schemas.microsoft.com/office/drawing/2014/main" xmlns="" id="{3FB2AEAC-BDEE-9D5F-67A3-17CEDA699052}"/>
+                  <a16:creationId xmlns="" xmlns:a16="http://schemas.microsoft.com/office/drawing/2014/main" id="{3FB2AEAC-BDEE-9D5F-67A3-17CEDA699052}"/>
                 </a:ext>
               </a:extLst>
             </p:cNvPr>
@@ -19623,7 +19981,7 @@
               <p:cNvPr id="31" name="Straight Connector 30">
                 <a:extLst>
                   <a:ext uri="{FF2B5EF4-FFF2-40B4-BE49-F238E27FC236}">
-                    <a16:creationId xmlns:a16="http://schemas.microsoft.com/office/drawing/2014/main" xmlns="" id="{AA38ABD5-1637-DC80-A922-DF10E4F75CDE}"/>
+                    <a16:creationId xmlns="" xmlns:a16="http://schemas.microsoft.com/office/drawing/2014/main" id="{AA38ABD5-1637-DC80-A922-DF10E4F75CDE}"/>
                   </a:ext>
                 </a:extLst>
               </p:cNvPr>
@@ -19666,7 +20024,7 @@
               <p:cNvPr id="33" name="Picture 32">
                 <a:extLst>
                   <a:ext uri="{FF2B5EF4-FFF2-40B4-BE49-F238E27FC236}">
-                    <a16:creationId xmlns:a16="http://schemas.microsoft.com/office/drawing/2014/main" xmlns="" id="{617B586A-0BC5-5E32-7E67-FD277547ED69}"/>
+                    <a16:creationId xmlns="" xmlns:a16="http://schemas.microsoft.com/office/drawing/2014/main" id="{617B586A-0BC5-5E32-7E67-FD277547ED69}"/>
                   </a:ext>
                 </a:extLst>
               </p:cNvPr>
@@ -19698,7 +20056,7 @@
           <p:cNvPr id="40" name="Picture 39" descr="Logo&#10;&#10;Description automatically generated">
             <a:extLst>
               <a:ext uri="{FF2B5EF4-FFF2-40B4-BE49-F238E27FC236}">
-                <a16:creationId xmlns:a16="http://schemas.microsoft.com/office/drawing/2014/main" xmlns="" id="{9C30DD70-D438-6D27-35D3-8BB874966D84}"/>
+                <a16:creationId xmlns="" xmlns:a16="http://schemas.microsoft.com/office/drawing/2014/main" id="{9C30DD70-D438-6D27-35D3-8BB874966D84}"/>
               </a:ext>
             </a:extLst>
           </p:cNvPr>
@@ -19728,7 +20086,7 @@
           <p:cNvPr id="2" name="Google Shape;441;p37">
             <a:extLst>
               <a:ext uri="{FF2B5EF4-FFF2-40B4-BE49-F238E27FC236}">
-                <a16:creationId xmlns:a16="http://schemas.microsoft.com/office/drawing/2014/main" xmlns="" id="{2AFB472C-93C2-241B-75FA-457782840F92}"/>
+                <a16:creationId xmlns="" xmlns:a16="http://schemas.microsoft.com/office/drawing/2014/main" id="{2AFB472C-93C2-241B-75FA-457782840F92}"/>
               </a:ext>
             </a:extLst>
           </p:cNvPr>
@@ -20033,7 +20391,7 @@
           <p:cNvPr id="14" name="Картина 13">
             <a:extLst>
               <a:ext uri="{FF2B5EF4-FFF2-40B4-BE49-F238E27FC236}">
-                <a16:creationId xmlns:a16="http://schemas.microsoft.com/office/drawing/2014/main" xmlns="" id="{54B365E9-8FD0-6D5B-2DFC-723EE5DDD555}"/>
+                <a16:creationId xmlns="" xmlns:a16="http://schemas.microsoft.com/office/drawing/2014/main" id="{54B365E9-8FD0-6D5B-2DFC-723EE5DDD555}"/>
               </a:ext>
             </a:extLst>
           </p:cNvPr>
@@ -20063,7 +20421,7 @@
           <p:cNvPr id="16" name="Картина 15">
             <a:extLst>
               <a:ext uri="{FF2B5EF4-FFF2-40B4-BE49-F238E27FC236}">
-                <a16:creationId xmlns:a16="http://schemas.microsoft.com/office/drawing/2014/main" xmlns="" id="{3BD6ABFC-02BF-2D42-B42B-6929222F37B6}"/>
+                <a16:creationId xmlns="" xmlns:a16="http://schemas.microsoft.com/office/drawing/2014/main" id="{3BD6ABFC-02BF-2D42-B42B-6929222F37B6}"/>
               </a:ext>
             </a:extLst>
           </p:cNvPr>
@@ -20091,7 +20449,7 @@
     </p:spTree>
     <p:extLst>
       <p:ext uri="{BB962C8B-B14F-4D97-AF65-F5344CB8AC3E}">
-        <p14:creationId xmlns:p14="http://schemas.microsoft.com/office/powerpoint/2010/main" xmlns="" val="2144060659"/>
+        <p14:creationId xmlns="" xmlns:p14="http://schemas.microsoft.com/office/powerpoint/2010/main" val="2144060659"/>
       </p:ext>
     </p:extLst>
   </p:cSld>
@@ -20130,7 +20488,7 @@
           <p:cNvPr id="5" name="Slide Number">
             <a:extLst>
               <a:ext uri="{FF2B5EF4-FFF2-40B4-BE49-F238E27FC236}">
-                <a16:creationId xmlns:a16="http://schemas.microsoft.com/office/drawing/2014/main" xmlns="" id="{F48C3C93-90A1-4D31-BEA6-B54D1106CE31}"/>
+                <a16:creationId xmlns="" xmlns:a16="http://schemas.microsoft.com/office/drawing/2014/main" id="{F48C3C93-90A1-4D31-BEA6-B54D1106CE31}"/>
               </a:ext>
             </a:extLst>
           </p:cNvPr>
@@ -20172,7 +20530,7 @@
           <p:cNvPr id="2" name="Slide Body">
             <a:extLst>
               <a:ext uri="{FF2B5EF4-FFF2-40B4-BE49-F238E27FC236}">
-                <a16:creationId xmlns:a16="http://schemas.microsoft.com/office/drawing/2014/main" xmlns="" id="{980F49B1-E4BE-4389-A747-7AB9B71AD920}"/>
+                <a16:creationId xmlns="" xmlns:a16="http://schemas.microsoft.com/office/drawing/2014/main" id="{980F49B1-E4BE-4389-A747-7AB9B71AD920}"/>
               </a:ext>
             </a:extLst>
           </p:cNvPr>
@@ -20306,7 +20664,7 @@
           <p:cNvPr id="6" name="Picture License" descr="License">
             <a:extLst>
               <a:ext uri="{FF2B5EF4-FFF2-40B4-BE49-F238E27FC236}">
-                <a16:creationId xmlns:a16="http://schemas.microsoft.com/office/drawing/2014/main" xmlns="" id="{A10A2585-858C-4B1E-8846-27CF1C15729E}"/>
+                <a16:creationId xmlns="" xmlns:a16="http://schemas.microsoft.com/office/drawing/2014/main" id="{A10A2585-858C-4B1E-8846-27CF1C15729E}"/>
               </a:ext>
             </a:extLst>
           </p:cNvPr>
@@ -20347,7 +20705,7 @@
           <p:cNvPr id="3" name="Slide Title">
             <a:extLst>
               <a:ext uri="{FF2B5EF4-FFF2-40B4-BE49-F238E27FC236}">
-                <a16:creationId xmlns:a16="http://schemas.microsoft.com/office/drawing/2014/main" xmlns="" id="{E5F1FB41-80C3-4816-BC47-CCC50632E6E8}"/>
+                <a16:creationId xmlns="" xmlns:a16="http://schemas.microsoft.com/office/drawing/2014/main" id="{E5F1FB41-80C3-4816-BC47-CCC50632E6E8}"/>
               </a:ext>
             </a:extLst>
           </p:cNvPr>
@@ -20373,7 +20731,7 @@
     </p:spTree>
     <p:extLst>
       <p:ext uri="{BB962C8B-B14F-4D97-AF65-F5344CB8AC3E}">
-        <p14:creationId xmlns:p14="http://schemas.microsoft.com/office/powerpoint/2010/main" xmlns="" val="3506533871"/>
+        <p14:creationId xmlns="" xmlns:p14="http://schemas.microsoft.com/office/powerpoint/2010/main" val="3506533871"/>
       </p:ext>
     </p:extLst>
   </p:cSld>
@@ -20381,7 +20739,7 @@
     <a:masterClrMapping/>
   </p:clrMapOvr>
   <mc:AlternateContent xmlns:mc="http://schemas.openxmlformats.org/markup-compatibility/2006">
-    <mc:Choice xmlns:p14="http://schemas.microsoft.com/office/powerpoint/2010/main" xmlns="" Requires="p14">
+    <mc:Choice xmlns="" xmlns:p14="http://schemas.microsoft.com/office/powerpoint/2010/main" Requires="p14">
       <p:transition spd="slow" p14:dur="2000" advClick="0" advTm="5000"/>
     </mc:Choice>
     <mc:Fallback>
@@ -20499,7 +20857,7 @@
           <a:blip r:embed="rId3" cstate="print">
             <a:extLst>
               <a:ext uri="{28A0092B-C50C-407E-A947-70E740481C1C}">
-                <a14:useLocalDpi xmlns="" xmlns:a14="http://schemas.microsoft.com/office/drawing/2010/main" val="0"/>
+                <a14:useLocalDpi xmlns:a14="http://schemas.microsoft.com/office/drawing/2010/main" xmlns="" val="0"/>
               </a:ext>
             </a:extLst>
           </a:blip>
@@ -20529,7 +20887,7 @@
           <a:blip r:embed="rId4" cstate="print">
             <a:extLst>
               <a:ext uri="{28A0092B-C50C-407E-A947-70E740481C1C}">
-                <a14:useLocalDpi xmlns="" xmlns:a14="http://schemas.microsoft.com/office/drawing/2010/main" val="0"/>
+                <a14:useLocalDpi xmlns:a14="http://schemas.microsoft.com/office/drawing/2010/main" xmlns="" val="0"/>
               </a:ext>
             </a:extLst>
           </a:blip>
@@ -20552,7 +20910,7 @@
           <p:cNvPr id="9" name="Slide Number">
             <a:extLst>
               <a:ext uri="{FF2B5EF4-FFF2-40B4-BE49-F238E27FC236}">
-                <a16:creationId xmlns="" xmlns:a16="http://schemas.microsoft.com/office/drawing/2014/main" id="{A1A140CB-706A-47C5-95D7-9FB67CDC050D}"/>
+                <a16:creationId xmlns:a16="http://schemas.microsoft.com/office/drawing/2014/main" xmlns="" id="{A1A140CB-706A-47C5-95D7-9FB67CDC050D}"/>
               </a:ext>
             </a:extLst>
           </p:cNvPr>
@@ -20592,7 +20950,7 @@
     </p:spTree>
     <p:extLst>
       <p:ext uri="{BB962C8B-B14F-4D97-AF65-F5344CB8AC3E}">
-        <p14:creationId xmlns="" xmlns:p14="http://schemas.microsoft.com/office/powerpoint/2010/main" val="2063449876"/>
+        <p14:creationId xmlns:p14="http://schemas.microsoft.com/office/powerpoint/2010/main" xmlns="" val="2063449876"/>
       </p:ext>
     </p:extLst>
   </p:cSld>
@@ -20600,7 +20958,7 @@
     <a:masterClrMapping/>
   </p:clrMapOvr>
   <mc:AlternateContent xmlns:mc="http://schemas.openxmlformats.org/markup-compatibility/2006">
-    <mc:Choice xmlns="" xmlns:p14="http://schemas.microsoft.com/office/powerpoint/2010/main" Requires="p14">
+    <mc:Choice xmlns:p14="http://schemas.microsoft.com/office/powerpoint/2010/main" xmlns="" Requires="p14">
       <p:transition spd="slow" p14:dur="2000" advClick="0" advTm="5000"/>
     </mc:Choice>
     <mc:Fallback>
@@ -20764,7 +21122,7 @@
           <p:cNvPr id="9" name="Picture 8">
             <a:extLst>
               <a:ext uri="{FF2B5EF4-FFF2-40B4-BE49-F238E27FC236}">
-                <a16:creationId xmlns="" xmlns:a16="http://schemas.microsoft.com/office/drawing/2014/main" id="{88B4316C-FE89-43BE-A30A-E7C7FBFC7F8B}"/>
+                <a16:creationId xmlns:a16="http://schemas.microsoft.com/office/drawing/2014/main" xmlns="" id="{88B4316C-FE89-43BE-A30A-E7C7FBFC7F8B}"/>
               </a:ext>
             </a:extLst>
           </p:cNvPr>
@@ -20801,7 +21159,7 @@
           <p:cNvPr id="10" name="Arrow: Down 9">
             <a:extLst>
               <a:ext uri="{FF2B5EF4-FFF2-40B4-BE49-F238E27FC236}">
-                <a16:creationId xmlns="" xmlns:a16="http://schemas.microsoft.com/office/drawing/2014/main" id="{33B3F24D-F732-43CD-82C2-BB5534F3A2A9}"/>
+                <a16:creationId xmlns:a16="http://schemas.microsoft.com/office/drawing/2014/main" xmlns="" id="{33B3F24D-F732-43CD-82C2-BB5534F3A2A9}"/>
               </a:ext>
             </a:extLst>
           </p:cNvPr>
@@ -20862,7 +21220,7 @@
           <a:blip r:embed="rId4" cstate="print">
             <a:extLst>
               <a:ext uri="{28A0092B-C50C-407E-A947-70E740481C1C}">
-                <a14:useLocalDpi xmlns="" xmlns:a14="http://schemas.microsoft.com/office/drawing/2010/main" val="0"/>
+                <a14:useLocalDpi xmlns:a14="http://schemas.microsoft.com/office/drawing/2010/main" xmlns="" val="0"/>
               </a:ext>
             </a:extLst>
           </a:blip>
@@ -20885,7 +21243,7 @@
           <p:cNvPr id="13" name="Slide Number">
             <a:extLst>
               <a:ext uri="{FF2B5EF4-FFF2-40B4-BE49-F238E27FC236}">
-                <a16:creationId xmlns="" xmlns:a16="http://schemas.microsoft.com/office/drawing/2014/main" id="{4C27AE7F-791E-4473-A9A8-F5AF9BF44DA8}"/>
+                <a16:creationId xmlns:a16="http://schemas.microsoft.com/office/drawing/2014/main" xmlns="" id="{4C27AE7F-791E-4473-A9A8-F5AF9BF44DA8}"/>
               </a:ext>
             </a:extLst>
           </p:cNvPr>
@@ -20925,7 +21283,7 @@
     </p:spTree>
     <p:extLst>
       <p:ext uri="{BB962C8B-B14F-4D97-AF65-F5344CB8AC3E}">
-        <p14:creationId xmlns="" xmlns:p14="http://schemas.microsoft.com/office/powerpoint/2010/main" val="2374997402"/>
+        <p14:creationId xmlns:p14="http://schemas.microsoft.com/office/powerpoint/2010/main" xmlns="" val="2374997402"/>
       </p:ext>
     </p:extLst>
   </p:cSld>
@@ -20933,7 +21291,7 @@
     <a:masterClrMapping/>
   </p:clrMapOvr>
   <mc:AlternateContent xmlns:mc="http://schemas.openxmlformats.org/markup-compatibility/2006">
-    <mc:Choice xmlns="" xmlns:p14="http://schemas.microsoft.com/office/powerpoint/2010/main" Requires="p14">
+    <mc:Choice xmlns:p14="http://schemas.microsoft.com/office/powerpoint/2010/main" xmlns="" Requires="p14">
       <p:transition spd="slow" p14:dur="2000" advClick="0" advTm="5000"/>
     </mc:Choice>
     <mc:Fallback>
@@ -21138,50 +21496,50 @@
           <a:p>
             <a:pPr lvl="1"/>
             <a:r>
-              <a:rPr lang="bg-BG" sz="3200" dirty="0" smtClean="0"/>
+              <a:rPr lang="bg-BG" sz="3000" dirty="0" smtClean="0"/>
               <a:t>Размера</a:t>
             </a:r>
-            <a:endParaRPr lang="en-US" sz="3200" dirty="0"/>
+            <a:endParaRPr lang="en-US" sz="3000" dirty="0"/>
           </a:p>
           <a:p>
             <a:pPr lvl="1"/>
             <a:r>
-              <a:rPr lang="bg-BG" sz="3200" dirty="0" smtClean="0"/>
+              <a:rPr lang="bg-BG" sz="3000" dirty="0" smtClean="0"/>
               <a:t>Променянето</a:t>
             </a:r>
-            <a:endParaRPr lang="en-US" sz="3200" dirty="0"/>
+            <a:endParaRPr lang="en-US" sz="3000" dirty="0"/>
           </a:p>
           <a:p>
             <a:pPr lvl="1"/>
             <a:r>
-              <a:rPr lang="bg-BG" sz="3200" dirty="0" smtClean="0"/>
+              <a:rPr lang="bg-BG" sz="3000" dirty="0" smtClean="0"/>
               <a:t>Търсенето</a:t>
             </a:r>
-            <a:endParaRPr lang="en-US" sz="3200" dirty="0"/>
+            <a:endParaRPr lang="en-US" sz="3000" dirty="0"/>
           </a:p>
           <a:p>
             <a:pPr lvl="1"/>
             <a:r>
-              <a:rPr lang="bg-BG" sz="3200" dirty="0" smtClean="0"/>
+              <a:rPr lang="bg-BG" sz="3000" dirty="0" smtClean="0"/>
               <a:t>Паралелност</a:t>
             </a:r>
-            <a:endParaRPr lang="en-US" sz="3200" dirty="0"/>
+            <a:endParaRPr lang="en-US" sz="3000" dirty="0"/>
           </a:p>
           <a:p>
             <a:pPr lvl="1"/>
             <a:r>
-              <a:rPr lang="bg-BG" sz="3200" dirty="0" smtClean="0"/>
+              <a:rPr lang="bg-BG" sz="3000" dirty="0" smtClean="0"/>
               <a:t>Сигурност</a:t>
             </a:r>
-            <a:endParaRPr lang="en-US" sz="3200" dirty="0"/>
+            <a:endParaRPr lang="en-US" sz="3000" dirty="0"/>
           </a:p>
           <a:p>
             <a:pPr lvl="1"/>
             <a:r>
-              <a:rPr lang="bg-BG" sz="3200" dirty="0" smtClean="0"/>
+              <a:rPr lang="bg-BG" sz="3000" dirty="0" smtClean="0"/>
               <a:t>Консистентност</a:t>
             </a:r>
-            <a:endParaRPr lang="en-US" sz="3200" dirty="0"/>
+            <a:endParaRPr lang="en-US" sz="3000" dirty="0"/>
           </a:p>
         </p:txBody>
       </p:sp>
@@ -21220,7 +21578,7 @@
           <p:cNvPr id="1026" name="Picture 2" descr="Ð ÐµÐ·ÑÐ»ÑÐ°Ñ Ñ Ð¸Ð·Ð¾Ð±ÑÐ°Ð¶ÐµÐ½Ð¸Ðµ Ð·Ð° folders png">
             <a:extLst>
               <a:ext uri="{FF2B5EF4-FFF2-40B4-BE49-F238E27FC236}">
-                <a16:creationId xmlns="" xmlns:a16="http://schemas.microsoft.com/office/drawing/2014/main" id="{FCAAA1D7-556D-4E56-8FD7-1C72A21492BB}"/>
+                <a16:creationId xmlns:a16="http://schemas.microsoft.com/office/drawing/2014/main" xmlns="" id="{FCAAA1D7-556D-4E56-8FD7-1C72A21492BB}"/>
               </a:ext>
             </a:extLst>
           </p:cNvPr>
@@ -21233,7 +21591,7 @@
           <a:blip r:embed="rId3" cstate="print">
             <a:extLst>
               <a:ext uri="{28A0092B-C50C-407E-A947-70E740481C1C}">
-                <a14:useLocalDpi xmlns="" xmlns:a14="http://schemas.microsoft.com/office/drawing/2010/main" val="0"/>
+                <a14:useLocalDpi xmlns:a14="http://schemas.microsoft.com/office/drawing/2010/main" xmlns="" val="0"/>
               </a:ext>
             </a:extLst>
           </a:blip>
@@ -21253,7 +21611,7 @@
           <a:noFill/>
           <a:extLst>
             <a:ext uri="{909E8E84-426E-40DD-AFC4-6F175D3DCCD1}">
-              <a14:hiddenFill xmlns="" xmlns:a14="http://schemas.microsoft.com/office/drawing/2010/main">
+              <a14:hiddenFill xmlns:a14="http://schemas.microsoft.com/office/drawing/2010/main" xmlns="">
                 <a:solidFill>
                   <a:srgbClr val="FFFFFF"/>
                 </a:solidFill>
@@ -21267,7 +21625,7 @@
           <p:cNvPr id="8" name="Slide Number">
             <a:extLst>
               <a:ext uri="{FF2B5EF4-FFF2-40B4-BE49-F238E27FC236}">
-                <a16:creationId xmlns="" xmlns:a16="http://schemas.microsoft.com/office/drawing/2014/main" id="{06A31703-39B5-4F2F-B0E1-D72AE73CA0A5}"/>
+                <a16:creationId xmlns:a16="http://schemas.microsoft.com/office/drawing/2014/main" xmlns="" id="{06A31703-39B5-4F2F-B0E1-D72AE73CA0A5}"/>
               </a:ext>
             </a:extLst>
           </p:cNvPr>
@@ -21307,7 +21665,7 @@
     </p:spTree>
     <p:extLst>
       <p:ext uri="{BB962C8B-B14F-4D97-AF65-F5344CB8AC3E}">
-        <p14:creationId xmlns="" xmlns:p14="http://schemas.microsoft.com/office/powerpoint/2010/main" val="4199894694"/>
+        <p14:creationId xmlns:p14="http://schemas.microsoft.com/office/powerpoint/2010/main" xmlns="" val="4199894694"/>
       </p:ext>
     </p:extLst>
   </p:cSld>
@@ -21315,7 +21673,7 @@
     <a:masterClrMapping/>
   </p:clrMapOvr>
   <mc:AlternateContent xmlns:mc="http://schemas.openxmlformats.org/markup-compatibility/2006">
-    <mc:Choice xmlns="" xmlns:p14="http://schemas.microsoft.com/office/powerpoint/2010/main" Requires="p14">
+    <mc:Choice xmlns:p14="http://schemas.microsoft.com/office/powerpoint/2010/main" xmlns="" Requires="p14">
       <p:transition spd="slow" p14:dur="2000" advClick="0" advTm="5000"/>
     </mc:Choice>
     <mc:Fallback>
@@ -21879,7 +22237,7 @@
               </a:buClr>
             </a:pPr>
             <a:r>
-              <a:rPr lang="bg-BG" sz="3100" b="1" dirty="0" smtClean="0">
+              <a:rPr lang="bg-BG" sz="2900" b="1" dirty="0" smtClean="0">
                 <a:solidFill>
                   <a:schemeClr val="bg1"/>
                 </a:solidFill>
@@ -21887,26 +22245,26 @@
               <a:t>Анализира </a:t>
             </a:r>
             <a:r>
-              <a:rPr lang="ru-RU" sz="3100" dirty="0" smtClean="0"/>
+              <a:rPr lang="ru-RU" sz="2900" dirty="0" smtClean="0"/>
               <a:t>заявките от потребителя и </a:t>
             </a:r>
             <a:r>
-              <a:rPr lang="bg-BG" sz="3100" b="1" dirty="0" smtClean="0">
+              <a:rPr lang="bg-BG" sz="2900" b="1" dirty="0" smtClean="0">
                 <a:solidFill>
                   <a:schemeClr val="bg1"/>
                 </a:solidFill>
               </a:rPr>
               <a:t>предприема подходящо действие</a:t>
             </a:r>
-            <a:endParaRPr lang="en-US" sz="3100" dirty="0" smtClean="0"/>
+            <a:endParaRPr lang="en-US" sz="2900" dirty="0" smtClean="0"/>
           </a:p>
           <a:p>
             <a:pPr lvl="1"/>
             <a:r>
-              <a:rPr lang="ru-RU" sz="3100" dirty="0" smtClean="0"/>
+              <a:rPr lang="ru-RU" sz="2900" dirty="0" smtClean="0"/>
               <a:t>Потребителят няма директен достъп до съхранените данни</a:t>
             </a:r>
-            <a:endParaRPr lang="bg-BG" sz="3100" dirty="0"/>
+            <a:endParaRPr lang="bg-BG" sz="2900" dirty="0"/>
           </a:p>
         </p:txBody>
       </p:sp>
@@ -21938,7 +22296,7 @@
           <p:cNvPr id="7" name="Slide Number">
             <a:extLst>
               <a:ext uri="{FF2B5EF4-FFF2-40B4-BE49-F238E27FC236}">
-                <a16:creationId xmlns="" xmlns:a16="http://schemas.microsoft.com/office/drawing/2014/main" id="{B276EE81-4E4B-4ADC-B1B1-F5D494B7A41E}"/>
+                <a16:creationId xmlns:a16="http://schemas.microsoft.com/office/drawing/2014/main" xmlns="" id="{B276EE81-4E4B-4ADC-B1B1-F5D494B7A41E}"/>
               </a:ext>
             </a:extLst>
           </p:cNvPr>
@@ -22066,7 +22424,7 @@
     </p:spTree>
     <p:extLst>
       <p:ext uri="{BB962C8B-B14F-4D97-AF65-F5344CB8AC3E}">
-        <p14:creationId xmlns="" xmlns:p14="http://schemas.microsoft.com/office/powerpoint/2010/main" val="3790313592"/>
+        <p14:creationId xmlns:p14="http://schemas.microsoft.com/office/powerpoint/2010/main" xmlns="" val="3790313592"/>
       </p:ext>
     </p:extLst>
   </p:cSld>
@@ -22074,7 +22432,7 @@
     <a:masterClrMapping/>
   </p:clrMapOvr>
   <mc:AlternateContent xmlns:mc="http://schemas.openxmlformats.org/markup-compatibility/2006">
-    <mc:Choice xmlns="" xmlns:p14="http://schemas.microsoft.com/office/powerpoint/2010/main" Requires="p14">
+    <mc:Choice xmlns:p14="http://schemas.microsoft.com/office/powerpoint/2010/main" xmlns="" Requires="p14">
       <p:transition spd="slow" p14:dur="2000" advClick="0" advTm="5000"/>
     </mc:Choice>
     <mc:Fallback>
@@ -22363,7 +22721,7 @@
           <p:cNvPr id="4" name="Slide Subtitle">
             <a:extLst>
               <a:ext uri="{FF2B5EF4-FFF2-40B4-BE49-F238E27FC236}">
-                <a16:creationId xmlns="" xmlns:a16="http://schemas.microsoft.com/office/drawing/2014/main" id="{BEB5BB41-09D4-4E9F-8C80-EE8709171CB3}"/>
+                <a16:creationId xmlns:a16="http://schemas.microsoft.com/office/drawing/2014/main" xmlns="" id="{BEB5BB41-09D4-4E9F-8C80-EE8709171CB3}"/>
               </a:ext>
             </a:extLst>
           </p:cNvPr>
@@ -22392,7 +22750,7 @@
           <p:cNvPr id="6" name="Slide Title">
             <a:extLst>
               <a:ext uri="{FF2B5EF4-FFF2-40B4-BE49-F238E27FC236}">
-                <a16:creationId xmlns="" xmlns:a16="http://schemas.microsoft.com/office/drawing/2014/main" id="{028D9EA3-B5E0-4F17-9467-4BE3C280DA68}"/>
+                <a16:creationId xmlns:a16="http://schemas.microsoft.com/office/drawing/2014/main" xmlns="" id="{028D9EA3-B5E0-4F17-9467-4BE3C280DA68}"/>
               </a:ext>
             </a:extLst>
           </p:cNvPr>
@@ -22429,7 +22787,7 @@
           <a:blip r:embed="rId3" cstate="print">
             <a:extLst>
               <a:ext uri="{28A0092B-C50C-407E-A947-70E740481C1C}">
-                <a14:useLocalDpi xmlns="" xmlns:a14="http://schemas.microsoft.com/office/drawing/2010/main" val="0"/>
+                <a14:useLocalDpi xmlns:a14="http://schemas.microsoft.com/office/drawing/2010/main" xmlns="" val="0"/>
               </a:ext>
             </a:extLst>
           </a:blip>
@@ -22450,7 +22808,7 @@
     </p:spTree>
     <p:extLst>
       <p:ext uri="{BB962C8B-B14F-4D97-AF65-F5344CB8AC3E}">
-        <p14:creationId xmlns="" xmlns:p14="http://schemas.microsoft.com/office/powerpoint/2010/main" val="882194472"/>
+        <p14:creationId xmlns:p14="http://schemas.microsoft.com/office/powerpoint/2010/main" xmlns="" val="882194472"/>
       </p:ext>
     </p:extLst>
   </p:cSld>
@@ -22458,7 +22816,7 @@
     <a:masterClrMapping/>
   </p:clrMapOvr>
   <mc:AlternateContent xmlns:mc="http://schemas.openxmlformats.org/markup-compatibility/2006">
-    <mc:Choice xmlns="" xmlns:p14="http://schemas.microsoft.com/office/powerpoint/2010/main" Requires="p14">
+    <mc:Choice xmlns:p14="http://schemas.microsoft.com/office/powerpoint/2010/main" xmlns="" Requires="p14">
       <p:transition spd="slow" p14:dur="2000" advClick="0" advTm="5000"/>
     </mc:Choice>
     <mc:Fallback>
@@ -22497,7 +22855,7 @@
           <p:cNvPr id="17" name="Text Placeholder 16">
             <a:extLst>
               <a:ext uri="{FF2B5EF4-FFF2-40B4-BE49-F238E27FC236}">
-                <a16:creationId xmlns="" xmlns:a16="http://schemas.microsoft.com/office/drawing/2014/main" id="{DE605031-18A6-F6CD-5805-9DE50DE4F437}"/>
+                <a16:creationId xmlns:a16="http://schemas.microsoft.com/office/drawing/2014/main" xmlns="" id="{DE605031-18A6-F6CD-5805-9DE50DE4F437}"/>
               </a:ext>
             </a:extLst>
           </p:cNvPr>
@@ -22685,7 +23043,7 @@
           <p:cNvPr id="2050" name="Picture 2" descr="The receipts prove it: Everything seems to be rising, from gas to cookies |  KX NEWS">
             <a:extLst>
               <a:ext uri="{FF2B5EF4-FFF2-40B4-BE49-F238E27FC236}">
-                <a16:creationId xmlns="" xmlns:a16="http://schemas.microsoft.com/office/drawing/2014/main" id="{DB01D814-6E1C-E4CE-5573-18B944EE2509}"/>
+                <a16:creationId xmlns:a16="http://schemas.microsoft.com/office/drawing/2014/main" xmlns="" id="{DB01D814-6E1C-E4CE-5573-18B944EE2509}"/>
               </a:ext>
             </a:extLst>
           </p:cNvPr>
@@ -22698,7 +23056,7 @@
           <a:blip r:embed="rId2" cstate="print">
             <a:extLst>
               <a:ext uri="{28A0092B-C50C-407E-A947-70E740481C1C}">
-                <a14:useLocalDpi xmlns="" xmlns:a14="http://schemas.microsoft.com/office/drawing/2010/main" val="0"/>
+                <a14:useLocalDpi xmlns:a14="http://schemas.microsoft.com/office/drawing/2010/main" xmlns="" val="0"/>
               </a:ext>
             </a:extLst>
           </a:blip>
@@ -22725,7 +23083,7 @@
           </a:ln>
           <a:extLst>
             <a:ext uri="{909E8E84-426E-40DD-AFC4-6F175D3DCCD1}">
-              <a14:hiddenFill xmlns="" xmlns:a14="http://schemas.microsoft.com/office/drawing/2010/main">
+              <a14:hiddenFill xmlns:a14="http://schemas.microsoft.com/office/drawing/2010/main" xmlns="">
                 <a:solidFill>
                   <a:srgbClr val="FFFFFF"/>
                 </a:solidFill>
@@ -22739,7 +23097,7 @@
           <p:cNvPr id="13" name="Picture 12">
             <a:extLst>
               <a:ext uri="{FF2B5EF4-FFF2-40B4-BE49-F238E27FC236}">
-                <a16:creationId xmlns="" xmlns:a16="http://schemas.microsoft.com/office/drawing/2014/main" id="{AFB64670-C4F3-348F-1421-9F71ACBB5C70}"/>
+                <a16:creationId xmlns:a16="http://schemas.microsoft.com/office/drawing/2014/main" xmlns="" id="{AFB64670-C4F3-348F-1421-9F71ACBB5C70}"/>
               </a:ext>
             </a:extLst>
           </p:cNvPr>
@@ -22774,7 +23132,7 @@
     </p:spTree>
     <p:extLst>
       <p:ext uri="{BB962C8B-B14F-4D97-AF65-F5344CB8AC3E}">
-        <p14:creationId xmlns="" xmlns:p14="http://schemas.microsoft.com/office/powerpoint/2010/main" val="249145978"/>
+        <p14:creationId xmlns:p14="http://schemas.microsoft.com/office/powerpoint/2010/main" xmlns="" val="249145978"/>
       </p:ext>
     </p:extLst>
   </p:cSld>
@@ -22782,7 +23140,7 @@
     <a:masterClrMapping/>
   </p:clrMapOvr>
   <mc:AlternateContent xmlns:mc="http://schemas.openxmlformats.org/markup-compatibility/2006">
-    <mc:Choice xmlns="" xmlns:p14="http://schemas.microsoft.com/office/powerpoint/2010/main" Requires="p14">
+    <mc:Choice xmlns:p14="http://schemas.microsoft.com/office/powerpoint/2010/main" xmlns="" Requires="p14">
       <p:transition spd="slow" p14:dur="2000" advClick="0" advTm="5000"/>
     </mc:Choice>
     <mc:Fallback>
@@ -22996,7 +23354,7 @@
           <p:cNvPr id="18" name="Text Placeholder 17">
             <a:extLst>
               <a:ext uri="{FF2B5EF4-FFF2-40B4-BE49-F238E27FC236}">
-                <a16:creationId xmlns="" xmlns:a16="http://schemas.microsoft.com/office/drawing/2014/main" id="{3C3247B6-3C54-DEFB-8B22-DFE6C9825712}"/>
+                <a16:creationId xmlns:a16="http://schemas.microsoft.com/office/drawing/2014/main" xmlns="" id="{3C3247B6-3C54-DEFB-8B22-DFE6C9825712}"/>
               </a:ext>
             </a:extLst>
           </p:cNvPr>
@@ -23242,7 +23600,7 @@
           <p:cNvPr id="15" name="Picture 14">
             <a:extLst>
               <a:ext uri="{FF2B5EF4-FFF2-40B4-BE49-F238E27FC236}">
-                <a16:creationId xmlns="" xmlns:a16="http://schemas.microsoft.com/office/drawing/2014/main" id="{DBA40998-706A-62A0-3C2C-8DA4085F711D}"/>
+                <a16:creationId xmlns:a16="http://schemas.microsoft.com/office/drawing/2014/main" xmlns="" id="{DBA40998-706A-62A0-3C2C-8DA4085F711D}"/>
               </a:ext>
             </a:extLst>
           </p:cNvPr>
@@ -23279,7 +23637,7 @@
           <p:cNvPr id="1032" name="Picture 8" descr="Printable Order Form Template (2 Options) - Freebie Finding Mom">
             <a:extLst>
               <a:ext uri="{FF2B5EF4-FFF2-40B4-BE49-F238E27FC236}">
-                <a16:creationId xmlns="" xmlns:a16="http://schemas.microsoft.com/office/drawing/2014/main" id="{DF1FD92E-8B13-F1FE-FCBD-8B767CE9939B}"/>
+                <a16:creationId xmlns:a16="http://schemas.microsoft.com/office/drawing/2014/main" xmlns="" id="{DF1FD92E-8B13-F1FE-FCBD-8B767CE9939B}"/>
               </a:ext>
             </a:extLst>
           </p:cNvPr>
@@ -23292,7 +23650,7 @@
           <a:blip r:embed="rId3" cstate="print">
             <a:extLst>
               <a:ext uri="{28A0092B-C50C-407E-A947-70E740481C1C}">
-                <a14:useLocalDpi xmlns="" xmlns:a14="http://schemas.microsoft.com/office/drawing/2010/main" val="0"/>
+                <a14:useLocalDpi xmlns:a14="http://schemas.microsoft.com/office/drawing/2010/main" xmlns="" val="0"/>
               </a:ext>
             </a:extLst>
           </a:blip>
@@ -23327,7 +23685,7 @@
           </a:scene3d>
           <a:extLst>
             <a:ext uri="{909E8E84-426E-40DD-AFC4-6F175D3DCCD1}">
-              <a14:hiddenFill xmlns="" xmlns:a14="http://schemas.microsoft.com/office/drawing/2010/main">
+              <a14:hiddenFill xmlns:a14="http://schemas.microsoft.com/office/drawing/2010/main" xmlns="">
                 <a:solidFill>
                   <a:srgbClr val="FFFFFF"/>
                 </a:solidFill>
@@ -23339,7 +23697,7 @@
     </p:spTree>
     <p:extLst>
       <p:ext uri="{BB962C8B-B14F-4D97-AF65-F5344CB8AC3E}">
-        <p14:creationId xmlns="" xmlns:p14="http://schemas.microsoft.com/office/powerpoint/2010/main" val="4267728362"/>
+        <p14:creationId xmlns:p14="http://schemas.microsoft.com/office/powerpoint/2010/main" xmlns="" val="4267728362"/>
       </p:ext>
     </p:extLst>
   </p:cSld>
@@ -23347,7 +23705,7 @@
     <a:masterClrMapping/>
   </p:clrMapOvr>
   <mc:AlternateContent xmlns:mc="http://schemas.openxmlformats.org/markup-compatibility/2006">
-    <mc:Choice xmlns="" xmlns:p14="http://schemas.microsoft.com/office/powerpoint/2010/main" Requires="p14">
+    <mc:Choice xmlns:p14="http://schemas.microsoft.com/office/powerpoint/2010/main" xmlns="" Requires="p14">
       <p:transition spd="slow" p14:dur="2000" advClick="0" advTm="5000"/>
     </mc:Choice>
     <mc:Fallback>
@@ -23903,7 +24261,7 @@
   <a:extraClrSchemeLst/>
   <a:extLst>
     <a:ext uri="{05A4C25C-085E-4340-85A3-A5531E510DB2}">
-      <thm15:themeFamily xmlns="" xmlns:thm15="http://schemas.microsoft.com/office/thememl/2012/main" name="SoftUni" id="{D61FAD9B-6E74-4E03-BFE4-B363D484F1DA}" vid="{7089C1A3-635B-4B03-A017-DAF10A3A396B}"/>
+      <thm15:themeFamily xmlns:thm15="http://schemas.microsoft.com/office/thememl/2012/main" xmlns="" name="SoftUni" id="{D61FAD9B-6E74-4E03-BFE4-B363D484F1DA}" vid="{7089C1A3-635B-4B03-A017-DAF10A3A396B}"/>
     </a:ext>
   </a:extLst>
 </a:theme>
@@ -24198,7 +24556,7 @@
   <a:extraClrSchemeLst/>
   <a:extLst>
     <a:ext uri="{05A4C25C-085E-4340-85A3-A5531E510DB2}">
-      <thm15:themeFamily xmlns="" xmlns:thm15="http://schemas.microsoft.com/office/thememl/2012/main" name="Office Theme" id="{62F939B6-93AF-4DB8-9C6B-D6C7DFDC589F}" vid="{4A3C46E8-61CC-4603-A589-7422A47A8E4A}"/>
+      <thm15:themeFamily xmlns:thm15="http://schemas.microsoft.com/office/thememl/2012/main" xmlns="" name="Office Theme" id="{62F939B6-93AF-4DB8-9C6B-D6C7DFDC589F}" vid="{4A3C46E8-61CC-4603-A589-7422A47A8E4A}"/>
     </a:ext>
   </a:extLst>
 </a:theme>
@@ -24493,28 +24851,13 @@
   <a:extraClrSchemeLst/>
   <a:extLst>
     <a:ext uri="{05A4C25C-085E-4340-85A3-A5531E510DB2}">
-      <thm15:themeFamily xmlns="" xmlns:thm15="http://schemas.microsoft.com/office/thememl/2012/main" name="Office Theme" id="{62F939B6-93AF-4DB8-9C6B-D6C7DFDC589F}" vid="{4A3C46E8-61CC-4603-A589-7422A47A8E4A}"/>
+      <thm15:themeFamily xmlns:thm15="http://schemas.microsoft.com/office/thememl/2012/main" xmlns="" name="Office Theme" id="{62F939B6-93AF-4DB8-9C6B-D6C7DFDC589F}" vid="{4A3C46E8-61CC-4603-A589-7422A47A8E4A}"/>
     </a:ext>
   </a:extLst>
 </a:theme>
 </file>
 
 <file path=customXml/item1.xml><?xml version="1.0" encoding="utf-8"?>
-<p:properties xmlns:p="http://schemas.microsoft.com/office/2006/metadata/properties" xmlns:xsi="http://www.w3.org/2001/XMLSchema-instance" xmlns:pc="http://schemas.microsoft.com/office/infopath/2007/PartnerControls">
-  <documentManagement/>
-</p:properties>
-</file>
-
-<file path=customXml/item2.xml><?xml version="1.0" encoding="utf-8"?>
-<?mso-contentType ?>
-<FormTemplates xmlns="http://schemas.microsoft.com/sharepoint/v3/contenttype/forms">
-  <Display>DocumentLibraryForm</Display>
-  <Edit>DocumentLibraryForm</Edit>
-  <New>DocumentLibraryForm</New>
-</FormTemplates>
-</file>
-
-<file path=customXml/item3.xml><?xml version="1.0" encoding="utf-8"?>
 <ct:contentTypeSchema xmlns:ct="http://schemas.microsoft.com/office/2006/metadata/contentType" xmlns:ma="http://schemas.microsoft.com/office/2006/metadata/properties/metaAttributes" ct:_="" ma:_="" ma:contentTypeName="Документ" ma:contentTypeID="0x010100B6C18B0EB80FEC43B96FC4929E3ACDFF" ma:contentTypeVersion="8" ma:contentTypeDescription="Създаване на нов документ" ma:contentTypeScope="" ma:versionID="5e73c28b7fde86b7f49c9d6b9be21d41">
   <xsd:schema xmlns:xsd="http://www.w3.org/2001/XMLSchema" xmlns:xs="http://www.w3.org/2001/XMLSchema" xmlns:p="http://schemas.microsoft.com/office/2006/metadata/properties" xmlns:ns2="4f985cec-e092-4bcf-a1e1-b816bd0221d8" targetNamespace="http://schemas.microsoft.com/office/2006/metadata/properties" ma:root="true" ma:fieldsID="f7a640d6aa79659634b3275499e0d9c9" ns2:_="">
     <xsd:import namespace="4f985cec-e092-4bcf-a1e1-b816bd0221d8"/>
@@ -24686,31 +25029,22 @@
 </ct:contentTypeSchema>
 </file>
 
-<file path=customXml/itemProps1.xml><?xml version="1.0" encoding="utf-8"?>
-<ds:datastoreItem xmlns:ds="http://schemas.openxmlformats.org/officeDocument/2006/customXml" ds:itemID="{5E2F4A33-1866-4BB8-8A35-8D6BDFE8D9F5}">
-  <ds:schemaRefs>
-    <ds:schemaRef ds:uri="http://schemas.microsoft.com/office/infopath/2007/PartnerControls"/>
-    <ds:schemaRef ds:uri="http://purl.org/dc/dcmitype/"/>
-    <ds:schemaRef ds:uri="http://schemas.microsoft.com/office/2006/documentManagement/types"/>
-    <ds:schemaRef ds:uri="http://schemas.microsoft.com/office/2006/metadata/properties"/>
-    <ds:schemaRef ds:uri="http://www.w3.org/XML/1998/namespace"/>
-    <ds:schemaRef ds:uri="4f985cec-e092-4bcf-a1e1-b816bd0221d8"/>
-    <ds:schemaRef ds:uri="http://schemas.openxmlformats.org/package/2006/metadata/core-properties"/>
-    <ds:schemaRef ds:uri="http://purl.org/dc/terms/"/>
-    <ds:schemaRef ds:uri="http://purl.org/dc/elements/1.1/"/>
-  </ds:schemaRefs>
-</ds:datastoreItem>
+<file path=customXml/item2.xml><?xml version="1.0" encoding="utf-8"?>
+<?mso-contentType ?>
+<FormTemplates xmlns="http://schemas.microsoft.com/sharepoint/v3/contenttype/forms">
+  <Display>DocumentLibraryForm</Display>
+  <Edit>DocumentLibraryForm</Edit>
+  <New>DocumentLibraryForm</New>
+</FormTemplates>
 </file>
 
-<file path=customXml/itemProps2.xml><?xml version="1.0" encoding="utf-8"?>
-<ds:datastoreItem xmlns:ds="http://schemas.openxmlformats.org/officeDocument/2006/customXml" ds:itemID="{68A20BEC-F81B-49CD-951D-E62C4BAE7796}">
-  <ds:schemaRefs>
-    <ds:schemaRef ds:uri="http://schemas.microsoft.com/sharepoint/v3/contenttype/forms"/>
-  </ds:schemaRefs>
-</ds:datastoreItem>
+<file path=customXml/item3.xml><?xml version="1.0" encoding="utf-8"?>
+<p:properties xmlns:p="http://schemas.microsoft.com/office/2006/metadata/properties" xmlns:xsi="http://www.w3.org/2001/XMLSchema-instance" xmlns:pc="http://schemas.microsoft.com/office/infopath/2007/PartnerControls">
+  <documentManagement/>
+</p:properties>
 </file>
 
-<file path=customXml/itemProps3.xml><?xml version="1.0" encoding="utf-8"?>
+<file path=customXml/itemProps1.xml><?xml version="1.0" encoding="utf-8"?>
 <ds:datastoreItem xmlns:ds="http://schemas.openxmlformats.org/officeDocument/2006/customXml" ds:itemID="{4443A303-689A-4436-B140-8B2DF827EBE9}">
   <ds:schemaRefs>
     <ds:schemaRef ds:uri="http://schemas.microsoft.com/office/2006/metadata/contentType"/>
@@ -24726,4 +25060,28 @@
     <ds:schemaRef ds:uri="http://schemas.microsoft.com/internal/obd"/>
   </ds:schemaRefs>
 </ds:datastoreItem>
+</file>
+
+<file path=customXml/itemProps2.xml><?xml version="1.0" encoding="utf-8"?>
+<ds:datastoreItem xmlns:ds="http://schemas.openxmlformats.org/officeDocument/2006/customXml" ds:itemID="{68A20BEC-F81B-49CD-951D-E62C4BAE7796}">
+  <ds:schemaRefs>
+    <ds:schemaRef ds:uri="http://schemas.microsoft.com/sharepoint/v3/contenttype/forms"/>
+  </ds:schemaRefs>
+</ds:datastoreItem>
+</file>
+
+<file path=customXml/itemProps3.xml><?xml version="1.0" encoding="utf-8"?>
+<ds:datastoreItem xmlns:ds="http://schemas.openxmlformats.org/officeDocument/2006/customXml" ds:itemID="{5E2F4A33-1866-4BB8-8A35-8D6BDFE8D9F5}">
+  <ds:schemaRefs>
+    <ds:schemaRef ds:uri="http://schemas.microsoft.com/office/infopath/2007/PartnerControls"/>
+    <ds:schemaRef ds:uri="http://purl.org/dc/dcmitype/"/>
+    <ds:schemaRef ds:uri="http://schemas.microsoft.com/office/2006/documentManagement/types"/>
+    <ds:schemaRef ds:uri="http://schemas.microsoft.com/office/2006/metadata/properties"/>
+    <ds:schemaRef ds:uri="http://www.w3.org/XML/1998/namespace"/>
+    <ds:schemaRef ds:uri="4f985cec-e092-4bcf-a1e1-b816bd0221d8"/>
+    <ds:schemaRef ds:uri="http://schemas.openxmlformats.org/package/2006/metadata/core-properties"/>
+    <ds:schemaRef ds:uri="http://purl.org/dc/terms/"/>
+    <ds:schemaRef ds:uri="http://purl.org/dc/elements/1.1/"/>
+  </ds:schemaRefs>
+</ds:datastoreItem>
 </file>
</xml_diff>

<commit_message>
Fixing slides for IT Systems
</commit_message>
<xml_diff>
--- a/Courses/Software-Sciences/Module-3-Databases-New/01-IT-Systems/01-IT-Systems.pptx
+++ b/Courses/Software-Sciences/Module-3-Databases-New/01-IT-Systems/01-IT-Systems.pptx
@@ -5,10 +5,10 @@
     <p:sldMasterId id="2147483675" r:id="rId1"/>
   </p:sldMasterIdLst>
   <p:notesMasterIdLst>
-    <p:notesMasterId r:id="rId27"/>
+    <p:notesMasterId r:id="rId29"/>
   </p:notesMasterIdLst>
   <p:handoutMasterIdLst>
-    <p:handoutMasterId r:id="rId28"/>
+    <p:handoutMasterId r:id="rId30"/>
   </p:handoutMasterIdLst>
   <p:sldIdLst>
     <p:sldId id="638" r:id="rId2"/>
@@ -30,12 +30,14 @@
     <p:sldId id="628" r:id="rId18"/>
     <p:sldId id="629" r:id="rId19"/>
     <p:sldId id="630" r:id="rId20"/>
-    <p:sldId id="631" r:id="rId21"/>
-    <p:sldId id="632" r:id="rId22"/>
-    <p:sldId id="637" r:id="rId23"/>
-    <p:sldId id="633" r:id="rId24"/>
-    <p:sldId id="504" r:id="rId25"/>
-    <p:sldId id="505" r:id="rId26"/>
+    <p:sldId id="640" r:id="rId21"/>
+    <p:sldId id="631" r:id="rId22"/>
+    <p:sldId id="641" r:id="rId23"/>
+    <p:sldId id="632" r:id="rId24"/>
+    <p:sldId id="637" r:id="rId25"/>
+    <p:sldId id="633" r:id="rId26"/>
+    <p:sldId id="504" r:id="rId27"/>
+    <p:sldId id="505" r:id="rId28"/>
   </p:sldIdLst>
   <p:sldSz cx="12192000" cy="6858000"/>
   <p:notesSz cx="6858000" cy="9144000"/>
@@ -170,7 +172,9 @@
             <p14:sldId id="628"/>
             <p14:sldId id="629"/>
             <p14:sldId id="630"/>
+            <p14:sldId id="640"/>
             <p14:sldId id="631"/>
+            <p14:sldId id="641"/>
             <p14:sldId id="632"/>
             <p14:sldId id="637"/>
           </p14:sldIdLst>
@@ -458,7 +462,7 @@
           <a:p>
             <a:fld id="{4E087215-0C8F-4762-A664-737A353EC9A4}" type="datetimeFigureOut">
               <a:rPr lang="bg-BG" smtClean="0"/>
-              <a:t>5.10.2023 г.</a:t>
+              <a:t>25.11.2023 г.</a:t>
             </a:fld>
             <a:endParaRPr lang="bg-BG"/>
           </a:p>
@@ -654,7 +658,7 @@
           <a:p>
             <a:fld id="{72D84649-876A-46C9-8472-14CB09C070D8}" type="datetimeFigureOut">
               <a:rPr lang="en-US" smtClean="0"/>
-              <a:t>10/5/2023</a:t>
+              <a:t>11/25/2023</a:t>
             </a:fld>
             <a:endParaRPr lang="en-US"/>
           </a:p>
@@ -1139,7 +1143,7 @@
           <p:cNvPr id="7" name="Slide Number Placeholder 5">
             <a:extLst>
               <a:ext uri="{FF2B5EF4-FFF2-40B4-BE49-F238E27FC236}">
-                <a16:creationId xmlns:a16="http://schemas.microsoft.com/office/drawing/2014/main" id="{5049B984-F964-47FF-8179-0A3007CE21CD}"/>
+                <a16:creationId xmlns:a16="http://schemas.microsoft.com/office/drawing/2014/main" id="{E65F1CA9-65DC-416B-8882-B3A5E415CE67}"/>
               </a:ext>
             </a:extLst>
           </p:cNvPr>
@@ -1258,7 +1262,7 @@
             <a:fld id="{3EBA5BD7-F043-4D1B-AA17-CD412FC534DE}" type="slidenum">
               <a:rPr lang="en-US" smtClean="0"/>
               <a:pPr/>
-              <a:t>24</a:t>
+              <a:t>25</a:t>
             </a:fld>
             <a:endParaRPr lang="en-US" dirty="0"/>
           </a:p>
@@ -1269,7 +1273,7 @@
           <p:cNvPr id="5" name="Footer Placeholder 7">
             <a:extLst>
               <a:ext uri="{FF2B5EF4-FFF2-40B4-BE49-F238E27FC236}">
-                <a16:creationId xmlns:a16="http://schemas.microsoft.com/office/drawing/2014/main" id="{87873718-4EF7-D4BA-768F-C09AAEC16FC2}"/>
+                <a16:creationId xmlns:a16="http://schemas.microsoft.com/office/drawing/2014/main" id="{43FAF785-0C8D-730E-8E59-68198DC82CE0}"/>
               </a:ext>
             </a:extLst>
           </p:cNvPr>
@@ -1322,7 +1326,7 @@
     </p:spTree>
     <p:extLst>
       <p:ext uri="{BB962C8B-B14F-4D97-AF65-F5344CB8AC3E}">
-        <p14:creationId xmlns:p14="http://schemas.microsoft.com/office/powerpoint/2010/main" val="2007979410"/>
+        <p14:creationId xmlns:p14="http://schemas.microsoft.com/office/powerpoint/2010/main" val="2689344733"/>
       </p:ext>
     </p:extLst>
   </p:cSld>
@@ -1376,16 +1380,16 @@
           <a:bodyPr/>
           <a:lstStyle/>
           <a:p>
-            <a:endParaRPr lang="en-US"/>
+            <a:endParaRPr lang="en-US" dirty="0"/>
           </a:p>
         </p:txBody>
       </p:sp>
       <p:sp>
         <p:nvSpPr>
-          <p:cNvPr id="6" name="Slide Number Placeholder 5">
+          <p:cNvPr id="7" name="Slide Number Placeholder 5">
             <a:extLst>
               <a:ext uri="{FF2B5EF4-FFF2-40B4-BE49-F238E27FC236}">
-                <a16:creationId xmlns:a16="http://schemas.microsoft.com/office/drawing/2014/main" id="{6627548A-4D3C-449B-81A5-FA4BE4628490}"/>
+                <a16:creationId xmlns:a16="http://schemas.microsoft.com/office/drawing/2014/main" id="{5049B984-F964-47FF-8179-0A3007CE21CD}"/>
               </a:ext>
             </a:extLst>
           </p:cNvPr>
@@ -1504,7 +1508,253 @@
             <a:fld id="{3EBA5BD7-F043-4D1B-AA17-CD412FC534DE}" type="slidenum">
               <a:rPr lang="en-US" smtClean="0"/>
               <a:pPr/>
-              <a:t>25</a:t>
+              <a:t>26</a:t>
+            </a:fld>
+            <a:endParaRPr lang="en-US" dirty="0"/>
+          </a:p>
+        </p:txBody>
+      </p:sp>
+      <p:sp>
+        <p:nvSpPr>
+          <p:cNvPr id="5" name="Footer Placeholder 7">
+            <a:extLst>
+              <a:ext uri="{FF2B5EF4-FFF2-40B4-BE49-F238E27FC236}">
+                <a16:creationId xmlns:a16="http://schemas.microsoft.com/office/drawing/2014/main" id="{87873718-4EF7-D4BA-768F-C09AAEC16FC2}"/>
+              </a:ext>
+            </a:extLst>
+          </p:cNvPr>
+          <p:cNvSpPr>
+            <a:spLocks noGrp="1"/>
+          </p:cNvSpPr>
+          <p:nvPr>
+            <p:ph type="ftr" sz="quarter" idx="4"/>
+          </p:nvPr>
+        </p:nvSpPr>
+        <p:spPr>
+          <a:xfrm>
+            <a:off x="-1" y="8892000"/>
+            <a:ext cx="6488999" cy="252000"/>
+          </a:xfrm>
+          <a:prstGeom prst="rect">
+            <a:avLst/>
+          </a:prstGeom>
+        </p:spPr>
+        <p:txBody>
+          <a:bodyPr vert="horz" lIns="91440" tIns="45720" rIns="91440" bIns="45720" rtlCol="0" anchor="b"/>
+          <a:lstStyle>
+            <a:lvl1pPr algn="l">
+              <a:defRPr sz="1100"/>
+            </a:lvl1pPr>
+          </a:lstStyle>
+          <a:p>
+            <a:r>
+              <a:rPr lang="bg-BG" sz="1100" dirty="0"/>
+              <a:t>Работна група </a:t>
+            </a:r>
+            <a:r>
+              <a:rPr lang="bg-BG" dirty="0"/>
+              <a:t>"Образование по програмиране и ИТ"</a:t>
+            </a:r>
+            <a:r>
+              <a:rPr lang="bg-BG" sz="1100" dirty="0"/>
+              <a:t>, с подкрепата на </a:t>
+            </a:r>
+            <a:r>
+              <a:rPr lang="en-US" sz="1100" dirty="0">
+                <a:hlinkClick r:id="rId3"/>
+              </a:rPr>
+              <a:t>SoftUni</a:t>
+            </a:r>
+            <a:endParaRPr lang="en-US" sz="1100" dirty="0"/>
+          </a:p>
+        </p:txBody>
+      </p:sp>
+    </p:spTree>
+    <p:extLst>
+      <p:ext uri="{BB962C8B-B14F-4D97-AF65-F5344CB8AC3E}">
+        <p14:creationId xmlns:p14="http://schemas.microsoft.com/office/powerpoint/2010/main" val="2007979410"/>
+      </p:ext>
+    </p:extLst>
+  </p:cSld>
+  <p:clrMapOvr>
+    <a:masterClrMapping/>
+  </p:clrMapOvr>
+</p:notes>
+</file>
+
+<file path=ppt/notesSlides/notesSlide12.xml><?xml version="1.0" encoding="utf-8"?>
+<p:notes xmlns:a="http://schemas.openxmlformats.org/drawingml/2006/main" xmlns:r="http://schemas.openxmlformats.org/officeDocument/2006/relationships" xmlns:p="http://schemas.openxmlformats.org/presentationml/2006/main">
+  <p:cSld>
+    <p:spTree>
+      <p:nvGrpSpPr>
+        <p:cNvPr id="1" name=""/>
+        <p:cNvGrpSpPr/>
+        <p:nvPr/>
+      </p:nvGrpSpPr>
+      <p:grpSpPr>
+        <a:xfrm>
+          <a:off x="0" y="0"/>
+          <a:ext cx="0" cy="0"/>
+          <a:chOff x="0" y="0"/>
+          <a:chExt cx="0" cy="0"/>
+        </a:xfrm>
+      </p:grpSpPr>
+      <p:sp>
+        <p:nvSpPr>
+          <p:cNvPr id="2" name="Slide Image Placeholder 1"/>
+          <p:cNvSpPr>
+            <a:spLocks noGrp="1" noRot="1" noChangeAspect="1"/>
+          </p:cNvSpPr>
+          <p:nvPr>
+            <p:ph type="sldImg"/>
+          </p:nvPr>
+        </p:nvSpPr>
+        <p:spPr/>
+      </p:sp>
+      <p:sp>
+        <p:nvSpPr>
+          <p:cNvPr id="3" name="Notes Placeholder 2"/>
+          <p:cNvSpPr>
+            <a:spLocks noGrp="1"/>
+          </p:cNvSpPr>
+          <p:nvPr>
+            <p:ph type="body" idx="1"/>
+          </p:nvPr>
+        </p:nvSpPr>
+        <p:spPr/>
+        <p:txBody>
+          <a:bodyPr/>
+          <a:lstStyle/>
+          <a:p>
+            <a:endParaRPr lang="en-US"/>
+          </a:p>
+        </p:txBody>
+      </p:sp>
+      <p:sp>
+        <p:nvSpPr>
+          <p:cNvPr id="6" name="Slide Number Placeholder 5">
+            <a:extLst>
+              <a:ext uri="{FF2B5EF4-FFF2-40B4-BE49-F238E27FC236}">
+                <a16:creationId xmlns:a16="http://schemas.microsoft.com/office/drawing/2014/main" id="{6627548A-4D3C-449B-81A5-FA4BE4628490}"/>
+              </a:ext>
+            </a:extLst>
+          </p:cNvPr>
+          <p:cNvSpPr txBox="1">
+            <a:spLocks/>
+          </p:cNvSpPr>
+          <p:nvPr/>
+        </p:nvSpPr>
+        <p:spPr>
+          <a:xfrm>
+            <a:off x="6488999" y="8847000"/>
+            <a:ext cx="367414" cy="297000"/>
+          </a:xfrm>
+          <a:prstGeom prst="rect">
+            <a:avLst/>
+          </a:prstGeom>
+        </p:spPr>
+        <p:txBody>
+          <a:bodyPr vert="horz" lIns="91440" tIns="45720" rIns="91440" bIns="45720" rtlCol="0" anchor="b"/>
+          <a:lstStyle>
+            <a:defPPr>
+              <a:defRPr lang="en-US"/>
+            </a:defPPr>
+            <a:lvl1pPr marL="0" algn="r" defTabSz="914400" rtl="0" eaLnBrk="1" latinLnBrk="0" hangingPunct="1">
+              <a:defRPr sz="1200" kern="1200">
+                <a:solidFill>
+                  <a:schemeClr val="tx1"/>
+                </a:solidFill>
+                <a:latin typeface="+mn-lt"/>
+                <a:ea typeface="+mn-ea"/>
+                <a:cs typeface="+mn-cs"/>
+              </a:defRPr>
+            </a:lvl1pPr>
+            <a:lvl2pPr marL="457200" algn="l" defTabSz="914400" rtl="0" eaLnBrk="1" latinLnBrk="0" hangingPunct="1">
+              <a:defRPr sz="1800" kern="1200">
+                <a:solidFill>
+                  <a:schemeClr val="tx1"/>
+                </a:solidFill>
+                <a:latin typeface="+mn-lt"/>
+                <a:ea typeface="+mn-ea"/>
+                <a:cs typeface="+mn-cs"/>
+              </a:defRPr>
+            </a:lvl2pPr>
+            <a:lvl3pPr marL="914400" algn="l" defTabSz="914400" rtl="0" eaLnBrk="1" latinLnBrk="0" hangingPunct="1">
+              <a:defRPr sz="1800" kern="1200">
+                <a:solidFill>
+                  <a:schemeClr val="tx1"/>
+                </a:solidFill>
+                <a:latin typeface="+mn-lt"/>
+                <a:ea typeface="+mn-ea"/>
+                <a:cs typeface="+mn-cs"/>
+              </a:defRPr>
+            </a:lvl3pPr>
+            <a:lvl4pPr marL="1371600" algn="l" defTabSz="914400" rtl="0" eaLnBrk="1" latinLnBrk="0" hangingPunct="1">
+              <a:defRPr sz="1800" kern="1200">
+                <a:solidFill>
+                  <a:schemeClr val="tx1"/>
+                </a:solidFill>
+                <a:latin typeface="+mn-lt"/>
+                <a:ea typeface="+mn-ea"/>
+                <a:cs typeface="+mn-cs"/>
+              </a:defRPr>
+            </a:lvl4pPr>
+            <a:lvl5pPr marL="1828800" algn="l" defTabSz="914400" rtl="0" eaLnBrk="1" latinLnBrk="0" hangingPunct="1">
+              <a:defRPr sz="1800" kern="1200">
+                <a:solidFill>
+                  <a:schemeClr val="tx1"/>
+                </a:solidFill>
+                <a:latin typeface="+mn-lt"/>
+                <a:ea typeface="+mn-ea"/>
+                <a:cs typeface="+mn-cs"/>
+              </a:defRPr>
+            </a:lvl5pPr>
+            <a:lvl6pPr marL="2286000" algn="l" defTabSz="914400" rtl="0" eaLnBrk="1" latinLnBrk="0" hangingPunct="1">
+              <a:defRPr sz="1800" kern="1200">
+                <a:solidFill>
+                  <a:schemeClr val="tx1"/>
+                </a:solidFill>
+                <a:latin typeface="+mn-lt"/>
+                <a:ea typeface="+mn-ea"/>
+                <a:cs typeface="+mn-cs"/>
+              </a:defRPr>
+            </a:lvl6pPr>
+            <a:lvl7pPr marL="2743200" algn="l" defTabSz="914400" rtl="0" eaLnBrk="1" latinLnBrk="0" hangingPunct="1">
+              <a:defRPr sz="1800" kern="1200">
+                <a:solidFill>
+                  <a:schemeClr val="tx1"/>
+                </a:solidFill>
+                <a:latin typeface="+mn-lt"/>
+                <a:ea typeface="+mn-ea"/>
+                <a:cs typeface="+mn-cs"/>
+              </a:defRPr>
+            </a:lvl7pPr>
+            <a:lvl8pPr marL="3200400" algn="l" defTabSz="914400" rtl="0" eaLnBrk="1" latinLnBrk="0" hangingPunct="1">
+              <a:defRPr sz="1800" kern="1200">
+                <a:solidFill>
+                  <a:schemeClr val="tx1"/>
+                </a:solidFill>
+                <a:latin typeface="+mn-lt"/>
+                <a:ea typeface="+mn-ea"/>
+                <a:cs typeface="+mn-cs"/>
+              </a:defRPr>
+            </a:lvl8pPr>
+            <a:lvl9pPr marL="3657600" algn="l" defTabSz="914400" rtl="0" eaLnBrk="1" latinLnBrk="0" hangingPunct="1">
+              <a:defRPr sz="1800" kern="1200">
+                <a:solidFill>
+                  <a:schemeClr val="tx1"/>
+                </a:solidFill>
+                <a:latin typeface="+mn-lt"/>
+                <a:ea typeface="+mn-ea"/>
+                <a:cs typeface="+mn-cs"/>
+              </a:defRPr>
+            </a:lvl9pPr>
+          </a:lstStyle>
+          <a:p>
+            <a:fld id="{3EBA5BD7-F043-4D1B-AA17-CD412FC534DE}" type="slidenum">
+              <a:rPr lang="en-US" smtClean="0"/>
+              <a:pPr/>
+              <a:t>27</a:t>
             </a:fld>
             <a:endParaRPr lang="en-US" dirty="0"/>
           </a:p>
@@ -2446,9 +2696,7 @@
         </p:nvSpPr>
         <p:spPr/>
         <p:txBody>
-          <a:bodyPr>
-            <a:normAutofit/>
-          </a:bodyPr>
+          <a:bodyPr/>
           <a:lstStyle/>
           <a:p>
             <a:endParaRPr lang="en-US" dirty="0"/>
@@ -2462,7 +2710,7 @@
             <a:spLocks noGrp="1"/>
           </p:cNvSpPr>
           <p:nvPr>
-            <p:ph type="sldNum" sz="quarter" idx="10"/>
+            <p:ph type="sldNum" sz="quarter" idx="5"/>
           </p:nvPr>
         </p:nvSpPr>
         <p:spPr/>
@@ -2472,22 +2720,15 @@
           <a:p>
             <a:fld id="{2BF067CD-8E6B-4360-9AA8-C5DF2A48A6D1}" type="slidenum">
               <a:rPr lang="en-US" smtClean="0"/>
-              <a:pPr/>
               <a:t>20</a:t>
             </a:fld>
-            <a:endParaRPr lang="en-US"/>
+            <a:endParaRPr lang="en-US" dirty="0"/>
           </a:p>
         </p:txBody>
       </p:sp>
       <p:sp>
         <p:nvSpPr>
-          <p:cNvPr id="6" name="Footer Placeholder 7">
-            <a:extLst>
-              <a:ext uri="{FF2B5EF4-FFF2-40B4-BE49-F238E27FC236}">
-                <a16:creationId xmlns:a16="http://schemas.microsoft.com/office/drawing/2014/main" id="{510F7767-DF30-2C12-440A-37240A87873D}"/>
-              </a:ext>
-            </a:extLst>
-          </p:cNvPr>
+          <p:cNvPr id="5" name="Footer Placeholder 4"/>
           <p:cNvSpPr>
             <a:spLocks noGrp="1"/>
           </p:cNvSpPr>
@@ -2495,37 +2736,25 @@
             <p:ph type="ftr" sz="quarter" idx="4"/>
           </p:nvPr>
         </p:nvSpPr>
-        <p:spPr>
-          <a:xfrm>
-            <a:off x="-1" y="8892000"/>
-            <a:ext cx="6488999" cy="252000"/>
-          </a:xfrm>
-          <a:prstGeom prst="rect">
-            <a:avLst/>
-          </a:prstGeom>
-        </p:spPr>
+        <p:spPr/>
         <p:txBody>
-          <a:bodyPr vert="horz" lIns="91440" tIns="45720" rIns="91440" bIns="45720" rtlCol="0" anchor="b"/>
-          <a:lstStyle>
-            <a:lvl1pPr algn="l">
-              <a:defRPr sz="1100"/>
-            </a:lvl1pPr>
-          </a:lstStyle>
-          <a:p>
-            <a:r>
-              <a:rPr lang="bg-BG" sz="1100" dirty="0"/>
+          <a:bodyPr/>
+          <a:lstStyle/>
+          <a:p>
+            <a:r>
+              <a:rPr lang="bg-BG" sz="1100"/>
               <a:t>Работна група </a:t>
             </a:r>
             <a:r>
-              <a:rPr lang="bg-BG" dirty="0"/>
+              <a:rPr lang="bg-BG"/>
               <a:t>"Образование по програмиране и ИТ"</a:t>
             </a:r>
             <a:r>
-              <a:rPr lang="bg-BG" sz="1100" dirty="0"/>
+              <a:rPr lang="bg-BG" sz="1100"/>
               <a:t>, с подкрепата на </a:t>
             </a:r>
             <a:r>
-              <a:rPr lang="en-US" sz="1100" dirty="0">
+              <a:rPr lang="en-US" sz="1100">
                 <a:hlinkClick r:id="rId3"/>
               </a:rPr>
               <a:t>SoftUni</a:t>
@@ -2537,7 +2766,7 @@
     </p:spTree>
     <p:extLst>
       <p:ext uri="{BB962C8B-B14F-4D97-AF65-F5344CB8AC3E}">
-        <p14:creationId xmlns:p14="http://schemas.microsoft.com/office/powerpoint/2010/main" val="3096516227"/>
+        <p14:creationId xmlns:p14="http://schemas.microsoft.com/office/powerpoint/2010/main" val="16447618"/>
       </p:ext>
     </p:extLst>
   </p:cSld>
@@ -2626,7 +2855,7 @@
           <p:cNvPr id="6" name="Footer Placeholder 7">
             <a:extLst>
               <a:ext uri="{FF2B5EF4-FFF2-40B4-BE49-F238E27FC236}">
-                <a16:creationId xmlns:a16="http://schemas.microsoft.com/office/drawing/2014/main" id="{4A52A70E-0FF3-F590-E4F2-B67CDCC24B4D}"/>
+                <a16:creationId xmlns:a16="http://schemas.microsoft.com/office/drawing/2014/main" id="{510F7767-DF30-2C12-440A-37240A87873D}"/>
               </a:ext>
             </a:extLst>
           </p:cNvPr>
@@ -2679,7 +2908,7 @@
     </p:spTree>
     <p:extLst>
       <p:ext uri="{BB962C8B-B14F-4D97-AF65-F5344CB8AC3E}">
-        <p14:creationId xmlns:p14="http://schemas.microsoft.com/office/powerpoint/2010/main" val="753312633"/>
+        <p14:creationId xmlns:p14="http://schemas.microsoft.com/office/powerpoint/2010/main" val="3096516227"/>
       </p:ext>
     </p:extLst>
   </p:cSld>
@@ -2730,149 +2959,45 @@
         </p:nvSpPr>
         <p:spPr/>
         <p:txBody>
+          <a:bodyPr>
+            <a:normAutofit/>
+          </a:bodyPr>
+          <a:lstStyle/>
+          <a:p>
+            <a:endParaRPr lang="en-US" dirty="0"/>
+          </a:p>
+        </p:txBody>
+      </p:sp>
+      <p:sp>
+        <p:nvSpPr>
+          <p:cNvPr id="4" name="Slide Number Placeholder 3"/>
+          <p:cNvSpPr>
+            <a:spLocks noGrp="1"/>
+          </p:cNvSpPr>
+          <p:nvPr>
+            <p:ph type="sldNum" sz="quarter" idx="10"/>
+          </p:nvPr>
+        </p:nvSpPr>
+        <p:spPr/>
+        <p:txBody>
           <a:bodyPr/>
           <a:lstStyle/>
           <a:p>
-            <a:endParaRPr lang="en-US" dirty="0"/>
-          </a:p>
-        </p:txBody>
-      </p:sp>
-      <p:sp>
-        <p:nvSpPr>
-          <p:cNvPr id="7" name="Slide Number Placeholder 5">
-            <a:extLst>
-              <a:ext uri="{FF2B5EF4-FFF2-40B4-BE49-F238E27FC236}">
-                <a16:creationId xmlns:a16="http://schemas.microsoft.com/office/drawing/2014/main" id="{E65F1CA9-65DC-416B-8882-B3A5E415CE67}"/>
-              </a:ext>
-            </a:extLst>
-          </p:cNvPr>
-          <p:cNvSpPr txBox="1">
-            <a:spLocks/>
-          </p:cNvSpPr>
-          <p:nvPr/>
-        </p:nvSpPr>
-        <p:spPr>
-          <a:xfrm>
-            <a:off x="6488999" y="8847000"/>
-            <a:ext cx="367414" cy="297000"/>
-          </a:xfrm>
-          <a:prstGeom prst="rect">
-            <a:avLst/>
-          </a:prstGeom>
-        </p:spPr>
-        <p:txBody>
-          <a:bodyPr vert="horz" lIns="91440" tIns="45720" rIns="91440" bIns="45720" rtlCol="0" anchor="b"/>
-          <a:lstStyle>
-            <a:defPPr>
-              <a:defRPr lang="en-US"/>
-            </a:defPPr>
-            <a:lvl1pPr marL="0" algn="r" defTabSz="914400" rtl="0" eaLnBrk="1" latinLnBrk="0" hangingPunct="1">
-              <a:defRPr sz="1200" kern="1200">
-                <a:solidFill>
-                  <a:schemeClr val="tx1"/>
-                </a:solidFill>
-                <a:latin typeface="+mn-lt"/>
-                <a:ea typeface="+mn-ea"/>
-                <a:cs typeface="+mn-cs"/>
-              </a:defRPr>
-            </a:lvl1pPr>
-            <a:lvl2pPr marL="457200" algn="l" defTabSz="914400" rtl="0" eaLnBrk="1" latinLnBrk="0" hangingPunct="1">
-              <a:defRPr sz="1800" kern="1200">
-                <a:solidFill>
-                  <a:schemeClr val="tx1"/>
-                </a:solidFill>
-                <a:latin typeface="+mn-lt"/>
-                <a:ea typeface="+mn-ea"/>
-                <a:cs typeface="+mn-cs"/>
-              </a:defRPr>
-            </a:lvl2pPr>
-            <a:lvl3pPr marL="914400" algn="l" defTabSz="914400" rtl="0" eaLnBrk="1" latinLnBrk="0" hangingPunct="1">
-              <a:defRPr sz="1800" kern="1200">
-                <a:solidFill>
-                  <a:schemeClr val="tx1"/>
-                </a:solidFill>
-                <a:latin typeface="+mn-lt"/>
-                <a:ea typeface="+mn-ea"/>
-                <a:cs typeface="+mn-cs"/>
-              </a:defRPr>
-            </a:lvl3pPr>
-            <a:lvl4pPr marL="1371600" algn="l" defTabSz="914400" rtl="0" eaLnBrk="1" latinLnBrk="0" hangingPunct="1">
-              <a:defRPr sz="1800" kern="1200">
-                <a:solidFill>
-                  <a:schemeClr val="tx1"/>
-                </a:solidFill>
-                <a:latin typeface="+mn-lt"/>
-                <a:ea typeface="+mn-ea"/>
-                <a:cs typeface="+mn-cs"/>
-              </a:defRPr>
-            </a:lvl4pPr>
-            <a:lvl5pPr marL="1828800" algn="l" defTabSz="914400" rtl="0" eaLnBrk="1" latinLnBrk="0" hangingPunct="1">
-              <a:defRPr sz="1800" kern="1200">
-                <a:solidFill>
-                  <a:schemeClr val="tx1"/>
-                </a:solidFill>
-                <a:latin typeface="+mn-lt"/>
-                <a:ea typeface="+mn-ea"/>
-                <a:cs typeface="+mn-cs"/>
-              </a:defRPr>
-            </a:lvl5pPr>
-            <a:lvl6pPr marL="2286000" algn="l" defTabSz="914400" rtl="0" eaLnBrk="1" latinLnBrk="0" hangingPunct="1">
-              <a:defRPr sz="1800" kern="1200">
-                <a:solidFill>
-                  <a:schemeClr val="tx1"/>
-                </a:solidFill>
-                <a:latin typeface="+mn-lt"/>
-                <a:ea typeface="+mn-ea"/>
-                <a:cs typeface="+mn-cs"/>
-              </a:defRPr>
-            </a:lvl6pPr>
-            <a:lvl7pPr marL="2743200" algn="l" defTabSz="914400" rtl="0" eaLnBrk="1" latinLnBrk="0" hangingPunct="1">
-              <a:defRPr sz="1800" kern="1200">
-                <a:solidFill>
-                  <a:schemeClr val="tx1"/>
-                </a:solidFill>
-                <a:latin typeface="+mn-lt"/>
-                <a:ea typeface="+mn-ea"/>
-                <a:cs typeface="+mn-cs"/>
-              </a:defRPr>
-            </a:lvl7pPr>
-            <a:lvl8pPr marL="3200400" algn="l" defTabSz="914400" rtl="0" eaLnBrk="1" latinLnBrk="0" hangingPunct="1">
-              <a:defRPr sz="1800" kern="1200">
-                <a:solidFill>
-                  <a:schemeClr val="tx1"/>
-                </a:solidFill>
-                <a:latin typeface="+mn-lt"/>
-                <a:ea typeface="+mn-ea"/>
-                <a:cs typeface="+mn-cs"/>
-              </a:defRPr>
-            </a:lvl8pPr>
-            <a:lvl9pPr marL="3657600" algn="l" defTabSz="914400" rtl="0" eaLnBrk="1" latinLnBrk="0" hangingPunct="1">
-              <a:defRPr sz="1800" kern="1200">
-                <a:solidFill>
-                  <a:schemeClr val="tx1"/>
-                </a:solidFill>
-                <a:latin typeface="+mn-lt"/>
-                <a:ea typeface="+mn-ea"/>
-                <a:cs typeface="+mn-cs"/>
-              </a:defRPr>
-            </a:lvl9pPr>
-          </a:lstStyle>
-          <a:p>
-            <a:fld id="{3EBA5BD7-F043-4D1B-AA17-CD412FC534DE}" type="slidenum">
+            <a:fld id="{2BF067CD-8E6B-4360-9AA8-C5DF2A48A6D1}" type="slidenum">
               <a:rPr lang="en-US" smtClean="0"/>
               <a:pPr/>
               <a:t>23</a:t>
             </a:fld>
-            <a:endParaRPr lang="en-US" dirty="0"/>
+            <a:endParaRPr lang="en-US"/>
           </a:p>
         </p:txBody>
       </p:sp>
       <p:sp>
         <p:nvSpPr>
-          <p:cNvPr id="5" name="Footer Placeholder 7">
+          <p:cNvPr id="6" name="Footer Placeholder 7">
             <a:extLst>
               <a:ext uri="{FF2B5EF4-FFF2-40B4-BE49-F238E27FC236}">
-                <a16:creationId xmlns:a16="http://schemas.microsoft.com/office/drawing/2014/main" id="{43FAF785-0C8D-730E-8E59-68198DC82CE0}"/>
+                <a16:creationId xmlns:a16="http://schemas.microsoft.com/office/drawing/2014/main" id="{4A52A70E-0FF3-F590-E4F2-B67CDCC24B4D}"/>
               </a:ext>
             </a:extLst>
           </p:cNvPr>
@@ -2925,7 +3050,7 @@
     </p:spTree>
     <p:extLst>
       <p:ext uri="{BB962C8B-B14F-4D97-AF65-F5344CB8AC3E}">
-        <p14:creationId xmlns:p14="http://schemas.microsoft.com/office/powerpoint/2010/main" val="2689344733"/>
+        <p14:creationId xmlns:p14="http://schemas.microsoft.com/office/powerpoint/2010/main" val="753312633"/>
       </p:ext>
     </p:extLst>
   </p:cSld>
@@ -9834,8 +9959,8 @@
         </p:nvSpPr>
         <p:spPr>
           <a:xfrm>
-            <a:off x="1752600" y="1005629"/>
-            <a:ext cx="8518146" cy="5852371"/>
+            <a:off x="1752600" y="961148"/>
+            <a:ext cx="8518146" cy="6202852"/>
           </a:xfrm>
           <a:prstGeom prst="rect">
             <a:avLst/>
@@ -9954,7 +10079,10 @@
               </a:rPr>
               <a:t>управлявани и променяни</a:t>
             </a:r>
-            <a:endParaRPr sz="3200" dirty="0">
+            <a:endParaRPr lang="en-US" sz="3200" spc="-5" dirty="0">
+              <a:solidFill>
+                <a:srgbClr val="224464"/>
+              </a:solidFill>
               <a:latin typeface="Calibri"/>
               <a:cs typeface="Calibri"/>
             </a:endParaRPr>
@@ -9978,7 +10106,7 @@
               </a:tabLst>
             </a:pPr>
             <a:r>
-              <a:rPr lang="bg-BG" sz="3200" b="1" spc="-15" dirty="0">
+              <a:rPr lang="ru-RU" sz="3200" b="1" spc="-15" dirty="0">
                 <a:solidFill>
                   <a:schemeClr val="bg1"/>
                 </a:solidFill>
@@ -9987,7 +10115,7 @@
               <a:t>Съвременните бази данни</a:t>
             </a:r>
             <a:r>
-              <a:rPr lang="bg-BG" sz="3200" b="1" dirty="0">
+              <a:rPr lang="ru-RU" sz="3200" b="1" dirty="0">
                 <a:solidFill>
                   <a:schemeClr val="bg1"/>
                 </a:solidFill>
@@ -10002,40 +10130,9 @@
                 </a:solidFill>
                 <a:cs typeface="Calibri"/>
               </a:rPr>
-              <a:t>се управляват от системи за управление на бази данни </a:t>
-            </a:r>
-            <a:r>
-              <a:rPr sz="3200" spc="-10" dirty="0">
-                <a:solidFill>
-                  <a:srgbClr val="224464"/>
-                </a:solidFill>
-                <a:latin typeface="Calibri"/>
-                <a:cs typeface="Calibri"/>
-              </a:rPr>
-              <a:t>(</a:t>
-            </a:r>
-            <a:r>
-              <a:rPr lang="bg-BG" sz="3200" spc="-10" dirty="0">
-                <a:solidFill>
-                  <a:srgbClr val="224464"/>
-                </a:solidFill>
-                <a:latin typeface="Calibri"/>
-                <a:cs typeface="Calibri"/>
-              </a:rPr>
-              <a:t>СУБД</a:t>
-            </a:r>
-            <a:r>
-              <a:rPr sz="3200" spc="-10" dirty="0">
-                <a:solidFill>
-                  <a:srgbClr val="224464"/>
-                </a:solidFill>
-                <a:latin typeface="Calibri"/>
-                <a:cs typeface="Calibri"/>
-              </a:rPr>
-              <a:t>)</a:t>
-            </a:r>
-            <a:endParaRPr sz="3200" dirty="0">
-              <a:latin typeface="Calibri"/>
+              <a:t>се управляват от системи за управление на бази данни (СУБД)</a:t>
+            </a:r>
+            <a:endParaRPr lang="ru-RU" sz="3200" dirty="0">
               <a:cs typeface="Calibri"/>
             </a:endParaRPr>
           </a:p>
@@ -10055,37 +10152,33 @@
               </a:tabLst>
             </a:pPr>
             <a:r>
-              <a:rPr lang="bg-BG" sz="3000" spc="-10" dirty="0">
+              <a:rPr lang="ru-RU" sz="3000" spc="-10" dirty="0">
                 <a:solidFill>
                   <a:srgbClr val="224464"/>
                 </a:solidFill>
-                <a:latin typeface="Calibri"/>
                 <a:cs typeface="Calibri"/>
               </a:rPr>
               <a:t>Определят </a:t>
             </a:r>
             <a:r>
-              <a:rPr lang="bg-BG" sz="3000" b="1" spc="-10" dirty="0">
+              <a:rPr lang="ru-RU" sz="3000" b="1" spc="-10" dirty="0">
                 <a:solidFill>
                   <a:srgbClr val="224464"/>
                 </a:solidFill>
-                <a:latin typeface="Calibri"/>
                 <a:cs typeface="Calibri"/>
               </a:rPr>
               <a:t>структурата</a:t>
             </a:r>
             <a:r>
-              <a:rPr lang="bg-BG" sz="3000" spc="-10" dirty="0">
+              <a:rPr lang="ru-RU" sz="3000" spc="-10" dirty="0">
                 <a:solidFill>
                   <a:srgbClr val="224464"/>
                 </a:solidFill>
-                <a:latin typeface="Calibri"/>
                 <a:cs typeface="Calibri"/>
               </a:rPr>
               <a:t> на базата данни</a:t>
             </a:r>
-            <a:endParaRPr sz="3000" dirty="0">
-              <a:latin typeface="Calibri"/>
+            <a:endParaRPr lang="ru-RU" sz="3000" dirty="0">
               <a:cs typeface="Calibri"/>
             </a:endParaRPr>
           </a:p>
@@ -10105,227 +10198,195 @@
               </a:tabLst>
             </a:pPr>
             <a:r>
-              <a:rPr sz="3000" b="1" spc="-20" dirty="0">
+              <a:rPr lang="ru-RU" sz="3000" b="1" spc="-20" dirty="0">
                 <a:solidFill>
                   <a:srgbClr val="224464"/>
                 </a:solidFill>
-                <a:latin typeface="Calibri"/>
                 <a:cs typeface="Calibri"/>
               </a:rPr>
               <a:t>C</a:t>
             </a:r>
             <a:r>
-              <a:rPr sz="3000" spc="-20" dirty="0">
+              <a:rPr lang="ru-RU" sz="3000" spc="-20" dirty="0">
                 <a:solidFill>
                   <a:srgbClr val="224464"/>
                 </a:solidFill>
-                <a:latin typeface="Calibri"/>
                 <a:cs typeface="Calibri"/>
               </a:rPr>
               <a:t>reate</a:t>
             </a:r>
             <a:r>
-              <a:rPr sz="3000" spc="-10" dirty="0">
+              <a:rPr lang="ru-RU" sz="3000" spc="-10" dirty="0">
                 <a:solidFill>
                   <a:srgbClr val="224464"/>
                 </a:solidFill>
-                <a:latin typeface="Calibri"/>
                 <a:cs typeface="Calibri"/>
               </a:rPr>
               <a:t> </a:t>
             </a:r>
             <a:r>
-              <a:rPr sz="3000" spc="-5" dirty="0">
+              <a:rPr lang="ru-RU" sz="3000" spc="-5" dirty="0">
                 <a:solidFill>
                   <a:srgbClr val="224464"/>
                 </a:solidFill>
-                <a:latin typeface="Calibri"/>
                 <a:cs typeface="Calibri"/>
               </a:rPr>
               <a:t>/</a:t>
             </a:r>
             <a:r>
-              <a:rPr sz="3000" spc="-10" dirty="0">
+              <a:rPr lang="ru-RU" sz="3000" spc="-10" dirty="0">
                 <a:solidFill>
                   <a:srgbClr val="224464"/>
                 </a:solidFill>
-                <a:latin typeface="Calibri"/>
                 <a:cs typeface="Calibri"/>
               </a:rPr>
               <a:t> </a:t>
             </a:r>
             <a:r>
-              <a:rPr sz="3000" b="1" spc="-20" dirty="0">
+              <a:rPr lang="ru-RU" sz="3000" b="1" spc="-20" dirty="0">
                 <a:solidFill>
                   <a:srgbClr val="224464"/>
                 </a:solidFill>
-                <a:latin typeface="Calibri"/>
                 <a:cs typeface="Calibri"/>
               </a:rPr>
               <a:t>R</a:t>
             </a:r>
             <a:r>
-              <a:rPr sz="3000" spc="-20" dirty="0">
+              <a:rPr lang="ru-RU" sz="3000" spc="-20" dirty="0">
                 <a:solidFill>
                   <a:srgbClr val="224464"/>
                 </a:solidFill>
-                <a:latin typeface="Calibri"/>
                 <a:cs typeface="Calibri"/>
               </a:rPr>
               <a:t>ead</a:t>
             </a:r>
             <a:r>
-              <a:rPr sz="3000" spc="-5" dirty="0">
+              <a:rPr lang="ru-RU" sz="3000" spc="-5" dirty="0">
                 <a:solidFill>
                   <a:srgbClr val="224464"/>
                 </a:solidFill>
-                <a:latin typeface="Calibri"/>
                 <a:cs typeface="Calibri"/>
               </a:rPr>
               <a:t> /</a:t>
             </a:r>
             <a:r>
-              <a:rPr sz="3000" dirty="0">
+              <a:rPr lang="ru-RU" sz="3000" dirty="0">
                 <a:solidFill>
                   <a:srgbClr val="224464"/>
                 </a:solidFill>
-                <a:latin typeface="Calibri"/>
                 <a:cs typeface="Calibri"/>
               </a:rPr>
               <a:t> </a:t>
             </a:r>
             <a:r>
-              <a:rPr sz="3000" b="1" spc="-15" dirty="0">
+              <a:rPr lang="ru-RU" sz="3000" b="1" spc="-15" dirty="0">
                 <a:solidFill>
                   <a:srgbClr val="224464"/>
                 </a:solidFill>
-                <a:latin typeface="Calibri"/>
                 <a:cs typeface="Calibri"/>
               </a:rPr>
               <a:t>U</a:t>
             </a:r>
             <a:r>
-              <a:rPr sz="3000" spc="-15" dirty="0">
+              <a:rPr lang="ru-RU" sz="3000" spc="-15" dirty="0">
                 <a:solidFill>
                   <a:srgbClr val="224464"/>
                 </a:solidFill>
-                <a:latin typeface="Calibri"/>
                 <a:cs typeface="Calibri"/>
               </a:rPr>
               <a:t>pdate</a:t>
             </a:r>
             <a:r>
-              <a:rPr sz="3000" spc="-40" dirty="0">
+              <a:rPr lang="ru-RU" sz="3000" spc="-40" dirty="0">
                 <a:solidFill>
                   <a:srgbClr val="224464"/>
                 </a:solidFill>
-                <a:latin typeface="Calibri"/>
                 <a:cs typeface="Calibri"/>
               </a:rPr>
               <a:t> </a:t>
             </a:r>
             <a:r>
-              <a:rPr sz="3000" spc="-5" dirty="0">
+              <a:rPr lang="ru-RU" sz="3000" spc="-5" dirty="0">
                 <a:solidFill>
                   <a:srgbClr val="224464"/>
                 </a:solidFill>
-                <a:latin typeface="Calibri"/>
                 <a:cs typeface="Calibri"/>
               </a:rPr>
               <a:t>/</a:t>
             </a:r>
             <a:r>
-              <a:rPr sz="3000" dirty="0">
+              <a:rPr lang="ru-RU" sz="3000" dirty="0">
                 <a:solidFill>
                   <a:srgbClr val="224464"/>
                 </a:solidFill>
-                <a:latin typeface="Calibri"/>
                 <a:cs typeface="Calibri"/>
               </a:rPr>
               <a:t> </a:t>
             </a:r>
             <a:r>
-              <a:rPr sz="3000" b="1" spc="-15" dirty="0">
+              <a:rPr lang="ru-RU" sz="3000" b="1" spc="-15" dirty="0">
                 <a:solidFill>
                   <a:srgbClr val="224464"/>
                 </a:solidFill>
-                <a:latin typeface="Calibri"/>
                 <a:cs typeface="Calibri"/>
               </a:rPr>
               <a:t>D</a:t>
             </a:r>
             <a:r>
-              <a:rPr sz="3000" spc="-15" dirty="0">
+              <a:rPr lang="ru-RU" sz="3000" spc="-15" dirty="0">
                 <a:solidFill>
                   <a:srgbClr val="224464"/>
                 </a:solidFill>
-                <a:latin typeface="Calibri"/>
                 <a:cs typeface="Calibri"/>
               </a:rPr>
               <a:t>elete</a:t>
             </a:r>
             <a:r>
-              <a:rPr lang="bg-BG" sz="3000" spc="-5" dirty="0">
+              <a:rPr lang="ru-RU" sz="3000" spc="-5" dirty="0">
                 <a:solidFill>
                   <a:srgbClr val="224464"/>
                 </a:solidFill>
-                <a:latin typeface="Calibri"/>
                 <a:cs typeface="Calibri"/>
               </a:rPr>
               <a:t> </a:t>
             </a:r>
             <a:r>
-              <a:rPr sz="3000" spc="-10" dirty="0">
+              <a:rPr lang="ru-RU" sz="3000" spc="-10" dirty="0">
                 <a:solidFill>
                   <a:srgbClr val="224464"/>
                 </a:solidFill>
-                <a:latin typeface="Calibri"/>
                 <a:cs typeface="Calibri"/>
               </a:rPr>
               <a:t>(</a:t>
             </a:r>
             <a:r>
-              <a:rPr sz="3000" b="1" spc="-10" dirty="0">
+              <a:rPr lang="ru-RU" sz="3000" b="1" spc="-10" dirty="0">
                 <a:solidFill>
                   <a:srgbClr val="224464"/>
                 </a:solidFill>
-                <a:latin typeface="Calibri"/>
                 <a:cs typeface="Calibri"/>
               </a:rPr>
               <a:t>CRUD</a:t>
             </a:r>
             <a:r>
-              <a:rPr sz="3000" b="1" spc="20" dirty="0">
+              <a:rPr lang="ru-RU" sz="3000" b="1" spc="20" dirty="0">
                 <a:solidFill>
                   <a:srgbClr val="224464"/>
                 </a:solidFill>
-                <a:latin typeface="Calibri"/>
                 <a:cs typeface="Calibri"/>
               </a:rPr>
               <a:t> </a:t>
             </a:r>
             <a:r>
-              <a:rPr lang="bg-BG" sz="3000" spc="-20" dirty="0">
+              <a:rPr lang="ru-RU" sz="3000" spc="-20" dirty="0">
                 <a:solidFill>
                   <a:srgbClr val="224464"/>
                 </a:solidFill>
-                <a:latin typeface="Calibri"/>
                 <a:cs typeface="Calibri"/>
               </a:rPr>
-              <a:t>операции</a:t>
-            </a:r>
-            <a:r>
-              <a:rPr sz="3000" spc="-20" dirty="0">
-                <a:solidFill>
-                  <a:srgbClr val="224464"/>
-                </a:solidFill>
-                <a:latin typeface="Calibri"/>
-                <a:cs typeface="Calibri"/>
-              </a:rPr>
-              <a:t>)</a:t>
-            </a:r>
-            <a:endParaRPr sz="3000" dirty="0">
-              <a:latin typeface="Calibri"/>
+              <a:t>операции)</a:t>
+            </a:r>
+            <a:endParaRPr lang="ru-RU" sz="3000" dirty="0">
               <a:cs typeface="Calibri"/>
             </a:endParaRPr>
           </a:p>
@@ -10345,76 +10406,55 @@
               </a:tabLst>
             </a:pPr>
             <a:r>
-              <a:rPr lang="bg-BG" sz="3000" spc="-25" dirty="0">
+              <a:rPr lang="ru-RU" sz="3000" spc="-25" dirty="0">
                 <a:solidFill>
                   <a:srgbClr val="224464"/>
                 </a:solidFill>
-                <a:latin typeface="Calibri"/>
                 <a:cs typeface="Calibri"/>
               </a:rPr>
               <a:t>Изпълняват заявки </a:t>
             </a:r>
             <a:r>
-              <a:rPr sz="3000" spc="-5" dirty="0">
+              <a:rPr lang="ru-RU" sz="3000" spc="-5" dirty="0">
                 <a:solidFill>
                   <a:srgbClr val="224464"/>
                 </a:solidFill>
-                <a:latin typeface="Calibri"/>
                 <a:cs typeface="Calibri"/>
               </a:rPr>
-              <a:t>(</a:t>
-            </a:r>
-            <a:r>
-              <a:rPr lang="bg-BG" sz="3000" spc="-5" dirty="0">
+              <a:t>(филтриране /</a:t>
+            </a:r>
+            <a:r>
+              <a:rPr lang="ru-RU" sz="3000" spc="-20" dirty="0">
                 <a:solidFill>
                   <a:srgbClr val="224464"/>
                 </a:solidFill>
-                <a:latin typeface="Calibri"/>
                 <a:cs typeface="Calibri"/>
               </a:rPr>
-              <a:t>филтриране </a:t>
-            </a:r>
-            <a:r>
-              <a:rPr sz="3000" spc="-5" dirty="0">
-                <a:solidFill>
-                  <a:srgbClr val="224464"/>
-                </a:solidFill>
-                <a:latin typeface="Calibri"/>
-                <a:cs typeface="Calibri"/>
-              </a:rPr>
-              <a:t>/</a:t>
-            </a:r>
-            <a:r>
-              <a:rPr sz="3000" spc="-20" dirty="0">
-                <a:solidFill>
-                  <a:srgbClr val="224464"/>
-                </a:solidFill>
-                <a:latin typeface="Calibri"/>
-                <a:cs typeface="Calibri"/>
-              </a:rPr>
-              <a:t> </a:t>
-            </a:r>
-            <a:r>
-              <a:rPr lang="bg-BG" sz="3000" spc="-20" dirty="0">
-                <a:solidFill>
-                  <a:srgbClr val="224464"/>
-                </a:solidFill>
-                <a:latin typeface="Calibri"/>
-                <a:cs typeface="Calibri"/>
-              </a:rPr>
-              <a:t>търсене на данни</a:t>
-            </a:r>
-            <a:r>
-              <a:rPr sz="3000" spc="-20" dirty="0">
-                <a:solidFill>
-                  <a:srgbClr val="224464"/>
-                </a:solidFill>
-                <a:latin typeface="Calibri"/>
-                <a:cs typeface="Calibri"/>
-              </a:rPr>
-              <a:t>)</a:t>
-            </a:r>
-            <a:endParaRPr sz="3000" dirty="0">
+              <a:t> търсене на данни)</a:t>
+            </a:r>
+            <a:endParaRPr lang="ru-RU" sz="3000" dirty="0">
+              <a:cs typeface="Calibri"/>
+            </a:endParaRPr>
+          </a:p>
+          <a:p>
+            <a:pPr marL="372110" marR="135890" indent="-360045">
+              <a:lnSpc>
+                <a:spcPct val="105000"/>
+              </a:lnSpc>
+              <a:spcBef>
+                <a:spcPts val="100"/>
+              </a:spcBef>
+              <a:buClr>
+                <a:schemeClr val="tx2"/>
+              </a:buClr>
+              <a:buFont typeface="Wingdings"/>
+              <a:buChar char=""/>
+              <a:tabLst>
+                <a:tab pos="372110" algn="l"/>
+                <a:tab pos="372745" algn="l"/>
+              </a:tabLst>
+            </a:pPr>
+            <a:endParaRPr sz="3200" dirty="0">
               <a:latin typeface="Calibri"/>
               <a:cs typeface="Calibri"/>
             </a:endParaRPr>
@@ -10684,214 +10724,6 @@
       <p:transition spd="slow" advClick="0" advTm="5000"/>
     </mc:Fallback>
   </mc:AlternateContent>
-  <p:timing>
-    <p:tnLst>
-      <p:par>
-        <p:cTn id="1" dur="indefinite" restart="never" nodeType="tmRoot">
-          <p:childTnLst>
-            <p:seq concurrent="1" nextAc="seek">
-              <p:cTn id="2" dur="indefinite" nodeType="mainSeq">
-                <p:childTnLst>
-                  <p:par>
-                    <p:cTn id="3" fill="hold">
-                      <p:stCondLst>
-                        <p:cond delay="indefinite"/>
-                      </p:stCondLst>
-                      <p:childTnLst>
-                        <p:par>
-                          <p:cTn id="4" fill="hold">
-                            <p:stCondLst>
-                              <p:cond delay="0"/>
-                            </p:stCondLst>
-                            <p:childTnLst>
-                              <p:par>
-                                <p:cTn id="5" presetID="1" presetClass="entr" presetSubtype="0" fill="hold" nodeType="clickEffect">
-                                  <p:stCondLst>
-                                    <p:cond delay="0"/>
-                                  </p:stCondLst>
-                                  <p:childTnLst>
-                                    <p:set>
-                                      <p:cBhvr>
-                                        <p:cTn id="6" dur="1" fill="hold">
-                                          <p:stCondLst>
-                                            <p:cond delay="0"/>
-                                          </p:stCondLst>
-                                        </p:cTn>
-                                        <p:tgtEl>
-                                          <p:spTgt spid="12">
-                                            <p:txEl>
-                                              <p:pRg st="1" end="1"/>
-                                            </p:txEl>
-                                          </p:spTgt>
-                                        </p:tgtEl>
-                                        <p:attrNameLst>
-                                          <p:attrName>style.visibility</p:attrName>
-                                        </p:attrNameLst>
-                                      </p:cBhvr>
-                                      <p:to>
-                                        <p:strVal val="visible"/>
-                                      </p:to>
-                                    </p:set>
-                                  </p:childTnLst>
-                                </p:cTn>
-                              </p:par>
-                              <p:par>
-                                <p:cTn id="7" presetID="1" presetClass="entr" presetSubtype="0" fill="hold" nodeType="withEffect">
-                                  <p:stCondLst>
-                                    <p:cond delay="0"/>
-                                  </p:stCondLst>
-                                  <p:childTnLst>
-                                    <p:set>
-                                      <p:cBhvr>
-                                        <p:cTn id="8" dur="1" fill="hold">
-                                          <p:stCondLst>
-                                            <p:cond delay="0"/>
-                                          </p:stCondLst>
-                                        </p:cTn>
-                                        <p:tgtEl>
-                                          <p:spTgt spid="12">
-                                            <p:txEl>
-                                              <p:pRg st="2" end="2"/>
-                                            </p:txEl>
-                                          </p:spTgt>
-                                        </p:tgtEl>
-                                        <p:attrNameLst>
-                                          <p:attrName>style.visibility</p:attrName>
-                                        </p:attrNameLst>
-                                      </p:cBhvr>
-                                      <p:to>
-                                        <p:strVal val="visible"/>
-                                      </p:to>
-                                    </p:set>
-                                  </p:childTnLst>
-                                </p:cTn>
-                              </p:par>
-                            </p:childTnLst>
-                          </p:cTn>
-                        </p:par>
-                      </p:childTnLst>
-                    </p:cTn>
-                  </p:par>
-                  <p:par>
-                    <p:cTn id="9" fill="hold">
-                      <p:stCondLst>
-                        <p:cond delay="indefinite"/>
-                      </p:stCondLst>
-                      <p:childTnLst>
-                        <p:par>
-                          <p:cTn id="10" fill="hold">
-                            <p:stCondLst>
-                              <p:cond delay="0"/>
-                            </p:stCondLst>
-                            <p:childTnLst>
-                              <p:par>
-                                <p:cTn id="11" presetID="1" presetClass="entr" presetSubtype="0" fill="hold" nodeType="clickEffect">
-                                  <p:stCondLst>
-                                    <p:cond delay="0"/>
-                                  </p:stCondLst>
-                                  <p:childTnLst>
-                                    <p:set>
-                                      <p:cBhvr>
-                                        <p:cTn id="12" dur="1" fill="hold">
-                                          <p:stCondLst>
-                                            <p:cond delay="0"/>
-                                          </p:stCondLst>
-                                        </p:cTn>
-                                        <p:tgtEl>
-                                          <p:spTgt spid="12">
-                                            <p:txEl>
-                                              <p:pRg st="3" end="3"/>
-                                            </p:txEl>
-                                          </p:spTgt>
-                                        </p:tgtEl>
-                                        <p:attrNameLst>
-                                          <p:attrName>style.visibility</p:attrName>
-                                        </p:attrNameLst>
-                                      </p:cBhvr>
-                                      <p:to>
-                                        <p:strVal val="visible"/>
-                                      </p:to>
-                                    </p:set>
-                                  </p:childTnLst>
-                                </p:cTn>
-                              </p:par>
-                            </p:childTnLst>
-                          </p:cTn>
-                        </p:par>
-                      </p:childTnLst>
-                    </p:cTn>
-                  </p:par>
-                  <p:par>
-                    <p:cTn id="13" fill="hold">
-                      <p:stCondLst>
-                        <p:cond delay="indefinite"/>
-                      </p:stCondLst>
-                      <p:childTnLst>
-                        <p:par>
-                          <p:cTn id="14" fill="hold">
-                            <p:stCondLst>
-                              <p:cond delay="0"/>
-                            </p:stCondLst>
-                            <p:childTnLst>
-                              <p:par>
-                                <p:cTn id="15" presetID="1" presetClass="entr" presetSubtype="0" fill="hold" nodeType="clickEffect">
-                                  <p:stCondLst>
-                                    <p:cond delay="0"/>
-                                  </p:stCondLst>
-                                  <p:childTnLst>
-                                    <p:set>
-                                      <p:cBhvr>
-                                        <p:cTn id="16" dur="1" fill="hold">
-                                          <p:stCondLst>
-                                            <p:cond delay="0"/>
-                                          </p:stCondLst>
-                                        </p:cTn>
-                                        <p:tgtEl>
-                                          <p:spTgt spid="12">
-                                            <p:txEl>
-                                              <p:pRg st="4" end="4"/>
-                                            </p:txEl>
-                                          </p:spTgt>
-                                        </p:tgtEl>
-                                        <p:attrNameLst>
-                                          <p:attrName>style.visibility</p:attrName>
-                                        </p:attrNameLst>
-                                      </p:cBhvr>
-                                      <p:to>
-                                        <p:strVal val="visible"/>
-                                      </p:to>
-                                    </p:set>
-                                  </p:childTnLst>
-                                </p:cTn>
-                              </p:par>
-                            </p:childTnLst>
-                          </p:cTn>
-                        </p:par>
-                      </p:childTnLst>
-                    </p:cTn>
-                  </p:par>
-                </p:childTnLst>
-              </p:cTn>
-              <p:prevCondLst>
-                <p:cond evt="onPrev" delay="0">
-                  <p:tgtEl>
-                    <p:sldTgt/>
-                  </p:tgtEl>
-                </p:cond>
-              </p:prevCondLst>
-              <p:nextCondLst>
-                <p:cond evt="onNext" delay="0">
-                  <p:tgtEl>
-                    <p:sldTgt/>
-                  </p:tgtEl>
-                </p:cond>
-              </p:nextCondLst>
-            </p:seq>
-          </p:childTnLst>
-        </p:cTn>
-      </p:par>
-    </p:tnLst>
-  </p:timing>
 </p:sld>
 </file>
 
@@ -12339,8 +12171,48 @@
           <a:lstStyle/>
           <a:p>
             <a:r>
+              <a:rPr lang="ru-RU" sz="3600" b="1" dirty="0"/>
+              <a:t>MS Word</a:t>
+            </a:r>
+            <a:r>
               <a:rPr lang="ru-RU" sz="3600" dirty="0"/>
-              <a:t>MS Word, MS Excel и PDF документите не са достатъчни за управление на големи обеми данни и сложни структури</a:t>
+              <a:t>, </a:t>
+            </a:r>
+            <a:r>
+              <a:rPr lang="ru-RU" sz="3600" b="1" dirty="0"/>
+              <a:t>MS Excel</a:t>
+            </a:r>
+            <a:r>
+              <a:rPr lang="ru-RU" sz="3600" dirty="0"/>
+              <a:t> и </a:t>
+            </a:r>
+            <a:r>
+              <a:rPr lang="ru-RU" sz="3600" b="1" dirty="0"/>
+              <a:t>PDF</a:t>
+            </a:r>
+            <a:r>
+              <a:rPr lang="ru-RU" sz="3600" dirty="0"/>
+              <a:t> документите не са достатъчни за управление на </a:t>
+            </a:r>
+            <a:r>
+              <a:rPr lang="ru-RU" sz="3600" b="1" dirty="0">
+                <a:solidFill>
+                  <a:schemeClr val="bg1"/>
+                </a:solidFill>
+              </a:rPr>
+              <a:t>големи обеми </a:t>
+            </a:r>
+            <a:r>
+              <a:rPr lang="ru-RU" sz="3600" dirty="0"/>
+              <a:t>данни и </a:t>
+            </a:r>
+            <a:r>
+              <a:rPr lang="ru-RU" sz="3600" b="1" dirty="0">
+                <a:solidFill>
+                  <a:schemeClr val="bg1"/>
+                </a:solidFill>
+              </a:rPr>
+              <a:t>сложни структури</a:t>
             </a:r>
           </a:p>
           <a:p>
@@ -12692,6 +12564,43 @@
           </a:p>
         </p:txBody>
       </p:sp>
+      <p:pic>
+        <p:nvPicPr>
+          <p:cNvPr id="6" name="Picture 5">
+            <a:extLst>
+              <a:ext uri="{FF2B5EF4-FFF2-40B4-BE49-F238E27FC236}">
+                <a16:creationId xmlns:a16="http://schemas.microsoft.com/office/drawing/2014/main" id="{E9DAE52D-FD7A-3404-4CC5-34CDE0093443}"/>
+              </a:ext>
+            </a:extLst>
+          </p:cNvPr>
+          <p:cNvPicPr>
+            <a:picLocks noChangeAspect="1"/>
+          </p:cNvPicPr>
+          <p:nvPr/>
+        </p:nvPicPr>
+        <p:blipFill>
+          <a:blip r:embed="rId2"/>
+          <a:stretch>
+            <a:fillRect/>
+          </a:stretch>
+        </p:blipFill>
+        <p:spPr>
+          <a:xfrm>
+            <a:off x="4171682" y="3136635"/>
+            <a:ext cx="3848637" cy="3505689"/>
+          </a:xfrm>
+          <a:prstGeom prst="rect">
+            <a:avLst/>
+          </a:prstGeom>
+          <a:ln>
+            <a:solidFill>
+              <a:schemeClr val="bg2">
+                <a:lumMod val="75000"/>
+              </a:schemeClr>
+            </a:solidFill>
+          </a:ln>
+        </p:spPr>
+      </p:pic>
     </p:spTree>
     <p:extLst>
       <p:ext uri="{BB962C8B-B14F-4D97-AF65-F5344CB8AC3E}">
@@ -12762,62 +12671,20 @@
             </a:r>
             <a:r>
               <a:rPr lang="ru-RU" sz="3800" dirty="0"/>
-              <a:t>е от първостепенно значение за защита на чувствителна информация и данни</a:t>
-            </a:r>
-          </a:p>
-          <a:p>
-            <a:pPr>
-              <a:buClr>
-                <a:schemeClr val="tx2"/>
-              </a:buClr>
-            </a:pPr>
-            <a:r>
-              <a:rPr lang="bg-BG" sz="3800" b="1" dirty="0">
+              <a:t>е от първостепенно значение за защита на </a:t>
+            </a:r>
+            <a:r>
+              <a:rPr lang="ru-RU" sz="3800" b="1" dirty="0">
                 <a:solidFill>
                   <a:schemeClr val="bg1"/>
                 </a:solidFill>
               </a:rPr>
-              <a:t>Информационните системи </a:t>
+              <a:t>чувствителна</a:t>
             </a:r>
             <a:r>
               <a:rPr lang="ru-RU" sz="3800" dirty="0"/>
-              <a:t>позволяват:</a:t>
-            </a:r>
-          </a:p>
-          <a:p>
-            <a:pPr lvl="1">
-              <a:buClr>
-                <a:schemeClr val="tx2"/>
-              </a:buClr>
-            </a:pPr>
-            <a:r>
-              <a:rPr lang="ru-RU" sz="3600" dirty="0"/>
-              <a:t> Управление на потребителските и администраторските права</a:t>
-            </a:r>
-          </a:p>
-          <a:p>
-            <a:pPr lvl="1">
-              <a:buClr>
-                <a:schemeClr val="tx2"/>
-              </a:buClr>
-            </a:pPr>
-            <a:r>
-              <a:rPr lang="ru-RU" sz="3600" dirty="0"/>
-              <a:t>Функции за </a:t>
-            </a:r>
-            <a:r>
-              <a:rPr lang="bg-BG" sz="3600" b="1" dirty="0">
-                <a:solidFill>
-                  <a:schemeClr val="bg1"/>
-                </a:solidFill>
-              </a:rPr>
-              <a:t>аутентикация и авторизация</a:t>
-            </a:r>
-            <a:r>
-              <a:rPr lang="ru-RU" sz="3600" dirty="0"/>
-              <a:t>, които осигуряват правата на потребителите и контрол върху техния достъп</a:t>
-            </a:r>
-            <a:endParaRPr lang="en-US" sz="3600" dirty="0"/>
+              <a:t> информация и данни</a:t>
+            </a:r>
           </a:p>
         </p:txBody>
       </p:sp>
@@ -12861,7 +12728,7 @@
         </p:blipFill>
         <p:spPr bwMode="auto">
           <a:xfrm>
-            <a:off x="9601200" y="2362200"/>
+            <a:off x="10134600" y="2124000"/>
             <a:ext cx="2057400" cy="2057400"/>
           </a:xfrm>
           <a:prstGeom prst="rect">
@@ -12912,6 +12779,43 @@
           </a:p>
         </p:txBody>
       </p:sp>
+      <p:pic>
+        <p:nvPicPr>
+          <p:cNvPr id="8" name="Picture 7">
+            <a:extLst>
+              <a:ext uri="{FF2B5EF4-FFF2-40B4-BE49-F238E27FC236}">
+                <a16:creationId xmlns:a16="http://schemas.microsoft.com/office/drawing/2014/main" id="{E07C0774-19EF-65D7-A5B7-18B63B1AA76D}"/>
+              </a:ext>
+            </a:extLst>
+          </p:cNvPr>
+          <p:cNvPicPr>
+            <a:picLocks noChangeAspect="1"/>
+          </p:cNvPicPr>
+          <p:nvPr/>
+        </p:nvPicPr>
+        <p:blipFill>
+          <a:blip r:embed="rId3"/>
+          <a:stretch>
+            <a:fillRect/>
+          </a:stretch>
+        </p:blipFill>
+        <p:spPr>
+          <a:xfrm>
+            <a:off x="426000" y="2934000"/>
+            <a:ext cx="9392236" cy="3420000"/>
+          </a:xfrm>
+          <a:prstGeom prst="rect">
+            <a:avLst/>
+          </a:prstGeom>
+          <a:ln>
+            <a:solidFill>
+              <a:schemeClr val="bg2">
+                <a:lumMod val="75000"/>
+              </a:schemeClr>
+            </a:solidFill>
+          </a:ln>
+        </p:spPr>
+      </p:pic>
     </p:spTree>
     <p:extLst>
       <p:ext uri="{BB962C8B-B14F-4D97-AF65-F5344CB8AC3E}">
@@ -12964,91 +12868,7 @@
                                           </p:stCondLst>
                                         </p:cTn>
                                         <p:tgtEl>
-                                          <p:spTgt spid="3">
-                                            <p:txEl>
-                                              <p:pRg st="1" end="1"/>
-                                            </p:txEl>
-                                          </p:spTgt>
-                                        </p:tgtEl>
-                                        <p:attrNameLst>
-                                          <p:attrName>style.visibility</p:attrName>
-                                        </p:attrNameLst>
-                                      </p:cBhvr>
-                                      <p:to>
-                                        <p:strVal val="visible"/>
-                                      </p:to>
-                                    </p:set>
-                                  </p:childTnLst>
-                                </p:cTn>
-                              </p:par>
-                              <p:par>
-                                <p:cTn id="7" presetID="1" presetClass="entr" presetSubtype="0" fill="hold" nodeType="withEffect">
-                                  <p:stCondLst>
-                                    <p:cond delay="0"/>
-                                  </p:stCondLst>
-                                  <p:childTnLst>
-                                    <p:set>
-                                      <p:cBhvr>
-                                        <p:cTn id="8" dur="1" fill="hold">
-                                          <p:stCondLst>
-                                            <p:cond delay="0"/>
-                                          </p:stCondLst>
-                                        </p:cTn>
-                                        <p:tgtEl>
-                                          <p:spTgt spid="3">
-                                            <p:txEl>
-                                              <p:pRg st="2" end="2"/>
-                                            </p:txEl>
-                                          </p:spTgt>
-                                        </p:tgtEl>
-                                        <p:attrNameLst>
-                                          <p:attrName>style.visibility</p:attrName>
-                                        </p:attrNameLst>
-                                      </p:cBhvr>
-                                      <p:to>
-                                        <p:strVal val="visible"/>
-                                      </p:to>
-                                    </p:set>
-                                  </p:childTnLst>
-                                </p:cTn>
-                              </p:par>
-                            </p:childTnLst>
-                          </p:cTn>
-                        </p:par>
-                      </p:childTnLst>
-                    </p:cTn>
-                  </p:par>
-                  <p:par>
-                    <p:cTn id="9" fill="hold">
-                      <p:stCondLst>
-                        <p:cond delay="indefinite"/>
-                      </p:stCondLst>
-                      <p:childTnLst>
-                        <p:par>
-                          <p:cTn id="10" fill="hold">
-                            <p:stCondLst>
-                              <p:cond delay="0"/>
-                            </p:stCondLst>
-                            <p:childTnLst>
-                              <p:par>
-                                <p:cTn id="11" presetID="1" presetClass="entr" presetSubtype="0" fill="hold" nodeType="clickEffect">
-                                  <p:stCondLst>
-                                    <p:cond delay="0"/>
-                                  </p:stCondLst>
-                                  <p:childTnLst>
-                                    <p:set>
-                                      <p:cBhvr>
-                                        <p:cTn id="12" dur="1" fill="hold">
-                                          <p:stCondLst>
-                                            <p:cond delay="0"/>
-                                          </p:stCondLst>
-                                        </p:cTn>
-                                        <p:tgtEl>
-                                          <p:spTgt spid="3">
-                                            <p:txEl>
-                                              <p:pRg st="3" end="3"/>
-                                            </p:txEl>
-                                          </p:spTgt>
+                                          <p:spTgt spid="8"/>
                                         </p:tgtEl>
                                         <p:attrNameLst>
                                           <p:attrName>style.visibility</p:attrName>
@@ -13350,6 +13170,304 @@
       </p:grpSpPr>
       <p:sp>
         <p:nvSpPr>
+          <p:cNvPr id="2" name="Slide Number Placeholder 1">
+            <a:extLst>
+              <a:ext uri="{FF2B5EF4-FFF2-40B4-BE49-F238E27FC236}">
+                <a16:creationId xmlns:a16="http://schemas.microsoft.com/office/drawing/2014/main" id="{106F4F77-B93B-EDB5-33F8-6A56FF8BE1EA}"/>
+              </a:ext>
+            </a:extLst>
+          </p:cNvPr>
+          <p:cNvSpPr>
+            <a:spLocks noGrp="1"/>
+          </p:cNvSpPr>
+          <p:nvPr>
+            <p:ph type="sldNum" sz="quarter" idx="5"/>
+          </p:nvPr>
+        </p:nvSpPr>
+        <p:spPr/>
+        <p:txBody>
+          <a:bodyPr/>
+          <a:lstStyle/>
+          <a:p>
+            <a:fld id="{2BF067CD-8E6B-4360-9AA8-C5DF2A48A6D1}" type="slidenum">
+              <a:rPr lang="en-US" noProof="0" smtClean="0"/>
+              <a:pPr/>
+              <a:t>20</a:t>
+            </a:fld>
+            <a:endParaRPr lang="en-US" noProof="0" dirty="0"/>
+          </a:p>
+        </p:txBody>
+      </p:sp>
+      <p:sp>
+        <p:nvSpPr>
+          <p:cNvPr id="3" name="Text Placeholder 2">
+            <a:extLst>
+              <a:ext uri="{FF2B5EF4-FFF2-40B4-BE49-F238E27FC236}">
+                <a16:creationId xmlns:a16="http://schemas.microsoft.com/office/drawing/2014/main" id="{D79DEB79-E4F8-B2AD-5315-DA2C19453FA2}"/>
+              </a:ext>
+            </a:extLst>
+          </p:cNvPr>
+          <p:cNvSpPr>
+            <a:spLocks noGrp="1"/>
+          </p:cNvSpPr>
+          <p:nvPr>
+            <p:ph type="body" sz="quarter" idx="10"/>
+          </p:nvPr>
+        </p:nvSpPr>
+        <p:spPr/>
+        <p:txBody>
+          <a:bodyPr/>
+          <a:lstStyle/>
+          <a:p>
+            <a:pPr>
+              <a:buClr>
+                <a:schemeClr val="tx2"/>
+              </a:buClr>
+            </a:pPr>
+            <a:r>
+              <a:rPr lang="bg-BG" sz="3600" b="1" dirty="0">
+                <a:solidFill>
+                  <a:schemeClr val="bg1"/>
+                </a:solidFill>
+              </a:rPr>
+              <a:t>Информационните системи </a:t>
+            </a:r>
+            <a:r>
+              <a:rPr lang="ru-RU" sz="3600" dirty="0"/>
+              <a:t>позволяват:</a:t>
+            </a:r>
+          </a:p>
+          <a:p>
+            <a:pPr lvl="1">
+              <a:buClr>
+                <a:schemeClr val="tx2"/>
+              </a:buClr>
+            </a:pPr>
+            <a:r>
+              <a:rPr lang="ru-RU" sz="3200" dirty="0"/>
+              <a:t> Управление на </a:t>
+            </a:r>
+            <a:r>
+              <a:rPr lang="ru-RU" sz="3200" b="1" dirty="0">
+                <a:solidFill>
+                  <a:schemeClr val="bg1"/>
+                </a:solidFill>
+              </a:rPr>
+              <a:t>потребителските</a:t>
+            </a:r>
+            <a:r>
+              <a:rPr lang="ru-RU" sz="3200" dirty="0"/>
+              <a:t> и </a:t>
+            </a:r>
+            <a:r>
+              <a:rPr lang="ru-RU" sz="3200" b="1" dirty="0">
+                <a:solidFill>
+                  <a:schemeClr val="bg1"/>
+                </a:solidFill>
+              </a:rPr>
+              <a:t>администраторските</a:t>
+            </a:r>
+            <a:r>
+              <a:rPr lang="ru-RU" sz="3200" dirty="0"/>
+              <a:t> права</a:t>
+            </a:r>
+          </a:p>
+          <a:p>
+            <a:pPr lvl="1">
+              <a:buClr>
+                <a:schemeClr val="tx2"/>
+              </a:buClr>
+            </a:pPr>
+            <a:r>
+              <a:rPr lang="ru-RU" sz="3200" dirty="0"/>
+              <a:t>Функции за </a:t>
+            </a:r>
+            <a:r>
+              <a:rPr lang="bg-BG" sz="3200" b="1" dirty="0">
+                <a:solidFill>
+                  <a:schemeClr val="bg1"/>
+                </a:solidFill>
+              </a:rPr>
+              <a:t>аутентикация и авторизация</a:t>
+            </a:r>
+            <a:r>
+              <a:rPr lang="ru-RU" sz="3200" dirty="0"/>
+              <a:t>, които осигуряват </a:t>
+            </a:r>
+            <a:r>
+              <a:rPr lang="ru-RU" sz="3200" b="1" dirty="0">
+                <a:solidFill>
+                  <a:schemeClr val="bg1"/>
+                </a:solidFill>
+              </a:rPr>
+              <a:t>правата</a:t>
+            </a:r>
+            <a:r>
+              <a:rPr lang="ru-RU" sz="3200" dirty="0"/>
+              <a:t> на потребителите и </a:t>
+            </a:r>
+            <a:r>
+              <a:rPr lang="ru-RU" sz="3200" b="1" dirty="0">
+                <a:solidFill>
+                  <a:schemeClr val="bg1"/>
+                </a:solidFill>
+              </a:rPr>
+              <a:t>контрол</a:t>
+            </a:r>
+            <a:r>
+              <a:rPr lang="ru-RU" sz="3200" dirty="0"/>
+              <a:t> върху техния </a:t>
+            </a:r>
+            <a:r>
+              <a:rPr lang="ru-RU" sz="3200" b="1" dirty="0">
+                <a:solidFill>
+                  <a:schemeClr val="bg1"/>
+                </a:solidFill>
+              </a:rPr>
+              <a:t>достъп</a:t>
+            </a:r>
+            <a:endParaRPr lang="en-US" sz="3200" b="1" dirty="0">
+              <a:solidFill>
+                <a:schemeClr val="bg1"/>
+              </a:solidFill>
+            </a:endParaRPr>
+          </a:p>
+          <a:p>
+            <a:endParaRPr lang="en-US" dirty="0"/>
+          </a:p>
+        </p:txBody>
+      </p:sp>
+      <p:sp>
+        <p:nvSpPr>
+          <p:cNvPr id="4" name="Title 3">
+            <a:extLst>
+              <a:ext uri="{FF2B5EF4-FFF2-40B4-BE49-F238E27FC236}">
+                <a16:creationId xmlns:a16="http://schemas.microsoft.com/office/drawing/2014/main" id="{E3E86590-2FC2-107E-BDC3-4B7AC5190A70}"/>
+              </a:ext>
+            </a:extLst>
+          </p:cNvPr>
+          <p:cNvSpPr>
+            <a:spLocks noGrp="1"/>
+          </p:cNvSpPr>
+          <p:nvPr>
+            <p:ph type="title"/>
+          </p:nvPr>
+        </p:nvSpPr>
+        <p:spPr/>
+        <p:txBody>
+          <a:bodyPr/>
+          <a:lstStyle/>
+          <a:p>
+            <a:r>
+              <a:rPr lang="bg-BG" dirty="0"/>
+              <a:t>Нужда от информационни системи (</a:t>
+            </a:r>
+            <a:r>
+              <a:rPr lang="en-US" dirty="0"/>
+              <a:t>4</a:t>
+            </a:r>
+            <a:r>
+              <a:rPr lang="bg-BG" dirty="0"/>
+              <a:t>)</a:t>
+            </a:r>
+            <a:endParaRPr lang="en-US" dirty="0"/>
+          </a:p>
+        </p:txBody>
+      </p:sp>
+      <p:pic>
+        <p:nvPicPr>
+          <p:cNvPr id="2050" name="Picture 2" descr="What Are User Permissions? Concepts, Examples, and Maintenance | Frontegg">
+            <a:extLst>
+              <a:ext uri="{FF2B5EF4-FFF2-40B4-BE49-F238E27FC236}">
+                <a16:creationId xmlns:a16="http://schemas.microsoft.com/office/drawing/2014/main" id="{4ED33EC1-3D7D-70AB-D09E-0921F6AA2D60}"/>
+              </a:ext>
+            </a:extLst>
+          </p:cNvPr>
+          <p:cNvPicPr>
+            <a:picLocks noChangeAspect="1" noChangeArrowheads="1"/>
+          </p:cNvPicPr>
+          <p:nvPr/>
+        </p:nvPicPr>
+        <p:blipFill>
+          <a:blip r:embed="rId3">
+            <a:extLst>
+              <a:ext uri="{28A0092B-C50C-407E-A947-70E740481C1C}">
+                <a14:useLocalDpi xmlns:a14="http://schemas.microsoft.com/office/drawing/2010/main" val="0"/>
+              </a:ext>
+            </a:extLst>
+          </a:blip>
+          <a:srcRect/>
+          <a:stretch>
+            <a:fillRect/>
+          </a:stretch>
+        </p:blipFill>
+        <p:spPr bwMode="auto">
+          <a:xfrm>
+            <a:off x="3778500" y="4284000"/>
+            <a:ext cx="4635000" cy="2350141"/>
+          </a:xfrm>
+          <a:prstGeom prst="rect">
+            <a:avLst/>
+          </a:prstGeom>
+          <a:noFill/>
+          <a:ln>
+            <a:solidFill>
+              <a:schemeClr val="bg2">
+                <a:lumMod val="75000"/>
+              </a:schemeClr>
+            </a:solidFill>
+          </a:ln>
+          <a:extLst>
+            <a:ext uri="{909E8E84-426E-40DD-AFC4-6F175D3DCCD1}">
+              <a14:hiddenFill xmlns:a14="http://schemas.microsoft.com/office/drawing/2010/main">
+                <a:solidFill>
+                  <a:srgbClr val="FFFFFF"/>
+                </a:solidFill>
+              </a14:hiddenFill>
+            </a:ext>
+          </a:extLst>
+        </p:spPr>
+      </p:pic>
+    </p:spTree>
+    <p:extLst>
+      <p:ext uri="{BB962C8B-B14F-4D97-AF65-F5344CB8AC3E}">
+        <p14:creationId xmlns:p14="http://schemas.microsoft.com/office/powerpoint/2010/main" val="3473250571"/>
+      </p:ext>
+    </p:extLst>
+  </p:cSld>
+  <p:clrMapOvr>
+    <a:masterClrMapping/>
+  </p:clrMapOvr>
+  <mc:AlternateContent xmlns:mc="http://schemas.openxmlformats.org/markup-compatibility/2006" xmlns:p14="http://schemas.microsoft.com/office/powerpoint/2010/main">
+    <mc:Choice Requires="p14">
+      <p:transition spd="slow" p14:dur="2000" advClick="0" advTm="5000"/>
+    </mc:Choice>
+    <mc:Fallback xmlns="">
+      <p:transition spd="slow" advClick="0" advTm="5000"/>
+    </mc:Fallback>
+  </mc:AlternateContent>
+</p:sld>
+</file>
+
+<file path=ppt/slides/slide21.xml><?xml version="1.0" encoding="utf-8"?>
+<p:sld xmlns:a="http://schemas.openxmlformats.org/drawingml/2006/main" xmlns:r="http://schemas.openxmlformats.org/officeDocument/2006/relationships" xmlns:p="http://schemas.openxmlformats.org/presentationml/2006/main">
+  <p:cSld>
+    <p:spTree>
+      <p:nvGrpSpPr>
+        <p:cNvPr id="1" name=""/>
+        <p:cNvGrpSpPr/>
+        <p:nvPr/>
+      </p:nvGrpSpPr>
+      <p:grpSpPr>
+        <a:xfrm>
+          <a:off x="0" y="0"/>
+          <a:ext cx="0" cy="0"/>
+          <a:chOff x="0" y="0"/>
+          <a:chExt cx="0" cy="0"/>
+        </a:xfrm>
+      </p:grpSpPr>
+      <p:sp>
+        <p:nvSpPr>
           <p:cNvPr id="3" name="Text Placeholder 2"/>
           <p:cNvSpPr>
             <a:spLocks noGrp="1"/>
@@ -13365,85 +13483,67 @@
           </a:bodyPr>
           <a:lstStyle/>
           <a:p>
-            <a:pPr>
-              <a:buClr>
-                <a:schemeClr val="tx2"/>
-              </a:buClr>
-            </a:pPr>
-            <a:r>
-              <a:rPr lang="bg-BG" sz="3800" b="1" dirty="0">
+            <a:r>
+              <a:rPr lang="ru-RU" sz="3800" dirty="0"/>
+              <a:t>Позволяват изпълнение на структурирани заявки към </a:t>
+            </a:r>
+            <a:r>
+              <a:rPr lang="ru-RU" sz="3800" b="1" dirty="0">
                 <a:solidFill>
                   <a:schemeClr val="bg1"/>
                 </a:solidFill>
               </a:rPr>
-              <a:t>Заявките</a:t>
-            </a:r>
-            <a:r>
-              <a:rPr lang="ru-RU" sz="3800" dirty="0"/>
-              <a:t>:</a:t>
-            </a:r>
+              <a:t>базата данни</a:t>
+            </a:r>
+            <a:endParaRPr lang="en-US" sz="3800" b="1" dirty="0">
+              <a:solidFill>
+                <a:schemeClr val="bg1"/>
+              </a:solidFill>
+            </a:endParaRPr>
           </a:p>
           <a:p>
             <a:pPr lvl="1"/>
             <a:r>
-              <a:rPr lang="ru-RU" sz="3600" dirty="0"/>
-              <a:t>Позволяват изпълнение на структурирани заявки към базата данни</a:t>
-            </a:r>
-          </a:p>
-          <a:p>
-            <a:pPr lvl="1">
-              <a:buClr>
-                <a:schemeClr val="tx2"/>
-              </a:buClr>
-            </a:pPr>
+              <a:rPr lang="bg-BG" sz="3600" dirty="0"/>
+              <a:t>При </a:t>
+            </a:r>
+            <a:r>
+              <a:rPr lang="bg-BG" sz="3600" b="1" dirty="0"/>
+              <a:t>натсикане</a:t>
+            </a:r>
+            <a:r>
+              <a:rPr lang="bg-BG" sz="3600" dirty="0"/>
+              <a:t> на бутона </a:t>
+            </a:r>
+            <a:r>
+              <a:rPr lang="en-US" sz="3600" dirty="0"/>
+              <a:t>[</a:t>
+            </a:r>
+            <a:r>
+              <a:rPr lang="bg-BG" sz="3600" b="1" dirty="0"/>
+              <a:t>Отсъствия</a:t>
+            </a:r>
+            <a:r>
+              <a:rPr lang="en-US" sz="3600" dirty="0"/>
+              <a:t>]</a:t>
+            </a:r>
+            <a:r>
+              <a:rPr lang="bg-BG" sz="3600" dirty="0"/>
+              <a:t>, потребителят може да види </a:t>
+            </a:r>
             <a:r>
               <a:rPr lang="bg-BG" sz="3600" b="1" dirty="0">
                 <a:solidFill>
                   <a:schemeClr val="bg1"/>
                 </a:solidFill>
               </a:rPr>
-              <a:t>Търсят </a:t>
-            </a:r>
-            <a:r>
-              <a:rPr lang="ru-RU" sz="3600" dirty="0"/>
-              <a:t>и </a:t>
-            </a:r>
-            <a:r>
-              <a:rPr lang="bg-BG" sz="3600" b="1" dirty="0">
-                <a:solidFill>
-                  <a:schemeClr val="bg1"/>
-                </a:solidFill>
-              </a:rPr>
-              <a:t>филтрират </a:t>
-            </a:r>
-            <a:r>
-              <a:rPr lang="ru-RU" sz="3600" dirty="0"/>
-              <a:t>информацията според определени критерии</a:t>
-            </a:r>
-          </a:p>
-          <a:p>
-            <a:pPr lvl="1">
-              <a:buClr>
-                <a:schemeClr val="tx2"/>
-              </a:buClr>
-            </a:pPr>
-            <a:r>
-              <a:rPr lang="ru-RU" sz="3600" dirty="0"/>
-              <a:t>Са </a:t>
-            </a:r>
-            <a:r>
-              <a:rPr lang="bg-BG" sz="3600" b="1" dirty="0">
-                <a:solidFill>
-                  <a:schemeClr val="bg1"/>
-                </a:solidFill>
-              </a:rPr>
-              <a:t>мощно средство </a:t>
-            </a:r>
-            <a:r>
-              <a:rPr lang="ru-RU" sz="3600" dirty="0"/>
-              <a:t>за извличане на конкретни данни и информация от големи обеми информация</a:t>
-            </a:r>
-            <a:endParaRPr lang="en-US" sz="3600" dirty="0"/>
+              <a:t>всичките</a:t>
+            </a:r>
+            <a:r>
+              <a:rPr lang="bg-BG" sz="3600" dirty="0"/>
+              <a:t> си такива</a:t>
+            </a:r>
+            <a:endParaRPr lang="ru-RU" sz="3600" dirty="0"/>
           </a:p>
         </p:txBody>
       </p:sp>
@@ -13464,17 +13564,12 @@
           <a:p>
             <a:r>
               <a:rPr lang="bg-BG" dirty="0"/>
-              <a:t>Нужда от информационни системи (</a:t>
+              <a:t>Заявки от потребителя</a:t>
             </a:r>
             <a:r>
               <a:rPr lang="en-US" dirty="0"/>
-              <a:t>4</a:t>
-            </a:r>
-            <a:r>
-              <a:rPr lang="bg-BG" dirty="0"/>
-              <a:t>)</a:t>
-            </a:r>
-            <a:endParaRPr lang="en-US" dirty="0"/>
+              <a:t> (1)</a:t>
+            </a:r>
           </a:p>
         </p:txBody>
       </p:sp>
@@ -13514,12 +13609,162 @@
             <a:fld id="{2BF067CD-8E6B-4360-9AA8-C5DF2A48A6D1}" type="slidenum">
               <a:rPr lang="en-US" noProof="0" smtClean="0"/>
               <a:pPr/>
-              <a:t>20</a:t>
+              <a:t>21</a:t>
             </a:fld>
             <a:endParaRPr lang="en-US" noProof="0" dirty="0"/>
           </a:p>
         </p:txBody>
       </p:sp>
+      <p:pic>
+        <p:nvPicPr>
+          <p:cNvPr id="6" name="Picture 5">
+            <a:extLst>
+              <a:ext uri="{FF2B5EF4-FFF2-40B4-BE49-F238E27FC236}">
+                <a16:creationId xmlns:a16="http://schemas.microsoft.com/office/drawing/2014/main" id="{BC4B174C-F40C-1EBF-70FC-5FBC2D0780F0}"/>
+              </a:ext>
+            </a:extLst>
+          </p:cNvPr>
+          <p:cNvPicPr>
+            <a:picLocks noChangeAspect="1"/>
+          </p:cNvPicPr>
+          <p:nvPr/>
+        </p:nvPicPr>
+        <p:blipFill>
+          <a:blip r:embed="rId3"/>
+          <a:stretch>
+            <a:fillRect/>
+          </a:stretch>
+        </p:blipFill>
+        <p:spPr>
+          <a:xfrm>
+            <a:off x="471000" y="4451104"/>
+            <a:ext cx="2029108" cy="1047896"/>
+          </a:xfrm>
+          <a:prstGeom prst="rect">
+            <a:avLst/>
+          </a:prstGeom>
+          <a:ln>
+            <a:solidFill>
+              <a:schemeClr val="bg2">
+                <a:lumMod val="75000"/>
+              </a:schemeClr>
+            </a:solidFill>
+          </a:ln>
+        </p:spPr>
+      </p:pic>
+      <p:sp>
+        <p:nvSpPr>
+          <p:cNvPr id="9" name="Arrow: Right 8">
+            <a:extLst>
+              <a:ext uri="{FF2B5EF4-FFF2-40B4-BE49-F238E27FC236}">
+                <a16:creationId xmlns:a16="http://schemas.microsoft.com/office/drawing/2014/main" id="{C66ADDD6-7AEA-EB73-C95B-7B2F777955BA}"/>
+              </a:ext>
+            </a:extLst>
+          </p:cNvPr>
+          <p:cNvSpPr/>
+          <p:nvPr/>
+        </p:nvSpPr>
+        <p:spPr bwMode="auto">
+          <a:xfrm>
+            <a:off x="2991000" y="4637584"/>
+            <a:ext cx="1215000" cy="630000"/>
+          </a:xfrm>
+          <a:prstGeom prst="rightArrow">
+            <a:avLst/>
+          </a:prstGeom>
+          <a:solidFill>
+            <a:schemeClr val="dk2">
+              <a:alpha val="80000"/>
+            </a:schemeClr>
+          </a:solidFill>
+          <a:ln w="19050">
+            <a:solidFill>
+              <a:schemeClr val="tx1">
+                <a:lumMod val="75000"/>
+                <a:alpha val="80000"/>
+              </a:schemeClr>
+            </a:solidFill>
+          </a:ln>
+          <a:effectLst/>
+        </p:spPr>
+        <p:style>
+          <a:lnRef idx="2">
+            <a:schemeClr val="accent1">
+              <a:shade val="50000"/>
+            </a:schemeClr>
+          </a:lnRef>
+          <a:fillRef idx="1001">
+            <a:schemeClr val="dk2"/>
+          </a:fillRef>
+          <a:effectRef idx="0">
+            <a:schemeClr val="accent1"/>
+          </a:effectRef>
+          <a:fontRef idx="minor">
+            <a:schemeClr val="lt1"/>
+          </a:fontRef>
+        </p:style>
+        <p:txBody>
+          <a:bodyPr rot="0" spcFirstLastPara="0" vertOverflow="overflow" horzOverflow="overflow" vert="horz" wrap="square" lIns="91440" tIns="45720" rIns="91440" bIns="45720" numCol="1" spcCol="0" rtlCol="0" fromWordArt="0" anchor="ctr" anchorCtr="0" forceAA="0" compatLnSpc="1">
+            <a:prstTxWarp prst="textNoShape">
+              <a:avLst/>
+            </a:prstTxWarp>
+            <a:noAutofit/>
+          </a:bodyPr>
+          <a:lstStyle/>
+          <a:p>
+            <a:pPr algn="ctr"/>
+            <a:endParaRPr lang="en-US" sz="2800" b="1" dirty="0">
+              <a:solidFill>
+                <a:srgbClr val="FFFFFF"/>
+              </a:solidFill>
+              <a:effectLst>
+                <a:outerShdw blurRad="38100" dist="38100" dir="2700000" algn="tl">
+                  <a:srgbClr val="000000">
+                    <a:alpha val="43137"/>
+                  </a:srgbClr>
+                </a:outerShdw>
+              </a:effectLst>
+            </a:endParaRPr>
+          </a:p>
+        </p:txBody>
+      </p:sp>
+      <p:pic>
+        <p:nvPicPr>
+          <p:cNvPr id="11" name="Picture 10">
+            <a:extLst>
+              <a:ext uri="{FF2B5EF4-FFF2-40B4-BE49-F238E27FC236}">
+                <a16:creationId xmlns:a16="http://schemas.microsoft.com/office/drawing/2014/main" id="{6F4E9BA3-8E3F-2479-69D0-0F7275146D14}"/>
+              </a:ext>
+            </a:extLst>
+          </p:cNvPr>
+          <p:cNvPicPr>
+            <a:picLocks noChangeAspect="1"/>
+          </p:cNvPicPr>
+          <p:nvPr/>
+        </p:nvPicPr>
+        <p:blipFill>
+          <a:blip r:embed="rId4"/>
+          <a:stretch>
+            <a:fillRect/>
+          </a:stretch>
+        </p:blipFill>
+        <p:spPr>
+          <a:xfrm>
+            <a:off x="4566000" y="4447184"/>
+            <a:ext cx="7184508" cy="1051816"/>
+          </a:xfrm>
+          <a:prstGeom prst="rect">
+            <a:avLst/>
+          </a:prstGeom>
+          <a:ln>
+            <a:solidFill>
+              <a:schemeClr val="bg2">
+                <a:lumMod val="75000"/>
+              </a:schemeClr>
+            </a:solidFill>
+          </a:ln>
+        </p:spPr>
+      </p:pic>
     </p:spTree>
     <p:extLst>
       <p:ext uri="{BB962C8B-B14F-4D97-AF65-F5344CB8AC3E}">
@@ -13572,11 +13817,7 @@
                                           </p:stCondLst>
                                         </p:cTn>
                                         <p:tgtEl>
-                                          <p:spTgt spid="3">
-                                            <p:txEl>
-                                              <p:pRg st="2" end="2"/>
-                                            </p:txEl>
-                                          </p:spTgt>
+                                          <p:spTgt spid="6"/>
                                         </p:tgtEl>
                                         <p:attrNameLst>
                                           <p:attrName>style.visibility</p:attrName>
@@ -13608,7 +13849,7 @@
                             </p:stCondLst>
                             <p:childTnLst>
                               <p:par>
-                                <p:cTn id="9" presetID="1" presetClass="entr" presetSubtype="0" fill="hold" nodeType="clickEffect">
+                                <p:cTn id="9" presetID="1" presetClass="entr" presetSubtype="0" fill="hold" grpId="0" nodeType="clickEffect">
                                   <p:stCondLst>
                                     <p:cond delay="0"/>
                                   </p:stCondLst>
@@ -13621,11 +13862,34 @@
                                           </p:stCondLst>
                                         </p:cTn>
                                         <p:tgtEl>
-                                          <p:spTgt spid="3">
-                                            <p:txEl>
-                                              <p:pRg st="3" end="3"/>
-                                            </p:txEl>
-                                          </p:spTgt>
+                                          <p:spTgt spid="9"/>
+                                        </p:tgtEl>
+                                        <p:attrNameLst>
+                                          <p:attrName>style.visibility</p:attrName>
+                                        </p:attrNameLst>
+                                      </p:cBhvr>
+                                      <p:to>
+                                        <p:strVal val="visible"/>
+                                      </p:to>
+                                    </p:set>
+                                  </p:childTnLst>
+                                </p:cTn>
+                              </p:par>
+                              <p:par>
+                                <p:cTn id="11" presetID="1" presetClass="entr" presetSubtype="0" fill="hold" nodeType="withEffect">
+                                  <p:stCondLst>
+                                    <p:cond delay="0"/>
+                                  </p:stCondLst>
+                                  <p:childTnLst>
+                                    <p:set>
+                                      <p:cBhvr>
+                                        <p:cTn id="12" dur="1" fill="hold">
+                                          <p:stCondLst>
+                                            <p:cond delay="0"/>
+                                          </p:stCondLst>
+                                        </p:cTn>
+                                        <p:tgtEl>
+                                          <p:spTgt spid="11"/>
                                         </p:tgtEl>
                                         <p:attrNameLst>
                                           <p:attrName>style.visibility</p:attrName>
@@ -13665,11 +13929,14 @@
         </p:cTn>
       </p:par>
     </p:tnLst>
+    <p:bldLst>
+      <p:bldP spid="9" grpId="0" animBg="1"/>
+    </p:bldLst>
   </p:timing>
 </p:sld>
 </file>
 
-<file path=ppt/slides/slide21.xml><?xml version="1.0" encoding="utf-8"?>
+<file path=ppt/slides/slide22.xml><?xml version="1.0" encoding="utf-8"?>
 <p:sld xmlns:a="http://schemas.openxmlformats.org/drawingml/2006/main" xmlns:r="http://schemas.openxmlformats.org/officeDocument/2006/relationships" xmlns:p="http://schemas.openxmlformats.org/presentationml/2006/main">
   <p:cSld>
     <p:spTree>
@@ -13688,153 +13955,10 @@
       </p:grpSpPr>
       <p:sp>
         <p:nvSpPr>
-          <p:cNvPr id="3" name="Text Placeholder 2"/>
-          <p:cNvSpPr>
-            <a:spLocks noGrp="1"/>
-          </p:cNvSpPr>
-          <p:nvPr>
-            <p:ph type="body" sz="quarter" idx="10"/>
-          </p:nvPr>
-        </p:nvSpPr>
-        <p:spPr/>
-        <p:txBody>
-          <a:bodyPr>
-            <a:normAutofit/>
-          </a:bodyPr>
-          <a:lstStyle/>
-          <a:p>
-            <a:pPr>
-              <a:buClr>
-                <a:schemeClr val="tx2"/>
-              </a:buClr>
-            </a:pPr>
-            <a:r>
-              <a:rPr lang="bg-BG" sz="3800" b="1" dirty="0">
-                <a:solidFill>
-                  <a:schemeClr val="bg1"/>
-                </a:solidFill>
-              </a:rPr>
-              <a:t>Отчетите</a:t>
-            </a:r>
-            <a:r>
-              <a:rPr lang="ru-RU" sz="3800" dirty="0"/>
-              <a:t>:</a:t>
-            </a:r>
-          </a:p>
-          <a:p>
-            <a:pPr lvl="1"/>
-            <a:r>
-              <a:rPr lang="ru-RU" sz="3600" dirty="0"/>
-              <a:t>Предоставят </a:t>
-            </a:r>
-            <a:r>
-              <a:rPr lang="bg-BG" sz="3600" b="1" dirty="0">
-                <a:solidFill>
-                  <a:schemeClr val="bg1"/>
-                </a:solidFill>
-              </a:rPr>
-              <a:t>визуално представление </a:t>
-            </a:r>
-            <a:r>
-              <a:rPr lang="ru-RU" sz="3600" dirty="0"/>
-              <a:t>на данните, което </a:t>
-            </a:r>
-            <a:r>
-              <a:rPr lang="bg-BG" sz="3600" b="1" dirty="0">
-                <a:solidFill>
-                  <a:schemeClr val="bg1"/>
-                </a:solidFill>
-              </a:rPr>
-              <a:t>облекчава анализа и представянето</a:t>
-            </a:r>
-            <a:r>
-              <a:rPr lang="ru-RU" sz="3600" dirty="0"/>
-              <a:t> на информацията</a:t>
-            </a:r>
-          </a:p>
-          <a:p>
-            <a:r>
-              <a:rPr lang="ru-RU" sz="3800" dirty="0"/>
-              <a:t>ИТ системите позволяват автоматизация на създаването на отчети</a:t>
-            </a:r>
-            <a:endParaRPr lang="en-US" sz="3800" dirty="0"/>
-          </a:p>
-          <a:p>
-            <a:pPr lvl="1">
-              <a:buClr>
-                <a:schemeClr val="tx2"/>
-              </a:buClr>
-            </a:pPr>
-            <a:r>
-              <a:rPr lang="bg-BG" sz="3600" b="1" dirty="0">
-                <a:solidFill>
-                  <a:schemeClr val="bg1"/>
-                </a:solidFill>
-              </a:rPr>
-              <a:t>Улесняване</a:t>
-            </a:r>
-            <a:r>
-              <a:rPr lang="bg-BG" sz="3600" dirty="0"/>
-              <a:t> на</a:t>
-            </a:r>
-            <a:r>
-              <a:rPr lang="ru-RU" sz="3600" dirty="0"/>
-              <a:t> вземането на решения </a:t>
-            </a:r>
-          </a:p>
-          <a:p>
-            <a:pPr lvl="1">
-              <a:buClr>
-                <a:schemeClr val="tx2"/>
-              </a:buClr>
-            </a:pPr>
-            <a:r>
-              <a:rPr lang="ru-RU" sz="3600" b="1" dirty="0">
-                <a:solidFill>
-                  <a:schemeClr val="bg1"/>
-                </a:solidFill>
-              </a:rPr>
-              <a:t>Подобряване</a:t>
-            </a:r>
-            <a:r>
-              <a:rPr lang="ru-RU" sz="3600" dirty="0"/>
-              <a:t> на ефективността на бизнес процесите</a:t>
-            </a:r>
-          </a:p>
-          <a:p>
-            <a:endParaRPr lang="en-US" sz="3600" dirty="0"/>
-          </a:p>
-        </p:txBody>
-      </p:sp>
-      <p:sp>
-        <p:nvSpPr>
-          <p:cNvPr id="4" name="Title 3"/>
-          <p:cNvSpPr>
-            <a:spLocks noGrp="1"/>
-          </p:cNvSpPr>
-          <p:nvPr>
-            <p:ph type="title"/>
-          </p:nvPr>
-        </p:nvSpPr>
-        <p:spPr/>
-        <p:txBody>
-          <a:bodyPr/>
-          <a:lstStyle/>
-          <a:p>
-            <a:r>
-              <a:rPr lang="bg-BG" dirty="0"/>
-              <a:t>Нужда от информационни системи (5)</a:t>
-            </a:r>
-            <a:endParaRPr lang="en-US" dirty="0"/>
-          </a:p>
-        </p:txBody>
-      </p:sp>
-      <p:sp>
-        <p:nvSpPr>
-          <p:cNvPr id="5" name="Slide Number">
+          <p:cNvPr id="2" name="Slide Number Placeholder 1">
             <a:extLst>
               <a:ext uri="{FF2B5EF4-FFF2-40B4-BE49-F238E27FC236}">
-                <a16:creationId xmlns:a16="http://schemas.microsoft.com/office/drawing/2014/main" id="{5E9ED9B0-0DD1-E15D-7A12-48067CEC2E37}"/>
+                <a16:creationId xmlns:a16="http://schemas.microsoft.com/office/drawing/2014/main" id="{32474448-C0E1-C761-93E0-74053A184ECD}"/>
               </a:ext>
             </a:extLst>
           </p:cNvPr>
@@ -13845,36 +13969,330 @@
             <p:ph type="sldNum" sz="quarter" idx="5"/>
           </p:nvPr>
         </p:nvSpPr>
+        <p:spPr/>
+        <p:txBody>
+          <a:bodyPr/>
+          <a:lstStyle/>
+          <a:p>
+            <a:fld id="{2BF067CD-8E6B-4360-9AA8-C5DF2A48A6D1}" type="slidenum">
+              <a:rPr lang="en-US" noProof="0" smtClean="0"/>
+              <a:pPr/>
+              <a:t>22</a:t>
+            </a:fld>
+            <a:endParaRPr lang="en-US" noProof="0" dirty="0"/>
+          </a:p>
+        </p:txBody>
+      </p:sp>
+      <p:sp>
+        <p:nvSpPr>
+          <p:cNvPr id="3" name="Text Placeholder 2">
+            <a:extLst>
+              <a:ext uri="{FF2B5EF4-FFF2-40B4-BE49-F238E27FC236}">
+                <a16:creationId xmlns:a16="http://schemas.microsoft.com/office/drawing/2014/main" id="{8786164E-4EDE-611A-A46B-FF230612594E}"/>
+              </a:ext>
+            </a:extLst>
+          </p:cNvPr>
+          <p:cNvSpPr>
+            <a:spLocks noGrp="1"/>
+          </p:cNvSpPr>
+          <p:nvPr>
+            <p:ph type="body" sz="quarter" idx="10"/>
+          </p:nvPr>
+        </p:nvSpPr>
+        <p:spPr/>
+        <p:txBody>
+          <a:bodyPr/>
+          <a:lstStyle/>
+          <a:p>
+            <a:pPr>
+              <a:buClr>
+                <a:schemeClr val="tx2"/>
+              </a:buClr>
+            </a:pPr>
+            <a:r>
+              <a:rPr lang="bg-BG" sz="3600" dirty="0"/>
+              <a:t>Заявките също така </a:t>
+            </a:r>
+            <a:r>
+              <a:rPr lang="bg-BG" sz="3600" b="1" dirty="0">
+                <a:solidFill>
+                  <a:schemeClr val="bg1"/>
+                </a:solidFill>
+              </a:rPr>
+              <a:t>търсят </a:t>
+            </a:r>
+            <a:r>
+              <a:rPr lang="ru-RU" sz="3600" dirty="0"/>
+              <a:t>и </a:t>
+            </a:r>
+            <a:r>
+              <a:rPr lang="bg-BG" sz="3600" b="1" dirty="0">
+                <a:solidFill>
+                  <a:schemeClr val="bg1"/>
+                </a:solidFill>
+              </a:rPr>
+              <a:t>филтрират </a:t>
+            </a:r>
+            <a:r>
+              <a:rPr lang="ru-RU" sz="3600" dirty="0"/>
+              <a:t>информацията според определени критерии</a:t>
+            </a:r>
+          </a:p>
+          <a:p>
+            <a:pPr lvl="1">
+              <a:buClr>
+                <a:schemeClr val="tx2"/>
+              </a:buClr>
+            </a:pPr>
+            <a:r>
+              <a:rPr lang="ru-RU" sz="3400" dirty="0"/>
+              <a:t>При натискане на бутона </a:t>
+            </a:r>
+            <a:r>
+              <a:rPr lang="en-US" sz="3400" dirty="0"/>
+              <a:t>[</a:t>
+            </a:r>
+            <a:r>
+              <a:rPr lang="bg-BG" sz="3400" b="1" dirty="0"/>
+              <a:t>Ф</a:t>
+            </a:r>
+            <a:r>
+              <a:rPr lang="ru-RU" sz="3400" b="1" dirty="0"/>
+              <a:t>илтри</a:t>
+            </a:r>
+            <a:r>
+              <a:rPr lang="en-US" sz="3400" dirty="0"/>
+              <a:t>]</a:t>
+            </a:r>
+            <a:r>
+              <a:rPr lang="ru-RU" sz="3400" dirty="0"/>
+              <a:t>, можем да </a:t>
+            </a:r>
+            <a:r>
+              <a:rPr lang="ru-RU" sz="3400" b="1" dirty="0">
+                <a:solidFill>
+                  <a:schemeClr val="bg1"/>
+                </a:solidFill>
+              </a:rPr>
+              <a:t>изберем</a:t>
+            </a:r>
+            <a:r>
+              <a:rPr lang="ru-RU" sz="3400" dirty="0"/>
+              <a:t> кои </a:t>
+            </a:r>
+            <a:r>
+              <a:rPr lang="ru-RU" sz="3400" b="1" dirty="0">
+                <a:solidFill>
+                  <a:schemeClr val="bg1"/>
+                </a:solidFill>
+              </a:rPr>
+              <a:t>оценки</a:t>
+            </a:r>
+            <a:r>
+              <a:rPr lang="ru-RU" sz="3400" dirty="0"/>
+              <a:t> да ни се </a:t>
+            </a:r>
+            <a:r>
+              <a:rPr lang="ru-RU" sz="3400" b="1" dirty="0">
+                <a:solidFill>
+                  <a:schemeClr val="bg1"/>
+                </a:solidFill>
+              </a:rPr>
+              <a:t>визуализират</a:t>
+            </a:r>
+            <a:r>
+              <a:rPr lang="ru-RU" sz="3400" dirty="0"/>
+              <a:t>:</a:t>
+            </a:r>
+          </a:p>
+        </p:txBody>
+      </p:sp>
+      <p:sp>
+        <p:nvSpPr>
+          <p:cNvPr id="4" name="Title 3">
+            <a:extLst>
+              <a:ext uri="{FF2B5EF4-FFF2-40B4-BE49-F238E27FC236}">
+                <a16:creationId xmlns:a16="http://schemas.microsoft.com/office/drawing/2014/main" id="{278D1B64-0E49-90C8-AF65-3BC09A7A4BC2}"/>
+              </a:ext>
+            </a:extLst>
+          </p:cNvPr>
+          <p:cNvSpPr>
+            <a:spLocks noGrp="1"/>
+          </p:cNvSpPr>
+          <p:nvPr>
+            <p:ph type="title"/>
+          </p:nvPr>
+        </p:nvSpPr>
+        <p:spPr/>
+        <p:txBody>
+          <a:bodyPr/>
+          <a:lstStyle/>
+          <a:p>
+            <a:r>
+              <a:rPr lang="bg-BG" dirty="0"/>
+              <a:t>Заявки от потребителя</a:t>
+            </a:r>
+            <a:r>
+              <a:rPr lang="en-US" dirty="0"/>
+              <a:t> (2)</a:t>
+            </a:r>
+          </a:p>
+        </p:txBody>
+      </p:sp>
+      <p:pic>
+        <p:nvPicPr>
+          <p:cNvPr id="6" name="Picture 5">
+            <a:extLst>
+              <a:ext uri="{FF2B5EF4-FFF2-40B4-BE49-F238E27FC236}">
+                <a16:creationId xmlns:a16="http://schemas.microsoft.com/office/drawing/2014/main" id="{0F1AD335-26F3-CA88-49F2-0E8210C9908A}"/>
+              </a:ext>
+            </a:extLst>
+          </p:cNvPr>
+          <p:cNvPicPr>
+            <a:picLocks noChangeAspect="1"/>
+          </p:cNvPicPr>
+          <p:nvPr/>
+        </p:nvPicPr>
+        <p:blipFill>
+          <a:blip r:embed="rId2"/>
+          <a:stretch>
+            <a:fillRect/>
+          </a:stretch>
+        </p:blipFill>
         <p:spPr>
           <a:xfrm>
-            <a:off x="11753030" y="6507000"/>
-            <a:ext cx="367414" cy="297000"/>
+            <a:off x="5151000" y="3960536"/>
+            <a:ext cx="1665000" cy="587647"/>
           </a:xfrm>
           <a:prstGeom prst="rect">
             <a:avLst/>
           </a:prstGeom>
+          <a:ln>
+            <a:solidFill>
+              <a:schemeClr val="bg2">
+                <a:lumMod val="75000"/>
+              </a:schemeClr>
+            </a:solidFill>
+          </a:ln>
         </p:spPr>
+      </p:pic>
+      <p:pic>
+        <p:nvPicPr>
+          <p:cNvPr id="8" name="Picture 7">
+            <a:extLst>
+              <a:ext uri="{FF2B5EF4-FFF2-40B4-BE49-F238E27FC236}">
+                <a16:creationId xmlns:a16="http://schemas.microsoft.com/office/drawing/2014/main" id="{F694ECFA-262C-9363-EFA6-E9F6BDCEDB35}"/>
+              </a:ext>
+            </a:extLst>
+          </p:cNvPr>
+          <p:cNvPicPr>
+            <a:picLocks noChangeAspect="1"/>
+          </p:cNvPicPr>
+          <p:nvPr/>
+        </p:nvPicPr>
+        <p:blipFill>
+          <a:blip r:embed="rId3"/>
+          <a:stretch>
+            <a:fillRect/>
+          </a:stretch>
+        </p:blipFill>
+        <p:spPr>
+          <a:xfrm>
+            <a:off x="622920" y="5488858"/>
+            <a:ext cx="10946160" cy="685142"/>
+          </a:xfrm>
+          <a:prstGeom prst="rect">
+            <a:avLst/>
+          </a:prstGeom>
+          <a:ln>
+            <a:solidFill>
+              <a:schemeClr val="bg2">
+                <a:lumMod val="75000"/>
+              </a:schemeClr>
+            </a:solidFill>
+          </a:ln>
+        </p:spPr>
+      </p:pic>
+      <p:sp>
+        <p:nvSpPr>
+          <p:cNvPr id="9" name="Arrow: Down 8">
+            <a:extLst>
+              <a:ext uri="{FF2B5EF4-FFF2-40B4-BE49-F238E27FC236}">
+                <a16:creationId xmlns:a16="http://schemas.microsoft.com/office/drawing/2014/main" id="{AECC8366-C296-C700-CD81-E6244E94EB51}"/>
+              </a:ext>
+            </a:extLst>
+          </p:cNvPr>
+          <p:cNvSpPr/>
+          <p:nvPr/>
+        </p:nvSpPr>
+        <p:spPr bwMode="auto">
+          <a:xfrm>
+            <a:off x="5871000" y="4731353"/>
+            <a:ext cx="450000" cy="587647"/>
+          </a:xfrm>
+          <a:prstGeom prst="downArrow">
+            <a:avLst/>
+          </a:prstGeom>
+          <a:solidFill>
+            <a:schemeClr val="dk2">
+              <a:alpha val="80000"/>
+            </a:schemeClr>
+          </a:solidFill>
+          <a:ln w="19050">
+            <a:solidFill>
+              <a:schemeClr val="tx1">
+                <a:lumMod val="75000"/>
+                <a:alpha val="80000"/>
+              </a:schemeClr>
+            </a:solidFill>
+          </a:ln>
+          <a:effectLst/>
+        </p:spPr>
+        <p:style>
+          <a:lnRef idx="2">
+            <a:schemeClr val="accent1">
+              <a:shade val="50000"/>
+            </a:schemeClr>
+          </a:lnRef>
+          <a:fillRef idx="1001">
+            <a:schemeClr val="dk2"/>
+          </a:fillRef>
+          <a:effectRef idx="0">
+            <a:schemeClr val="accent1"/>
+          </a:effectRef>
+          <a:fontRef idx="minor">
+            <a:schemeClr val="lt1"/>
+          </a:fontRef>
+        </p:style>
         <p:txBody>
-          <a:bodyPr vert="horz" lIns="91440" tIns="45720" rIns="91440" bIns="45720" rtlCol="0" anchor="b"/>
-          <a:lstStyle>
-            <a:lvl1pPr algn="r">
-              <a:defRPr sz="1000"/>
-            </a:lvl1pPr>
-          </a:lstStyle>
-          <a:p>
-            <a:fld id="{2BF067CD-8E6B-4360-9AA8-C5DF2A48A6D1}" type="slidenum">
-              <a:rPr lang="en-US" noProof="0" smtClean="0"/>
-              <a:pPr/>
-              <a:t>21</a:t>
-            </a:fld>
-            <a:endParaRPr lang="en-US" noProof="0" dirty="0"/>
+          <a:bodyPr rot="0" spcFirstLastPara="0" vertOverflow="overflow" horzOverflow="overflow" vert="horz" wrap="square" lIns="91440" tIns="45720" rIns="91440" bIns="45720" numCol="1" spcCol="0" rtlCol="0" fromWordArt="0" anchor="ctr" anchorCtr="0" forceAA="0" compatLnSpc="1">
+            <a:prstTxWarp prst="textNoShape">
+              <a:avLst/>
+            </a:prstTxWarp>
+            <a:noAutofit/>
+          </a:bodyPr>
+          <a:lstStyle/>
+          <a:p>
+            <a:pPr algn="ctr"/>
+            <a:endParaRPr lang="en-US" sz="2800" b="1" dirty="0">
+              <a:solidFill>
+                <a:srgbClr val="FFFFFF"/>
+              </a:solidFill>
+              <a:effectLst>
+                <a:outerShdw blurRad="38100" dist="38100" dir="2700000" algn="tl">
+                  <a:srgbClr val="000000">
+                    <a:alpha val="43137"/>
+                  </a:srgbClr>
+                </a:outerShdw>
+              </a:effectLst>
+            </a:endParaRPr>
           </a:p>
         </p:txBody>
       </p:sp>
     </p:spTree>
     <p:extLst>
       <p:ext uri="{BB962C8B-B14F-4D97-AF65-F5344CB8AC3E}">
-        <p14:creationId xmlns:p14="http://schemas.microsoft.com/office/powerpoint/2010/main" val="895079111"/>
+        <p14:creationId xmlns:p14="http://schemas.microsoft.com/office/powerpoint/2010/main" val="1543094484"/>
       </p:ext>
     </p:extLst>
   </p:cSld>
@@ -13923,42 +14341,7 @@
                                           </p:stCondLst>
                                         </p:cTn>
                                         <p:tgtEl>
-                                          <p:spTgt spid="3">
-                                            <p:txEl>
-                                              <p:pRg st="2" end="2"/>
-                                            </p:txEl>
-                                          </p:spTgt>
-                                        </p:tgtEl>
-                                        <p:attrNameLst>
-                                          <p:attrName>style.visibility</p:attrName>
-                                        </p:attrNameLst>
-                                      </p:cBhvr>
-                                      <p:to>
-                                        <p:strVal val="visible"/>
-                                      </p:to>
-                                    </p:set>
-                                  </p:childTnLst>
-                                </p:cTn>
-                              </p:par>
-                              <p:par>
-                                <p:cTn id="7" presetID="1" presetClass="entr" presetSubtype="0" fill="hold" nodeType="withEffect">
-                                  <p:stCondLst>
-                                    <p:cond delay="0"/>
-                                  </p:stCondLst>
-                                  <p:childTnLst>
-                                    <p:set>
-                                      <p:cBhvr>
-                                        <p:cTn id="8" dur="1" fill="hold">
-                                          <p:stCondLst>
-                                            <p:cond delay="0"/>
-                                          </p:stCondLst>
-                                        </p:cTn>
-                                        <p:tgtEl>
-                                          <p:spTgt spid="3">
-                                            <p:txEl>
-                                              <p:pRg st="3" end="3"/>
-                                            </p:txEl>
-                                          </p:spTgt>
+                                          <p:spTgt spid="6"/>
                                         </p:tgtEl>
                                         <p:attrNameLst>
                                           <p:attrName>style.visibility</p:attrName>
@@ -13978,19 +14361,46 @@
                     </p:cTn>
                   </p:par>
                   <p:par>
-                    <p:cTn id="9" fill="hold">
+                    <p:cTn id="7" fill="hold">
                       <p:stCondLst>
                         <p:cond delay="indefinite"/>
                       </p:stCondLst>
                       <p:childTnLst>
                         <p:par>
-                          <p:cTn id="10" fill="hold">
+                          <p:cTn id="8" fill="hold">
                             <p:stCondLst>
                               <p:cond delay="0"/>
                             </p:stCondLst>
                             <p:childTnLst>
                               <p:par>
-                                <p:cTn id="11" presetID="1" presetClass="entr" presetSubtype="0" fill="hold" nodeType="clickEffect">
+                                <p:cTn id="9" presetID="1" presetClass="entr" presetSubtype="0" fill="hold" nodeType="clickEffect">
+                                  <p:stCondLst>
+                                    <p:cond delay="0"/>
+                                  </p:stCondLst>
+                                  <p:childTnLst>
+                                    <p:set>
+                                      <p:cBhvr>
+                                        <p:cTn id="10" dur="1" fill="hold">
+                                          <p:stCondLst>
+                                            <p:cond delay="0"/>
+                                          </p:stCondLst>
+                                        </p:cTn>
+                                        <p:tgtEl>
+                                          <p:spTgt spid="8"/>
+                                        </p:tgtEl>
+                                        <p:attrNameLst>
+                                          <p:attrName>style.visibility</p:attrName>
+                                        </p:attrNameLst>
+                                      </p:cBhvr>
+                                      <p:to>
+                                        <p:strVal val="visible"/>
+                                      </p:to>
+                                    </p:set>
+                                  </p:childTnLst>
+                                </p:cTn>
+                              </p:par>
+                              <p:par>
+                                <p:cTn id="11" presetID="1" presetClass="entr" presetSubtype="0" fill="hold" grpId="0" nodeType="withEffect">
                                   <p:stCondLst>
                                     <p:cond delay="0"/>
                                   </p:stCondLst>
@@ -14003,11 +14413,7 @@
                                           </p:stCondLst>
                                         </p:cTn>
                                         <p:tgtEl>
-                                          <p:spTgt spid="3">
-                                            <p:txEl>
-                                              <p:pRg st="4" end="4"/>
-                                            </p:txEl>
-                                          </p:spTgt>
+                                          <p:spTgt spid="9"/>
                                         </p:tgtEl>
                                         <p:attrNameLst>
                                           <p:attrName>style.visibility</p:attrName>
@@ -14047,11 +14453,14 @@
         </p:cTn>
       </p:par>
     </p:tnLst>
+    <p:bldLst>
+      <p:bldP spid="9" grpId="0" animBg="1"/>
+    </p:bldLst>
   </p:timing>
 </p:sld>
 </file>
 
-<file path=ppt/slides/slide22.xml><?xml version="1.0" encoding="utf-8"?>
+<file path=ppt/slides/slide23.xml><?xml version="1.0" encoding="utf-8"?>
 <p:sld xmlns:a="http://schemas.openxmlformats.org/drawingml/2006/main" xmlns:r="http://schemas.openxmlformats.org/officeDocument/2006/relationships" xmlns:p="http://schemas.openxmlformats.org/presentationml/2006/main">
   <p:cSld>
     <p:spTree>
@@ -14078,119 +14487,103 @@
             <p:ph type="body" sz="quarter" idx="10"/>
           </p:nvPr>
         </p:nvSpPr>
-        <p:spPr/>
+        <p:spPr>
+          <a:xfrm>
+            <a:off x="190402" y="1224000"/>
+            <a:ext cx="11818096" cy="5528766"/>
+          </a:xfrm>
+        </p:spPr>
         <p:txBody>
           <a:bodyPr>
             <a:normAutofit/>
           </a:bodyPr>
           <a:lstStyle/>
           <a:p>
-            <a:pPr>
+            <a:r>
+              <a:rPr lang="ru-RU" sz="3800" dirty="0"/>
+              <a:t>Предоставят </a:t>
+            </a:r>
+            <a:r>
+              <a:rPr lang="bg-BG" sz="3800" b="1" dirty="0">
+                <a:solidFill>
+                  <a:schemeClr val="bg1"/>
+                </a:solidFill>
+              </a:rPr>
+              <a:t>визуално представление </a:t>
+            </a:r>
+            <a:r>
+              <a:rPr lang="ru-RU" sz="3800" dirty="0"/>
+              <a:t>на данните, което </a:t>
+            </a:r>
+            <a:r>
+              <a:rPr lang="bg-BG" sz="3800" b="1" dirty="0">
+                <a:solidFill>
+                  <a:schemeClr val="bg1"/>
+                </a:solidFill>
+              </a:rPr>
+              <a:t>облекчава анализа и представянето</a:t>
+            </a:r>
+            <a:r>
+              <a:rPr lang="ru-RU" sz="3800" dirty="0"/>
+              <a:t> на информацията</a:t>
+            </a:r>
+            <a:endParaRPr lang="en-US" sz="3800" dirty="0"/>
+          </a:p>
+          <a:p>
+            <a:r>
+              <a:rPr lang="ru-RU" sz="3800" dirty="0"/>
+              <a:t>ИТ системите позволяват автоматизация на създаването на отчети</a:t>
+            </a:r>
+            <a:endParaRPr lang="en-US" sz="3800" dirty="0"/>
+          </a:p>
+          <a:p>
+            <a:pPr lvl="1">
               <a:buClr>
                 <a:schemeClr val="tx2"/>
               </a:buClr>
             </a:pPr>
             <a:r>
-              <a:rPr lang="en-US" sz="3600" b="1" dirty="0">
+              <a:rPr lang="bg-BG" sz="3600" b="1" dirty="0">
                 <a:solidFill>
                   <a:schemeClr val="bg1"/>
                 </a:solidFill>
               </a:rPr>
-              <a:t>MIS </a:t>
+              <a:t>Улесняване</a:t>
+            </a:r>
+            <a:r>
+              <a:rPr lang="bg-BG" sz="3600" dirty="0"/>
+              <a:t> на</a:t>
             </a:r>
             <a:r>
               <a:rPr lang="ru-RU" sz="3600" dirty="0"/>
-              <a:t>(Управление на информацията)</a:t>
-            </a:r>
-          </a:p>
-          <a:p>
-            <a:pPr>
+              <a:t> вземането на решения </a:t>
+            </a:r>
+          </a:p>
+          <a:p>
+            <a:pPr lvl="1">
               <a:buClr>
                 <a:schemeClr val="tx2"/>
               </a:buClr>
             </a:pPr>
             <a:r>
-              <a:rPr lang="en-US" sz="3600" b="1" dirty="0">
+              <a:rPr lang="ru-RU" sz="3600" b="1" dirty="0">
                 <a:solidFill>
                   <a:schemeClr val="bg1"/>
                 </a:solidFill>
               </a:rPr>
-              <a:t>ERP </a:t>
+              <a:t>Подобряване</a:t>
             </a:r>
             <a:r>
               <a:rPr lang="ru-RU" sz="3600" dirty="0"/>
-              <a:t>(Интегрирана система за управление на ресурсите)</a:t>
-            </a:r>
-          </a:p>
-          <a:p>
-            <a:pPr>
-              <a:buClr>
-                <a:schemeClr val="tx2"/>
-              </a:buClr>
-            </a:pPr>
-            <a:r>
-              <a:rPr lang="en-US" sz="3600" b="1" dirty="0">
-                <a:solidFill>
-                  <a:schemeClr val="bg1"/>
-                </a:solidFill>
-              </a:rPr>
-              <a:t>CRM </a:t>
-            </a:r>
-            <a:r>
-              <a:rPr lang="ru-RU" sz="3600" dirty="0"/>
-              <a:t>(Управление на взаимоотношенията с клиентите)</a:t>
-            </a:r>
-          </a:p>
-          <a:p>
-            <a:pPr>
-              <a:buClr>
-                <a:schemeClr val="tx2"/>
-              </a:buClr>
-            </a:pPr>
-            <a:r>
-              <a:rPr lang="en-US" sz="3600" b="1" dirty="0">
-                <a:solidFill>
-                  <a:schemeClr val="bg1"/>
-                </a:solidFill>
-              </a:rPr>
-              <a:t>PMS </a:t>
-            </a:r>
-            <a:r>
-              <a:rPr lang="ru-RU" sz="3600" dirty="0"/>
-              <a:t>(Система за управление на проекти)</a:t>
-            </a:r>
-          </a:p>
-          <a:p>
-            <a:pPr>
-              <a:buClr>
-                <a:schemeClr val="tx2"/>
-              </a:buClr>
-            </a:pPr>
-            <a:r>
-              <a:rPr lang="en-US" sz="3600" b="1" dirty="0">
-                <a:solidFill>
-                  <a:schemeClr val="bg1"/>
-                </a:solidFill>
-              </a:rPr>
-              <a:t>LMS </a:t>
-            </a:r>
-            <a:r>
-              <a:rPr lang="ru-RU" sz="3600" dirty="0"/>
-              <a:t>(Система за управление на обучението)</a:t>
-            </a:r>
+              <a:t> на ефективността на бизнес процесите</a:t>
+            </a:r>
+          </a:p>
+          <a:p>
+            <a:pPr lvl="1"/>
+            <a:endParaRPr lang="ru-RU" sz="3600" dirty="0"/>
+          </a:p>
+          <a:p>
             <a:endParaRPr lang="en-US" sz="3600" dirty="0"/>
-          </a:p>
-          <a:p>
-            <a:pPr>
-              <a:buClr>
-                <a:schemeClr val="tx2"/>
-              </a:buClr>
-            </a:pPr>
-            <a:r>
-              <a:rPr lang="bg-BG" sz="3600" dirty="0"/>
-              <a:t>И други...</a:t>
-            </a:r>
-            <a:endParaRPr lang="ru-RU" sz="3600" dirty="0"/>
           </a:p>
         </p:txBody>
       </p:sp>
@@ -14211,7 +14604,7 @@
           <a:p>
             <a:r>
               <a:rPr lang="bg-BG" dirty="0"/>
-              <a:t>Видове ИТ системи</a:t>
+              <a:t>Отчети</a:t>
             </a:r>
             <a:endParaRPr lang="en-US" dirty="0"/>
           </a:p>
@@ -14222,7 +14615,7 @@
           <p:cNvPr id="5" name="Slide Number">
             <a:extLst>
               <a:ext uri="{FF2B5EF4-FFF2-40B4-BE49-F238E27FC236}">
-                <a16:creationId xmlns:a16="http://schemas.microsoft.com/office/drawing/2014/main" id="{2AD9D385-7FE8-3598-C646-0D13A4F68AB3}"/>
+                <a16:creationId xmlns:a16="http://schemas.microsoft.com/office/drawing/2014/main" id="{5E9ED9B0-0DD1-E15D-7A12-48067CEC2E37}"/>
               </a:ext>
             </a:extLst>
           </p:cNvPr>
@@ -14253,7 +14646,236 @@
             <a:fld id="{2BF067CD-8E6B-4360-9AA8-C5DF2A48A6D1}" type="slidenum">
               <a:rPr lang="en-US" noProof="0" smtClean="0"/>
               <a:pPr/>
-              <a:t>22</a:t>
+              <a:t>23</a:t>
+            </a:fld>
+            <a:endParaRPr lang="en-US" noProof="0" dirty="0"/>
+          </a:p>
+        </p:txBody>
+      </p:sp>
+    </p:spTree>
+    <p:extLst>
+      <p:ext uri="{BB962C8B-B14F-4D97-AF65-F5344CB8AC3E}">
+        <p14:creationId xmlns:p14="http://schemas.microsoft.com/office/powerpoint/2010/main" val="895079111"/>
+      </p:ext>
+    </p:extLst>
+  </p:cSld>
+  <p:clrMapOvr>
+    <a:masterClrMapping/>
+  </p:clrMapOvr>
+  <mc:AlternateContent xmlns:mc="http://schemas.openxmlformats.org/markup-compatibility/2006" xmlns:p14="http://schemas.microsoft.com/office/powerpoint/2010/main">
+    <mc:Choice Requires="p14">
+      <p:transition spd="slow" p14:dur="2000" advClick="0" advTm="5000"/>
+    </mc:Choice>
+    <mc:Fallback xmlns="">
+      <p:transition spd="slow" advClick="0" advTm="5000"/>
+    </mc:Fallback>
+  </mc:AlternateContent>
+</p:sld>
+</file>
+
+<file path=ppt/slides/slide24.xml><?xml version="1.0" encoding="utf-8"?>
+<p:sld xmlns:a="http://schemas.openxmlformats.org/drawingml/2006/main" xmlns:r="http://schemas.openxmlformats.org/officeDocument/2006/relationships" xmlns:p="http://schemas.openxmlformats.org/presentationml/2006/main">
+  <p:cSld>
+    <p:spTree>
+      <p:nvGrpSpPr>
+        <p:cNvPr id="1" name=""/>
+        <p:cNvGrpSpPr/>
+        <p:nvPr/>
+      </p:nvGrpSpPr>
+      <p:grpSpPr>
+        <a:xfrm>
+          <a:off x="0" y="0"/>
+          <a:ext cx="0" cy="0"/>
+          <a:chOff x="0" y="0"/>
+          <a:chExt cx="0" cy="0"/>
+        </a:xfrm>
+      </p:grpSpPr>
+      <p:sp>
+        <p:nvSpPr>
+          <p:cNvPr id="3" name="Text Placeholder 2"/>
+          <p:cNvSpPr>
+            <a:spLocks noGrp="1"/>
+          </p:cNvSpPr>
+          <p:nvPr>
+            <p:ph type="body" sz="quarter" idx="10"/>
+          </p:nvPr>
+        </p:nvSpPr>
+        <p:spPr/>
+        <p:txBody>
+          <a:bodyPr>
+            <a:normAutofit/>
+          </a:bodyPr>
+          <a:lstStyle/>
+          <a:p>
+            <a:pPr>
+              <a:buClr>
+                <a:schemeClr val="tx2"/>
+              </a:buClr>
+            </a:pPr>
+            <a:r>
+              <a:rPr lang="en-US" sz="3600" b="1" dirty="0">
+                <a:solidFill>
+                  <a:schemeClr val="bg1"/>
+                </a:solidFill>
+              </a:rPr>
+              <a:t>MIS </a:t>
+            </a:r>
+            <a:r>
+              <a:rPr lang="ru-RU" sz="3600" dirty="0"/>
+              <a:t>(Управление на информацията)</a:t>
+            </a:r>
+          </a:p>
+          <a:p>
+            <a:pPr>
+              <a:buClr>
+                <a:schemeClr val="tx2"/>
+              </a:buClr>
+            </a:pPr>
+            <a:r>
+              <a:rPr lang="en-US" sz="3600" b="1" dirty="0">
+                <a:solidFill>
+                  <a:schemeClr val="bg1"/>
+                </a:solidFill>
+              </a:rPr>
+              <a:t>ERP </a:t>
+            </a:r>
+            <a:r>
+              <a:rPr lang="ru-RU" sz="3600" dirty="0"/>
+              <a:t>(Интегрирана система за управление на ресурсите)</a:t>
+            </a:r>
+          </a:p>
+          <a:p>
+            <a:pPr>
+              <a:buClr>
+                <a:schemeClr val="tx2"/>
+              </a:buClr>
+            </a:pPr>
+            <a:r>
+              <a:rPr lang="en-US" sz="3600" b="1" dirty="0">
+                <a:solidFill>
+                  <a:schemeClr val="bg1"/>
+                </a:solidFill>
+              </a:rPr>
+              <a:t>CRM </a:t>
+            </a:r>
+            <a:r>
+              <a:rPr lang="ru-RU" sz="3600" dirty="0"/>
+              <a:t>(Управление на взаимоотношенията с клиентите)</a:t>
+            </a:r>
+          </a:p>
+          <a:p>
+            <a:pPr>
+              <a:buClr>
+                <a:schemeClr val="tx2"/>
+              </a:buClr>
+            </a:pPr>
+            <a:r>
+              <a:rPr lang="en-US" sz="3600" b="1" dirty="0">
+                <a:solidFill>
+                  <a:schemeClr val="bg1"/>
+                </a:solidFill>
+              </a:rPr>
+              <a:t>PMS </a:t>
+            </a:r>
+            <a:r>
+              <a:rPr lang="ru-RU" sz="3600" dirty="0"/>
+              <a:t>(Система за управление на проекти)</a:t>
+            </a:r>
+          </a:p>
+          <a:p>
+            <a:pPr>
+              <a:buClr>
+                <a:schemeClr val="tx2"/>
+              </a:buClr>
+            </a:pPr>
+            <a:r>
+              <a:rPr lang="en-US" sz="3600" b="1" dirty="0">
+                <a:solidFill>
+                  <a:schemeClr val="bg1"/>
+                </a:solidFill>
+              </a:rPr>
+              <a:t>LMS </a:t>
+            </a:r>
+            <a:r>
+              <a:rPr lang="ru-RU" sz="3600" dirty="0"/>
+              <a:t>(Система за управление на обучението)</a:t>
+            </a:r>
+            <a:endParaRPr lang="en-US" sz="3600" dirty="0"/>
+          </a:p>
+          <a:p>
+            <a:pPr>
+              <a:buClr>
+                <a:schemeClr val="tx2"/>
+              </a:buClr>
+            </a:pPr>
+            <a:r>
+              <a:rPr lang="bg-BG" sz="3600" dirty="0"/>
+              <a:t>И други...</a:t>
+            </a:r>
+            <a:endParaRPr lang="ru-RU" sz="3600" dirty="0"/>
+          </a:p>
+        </p:txBody>
+      </p:sp>
+      <p:sp>
+        <p:nvSpPr>
+          <p:cNvPr id="4" name="Title 3"/>
+          <p:cNvSpPr>
+            <a:spLocks noGrp="1"/>
+          </p:cNvSpPr>
+          <p:nvPr>
+            <p:ph type="title"/>
+          </p:nvPr>
+        </p:nvSpPr>
+        <p:spPr/>
+        <p:txBody>
+          <a:bodyPr/>
+          <a:lstStyle/>
+          <a:p>
+            <a:r>
+              <a:rPr lang="bg-BG" dirty="0"/>
+              <a:t>Видове ИТ системи</a:t>
+            </a:r>
+            <a:endParaRPr lang="en-US" dirty="0"/>
+          </a:p>
+        </p:txBody>
+      </p:sp>
+      <p:sp>
+        <p:nvSpPr>
+          <p:cNvPr id="5" name="Slide Number">
+            <a:extLst>
+              <a:ext uri="{FF2B5EF4-FFF2-40B4-BE49-F238E27FC236}">
+                <a16:creationId xmlns:a16="http://schemas.microsoft.com/office/drawing/2014/main" id="{2AD9D385-7FE8-3598-C646-0D13A4F68AB3}"/>
+              </a:ext>
+            </a:extLst>
+          </p:cNvPr>
+          <p:cNvSpPr>
+            <a:spLocks noGrp="1"/>
+          </p:cNvSpPr>
+          <p:nvPr>
+            <p:ph type="sldNum" sz="quarter" idx="5"/>
+          </p:nvPr>
+        </p:nvSpPr>
+        <p:spPr>
+          <a:xfrm>
+            <a:off x="11753030" y="6507000"/>
+            <a:ext cx="367414" cy="297000"/>
+          </a:xfrm>
+          <a:prstGeom prst="rect">
+            <a:avLst/>
+          </a:prstGeom>
+        </p:spPr>
+        <p:txBody>
+          <a:bodyPr vert="horz" lIns="91440" tIns="45720" rIns="91440" bIns="45720" rtlCol="0" anchor="b"/>
+          <a:lstStyle>
+            <a:lvl1pPr algn="r">
+              <a:defRPr sz="1000"/>
+            </a:lvl1pPr>
+          </a:lstStyle>
+          <a:p>
+            <a:fld id="{2BF067CD-8E6B-4360-9AA8-C5DF2A48A6D1}" type="slidenum">
+              <a:rPr lang="en-US" noProof="0" smtClean="0"/>
+              <a:pPr/>
+              <a:t>24</a:t>
             </a:fld>
             <a:endParaRPr lang="en-US" noProof="0" dirty="0"/>
           </a:p>
@@ -14555,7 +15177,7 @@
 </p:sld>
 </file>
 
-<file path=ppt/slides/slide23.xml><?xml version="1.0" encoding="utf-8"?>
+<file path=ppt/slides/slide25.xml><?xml version="1.0" encoding="utf-8"?>
 <p:sld xmlns:a="http://schemas.openxmlformats.org/drawingml/2006/main" xmlns:r="http://schemas.openxmlformats.org/officeDocument/2006/relationships" xmlns:p="http://schemas.openxmlformats.org/presentationml/2006/main">
   <p:cSld>
     <p:spTree>
@@ -15050,7 +15672,7 @@
             <a:fld id="{2BF067CD-8E6B-4360-9AA8-C5DF2A48A6D1}" type="slidenum">
               <a:rPr lang="en-US" noProof="0" smtClean="0"/>
               <a:pPr/>
-              <a:t>23</a:t>
+              <a:t>25</a:t>
             </a:fld>
             <a:endParaRPr lang="en-US" noProof="0" dirty="0"/>
           </a:p>
@@ -15303,7 +15925,7 @@
 </p:sld>
 </file>
 
-<file path=ppt/slides/slide24.xml><?xml version="1.0" encoding="utf-8"?>
+<file path=ppt/slides/slide26.xml><?xml version="1.0" encoding="utf-8"?>
 <p:sld xmlns:a="http://schemas.openxmlformats.org/drawingml/2006/main" xmlns:r="http://schemas.openxmlformats.org/officeDocument/2006/relationships" xmlns:p="http://schemas.openxmlformats.org/presentationml/2006/main">
   <p:cSld>
     <p:spTree>
@@ -15493,7 +16115,7 @@
 </p:sld>
 </file>
 
-<file path=ppt/slides/slide25.xml><?xml version="1.0" encoding="utf-8"?>
+<file path=ppt/slides/slide27.xml><?xml version="1.0" encoding="utf-8"?>
 <p:sld xmlns:a="http://schemas.openxmlformats.org/drawingml/2006/main" xmlns:r="http://schemas.openxmlformats.org/officeDocument/2006/relationships" xmlns:p="http://schemas.openxmlformats.org/presentationml/2006/main">
   <p:cSld>
     <p:spTree>
@@ -15849,7 +16471,7 @@
             <a:fld id="{2BF067CD-8E6B-4360-9AA8-C5DF2A48A6D1}" type="slidenum">
               <a:rPr lang="en-US" noProof="0" smtClean="0"/>
               <a:pPr/>
-              <a:t>25</a:t>
+              <a:t>27</a:t>
             </a:fld>
             <a:endParaRPr lang="en-US" noProof="0" dirty="0"/>
           </a:p>

</xml_diff>

<commit_message>
Fixing images for IT Systems presentation
</commit_message>
<xml_diff>
--- a/Courses/Software-Sciences/Module-3-Databases-New/01-IT-Systems/01-IT-Systems.pptx
+++ b/Courses/Software-Sciences/Module-3-Databases-New/01-IT-Systems/01-IT-Systems.pptx
@@ -462,7 +462,7 @@
           <a:p>
             <a:fld id="{4E087215-0C8F-4762-A664-737A353EC9A4}" type="datetimeFigureOut">
               <a:rPr lang="bg-BG" smtClean="0"/>
-              <a:t>25.11.2023 г.</a:t>
+              <a:t>27.11.2023 г.</a:t>
             </a:fld>
             <a:endParaRPr lang="bg-BG"/>
           </a:p>
@@ -658,7 +658,7 @@
           <a:p>
             <a:fld id="{72D84649-876A-46C9-8472-14CB09C070D8}" type="datetimeFigureOut">
               <a:rPr lang="en-US" smtClean="0"/>
-              <a:t>11/25/2023</a:t>
+              <a:t>11/27/2023</a:t>
             </a:fld>
             <a:endParaRPr lang="en-US"/>
           </a:p>
@@ -13637,8 +13637,8 @@
         </p:blipFill>
         <p:spPr>
           <a:xfrm>
-            <a:off x="471000" y="4451104"/>
-            <a:ext cx="2029108" cy="1047896"/>
+            <a:off x="538103" y="4470287"/>
+            <a:ext cx="2526954" cy="1304999"/>
           </a:xfrm>
           <a:prstGeom prst="rect">
             <a:avLst/>
@@ -13666,8 +13666,8 @@
         </p:nvSpPr>
         <p:spPr bwMode="auto">
           <a:xfrm>
-            <a:off x="2991000" y="4637584"/>
-            <a:ext cx="1215000" cy="630000"/>
+            <a:off x="3733103" y="4932235"/>
+            <a:ext cx="734988" cy="381105"/>
           </a:xfrm>
           <a:prstGeom prst="rightArrow">
             <a:avLst/>
@@ -13730,10 +13730,10 @@
       </p:sp>
       <p:pic>
         <p:nvPicPr>
-          <p:cNvPr id="11" name="Picture 10">
+          <p:cNvPr id="14" name="Picture 13">
             <a:extLst>
               <a:ext uri="{FF2B5EF4-FFF2-40B4-BE49-F238E27FC236}">
-                <a16:creationId xmlns:a16="http://schemas.microsoft.com/office/drawing/2014/main" id="{6F4E9BA3-8E3F-2479-69D0-0F7275146D14}"/>
+                <a16:creationId xmlns:a16="http://schemas.microsoft.com/office/drawing/2014/main" id="{6E2DC618-0D26-1E0C-3C4E-A317297AF29E}"/>
               </a:ext>
             </a:extLst>
           </p:cNvPr>
@@ -13750,8 +13750,8 @@
         </p:blipFill>
         <p:spPr>
           <a:xfrm>
-            <a:off x="4566000" y="4447184"/>
-            <a:ext cx="7184508" cy="1051816"/>
+            <a:off x="4999674" y="4132103"/>
+            <a:ext cx="6811326" cy="1771897"/>
           </a:xfrm>
           <a:prstGeom prst="rect">
             <a:avLst/>
@@ -13889,7 +13889,7 @@
                                           </p:stCondLst>
                                         </p:cTn>
                                         <p:tgtEl>
-                                          <p:spTgt spid="11"/>
+                                          <p:spTgt spid="14"/>
                                         </p:tgtEl>
                                         <p:attrNameLst>
                                           <p:attrName>style.visibility</p:attrName>

</xml_diff>

<commit_message>
Add example for TPS system
</commit_message>
<xml_diff>
--- a/Courses/Software-Sciences/Module-3-Databases-New/01-IT-Systems/01-IT-Systems.pptx
+++ b/Courses/Software-Sciences/Module-3-Databases-New/01-IT-Systems/01-IT-Systems.pptx
@@ -460,7 +460,7 @@
           <a:p>
             <a:fld id="{4E087215-0C8F-4762-A664-737A353EC9A4}" type="datetimeFigureOut">
               <a:rPr lang="bg-BG" smtClean="0"/>
-              <a:t>15.07.24 г.</a:t>
+              <a:t>15.7.2024 г.</a:t>
             </a:fld>
             <a:endParaRPr lang="bg-BG"/>
           </a:p>
@@ -656,7 +656,7 @@
           <a:p>
             <a:fld id="{72D84649-876A-46C9-8472-14CB09C070D8}" type="datetimeFigureOut">
               <a:rPr lang="en-US" smtClean="0"/>
-              <a:t>7/15/24</a:t>
+              <a:t>7/15/2024</a:t>
             </a:fld>
             <a:endParaRPr lang="en-US"/>
           </a:p>
@@ -13999,7 +13999,12 @@
             <p:ph type="sldNum" sz="quarter" idx="5"/>
           </p:nvPr>
         </p:nvSpPr>
-        <p:spPr/>
+        <p:spPr>
+          <a:xfrm>
+            <a:off x="11753030" y="6507000"/>
+            <a:ext cx="367414" cy="297000"/>
+          </a:xfrm>
+        </p:spPr>
         <p:txBody>
           <a:bodyPr/>
           <a:lstStyle/>
@@ -14015,10 +14020,10 @@
       </p:sp>
       <p:sp>
         <p:nvSpPr>
-          <p:cNvPr id="3" name="Text Placeholder 2">
+          <p:cNvPr id="9" name="Text Placeholder 8">
             <a:extLst>
               <a:ext uri="{FF2B5EF4-FFF2-40B4-BE49-F238E27FC236}">
-                <a16:creationId xmlns:a16="http://schemas.microsoft.com/office/drawing/2014/main" id="{2E1EA04E-E9E8-4E29-D34C-B177E0745259}"/>
+                <a16:creationId xmlns:a16="http://schemas.microsoft.com/office/drawing/2014/main" id="{6CBF07E6-408A-4A59-C68C-2933AFC83AD6}"/>
               </a:ext>
             </a:extLst>
           </p:cNvPr>
@@ -14031,20 +14036,62 @@
         </p:nvSpPr>
         <p:spPr/>
         <p:txBody>
-          <a:bodyPr>
-            <a:noAutofit/>
-          </a:bodyPr>
+          <a:bodyPr/>
           <a:lstStyle/>
           <a:p>
             <a:r>
-              <a:rPr lang="en-US" sz="10000" b="1" dirty="0">
-                <a:highlight>
-                  <a:srgbClr val="FFFF00"/>
-                </a:highlight>
+              <a:rPr lang="ru-RU" b="1" dirty="0"/>
+              <a:t>Square</a:t>
+            </a:r>
+            <a:r>
+              <a:rPr lang="ru-RU" dirty="0"/>
+              <a:t> е известна със своите </a:t>
+            </a:r>
+            <a:r>
+              <a:rPr lang="ru-RU" b="1" dirty="0"/>
+              <a:t>услуги</a:t>
+            </a:r>
+            <a:r>
+              <a:rPr lang="ru-RU" dirty="0"/>
+              <a:t> за </a:t>
+            </a:r>
+            <a:r>
+              <a:rPr lang="ru-RU" b="1" dirty="0">
+                <a:solidFill>
+                  <a:schemeClr val="bg1"/>
+                </a:solidFill>
               </a:rPr>
-              <a:t>TODO: Screenshot with example of TPS</a:t>
-            </a:r>
-            <a:endParaRPr lang="bg-BG" sz="10000" b="1" dirty="0"/>
+              <a:t>обработка</a:t>
+            </a:r>
+            <a:r>
+              <a:rPr lang="ru-RU" dirty="0"/>
+              <a:t> на </a:t>
+            </a:r>
+            <a:r>
+              <a:rPr lang="ru-RU" b="1" dirty="0">
+                <a:solidFill>
+                  <a:schemeClr val="bg1"/>
+                </a:solidFill>
+              </a:rPr>
+              <a:t>плащания</a:t>
+            </a:r>
+            <a:r>
+              <a:rPr lang="ru-RU" dirty="0"/>
+              <a:t>, които позволяват на търговците да приемат </a:t>
+            </a:r>
+            <a:r>
+              <a:rPr lang="ru-RU" b="1" dirty="0"/>
+              <a:t>кредитни карти </a:t>
+            </a:r>
+            <a:r>
+              <a:rPr lang="ru-RU" dirty="0"/>
+              <a:t>и други видове </a:t>
+            </a:r>
+            <a:r>
+              <a:rPr lang="ru-RU" b="1" dirty="0"/>
+              <a:t>електронни плащания</a:t>
+            </a:r>
+            <a:endParaRPr lang="en-US" b="1" dirty="0"/>
           </a:p>
         </p:txBody>
       </p:sp>
@@ -14064,7 +14111,12 @@
             <p:ph type="title"/>
           </p:nvPr>
         </p:nvSpPr>
-        <p:spPr/>
+        <p:spPr>
+          <a:xfrm>
+            <a:off x="190406" y="100750"/>
+            <a:ext cx="10270594" cy="882654"/>
+          </a:xfrm>
+        </p:spPr>
         <p:txBody>
           <a:bodyPr/>
           <a:lstStyle/>
@@ -14077,14 +14129,46 @@
               <a:rPr lang="bg-BG" dirty="0"/>
               <a:t>система – пример</a:t>
             </a:r>
-            <a:endParaRPr lang="bg-BG" dirty="0">
-              <a:highlight>
-                <a:srgbClr val="FFFF00"/>
-              </a:highlight>
-            </a:endParaRPr>
           </a:p>
         </p:txBody>
       </p:sp>
+      <p:pic>
+        <p:nvPicPr>
+          <p:cNvPr id="11" name="Picture 10">
+            <a:extLst>
+              <a:ext uri="{FF2B5EF4-FFF2-40B4-BE49-F238E27FC236}">
+                <a16:creationId xmlns:a16="http://schemas.microsoft.com/office/drawing/2014/main" id="{7D1B96E8-A808-C253-8586-BE25010731B0}"/>
+              </a:ext>
+            </a:extLst>
+          </p:cNvPr>
+          <p:cNvPicPr>
+            <a:picLocks noChangeAspect="1"/>
+          </p:cNvPicPr>
+          <p:nvPr/>
+        </p:nvPicPr>
+        <p:blipFill>
+          <a:blip r:embed="rId2"/>
+          <a:stretch>
+            <a:fillRect/>
+          </a:stretch>
+        </p:blipFill>
+        <p:spPr>
+          <a:xfrm>
+            <a:off x="3054662" y="3078163"/>
+            <a:ext cx="6081289" cy="3429000"/>
+          </a:xfrm>
+          <a:prstGeom prst="rect">
+            <a:avLst/>
+          </a:prstGeom>
+          <a:ln>
+            <a:solidFill>
+              <a:schemeClr val="bg2">
+                <a:lumMod val="75000"/>
+              </a:schemeClr>
+            </a:solidFill>
+          </a:ln>
+        </p:spPr>
+      </p:pic>
     </p:spTree>
     <p:extLst>
       <p:ext uri="{BB962C8B-B14F-4D97-AF65-F5344CB8AC3E}">

</xml_diff>